<commit_message>
adding OnBoarding Squad changes
Signed-off-by: zFernand0 <fernando.rijocedeno@broadcom.com>
</commit_message>
<xml_diff>
--- a/Project Management/20PI3 Planning/Zowe Community Squad Focus for 20PI3.pptx
+++ b/Project Management/20PI3 Planning/Zowe Community Squad Focus for 20PI3.pptx
@@ -5,7 +5,7 @@
     <p:sldMasterId id="2147483653" r:id="rId4"/>
   </p:sldMasterIdLst>
   <p:notesMasterIdLst>
-    <p:notesMasterId r:id="rId26"/>
+    <p:notesMasterId r:id="rId27"/>
   </p:notesMasterIdLst>
   <p:sldIdLst>
     <p:sldId id="279" r:id="rId5"/>
@@ -23,27 +23,28 @@
     <p:sldId id="2142532363" r:id="rId17"/>
     <p:sldId id="2142532359" r:id="rId18"/>
     <p:sldId id="2142532366" r:id="rId19"/>
-    <p:sldId id="2142532356" r:id="rId20"/>
-    <p:sldId id="2142532364" r:id="rId21"/>
-    <p:sldId id="2142532357" r:id="rId22"/>
-    <p:sldId id="2142532365" r:id="rId23"/>
-    <p:sldId id="2142532358" r:id="rId24"/>
-    <p:sldId id="2142532367" r:id="rId25"/>
+    <p:sldId id="2142532370" r:id="rId20"/>
+    <p:sldId id="2142532356" r:id="rId21"/>
+    <p:sldId id="2142532364" r:id="rId22"/>
+    <p:sldId id="2142532357" r:id="rId23"/>
+    <p:sldId id="2142532365" r:id="rId24"/>
+    <p:sldId id="2142532358" r:id="rId25"/>
+    <p:sldId id="2142532367" r:id="rId26"/>
   </p:sldIdLst>
   <p:sldSz cx="9144000" cy="5143500" type="screen16x9"/>
   <p:notesSz cx="6858000" cy="9144000"/>
   <p:embeddedFontLst>
     <p:embeddedFont>
-      <p:font typeface="Calibri" panose="020F0502020204030204" pitchFamily="34" charset="0"/>
-      <p:regular r:id="rId27"/>
-      <p:bold r:id="rId28"/>
-      <p:italic r:id="rId29"/>
-      <p:boldItalic r:id="rId30"/>
+      <p:font typeface="Gill Sans" panose="020B0604020202020204" charset="0"/>
+      <p:regular r:id="rId28"/>
+      <p:bold r:id="rId29"/>
     </p:embeddedFont>
     <p:embeddedFont>
-      <p:font typeface="Gill Sans" panose="020B0604020202020204" charset="0"/>
-      <p:regular r:id="rId31"/>
-      <p:bold r:id="rId32"/>
+      <p:font typeface="Calibri" panose="020F0502020204030204" pitchFamily="34" charset="0"/>
+      <p:regular r:id="rId30"/>
+      <p:bold r:id="rId31"/>
+      <p:italic r:id="rId32"/>
+      <p:boldItalic r:id="rId33"/>
     </p:embeddedFont>
   </p:embeddedFontLst>
   <p:defaultTextStyle>
@@ -1016,7 +1017,12 @@
             <p:ph type="sldImg"/>
           </p:nvPr>
         </p:nvSpPr>
-        <p:spPr/>
+        <p:spPr>
+          <a:xfrm>
+            <a:off x="381000" y="685800"/>
+            <a:ext cx="6096000" cy="3429000"/>
+          </a:xfrm>
+        </p:spPr>
       </p:sp>
       <p:sp>
         <p:nvSpPr>
@@ -1406,6 +1412,100 @@
     <p:extLst>
       <p:ext uri="{BB962C8B-B14F-4D97-AF65-F5344CB8AC3E}">
         <p14:creationId xmlns:p14="http://schemas.microsoft.com/office/powerpoint/2010/main" val="2138370677"/>
+      </p:ext>
+    </p:extLst>
+  </p:cSld>
+  <p:clrMapOvr>
+    <a:masterClrMapping/>
+  </p:clrMapOvr>
+</p:notes>
+</file>
+
+<file path=ppt/notesSlides/notesSlide5.xml><?xml version="1.0" encoding="utf-8"?>
+<p:notes xmlns:a="http://schemas.openxmlformats.org/drawingml/2006/main" xmlns:r="http://schemas.openxmlformats.org/officeDocument/2006/relationships" xmlns:p="http://schemas.openxmlformats.org/presentationml/2006/main">
+  <p:cSld>
+    <p:spTree>
+      <p:nvGrpSpPr>
+        <p:cNvPr id="1" name=""/>
+        <p:cNvGrpSpPr/>
+        <p:nvPr/>
+      </p:nvGrpSpPr>
+      <p:grpSpPr>
+        <a:xfrm>
+          <a:off x="0" y="0"/>
+          <a:ext cx="0" cy="0"/>
+          <a:chOff x="0" y="0"/>
+          <a:chExt cx="0" cy="0"/>
+        </a:xfrm>
+      </p:grpSpPr>
+      <p:sp>
+        <p:nvSpPr>
+          <p:cNvPr id="2" name="Slide Image Placeholder 1"/>
+          <p:cNvSpPr>
+            <a:spLocks noGrp="1" noRot="1" noChangeAspect="1"/>
+          </p:cNvSpPr>
+          <p:nvPr>
+            <p:ph type="sldImg"/>
+          </p:nvPr>
+        </p:nvSpPr>
+        <p:spPr>
+          <a:xfrm>
+            <a:off x="381000" y="685800"/>
+            <a:ext cx="6096000" cy="3429000"/>
+          </a:xfrm>
+        </p:spPr>
+      </p:sp>
+      <p:sp>
+        <p:nvSpPr>
+          <p:cNvPr id="3" name="Notes Placeholder 2"/>
+          <p:cNvSpPr>
+            <a:spLocks noGrp="1"/>
+          </p:cNvSpPr>
+          <p:nvPr>
+            <p:ph type="body" idx="1"/>
+          </p:nvPr>
+        </p:nvSpPr>
+        <p:spPr/>
+        <p:txBody>
+          <a:bodyPr/>
+          <a:lstStyle/>
+          <a:p>
+            <a:pPr marL="457200" marR="0" lvl="0" indent="-298450" algn="l" defTabSz="914400" rtl="0" eaLnBrk="1" fontAlgn="auto" latinLnBrk="0" hangingPunct="1">
+              <a:lnSpc>
+                <a:spcPct val="100000"/>
+              </a:lnSpc>
+              <a:spcBef>
+                <a:spcPts val="0"/>
+              </a:spcBef>
+              <a:spcAft>
+                <a:spcPts val="0"/>
+              </a:spcAft>
+              <a:buClr>
+                <a:srgbClr val="000000"/>
+              </a:buClr>
+              <a:buSzPts val="1100"/>
+              <a:buFont typeface="Arial"/>
+              <a:buChar char="●"/>
+              <a:tabLst/>
+              <a:defRPr/>
+            </a:pPr>
+            <a:r>
+              <a:rPr lang="en-US" dirty="0" smtClean="0"/>
+              <a:t>Leverage new UX members / design thinking / persona identification Onboarding New Members</a:t>
+            </a:r>
+          </a:p>
+          <a:p>
+            <a:pPr marL="158750" indent="0">
+              <a:buNone/>
+            </a:pPr>
+            <a:endParaRPr lang="en-US" dirty="0"/>
+          </a:p>
+        </p:txBody>
+      </p:sp>
+    </p:spTree>
+    <p:extLst>
+      <p:ext uri="{BB962C8B-B14F-4D97-AF65-F5344CB8AC3E}">
+        <p14:creationId xmlns:p14="http://schemas.microsoft.com/office/powerpoint/2010/main" val="1618876320"/>
       </p:ext>
     </p:extLst>
   </p:cSld>
@@ -5715,6 +5815,171 @@
       </p:grpSpPr>
       <p:sp>
         <p:nvSpPr>
+          <p:cNvPr id="3" name="Title 2">
+            <a:extLst>
+              <a:ext uri="{FF2B5EF4-FFF2-40B4-BE49-F238E27FC236}">
+                <a16:creationId xmlns:a16="http://schemas.microsoft.com/office/drawing/2014/main" id="{CFEEEE36-E132-0D40-A4B8-9BDC5C8B6528}"/>
+              </a:ext>
+            </a:extLst>
+          </p:cNvPr>
+          <p:cNvSpPr>
+            <a:spLocks noGrp="1"/>
+          </p:cNvSpPr>
+          <p:nvPr>
+            <p:ph type="title"/>
+          </p:nvPr>
+        </p:nvSpPr>
+        <p:spPr/>
+        <p:txBody>
+          <a:bodyPr/>
+          <a:lstStyle/>
+          <a:p>
+            <a:r>
+              <a:rPr lang="en-US" dirty="0"/>
+              <a:t>Focus</a:t>
+            </a:r>
+          </a:p>
+        </p:txBody>
+      </p:sp>
+      <p:sp>
+        <p:nvSpPr>
+          <p:cNvPr id="4" name="Text Placeholder 3">
+            <a:extLst>
+              <a:ext uri="{FF2B5EF4-FFF2-40B4-BE49-F238E27FC236}">
+                <a16:creationId xmlns:a16="http://schemas.microsoft.com/office/drawing/2014/main" id="{C0DB4ECB-A7D5-6B47-8180-75CB3C3DB7DE}"/>
+              </a:ext>
+            </a:extLst>
+          </p:cNvPr>
+          <p:cNvSpPr>
+            <a:spLocks noGrp="1"/>
+          </p:cNvSpPr>
+          <p:nvPr>
+            <p:ph type="body" idx="1"/>
+          </p:nvPr>
+        </p:nvSpPr>
+        <p:spPr>
+          <a:xfrm>
+            <a:off x="317500" y="943428"/>
+            <a:ext cx="8369400" cy="4085772"/>
+          </a:xfrm>
+        </p:spPr>
+        <p:txBody>
+          <a:bodyPr/>
+          <a:lstStyle/>
+          <a:p>
+            <a:r>
+              <a:rPr lang="en-US" dirty="0" smtClean="0"/>
+              <a:t>Further Conformance Process Maturity</a:t>
+            </a:r>
+          </a:p>
+          <a:p>
+            <a:pPr lvl="1"/>
+            <a:r>
+              <a:rPr lang="en-US" dirty="0" smtClean="0"/>
+              <a:t>Active LTS conformance test criteria updates / incremental badging / app-store-like landscape page</a:t>
+            </a:r>
+          </a:p>
+          <a:p>
+            <a:pPr lvl="1"/>
+            <a:r>
+              <a:rPr lang="en-US" dirty="0" smtClean="0"/>
+              <a:t>Active LTS conformance change requests (test criteria &amp; submitter form)</a:t>
+            </a:r>
+          </a:p>
+          <a:p>
+            <a:r>
+              <a:rPr lang="en-US" dirty="0" smtClean="0"/>
+              <a:t>Increase focus on Outreach</a:t>
+            </a:r>
+          </a:p>
+          <a:p>
+            <a:pPr lvl="1"/>
+            <a:r>
+              <a:rPr lang="en-US" dirty="0" smtClean="0"/>
+              <a:t>Webinars &amp; Marketing</a:t>
+            </a:r>
+          </a:p>
+          <a:p>
+            <a:r>
+              <a:rPr lang="en-US" dirty="0" smtClean="0"/>
+              <a:t>Improve Onboarding experience</a:t>
+            </a:r>
+          </a:p>
+          <a:p>
+            <a:pPr lvl="1"/>
+            <a:r>
+              <a:rPr lang="en-US" dirty="0" smtClean="0"/>
+              <a:t>Improve/influence Zowe.org website navigation</a:t>
+            </a:r>
+          </a:p>
+          <a:p>
+            <a:pPr lvl="1"/>
+            <a:r>
+              <a:rPr lang="en-US" dirty="0" smtClean="0"/>
+              <a:t>Accurately “direct” new-to-Zowe visitors</a:t>
+            </a:r>
+          </a:p>
+          <a:p>
+            <a:r>
+              <a:rPr lang="en-US" dirty="0" smtClean="0"/>
+              <a:t>Continue and transition stat reporting (KPI-centric)</a:t>
+            </a:r>
+          </a:p>
+          <a:p>
+            <a:pPr lvl="1"/>
+            <a:r>
+              <a:rPr lang="en-US" dirty="0" smtClean="0"/>
+              <a:t>Identify trends &amp; influencers</a:t>
+            </a:r>
+          </a:p>
+          <a:p>
+            <a:pPr lvl="1"/>
+            <a:r>
+              <a:rPr lang="en-US" dirty="0" smtClean="0"/>
+              <a:t>Easy prep for all Zowe Communications</a:t>
+            </a:r>
+          </a:p>
+          <a:p>
+            <a:pPr lvl="1"/>
+            <a:endParaRPr lang="en-US" dirty="0"/>
+          </a:p>
+        </p:txBody>
+      </p:sp>
+    </p:spTree>
+    <p:extLst>
+      <p:ext uri="{BB962C8B-B14F-4D97-AF65-F5344CB8AC3E}">
+        <p14:creationId xmlns:p14="http://schemas.microsoft.com/office/powerpoint/2010/main" val="345901736"/>
+      </p:ext>
+    </p:extLst>
+  </p:cSld>
+  <p:clrMapOvr>
+    <a:masterClrMapping/>
+  </p:clrMapOvr>
+  <p:transition spd="med">
+    <p:fade thruBlk="1"/>
+  </p:transition>
+</p:sld>
+</file>
+
+<file path=ppt/slides/slide17.xml><?xml version="1.0" encoding="utf-8"?>
+<p:sld xmlns:a="http://schemas.openxmlformats.org/drawingml/2006/main" xmlns:r="http://schemas.openxmlformats.org/officeDocument/2006/relationships" xmlns:p="http://schemas.openxmlformats.org/presentationml/2006/main">
+  <p:cSld>
+    <p:spTree>
+      <p:nvGrpSpPr>
+        <p:cNvPr id="1" name=""/>
+        <p:cNvGrpSpPr/>
+        <p:nvPr/>
+      </p:nvGrpSpPr>
+      <p:grpSpPr>
+        <a:xfrm>
+          <a:off x="0" y="0"/>
+          <a:ext cx="0" cy="0"/>
+          <a:chOff x="0" y="0"/>
+          <a:chExt cx="0" cy="0"/>
+        </a:xfrm>
+      </p:grpSpPr>
+      <p:sp>
+        <p:nvSpPr>
           <p:cNvPr id="2" name="Text Placeholder 1">
             <a:extLst>
               <a:ext uri="{FF2B5EF4-FFF2-40B4-BE49-F238E27FC236}">
@@ -5771,7 +6036,7 @@
 </p:sld>
 </file>
 
-<file path=ppt/slides/slide17.xml><?xml version="1.0" encoding="utf-8"?>
+<file path=ppt/slides/slide18.xml><?xml version="1.0" encoding="utf-8"?>
 <p:sld xmlns:a="http://schemas.openxmlformats.org/drawingml/2006/main" xmlns:r="http://schemas.openxmlformats.org/officeDocument/2006/relationships" xmlns:p="http://schemas.openxmlformats.org/presentationml/2006/main">
   <p:cSld>
     <p:spTree>
@@ -5868,7 +6133,7 @@
 </p:sld>
 </file>
 
-<file path=ppt/slides/slide18.xml><?xml version="1.0" encoding="utf-8"?>
+<file path=ppt/slides/slide19.xml><?xml version="1.0" encoding="utf-8"?>
 <p:sld xmlns:a="http://schemas.openxmlformats.org/drawingml/2006/main" xmlns:r="http://schemas.openxmlformats.org/officeDocument/2006/relationships" xmlns:p="http://schemas.openxmlformats.org/presentationml/2006/main">
   <p:cSld>
     <p:spTree>
@@ -5936,103 +6201,6 @@
   </p:clrMapOvr>
   <p:transition spd="med">
     <p:fade/>
-  </p:transition>
-</p:sld>
-</file>
-
-<file path=ppt/slides/slide19.xml><?xml version="1.0" encoding="utf-8"?>
-<p:sld xmlns:a="http://schemas.openxmlformats.org/drawingml/2006/main" xmlns:r="http://schemas.openxmlformats.org/officeDocument/2006/relationships" xmlns:p="http://schemas.openxmlformats.org/presentationml/2006/main">
-  <p:cSld>
-    <p:spTree>
-      <p:nvGrpSpPr>
-        <p:cNvPr id="1" name=""/>
-        <p:cNvGrpSpPr/>
-        <p:nvPr/>
-      </p:nvGrpSpPr>
-      <p:grpSpPr>
-        <a:xfrm>
-          <a:off x="0" y="0"/>
-          <a:ext cx="0" cy="0"/>
-          <a:chOff x="0" y="0"/>
-          <a:chExt cx="0" cy="0"/>
-        </a:xfrm>
-      </p:grpSpPr>
-      <p:sp>
-        <p:nvSpPr>
-          <p:cNvPr id="3" name="Title 2">
-            <a:extLst>
-              <a:ext uri="{FF2B5EF4-FFF2-40B4-BE49-F238E27FC236}">
-                <a16:creationId xmlns:a16="http://schemas.microsoft.com/office/drawing/2014/main" id="{CFEEEE36-E132-0D40-A4B8-9BDC5C8B6528}"/>
-              </a:ext>
-            </a:extLst>
-          </p:cNvPr>
-          <p:cNvSpPr>
-            <a:spLocks noGrp="1"/>
-          </p:cNvSpPr>
-          <p:nvPr>
-            <p:ph type="title"/>
-          </p:nvPr>
-        </p:nvSpPr>
-        <p:spPr/>
-        <p:txBody>
-          <a:bodyPr/>
-          <a:lstStyle/>
-          <a:p>
-            <a:r>
-              <a:rPr lang="en-US" dirty="0"/>
-              <a:t>Features</a:t>
-            </a:r>
-          </a:p>
-        </p:txBody>
-      </p:sp>
-      <p:sp>
-        <p:nvSpPr>
-          <p:cNvPr id="4" name="Text Placeholder 3">
-            <a:extLst>
-              <a:ext uri="{FF2B5EF4-FFF2-40B4-BE49-F238E27FC236}">
-                <a16:creationId xmlns:a16="http://schemas.microsoft.com/office/drawing/2014/main" id="{C0DB4ECB-A7D5-6B47-8180-75CB3C3DB7DE}"/>
-              </a:ext>
-            </a:extLst>
-          </p:cNvPr>
-          <p:cNvSpPr>
-            <a:spLocks noGrp="1"/>
-          </p:cNvSpPr>
-          <p:nvPr>
-            <p:ph type="body" idx="1"/>
-          </p:nvPr>
-        </p:nvSpPr>
-        <p:spPr/>
-        <p:txBody>
-          <a:bodyPr/>
-          <a:lstStyle/>
-          <a:p>
-            <a:r>
-              <a:rPr lang="en-US" dirty="0"/>
-              <a:t>Feature </a:t>
-            </a:r>
-            <a:r>
-              <a:rPr lang="en-US" dirty="0" err="1"/>
-              <a:t>xxxx</a:t>
-            </a:r>
-            <a:r>
-              <a:rPr lang="en-US" dirty="0"/>
-              <a:t> (in support of theme xxx)</a:t>
-            </a:r>
-          </a:p>
-        </p:txBody>
-      </p:sp>
-    </p:spTree>
-    <p:extLst>
-      <p:ext uri="{BB962C8B-B14F-4D97-AF65-F5344CB8AC3E}">
-        <p14:creationId xmlns:p14="http://schemas.microsoft.com/office/powerpoint/2010/main" val="3391740602"/>
-      </p:ext>
-    </p:extLst>
-  </p:cSld>
-  <p:clrMapOvr>
-    <a:masterClrMapping/>
-  </p:clrMapOvr>
-  <p:transition spd="med">
-    <p:fade thruBlk="1"/>
   </p:transition>
 </p:sld>
 </file>
@@ -6185,6 +6353,103 @@
       </p:grpSpPr>
       <p:sp>
         <p:nvSpPr>
+          <p:cNvPr id="3" name="Title 2">
+            <a:extLst>
+              <a:ext uri="{FF2B5EF4-FFF2-40B4-BE49-F238E27FC236}">
+                <a16:creationId xmlns:a16="http://schemas.microsoft.com/office/drawing/2014/main" id="{CFEEEE36-E132-0D40-A4B8-9BDC5C8B6528}"/>
+              </a:ext>
+            </a:extLst>
+          </p:cNvPr>
+          <p:cNvSpPr>
+            <a:spLocks noGrp="1"/>
+          </p:cNvSpPr>
+          <p:nvPr>
+            <p:ph type="title"/>
+          </p:nvPr>
+        </p:nvSpPr>
+        <p:spPr/>
+        <p:txBody>
+          <a:bodyPr/>
+          <a:lstStyle/>
+          <a:p>
+            <a:r>
+              <a:rPr lang="en-US" dirty="0"/>
+              <a:t>Features</a:t>
+            </a:r>
+          </a:p>
+        </p:txBody>
+      </p:sp>
+      <p:sp>
+        <p:nvSpPr>
+          <p:cNvPr id="4" name="Text Placeholder 3">
+            <a:extLst>
+              <a:ext uri="{FF2B5EF4-FFF2-40B4-BE49-F238E27FC236}">
+                <a16:creationId xmlns:a16="http://schemas.microsoft.com/office/drawing/2014/main" id="{C0DB4ECB-A7D5-6B47-8180-75CB3C3DB7DE}"/>
+              </a:ext>
+            </a:extLst>
+          </p:cNvPr>
+          <p:cNvSpPr>
+            <a:spLocks noGrp="1"/>
+          </p:cNvSpPr>
+          <p:nvPr>
+            <p:ph type="body" idx="1"/>
+          </p:nvPr>
+        </p:nvSpPr>
+        <p:spPr/>
+        <p:txBody>
+          <a:bodyPr/>
+          <a:lstStyle/>
+          <a:p>
+            <a:r>
+              <a:rPr lang="en-US" dirty="0"/>
+              <a:t>Feature </a:t>
+            </a:r>
+            <a:r>
+              <a:rPr lang="en-US" dirty="0" err="1"/>
+              <a:t>xxxx</a:t>
+            </a:r>
+            <a:r>
+              <a:rPr lang="en-US" dirty="0"/>
+              <a:t> (in support of theme xxx)</a:t>
+            </a:r>
+          </a:p>
+        </p:txBody>
+      </p:sp>
+    </p:spTree>
+    <p:extLst>
+      <p:ext uri="{BB962C8B-B14F-4D97-AF65-F5344CB8AC3E}">
+        <p14:creationId xmlns:p14="http://schemas.microsoft.com/office/powerpoint/2010/main" val="3391740602"/>
+      </p:ext>
+    </p:extLst>
+  </p:cSld>
+  <p:clrMapOvr>
+    <a:masterClrMapping/>
+  </p:clrMapOvr>
+  <p:transition spd="med">
+    <p:fade thruBlk="1"/>
+  </p:transition>
+</p:sld>
+</file>
+
+<file path=ppt/slides/slide21.xml><?xml version="1.0" encoding="utf-8"?>
+<p:sld xmlns:a="http://schemas.openxmlformats.org/drawingml/2006/main" xmlns:r="http://schemas.openxmlformats.org/officeDocument/2006/relationships" xmlns:p="http://schemas.openxmlformats.org/presentationml/2006/main">
+  <p:cSld>
+    <p:spTree>
+      <p:nvGrpSpPr>
+        <p:cNvPr id="1" name=""/>
+        <p:cNvGrpSpPr/>
+        <p:nvPr/>
+      </p:nvGrpSpPr>
+      <p:grpSpPr>
+        <a:xfrm>
+          <a:off x="0" y="0"/>
+          <a:ext cx="0" cy="0"/>
+          <a:chOff x="0" y="0"/>
+          <a:chExt cx="0" cy="0"/>
+        </a:xfrm>
+      </p:grpSpPr>
+      <p:sp>
+        <p:nvSpPr>
           <p:cNvPr id="2" name="Text Placeholder 1">
             <a:extLst>
               <a:ext uri="{FF2B5EF4-FFF2-40B4-BE49-F238E27FC236}">
@@ -6233,7 +6498,7 @@
 </p:sld>
 </file>
 
-<file path=ppt/slides/slide21.xml><?xml version="1.0" encoding="utf-8"?>
+<file path=ppt/slides/slide22.xml><?xml version="1.0" encoding="utf-8"?>
 <p:sld xmlns:a="http://schemas.openxmlformats.org/drawingml/2006/main" xmlns:r="http://schemas.openxmlformats.org/officeDocument/2006/relationships" xmlns:p="http://schemas.openxmlformats.org/presentationml/2006/main">
   <p:cSld>
     <p:spTree>
@@ -8174,18 +8439,18 @@
 </file>
 
 <file path=customXml/item2.xml><?xml version="1.0" encoding="utf-8"?>
-<p:properties xmlns:p="http://schemas.microsoft.com/office/2006/metadata/properties" xmlns:xsi="http://www.w3.org/2001/XMLSchema-instance" xmlns:pc="http://schemas.microsoft.com/office/infopath/2007/PartnerControls">
-  <documentManagement/>
-</p:properties>
-</file>
-
-<file path=customXml/item3.xml><?xml version="1.0" encoding="utf-8"?>
 <?mso-contentType ?>
 <FormTemplates xmlns="http://schemas.microsoft.com/sharepoint/v3/contenttype/forms">
   <Display>DocumentLibraryForm</Display>
   <Edit>DocumentLibraryForm</Edit>
   <New>DocumentLibraryForm</New>
 </FormTemplates>
+</file>
+
+<file path=customXml/item3.xml><?xml version="1.0" encoding="utf-8"?>
+<p:properties xmlns:p="http://schemas.microsoft.com/office/2006/metadata/properties" xmlns:xsi="http://www.w3.org/2001/XMLSchema-instance" xmlns:pc="http://schemas.microsoft.com/office/infopath/2007/PartnerControls">
+  <documentManagement/>
+</p:properties>
 </file>
 
 <file path=customXml/itemProps1.xml><?xml version="1.0" encoding="utf-8"?>
@@ -8208,6 +8473,14 @@
 </file>
 
 <file path=customXml/itemProps2.xml><?xml version="1.0" encoding="utf-8"?>
+<ds:datastoreItem xmlns:ds="http://schemas.openxmlformats.org/officeDocument/2006/customXml" ds:itemID="{B16FB3BA-9F7C-4CD8-B3AB-262CEFAAFDB4}">
+  <ds:schemaRefs>
+    <ds:schemaRef ds:uri="http://schemas.microsoft.com/sharepoint/v3/contenttype/forms"/>
+  </ds:schemaRefs>
+</ds:datastoreItem>
+</file>
+
+<file path=customXml/itemProps3.xml><?xml version="1.0" encoding="utf-8"?>
 <ds:datastoreItem xmlns:ds="http://schemas.openxmlformats.org/officeDocument/2006/customXml" ds:itemID="{0A54B724-95FE-4227-A509-89C0BE165019}">
   <ds:schemaRefs>
     <ds:schemaRef ds:uri="http://purl.org/dc/terms/"/>
@@ -8222,12 +8495,4 @@
     <ds:schemaRef ds:uri="http://www.w3.org/XML/1998/namespace"/>
   </ds:schemaRefs>
 </ds:datastoreItem>
-</file>
-
-<file path=customXml/itemProps3.xml><?xml version="1.0" encoding="utf-8"?>
-<ds:datastoreItem xmlns:ds="http://schemas.openxmlformats.org/officeDocument/2006/customXml" ds:itemID="{B16FB3BA-9F7C-4CD8-B3AB-262CEFAAFDB4}">
-  <ds:schemaRefs>
-    <ds:schemaRef ds:uri="http://schemas.microsoft.com/sharepoint/v3/contenttype/forms"/>
-  </ds:schemaRefs>
-</ds:datastoreItem>
 </file>
</xml_diff>

<commit_message>
systems squad and deployments wg
Signed-off-by: MarkAckert <mark.ackert@broadcom.com>
</commit_message>
<xml_diff>
--- a/Project Management/20PI3 Planning/Zowe Community Squad Focus for 20PI3.pptx
+++ b/Project Management/20PI3 Planning/Zowe Community Squad Focus for 20PI3.pptx
@@ -35,16 +35,16 @@
   <p:notesSz cx="6858000" cy="9144000"/>
   <p:embeddedFontLst>
     <p:embeddedFont>
-      <p:font typeface="Gill Sans" panose="020B0604020202020204" charset="0"/>
+      <p:font typeface="Calibri" panose="020F0502020204030204" pitchFamily="34" charset="0"/>
       <p:regular r:id="rId28"/>
       <p:bold r:id="rId29"/>
+      <p:italic r:id="rId30"/>
+      <p:boldItalic r:id="rId31"/>
     </p:embeddedFont>
     <p:embeddedFont>
-      <p:font typeface="Calibri" panose="020F0502020204030204" pitchFamily="34" charset="0"/>
-      <p:regular r:id="rId30"/>
-      <p:bold r:id="rId31"/>
-      <p:italic r:id="rId32"/>
-      <p:boldItalic r:id="rId33"/>
+      <p:font typeface="Gill Sans" panose="020B0502020104020203" pitchFamily="34" charset="-79"/>
+      <p:regular r:id="rId32"/>
+      <p:bold r:id="rId33"/>
     </p:embeddedFont>
   </p:embeddedFontLst>
   <p:defaultTextStyle>
@@ -1043,7 +1043,7 @@
               <a:buNone/>
             </a:pPr>
             <a:r>
-              <a:rPr lang="en-US" sz="1100" b="0" i="0" u="none" strike="noStrike" cap="none" dirty="0" smtClean="0">
+              <a:rPr lang="en-US" sz="1100" b="0" i="0" u="none" strike="noStrike" cap="none" dirty="0">
                 <a:solidFill>
                   <a:srgbClr val="000000"/>
                 </a:solidFill>
@@ -1055,7 +1055,7 @@
               </a:rPr>
               <a:t>Notes: </a:t>
             </a:r>
-            <a:endParaRPr lang="en-US" b="0" dirty="0" smtClean="0">
+            <a:endParaRPr lang="en-US" b="0" dirty="0">
               <a:effectLst/>
             </a:endParaRPr>
           </a:p>
@@ -1064,7 +1064,7 @@
               <a:buNone/>
             </a:pPr>
             <a:r>
-              <a:rPr lang="en-US" sz="1100" b="0" i="0" u="none" strike="noStrike" cap="none" dirty="0" smtClean="0">
+              <a:rPr lang="en-US" sz="1100" b="0" i="0" u="none" strike="noStrike" cap="none" dirty="0">
                 <a:solidFill>
                   <a:srgbClr val="000000"/>
                 </a:solidFill>
@@ -1082,7 +1082,7 @@
               <a:buNone/>
             </a:pPr>
             <a:r>
-              <a:rPr lang="en-US" sz="1100" b="0" i="0" u="none" strike="noStrike" cap="none" dirty="0" err="1" smtClean="0">
+              <a:rPr lang="en-US" sz="1100" b="0" i="0" u="none" strike="noStrike" cap="none" dirty="0" err="1">
                 <a:solidFill>
                   <a:srgbClr val="000000"/>
                 </a:solidFill>
@@ -1095,7 +1095,7 @@
               <a:t>Zowe</a:t>
             </a:r>
             <a:r>
-              <a:rPr lang="en-US" sz="1100" b="0" i="0" u="none" strike="noStrike" cap="none" dirty="0" smtClean="0">
+              <a:rPr lang="en-US" sz="1100" b="0" i="0" u="none" strike="noStrike" cap="none" dirty="0">
                 <a:solidFill>
                   <a:srgbClr val="000000"/>
                 </a:solidFill>
@@ -1113,7 +1113,7 @@
               <a:buNone/>
             </a:pPr>
             <a:r>
-              <a:rPr lang="en-US" sz="1100" b="0" i="0" u="none" strike="noStrike" cap="none" dirty="0" smtClean="0">
+              <a:rPr lang="en-US" sz="1100" b="0" i="0" u="none" strike="noStrike" cap="none" dirty="0">
                 <a:solidFill>
                   <a:srgbClr val="000000"/>
                 </a:solidFill>
@@ -1200,7 +1200,7 @@
               <a:buNone/>
             </a:pPr>
             <a:r>
-              <a:rPr lang="en-US" sz="1100" b="0" i="0" u="none" strike="noStrike" cap="none" dirty="0" err="1" smtClean="0">
+              <a:rPr lang="en-US" sz="1100" b="0" i="0" u="none" strike="noStrike" cap="none" dirty="0" err="1">
                 <a:solidFill>
                   <a:srgbClr val="000000"/>
                 </a:solidFill>
@@ -1213,7 +1213,7 @@
               <a:t>Zowe</a:t>
             </a:r>
             <a:r>
-              <a:rPr lang="en-US" sz="1100" b="0" i="0" u="none" strike="noStrike" cap="none" dirty="0" smtClean="0">
+              <a:rPr lang="en-US" sz="1100" b="0" i="0" u="none" strike="noStrike" cap="none" dirty="0">
                 <a:solidFill>
                   <a:srgbClr val="000000"/>
                 </a:solidFill>
@@ -1231,7 +1231,7 @@
               <a:buNone/>
             </a:pPr>
             <a:r>
-              <a:rPr lang="en-US" sz="1100" b="0" i="0" u="none" strike="noStrike" cap="none" dirty="0" smtClean="0">
+              <a:rPr lang="en-US" sz="1100" b="0" i="0" u="none" strike="noStrike" cap="none" dirty="0">
                 <a:solidFill>
                   <a:srgbClr val="000000"/>
                 </a:solidFill>
@@ -1249,7 +1249,7 @@
               <a:buNone/>
             </a:pPr>
             <a:r>
-              <a:rPr lang="en-US" sz="1100" b="0" i="0" u="none" strike="noStrike" cap="none" dirty="0" smtClean="0">
+              <a:rPr lang="en-US" sz="1100" b="0" i="0" u="none" strike="noStrike" cap="none" dirty="0">
                 <a:solidFill>
                   <a:srgbClr val="000000"/>
                 </a:solidFill>
@@ -1267,7 +1267,7 @@
               <a:buNone/>
             </a:pPr>
             <a:r>
-              <a:rPr lang="en-US" sz="1100" b="0" i="0" u="none" strike="noStrike" cap="none" dirty="0" smtClean="0">
+              <a:rPr lang="en-US" sz="1100" b="0" i="0" u="none" strike="noStrike" cap="none" dirty="0">
                 <a:solidFill>
                   <a:srgbClr val="000000"/>
                 </a:solidFill>
@@ -1285,7 +1285,7 @@
               <a:buNone/>
             </a:pPr>
             <a:r>
-              <a:rPr lang="en-US" sz="1100" b="0" i="0" u="none" strike="noStrike" cap="none" dirty="0" smtClean="0">
+              <a:rPr lang="en-US" sz="1100" b="0" i="0" u="none" strike="noStrike" cap="none" dirty="0">
                 <a:solidFill>
                   <a:srgbClr val="000000"/>
                 </a:solidFill>
@@ -1303,7 +1303,7 @@
               <a:buNone/>
             </a:pPr>
             <a:r>
-              <a:rPr lang="en-US" sz="1100" b="0" i="0" u="none" strike="noStrike" cap="none" dirty="0" smtClean="0">
+              <a:rPr lang="en-US" sz="1100" b="0" i="0" u="none" strike="noStrike" cap="none" dirty="0">
                 <a:solidFill>
                   <a:srgbClr val="000000"/>
                 </a:solidFill>
@@ -1321,7 +1321,7 @@
               <a:buNone/>
             </a:pPr>
             <a:r>
-              <a:rPr lang="en-US" sz="1100" b="0" i="0" u="none" strike="noStrike" cap="none" dirty="0" smtClean="0">
+              <a:rPr lang="en-US" sz="1100" b="0" i="0" u="none" strike="noStrike" cap="none" dirty="0">
                 <a:solidFill>
                   <a:srgbClr val="000000"/>
                 </a:solidFill>
@@ -1490,7 +1490,7 @@
               <a:defRPr/>
             </a:pPr>
             <a:r>
-              <a:rPr lang="en-US" dirty="0" smtClean="0"/>
+              <a:rPr lang="en-US" dirty="0"/>
               <a:t>Leverage new UX members / design thinking / persona identification Onboarding New Members</a:t>
             </a:r>
           </a:p>
@@ -5868,74 +5868,74 @@
           <a:lstStyle/>
           <a:p>
             <a:r>
-              <a:rPr lang="en-US" dirty="0" smtClean="0"/>
+              <a:rPr lang="en-US" dirty="0"/>
               <a:t>Further Conformance Process Maturity</a:t>
             </a:r>
           </a:p>
           <a:p>
             <a:pPr lvl="1"/>
             <a:r>
-              <a:rPr lang="en-US" dirty="0" smtClean="0"/>
+              <a:rPr lang="en-US" dirty="0"/>
               <a:t>Active LTS conformance test criteria updates / incremental badging / app-store-like landscape page</a:t>
             </a:r>
           </a:p>
           <a:p>
             <a:pPr lvl="1"/>
             <a:r>
-              <a:rPr lang="en-US" dirty="0" smtClean="0"/>
+              <a:rPr lang="en-US" dirty="0"/>
               <a:t>Active LTS conformance change requests (test criteria &amp; submitter form)</a:t>
             </a:r>
           </a:p>
           <a:p>
             <a:r>
-              <a:rPr lang="en-US" dirty="0" smtClean="0"/>
+              <a:rPr lang="en-US" dirty="0"/>
               <a:t>Increase focus on Outreach</a:t>
             </a:r>
           </a:p>
           <a:p>
             <a:pPr lvl="1"/>
             <a:r>
-              <a:rPr lang="en-US" dirty="0" smtClean="0"/>
+              <a:rPr lang="en-US" dirty="0"/>
               <a:t>Webinars &amp; Marketing</a:t>
             </a:r>
           </a:p>
           <a:p>
             <a:r>
-              <a:rPr lang="en-US" dirty="0" smtClean="0"/>
+              <a:rPr lang="en-US" dirty="0"/>
               <a:t>Improve Onboarding experience</a:t>
             </a:r>
           </a:p>
           <a:p>
             <a:pPr lvl="1"/>
             <a:r>
-              <a:rPr lang="en-US" dirty="0" smtClean="0"/>
+              <a:rPr lang="en-US" dirty="0"/>
               <a:t>Improve/influence Zowe.org website navigation</a:t>
             </a:r>
           </a:p>
           <a:p>
             <a:pPr lvl="1"/>
             <a:r>
-              <a:rPr lang="en-US" dirty="0" smtClean="0"/>
+              <a:rPr lang="en-US" dirty="0"/>
               <a:t>Accurately “direct” new-to-Zowe visitors</a:t>
             </a:r>
           </a:p>
           <a:p>
             <a:r>
-              <a:rPr lang="en-US" dirty="0" smtClean="0"/>
+              <a:rPr lang="en-US" dirty="0"/>
               <a:t>Continue and transition stat reporting (KPI-centric)</a:t>
             </a:r>
           </a:p>
           <a:p>
             <a:pPr lvl="1"/>
             <a:r>
-              <a:rPr lang="en-US" dirty="0" smtClean="0"/>
+              <a:rPr lang="en-US" dirty="0"/>
               <a:t>Identify trends &amp; influencers</a:t>
             </a:r>
           </a:p>
           <a:p>
             <a:pPr lvl="1"/>
             <a:r>
-              <a:rPr lang="en-US" dirty="0" smtClean="0"/>
+              <a:rPr lang="en-US" dirty="0"/>
               <a:t>Easy prep for all Zowe Communications</a:t>
             </a:r>
           </a:p>
@@ -6001,7 +6001,7 @@
           <a:p>
             <a:r>
               <a:rPr lang="en-US" dirty="0"/>
-              <a:t>CI/CD Squad Focus</a:t>
+              <a:t>Systems Squad Focus</a:t>
             </a:r>
           </a:p>
           <a:p>
@@ -6016,6 +6016,16 @@
             <a:r>
               <a:rPr lang="en-US" sz="2000" dirty="0"/>
               <a:t> (Squad Lead)</a:t>
+            </a:r>
+          </a:p>
+          <a:p>
+            <a:r>
+              <a:rPr lang="en-US" sz="2000" dirty="0" err="1"/>
+              <a:t>f.k.a</a:t>
+            </a:r>
+            <a:r>
+              <a:rPr lang="en-US" sz="2000" dirty="0"/>
+              <a:t>. CI/CD Squad</a:t>
             </a:r>
           </a:p>
         </p:txBody>
@@ -6076,7 +6086,7 @@
           <a:p>
             <a:r>
               <a:rPr lang="en-US" dirty="0"/>
-              <a:t>Features</a:t>
+              <a:t>Focus</a:t>
             </a:r>
           </a:p>
         </p:txBody>
@@ -6104,15 +6114,81 @@
           <a:p>
             <a:r>
               <a:rPr lang="en-US" dirty="0"/>
-              <a:t>Feature </a:t>
-            </a:r>
+              <a:t>Expand system testing in the community</a:t>
+            </a:r>
+          </a:p>
+          <a:p>
+            <a:pPr lvl="1"/>
+            <a:r>
+              <a:rPr lang="en-US" dirty="0"/>
+              <a:t>Component integration testing on Marist systems</a:t>
+            </a:r>
+          </a:p>
+          <a:p>
+            <a:pPr lvl="1"/>
             <a:r>
               <a:rPr lang="en-US" dirty="0" err="1"/>
-              <a:t>xxxx</a:t>
+              <a:t>Zowe</a:t>
             </a:r>
             <a:r>
               <a:rPr lang="en-US" dirty="0"/>
-              <a:t> (in support of theme xxx)</a:t>
+              <a:t> “release” smoke and integration testing</a:t>
+            </a:r>
+          </a:p>
+          <a:p>
+            <a:r>
+              <a:rPr lang="en-US" dirty="0"/>
+              <a:t>Build out </a:t>
+            </a:r>
+            <a:r>
+              <a:rPr lang="en-US" dirty="0" err="1"/>
+              <a:t>Zowe</a:t>
+            </a:r>
+            <a:r>
+              <a:rPr lang="en-US" dirty="0"/>
+              <a:t> “release” Performance Testing</a:t>
+            </a:r>
+          </a:p>
+          <a:p>
+            <a:pPr lvl="1"/>
+            <a:r>
+              <a:rPr lang="en-US" dirty="0"/>
+              <a:t>Standardize infrastructure and tooling, extensible code-base for squad contribution</a:t>
+            </a:r>
+          </a:p>
+          <a:p>
+            <a:r>
+              <a:rPr lang="en-US" dirty="0"/>
+              <a:t>Design </a:t>
+            </a:r>
+            <a:r>
+              <a:rPr lang="en-US" dirty="0" err="1"/>
+              <a:t>Zowe</a:t>
+            </a:r>
+            <a:r>
+              <a:rPr lang="en-US" dirty="0"/>
+              <a:t> HA Infrastructure</a:t>
+            </a:r>
+          </a:p>
+          <a:p>
+            <a:r>
+              <a:rPr lang="en-US" dirty="0"/>
+              <a:t>Continue </a:t>
+            </a:r>
+            <a:r>
+              <a:rPr lang="en-US" dirty="0" err="1"/>
+              <a:t>Zowe</a:t>
+            </a:r>
+            <a:r>
+              <a:rPr lang="en-US" dirty="0"/>
+              <a:t> Release activities and improvements</a:t>
+            </a:r>
+          </a:p>
+          <a:p>
+            <a:pPr lvl="1"/>
+            <a:r>
+              <a:rPr lang="en-US" dirty="0"/>
+              <a:t>Second Nightly “Stable” Build</a:t>
             </a:r>
           </a:p>
         </p:txBody>
@@ -6178,13 +6254,31 @@
           <a:p>
             <a:r>
               <a:rPr lang="en-US" dirty="0"/>
-              <a:t>Expanded CI/CD work-group Focus</a:t>
+              <a:t>“Deployments” Working Group Focus</a:t>
             </a:r>
           </a:p>
           <a:p>
             <a:r>
               <a:rPr lang="en-US" sz="2000" dirty="0"/>
-              <a:t>Steven Horsman (Squad Lead)</a:t>
+              <a:t>Steven </a:t>
+            </a:r>
+            <a:r>
+              <a:rPr lang="en-US" sz="2000"/>
+              <a:t>Horsman (Lead</a:t>
+            </a:r>
+            <a:r>
+              <a:rPr lang="en-US" sz="2000" dirty="0"/>
+              <a:t>)</a:t>
+            </a:r>
+          </a:p>
+          <a:p>
+            <a:r>
+              <a:rPr lang="en-US" sz="2000" dirty="0" err="1"/>
+              <a:t>f.k.a</a:t>
+            </a:r>
+            <a:r>
+              <a:rPr lang="en-US" sz="2000" dirty="0"/>
+              <a:t>. CUPIDs</a:t>
             </a:r>
           </a:p>
         </p:txBody>
@@ -6401,16 +6495,61 @@
           <a:lstStyle/>
           <a:p>
             <a:r>
+              <a:rPr lang="en-US" dirty="0" err="1"/>
+              <a:t>Zowe</a:t>
+            </a:r>
+            <a:r>
               <a:rPr lang="en-US" dirty="0"/>
-              <a:t>Feature </a:t>
+              <a:t> Extensions rework</a:t>
+            </a:r>
+          </a:p>
+          <a:p>
+            <a:pPr lvl="1"/>
+            <a:r>
+              <a:rPr lang="en-US" dirty="0"/>
+              <a:t>Improve both </a:t>
             </a:r>
             <a:r>
               <a:rPr lang="en-US" dirty="0" err="1"/>
-              <a:t>xxxx</a:t>
+              <a:t>Zowe</a:t>
             </a:r>
             <a:r>
               <a:rPr lang="en-US" dirty="0"/>
-              <a:t> (in support of theme xxx)</a:t>
+              <a:t> administrator and </a:t>
+            </a:r>
+            <a:r>
+              <a:rPr lang="en-US" dirty="0" err="1"/>
+              <a:t>Zowe</a:t>
+            </a:r>
+            <a:r>
+              <a:rPr lang="en-US" dirty="0"/>
+              <a:t> extender user experiences when deploying </a:t>
+            </a:r>
+            <a:r>
+              <a:rPr lang="en-US" dirty="0" err="1"/>
+              <a:t>Zowe</a:t>
+            </a:r>
+            <a:r>
+              <a:rPr lang="en-US" dirty="0"/>
+              <a:t> extensions.</a:t>
+            </a:r>
+          </a:p>
+          <a:p>
+            <a:r>
+              <a:rPr lang="en-US" dirty="0"/>
+              <a:t>Research and POC containerization of </a:t>
+            </a:r>
+            <a:r>
+              <a:rPr lang="en-US" dirty="0" err="1"/>
+              <a:t>Zowe</a:t>
+            </a:r>
+            <a:endParaRPr lang="en-US" dirty="0"/>
+          </a:p>
+          <a:p>
+            <a:pPr lvl="1"/>
+            <a:r>
+              <a:rPr lang="en-US" dirty="0"/>
+              <a:t>Initially targeted for developers</a:t>
             </a:r>
           </a:p>
         </p:txBody>
@@ -6694,13 +6833,13 @@
           <a:p>
             <a:r>
               <a:rPr lang="en-US" dirty="0"/>
-              <a:t>CI/CD Squad Focus</a:t>
+              <a:t>Systems Squad Focus</a:t>
             </a:r>
           </a:p>
           <a:p>
             <a:r>
               <a:rPr lang="en-US" dirty="0"/>
-              <a:t>Expanded CI/CD work-group Focus</a:t>
+              <a:t>“Deployments” Working Group Focus</a:t>
             </a:r>
           </a:p>
           <a:p>
@@ -6856,10 +6995,9 @@
           <a:lstStyle/>
           <a:p>
             <a:r>
-              <a:rPr lang="en-US" dirty="0" smtClean="0"/>
+              <a:rPr lang="en-US" dirty="0"/>
               <a:t>Feature 1</a:t>
             </a:r>
-            <a:endParaRPr lang="en-US" dirty="0"/>
           </a:p>
         </p:txBody>
       </p:sp>
@@ -6896,22 +7034,10 @@
               <a:rPr lang="en-US" u="sng" dirty="0">
                 <a:hlinkClick r:id="rId3"/>
               </a:rPr>
-              <a:t>x</a:t>
-            </a:r>
-            <a:r>
-              <a:rPr lang="en-US" u="sng" dirty="0" smtClean="0">
-                <a:hlinkClick r:id="rId3"/>
-              </a:rPr>
-              <a:t>.509 </a:t>
-            </a:r>
-            <a:r>
-              <a:rPr lang="en-US" u="sng" dirty="0">
-                <a:hlinkClick r:id="rId3"/>
-              </a:rPr>
-              <a:t>client certificate authentication support for API Mediation Layer</a:t>
-            </a:r>
-            <a:r>
-              <a:rPr lang="en-US" dirty="0" smtClean="0"/>
+              <a:t>x.509 client certificate authentication support for API Mediation Layer</a:t>
+            </a:r>
+            <a:r>
+              <a:rPr lang="en-US" dirty="0"/>
               <a:t> </a:t>
             </a:r>
           </a:p>
@@ -6920,23 +7046,15 @@
               <a:buNone/>
             </a:pPr>
             <a:r>
-              <a:rPr lang="en-US" dirty="0" smtClean="0"/>
-              <a:t>(</a:t>
-            </a:r>
-            <a:r>
               <a:rPr lang="en-US" dirty="0"/>
-              <a:t>in support of </a:t>
-            </a:r>
-            <a:r>
-              <a:rPr lang="en-US" dirty="0" smtClean="0"/>
-              <a:t>SECURITY theme)</a:t>
+              <a:t>(in support of SECURITY theme)</a:t>
             </a:r>
           </a:p>
           <a:p>
             <a:pPr marL="101600" indent="0">
               <a:buNone/>
             </a:pPr>
-            <a:endParaRPr lang="en-US" dirty="0" smtClean="0"/>
+            <a:endParaRPr lang="en-US" dirty="0"/>
           </a:p>
           <a:p>
             <a:pPr marL="101600" indent="0">
@@ -6944,23 +7062,7 @@
             </a:pPr>
             <a:r>
               <a:rPr lang="en-US" dirty="0"/>
-              <a:t>As a system admin </a:t>
-            </a:r>
-            <a:r>
-              <a:rPr lang="en-US" dirty="0" smtClean="0"/>
-              <a:t>/ </a:t>
-            </a:r>
-            <a:r>
-              <a:rPr lang="en-US" dirty="0"/>
-              <a:t>security admin, I want to allow my platform users (Michelle, Tyler) to </a:t>
-            </a:r>
-            <a:r>
-              <a:rPr lang="en-US" dirty="0" smtClean="0"/>
-              <a:t>authenticate </a:t>
-            </a:r>
-            <a:r>
-              <a:rPr lang="en-US" dirty="0"/>
-              <a:t>their custom client applications or </a:t>
+              <a:t>As a system admin / security admin, I want to allow my platform users (Michelle, Tyler) to authenticate their custom client applications or </a:t>
             </a:r>
             <a:r>
               <a:rPr lang="en-US" dirty="0" err="1"/>
@@ -6979,16 +7081,12 @@
               <a:t> explorer, cli, desktop) using client certificates (x.509) which are industry-proven to be more secure than </a:t>
             </a:r>
             <a:r>
-              <a:rPr lang="en-US" dirty="0" err="1" smtClean="0"/>
+              <a:rPr lang="en-US" dirty="0" err="1"/>
               <a:t>PassTickets</a:t>
             </a:r>
             <a:r>
               <a:rPr lang="en-US" dirty="0"/>
-              <a:t>, JWT or </a:t>
-            </a:r>
-            <a:r>
-              <a:rPr lang="en-US" dirty="0" smtClean="0"/>
-              <a:t>credential authentication.</a:t>
+              <a:t>, JWT or credential authentication.</a:t>
             </a:r>
           </a:p>
           <a:p>
@@ -7003,27 +7101,11 @@
             </a:pPr>
             <a:r>
               <a:rPr lang="en-US" b="1" dirty="0"/>
-              <a:t>Deliverable</a:t>
-            </a:r>
-            <a:r>
-              <a:rPr lang="en-US" b="1" dirty="0" smtClean="0"/>
-              <a:t>: </a:t>
-            </a:r>
-            <a:r>
-              <a:rPr lang="en-US" dirty="0" smtClean="0"/>
-              <a:t>APIML </a:t>
+              <a:t>Deliverable: </a:t>
             </a:r>
             <a:r>
               <a:rPr lang="en-US" dirty="0"/>
-              <a:t>can validate client certificates and exchange with the authentication mechanism that is native to the given service </a:t>
-            </a:r>
-            <a:r>
-              <a:rPr lang="en-US" dirty="0" smtClean="0"/>
-              <a:t>(e.g</a:t>
-            </a:r>
-            <a:r>
-              <a:rPr lang="en-US" dirty="0"/>
-              <a:t>. JWT, </a:t>
+              <a:t>APIML can validate client certificates and exchange with the authentication mechanism that is native to the given service (e.g. JWT, </a:t>
             </a:r>
             <a:r>
               <a:rPr lang="en-US" dirty="0" err="1"/>
@@ -7097,10 +7179,9 @@
           <a:lstStyle/>
           <a:p>
             <a:r>
-              <a:rPr lang="en-US" dirty="0" smtClean="0"/>
+              <a:rPr lang="en-US" dirty="0"/>
               <a:t>Feature 2</a:t>
             </a:r>
-            <a:endParaRPr lang="en-US" dirty="0"/>
           </a:p>
         </p:txBody>
       </p:sp>
@@ -7137,66 +7218,17 @@
               <a:rPr lang="en-US" u="sng" dirty="0">
                 <a:hlinkClick r:id="rId3"/>
               </a:rPr>
-              <a:t>Remove the dependency of APIML on z/OSMF for authentication and use SAF to obtain the JWT</a:t>
-            </a:r>
-            <a:r>
-              <a:rPr lang="en-US" u="sng" dirty="0" smtClean="0">
-                <a:hlinkClick r:id="rId3"/>
-              </a:rPr>
-              <a:t> </a:t>
-            </a:r>
-            <a:endParaRPr lang="en-US" u="sng" dirty="0" smtClean="0"/>
+              <a:t>Remove the dependency of APIML on z/OSMF for authentication and use SAF to obtain the JWT </a:t>
+            </a:r>
+            <a:endParaRPr lang="en-US" u="sng" dirty="0"/>
           </a:p>
           <a:p>
             <a:pPr marL="101600" indent="0">
               <a:buNone/>
             </a:pPr>
             <a:r>
-              <a:rPr lang="en-US" dirty="0" smtClean="0"/>
-              <a:t>(</a:t>
-            </a:r>
-            <a:r>
               <a:rPr lang="en-US" dirty="0"/>
-              <a:t>in support of </a:t>
-            </a:r>
-            <a:r>
-              <a:rPr lang="en-US" dirty="0" smtClean="0"/>
-              <a:t>SECURITY theme)</a:t>
-            </a:r>
-          </a:p>
-          <a:p>
-            <a:pPr marL="101600" indent="0">
-              <a:buNone/>
-            </a:pPr>
-            <a:endParaRPr lang="en-US" dirty="0" smtClean="0"/>
-          </a:p>
-          <a:p>
-            <a:pPr marL="101600" indent="0">
-              <a:buNone/>
-            </a:pPr>
-            <a:r>
-              <a:rPr lang="en-US" dirty="0"/>
-              <a:t>As a system admin </a:t>
-            </a:r>
-            <a:r>
-              <a:rPr lang="en-US" dirty="0" smtClean="0"/>
-              <a:t>/ </a:t>
-            </a:r>
-            <a:r>
-              <a:rPr lang="en-US" dirty="0"/>
-              <a:t>security admin, I want </a:t>
-            </a:r>
-            <a:r>
-              <a:rPr lang="en-US" dirty="0" smtClean="0"/>
-              <a:t>a configurable option at installation of </a:t>
-            </a:r>
-            <a:r>
-              <a:rPr lang="en-US" dirty="0" err="1" smtClean="0"/>
-              <a:t>Zowe</a:t>
-            </a:r>
-            <a:r>
-              <a:rPr lang="en-US" dirty="0" smtClean="0"/>
-              <a:t> to use SAF as my authentication provider, thereby eliminating the pre-requisite on z/OSMF, and removing a barrier to my adoption.</a:t>
+              <a:t>(in support of SECURITY theme)</a:t>
             </a:r>
           </a:p>
           <a:p>
@@ -7210,11 +7242,34 @@
               <a:buNone/>
             </a:pPr>
             <a:r>
-              <a:rPr lang="en-US" b="1" dirty="0" smtClean="0"/>
+              <a:rPr lang="en-US" dirty="0"/>
+              <a:t>As a system admin / security admin, I want a configurable option at installation of </a:t>
+            </a:r>
+            <a:r>
+              <a:rPr lang="en-US" dirty="0" err="1"/>
+              <a:t>Zowe</a:t>
+            </a:r>
+            <a:r>
+              <a:rPr lang="en-US" dirty="0"/>
+              <a:t> to use SAF as my authentication provider, thereby eliminating the pre-requisite on z/OSMF, and removing a barrier to my adoption.</a:t>
+            </a:r>
+          </a:p>
+          <a:p>
+            <a:pPr marL="101600" indent="0">
+              <a:buNone/>
+            </a:pPr>
+            <a:endParaRPr lang="en-US" dirty="0"/>
+          </a:p>
+          <a:p>
+            <a:pPr marL="101600" indent="0">
+              <a:buNone/>
+            </a:pPr>
+            <a:r>
+              <a:rPr lang="en-US" b="1" dirty="0"/>
               <a:t>Deliverable: </a:t>
             </a:r>
             <a:r>
-              <a:rPr lang="en-US" dirty="0" smtClean="0"/>
+              <a:rPr lang="en-US" dirty="0"/>
               <a:t>Instead of a call to z/OSMF, APIML will use Java SAF APIs to verify credentials.</a:t>
             </a:r>
             <a:r>
@@ -7233,35 +7288,14 @@
               <a:rPr lang="en-US" dirty="0">
                 <a:sym typeface="Arial"/>
               </a:rPr>
-              <a:t>This will be implemented as </a:t>
-            </a:r>
-            <a:r>
-              <a:rPr lang="en-US" dirty="0" smtClean="0">
-                <a:sym typeface="Arial"/>
-              </a:rPr>
-              <a:t>an additional </a:t>
-            </a:r>
-            <a:r>
-              <a:rPr lang="en-US" dirty="0">
-                <a:sym typeface="Arial"/>
-              </a:rPr>
-              <a:t>provider, the z/OSMF authentication provider will remain the </a:t>
-            </a:r>
-            <a:r>
-              <a:rPr lang="en-US" dirty="0" smtClean="0">
-                <a:sym typeface="Arial"/>
-              </a:rPr>
-              <a:t>default.</a:t>
-            </a:r>
-            <a:endParaRPr lang="en-US" dirty="0">
-              <a:sym typeface="Arial"/>
-            </a:endParaRPr>
+              <a:t>This will be implemented as an additional provider, the z/OSMF authentication provider will remain the default.</a:t>
+            </a:r>
           </a:p>
           <a:p>
             <a:pPr marL="101600" indent="0">
               <a:buNone/>
             </a:pPr>
-            <a:endParaRPr lang="en-US" dirty="0" smtClean="0"/>
+            <a:endParaRPr lang="en-US" dirty="0"/>
           </a:p>
           <a:p>
             <a:pPr marL="101600" indent="0">
@@ -7326,10 +7360,9 @@
           <a:lstStyle/>
           <a:p>
             <a:r>
-              <a:rPr lang="en-US" dirty="0" smtClean="0"/>
+              <a:rPr lang="en-US" dirty="0"/>
               <a:t>Feature 3</a:t>
             </a:r>
-            <a:endParaRPr lang="en-US" dirty="0"/>
           </a:p>
         </p:txBody>
       </p:sp>
@@ -7378,38 +7411,24 @@
               <a:rPr lang="en-US" u="sng" dirty="0">
                 <a:hlinkClick r:id="rId3"/>
               </a:rPr>
-              <a:t> distributor in API Mediation </a:t>
-            </a:r>
-            <a:r>
-              <a:rPr lang="en-US" u="sng" dirty="0" smtClean="0">
-                <a:hlinkClick r:id="rId3"/>
-              </a:rPr>
-              <a:t>Layer </a:t>
-            </a:r>
-            <a:endParaRPr lang="en-US" u="sng" dirty="0" smtClean="0"/>
+              <a:t> distributor in API Mediation Layer </a:t>
+            </a:r>
+            <a:endParaRPr lang="en-US" u="sng" dirty="0"/>
           </a:p>
           <a:p>
             <a:pPr marL="101600" indent="0">
               <a:buNone/>
             </a:pPr>
             <a:r>
-              <a:rPr lang="en-US" dirty="0" smtClean="0"/>
-              <a:t>(in </a:t>
-            </a:r>
-            <a:r>
               <a:rPr lang="en-US" dirty="0"/>
-              <a:t>support of </a:t>
-            </a:r>
-            <a:r>
-              <a:rPr lang="en-US" dirty="0" smtClean="0"/>
-              <a:t>RESILIENCE theme)</a:t>
+              <a:t>(in support of RESILIENCE theme)</a:t>
             </a:r>
           </a:p>
           <a:p>
             <a:pPr marL="101600" indent="0">
               <a:buNone/>
             </a:pPr>
-            <a:endParaRPr lang="en-US" dirty="0" smtClean="0"/>
+            <a:endParaRPr lang="en-US" dirty="0"/>
           </a:p>
           <a:p>
             <a:pPr marL="101600" indent="0">
@@ -7417,38 +7436,26 @@
             </a:pPr>
             <a:r>
               <a:rPr lang="en-US" dirty="0"/>
-              <a:t>As an API consumer, I’m able to rely on </a:t>
-            </a:r>
-            <a:r>
-              <a:rPr lang="en-US" dirty="0" smtClean="0"/>
-              <a:t>API </a:t>
+              <a:t>As an API consumer, I’m able to rely on API routing by APIML with an expectation of 24/7 SLA (given the LPAR remains up).</a:t>
+            </a:r>
+          </a:p>
+          <a:p>
+            <a:pPr marL="101600" indent="0">
+              <a:buNone/>
+            </a:pPr>
+            <a:endParaRPr lang="en-US" b="1" dirty="0"/>
+          </a:p>
+          <a:p>
+            <a:pPr marL="101600" indent="0">
+              <a:buNone/>
+            </a:pPr>
+            <a:r>
+              <a:rPr lang="en-US" b="1" dirty="0"/>
+              <a:t>Deliverable: </a:t>
             </a:r>
             <a:r>
               <a:rPr lang="en-US" dirty="0"/>
-              <a:t>routing by APIML with an expectation of 24/7 SLA (given the LPAR remains up).</a:t>
-            </a:r>
-          </a:p>
-          <a:p>
-            <a:pPr marL="101600" indent="0">
-              <a:buNone/>
-            </a:pPr>
-            <a:endParaRPr lang="en-US" b="1" dirty="0" smtClean="0"/>
-          </a:p>
-          <a:p>
-            <a:pPr marL="101600" indent="0">
-              <a:buNone/>
-            </a:pPr>
-            <a:r>
-              <a:rPr lang="en-US" b="1" dirty="0" smtClean="0"/>
-              <a:t>Deliverable: </a:t>
-            </a:r>
-            <a:r>
-              <a:rPr lang="en-US" dirty="0" smtClean="0"/>
-              <a:t>Dynamic </a:t>
-            </a:r>
-            <a:r>
-              <a:rPr lang="en-US" dirty="0"/>
-              <a:t>Virtual IP Address (DVIPA) will ensure that if an instance of Gateway and EUREKA fails on one system (LPAR1), the other system (LPAR2) continues to provide service functionality through a </a:t>
+              <a:t>Dynamic Virtual IP Address (DVIPA) will ensure that if an instance of Gateway and EUREKA fails on one system (LPAR1), the other system (LPAR2) continues to provide service functionality through a </a:t>
             </a:r>
             <a:r>
               <a:rPr lang="en-US" dirty="0" err="1"/>
@@ -7463,7 +7470,7 @@
             <a:pPr marL="101600" indent="0">
               <a:buNone/>
             </a:pPr>
-            <a:endParaRPr lang="en-US" dirty="0" smtClean="0"/>
+            <a:endParaRPr lang="en-US" dirty="0"/>
           </a:p>
           <a:p>
             <a:pPr marL="101600" indent="0">
@@ -8216,6 +8223,15 @@
 </file>
 
 <file path=customXml/item1.xml><?xml version="1.0" encoding="utf-8"?>
+<?mso-contentType ?>
+<FormTemplates xmlns="http://schemas.microsoft.com/sharepoint/v3/contenttype/forms">
+  <Display>DocumentLibraryForm</Display>
+  <Edit>DocumentLibraryForm</Edit>
+  <New>DocumentLibraryForm</New>
+</FormTemplates>
+</file>
+
+<file path=customXml/item2.xml><?xml version="1.0" encoding="utf-8"?>
 <ct:contentTypeSchema xmlns:ct="http://schemas.microsoft.com/office/2006/metadata/contentType" xmlns:ma="http://schemas.microsoft.com/office/2006/metadata/properties/metaAttributes" ct:_="" ma:_="" ma:contentTypeName="Document" ma:contentTypeID="0x01010078366F8B0CAC4944B54E4FE62E1853FF" ma:contentTypeVersion="13" ma:contentTypeDescription="Create a new document." ma:contentTypeScope="" ma:versionID="c0144efe8435d8d2a41eb877ff779f3d">
   <xsd:schema xmlns:xsd="http://www.w3.org/2001/XMLSchema" xmlns:xs="http://www.w3.org/2001/XMLSchema" xmlns:p="http://schemas.microsoft.com/office/2006/metadata/properties" xmlns:ns3="dc93a766-66e7-40cb-ae91-7d18686f06cb" xmlns:ns4="218ddd80-e909-418b-876b-6da869ab062e" targetNamespace="http://schemas.microsoft.com/office/2006/metadata/properties" ma:root="true" ma:fieldsID="98e515d43d9a7e057d5a8f41d3b12b29" ns3:_="" ns4:_="">
     <xsd:import namespace="dc93a766-66e7-40cb-ae91-7d18686f06cb"/>
@@ -8438,15 +8454,6 @@
 </ct:contentTypeSchema>
 </file>
 
-<file path=customXml/item2.xml><?xml version="1.0" encoding="utf-8"?>
-<?mso-contentType ?>
-<FormTemplates xmlns="http://schemas.microsoft.com/sharepoint/v3/contenttype/forms">
-  <Display>DocumentLibraryForm</Display>
-  <Edit>DocumentLibraryForm</Edit>
-  <New>DocumentLibraryForm</New>
-</FormTemplates>
-</file>
-
 <file path=customXml/item3.xml><?xml version="1.0" encoding="utf-8"?>
 <p:properties xmlns:p="http://schemas.microsoft.com/office/2006/metadata/properties" xmlns:xsi="http://www.w3.org/2001/XMLSchema-instance" xmlns:pc="http://schemas.microsoft.com/office/infopath/2007/PartnerControls">
   <documentManagement/>
@@ -8454,6 +8461,14 @@
 </file>
 
 <file path=customXml/itemProps1.xml><?xml version="1.0" encoding="utf-8"?>
+<ds:datastoreItem xmlns:ds="http://schemas.openxmlformats.org/officeDocument/2006/customXml" ds:itemID="{B16FB3BA-9F7C-4CD8-B3AB-262CEFAAFDB4}">
+  <ds:schemaRefs>
+    <ds:schemaRef ds:uri="http://schemas.microsoft.com/sharepoint/v3/contenttype/forms"/>
+  </ds:schemaRefs>
+</ds:datastoreItem>
+</file>
+
+<file path=customXml/itemProps2.xml><?xml version="1.0" encoding="utf-8"?>
 <ds:datastoreItem xmlns:ds="http://schemas.openxmlformats.org/officeDocument/2006/customXml" ds:itemID="{75DFD259-8AF4-4CFA-9594-D45098FC5839}">
   <ds:schemaRefs>
     <ds:schemaRef ds:uri="http://schemas.microsoft.com/office/2006/metadata/contentType"/>
@@ -8468,14 +8483,6 @@
     <ds:schemaRef ds:uri="http://purl.org/dc/elements/1.1/"/>
     <ds:schemaRef ds:uri="http://purl.org/dc/terms/"/>
     <ds:schemaRef ds:uri="http://schemas.microsoft.com/internal/obd"/>
-  </ds:schemaRefs>
-</ds:datastoreItem>
-</file>
-
-<file path=customXml/itemProps2.xml><?xml version="1.0" encoding="utf-8"?>
-<ds:datastoreItem xmlns:ds="http://schemas.openxmlformats.org/officeDocument/2006/customXml" ds:itemID="{B16FB3BA-9F7C-4CD8-B3AB-262CEFAAFDB4}">
-  <ds:schemaRefs>
-    <ds:schemaRef ds:uri="http://schemas.microsoft.com/sharepoint/v3/contenttype/forms"/>
   </ds:schemaRefs>
 </ds:datastoreItem>
 </file>

</xml_diff>

<commit_message>
Add Zowe doc squad vision and objectives
Signed-off-by: nannanli <nannanli@cn.ibm.com>
</commit_message>
<xml_diff>
--- a/Project Management/20PI3 Planning/Zowe Community Squad Focus for 20PI3.pptx
+++ b/Project Management/20PI3 Planning/Zowe Community Squad Focus for 20PI3.pptx
@@ -35,16 +35,16 @@
   <p:notesSz cx="6858000" cy="9144000"/>
   <p:embeddedFontLst>
     <p:embeddedFont>
-      <p:font typeface="Gill Sans" panose="020B0604020202020204" charset="0"/>
+      <p:font typeface="Calibri" panose="020F0502020204030204" pitchFamily="34" charset="0"/>
       <p:regular r:id="rId28"/>
       <p:bold r:id="rId29"/>
+      <p:italic r:id="rId30"/>
+      <p:boldItalic r:id="rId31"/>
     </p:embeddedFont>
     <p:embeddedFont>
-      <p:font typeface="Calibri" panose="020F0502020204030204" pitchFamily="34" charset="0"/>
-      <p:regular r:id="rId30"/>
-      <p:bold r:id="rId31"/>
-      <p:italic r:id="rId32"/>
-      <p:boldItalic r:id="rId33"/>
+      <p:font typeface="Gill Sans" panose="020B0502020104020203" pitchFamily="34" charset="-79"/>
+      <p:regular r:id="rId32"/>
+      <p:bold r:id="rId33"/>
     </p:embeddedFont>
   </p:embeddedFontLst>
   <p:defaultTextStyle>
@@ -282,14 +282,6 @@
     </p:ext>
   </p:extLst>
 </p:presentation>
-</file>
-
-<file path=ppt/revisionInfo.xml><?xml version="1.0" encoding="utf-8"?>
-<p1510:revInfo xmlns:a="http://schemas.openxmlformats.org/drawingml/2006/main" xmlns:r="http://schemas.openxmlformats.org/officeDocument/2006/relationships" xmlns:p1510="http://schemas.microsoft.com/office/powerpoint/2015/10/main">
-  <p1510:revLst>
-    <p1510:client id="{CC6E4D09-935D-43B9-8870-911B4420BDA4}" v="74" dt="2020-06-04T11:17:34.315"/>
-  </p1510:revLst>
-</p1510:revInfo>
 </file>
 
 <file path=ppt/notesMasters/notesMaster1.xml><?xml version="1.0" encoding="utf-8"?>
@@ -1043,7 +1035,7 @@
               <a:buNone/>
             </a:pPr>
             <a:r>
-              <a:rPr lang="en-US" sz="1100" b="0" i="0" u="none" strike="noStrike" cap="none" dirty="0" smtClean="0">
+              <a:rPr lang="en-US" sz="1100" b="0" i="0" u="none" strike="noStrike" cap="none" dirty="0">
                 <a:solidFill>
                   <a:srgbClr val="000000"/>
                 </a:solidFill>
@@ -1055,7 +1047,7 @@
               </a:rPr>
               <a:t>Notes: </a:t>
             </a:r>
-            <a:endParaRPr lang="en-US" b="0" dirty="0" smtClean="0">
+            <a:endParaRPr lang="en-US" b="0" dirty="0">
               <a:effectLst/>
             </a:endParaRPr>
           </a:p>
@@ -1064,7 +1056,7 @@
               <a:buNone/>
             </a:pPr>
             <a:r>
-              <a:rPr lang="en-US" sz="1100" b="0" i="0" u="none" strike="noStrike" cap="none" dirty="0" smtClean="0">
+              <a:rPr lang="en-US" sz="1100" b="0" i="0" u="none" strike="noStrike" cap="none" dirty="0">
                 <a:solidFill>
                   <a:srgbClr val="000000"/>
                 </a:solidFill>
@@ -1082,7 +1074,7 @@
               <a:buNone/>
             </a:pPr>
             <a:r>
-              <a:rPr lang="en-US" sz="1100" b="0" i="0" u="none" strike="noStrike" cap="none" dirty="0" err="1" smtClean="0">
+              <a:rPr lang="en-US" sz="1100" b="0" i="0" u="none" strike="noStrike" cap="none" dirty="0" err="1">
                 <a:solidFill>
                   <a:srgbClr val="000000"/>
                 </a:solidFill>
@@ -1095,7 +1087,7 @@
               <a:t>Zowe</a:t>
             </a:r>
             <a:r>
-              <a:rPr lang="en-US" sz="1100" b="0" i="0" u="none" strike="noStrike" cap="none" dirty="0" smtClean="0">
+              <a:rPr lang="en-US" sz="1100" b="0" i="0" u="none" strike="noStrike" cap="none" dirty="0">
                 <a:solidFill>
                   <a:srgbClr val="000000"/>
                 </a:solidFill>
@@ -1113,7 +1105,7 @@
               <a:buNone/>
             </a:pPr>
             <a:r>
-              <a:rPr lang="en-US" sz="1100" b="0" i="0" u="none" strike="noStrike" cap="none" dirty="0" smtClean="0">
+              <a:rPr lang="en-US" sz="1100" b="0" i="0" u="none" strike="noStrike" cap="none" dirty="0">
                 <a:solidFill>
                   <a:srgbClr val="000000"/>
                 </a:solidFill>
@@ -1200,7 +1192,7 @@
               <a:buNone/>
             </a:pPr>
             <a:r>
-              <a:rPr lang="en-US" sz="1100" b="0" i="0" u="none" strike="noStrike" cap="none" dirty="0" err="1" smtClean="0">
+              <a:rPr lang="en-US" sz="1100" b="0" i="0" u="none" strike="noStrike" cap="none" dirty="0" err="1">
                 <a:solidFill>
                   <a:srgbClr val="000000"/>
                 </a:solidFill>
@@ -1213,7 +1205,7 @@
               <a:t>Zowe</a:t>
             </a:r>
             <a:r>
-              <a:rPr lang="en-US" sz="1100" b="0" i="0" u="none" strike="noStrike" cap="none" dirty="0" smtClean="0">
+              <a:rPr lang="en-US" sz="1100" b="0" i="0" u="none" strike="noStrike" cap="none" dirty="0">
                 <a:solidFill>
                   <a:srgbClr val="000000"/>
                 </a:solidFill>
@@ -1231,7 +1223,7 @@
               <a:buNone/>
             </a:pPr>
             <a:r>
-              <a:rPr lang="en-US" sz="1100" b="0" i="0" u="none" strike="noStrike" cap="none" dirty="0" smtClean="0">
+              <a:rPr lang="en-US" sz="1100" b="0" i="0" u="none" strike="noStrike" cap="none" dirty="0">
                 <a:solidFill>
                   <a:srgbClr val="000000"/>
                 </a:solidFill>
@@ -1249,7 +1241,7 @@
               <a:buNone/>
             </a:pPr>
             <a:r>
-              <a:rPr lang="en-US" sz="1100" b="0" i="0" u="none" strike="noStrike" cap="none" dirty="0" smtClean="0">
+              <a:rPr lang="en-US" sz="1100" b="0" i="0" u="none" strike="noStrike" cap="none" dirty="0">
                 <a:solidFill>
                   <a:srgbClr val="000000"/>
                 </a:solidFill>
@@ -1267,7 +1259,7 @@
               <a:buNone/>
             </a:pPr>
             <a:r>
-              <a:rPr lang="en-US" sz="1100" b="0" i="0" u="none" strike="noStrike" cap="none" dirty="0" smtClean="0">
+              <a:rPr lang="en-US" sz="1100" b="0" i="0" u="none" strike="noStrike" cap="none" dirty="0">
                 <a:solidFill>
                   <a:srgbClr val="000000"/>
                 </a:solidFill>
@@ -1285,7 +1277,7 @@
               <a:buNone/>
             </a:pPr>
             <a:r>
-              <a:rPr lang="en-US" sz="1100" b="0" i="0" u="none" strike="noStrike" cap="none" dirty="0" smtClean="0">
+              <a:rPr lang="en-US" sz="1100" b="0" i="0" u="none" strike="noStrike" cap="none" dirty="0">
                 <a:solidFill>
                   <a:srgbClr val="000000"/>
                 </a:solidFill>
@@ -1303,7 +1295,7 @@
               <a:buNone/>
             </a:pPr>
             <a:r>
-              <a:rPr lang="en-US" sz="1100" b="0" i="0" u="none" strike="noStrike" cap="none" dirty="0" smtClean="0">
+              <a:rPr lang="en-US" sz="1100" b="0" i="0" u="none" strike="noStrike" cap="none" dirty="0">
                 <a:solidFill>
                   <a:srgbClr val="000000"/>
                 </a:solidFill>
@@ -1321,7 +1313,7 @@
               <a:buNone/>
             </a:pPr>
             <a:r>
-              <a:rPr lang="en-US" sz="1100" b="0" i="0" u="none" strike="noStrike" cap="none" dirty="0" smtClean="0">
+              <a:rPr lang="en-US" sz="1100" b="0" i="0" u="none" strike="noStrike" cap="none" dirty="0">
                 <a:solidFill>
                   <a:srgbClr val="000000"/>
                 </a:solidFill>
@@ -1490,7 +1482,7 @@
               <a:defRPr/>
             </a:pPr>
             <a:r>
-              <a:rPr lang="en-US" dirty="0" smtClean="0"/>
+              <a:rPr lang="en-US" dirty="0"/>
               <a:t>Leverage new UX members / design thinking / persona identification Onboarding New Members</a:t>
             </a:r>
           </a:p>
@@ -5868,74 +5860,74 @@
           <a:lstStyle/>
           <a:p>
             <a:r>
-              <a:rPr lang="en-US" dirty="0" smtClean="0"/>
+              <a:rPr lang="en-US" dirty="0"/>
               <a:t>Further Conformance Process Maturity</a:t>
             </a:r>
           </a:p>
           <a:p>
             <a:pPr lvl="1"/>
             <a:r>
-              <a:rPr lang="en-US" dirty="0" smtClean="0"/>
+              <a:rPr lang="en-US" dirty="0"/>
               <a:t>Active LTS conformance test criteria updates / incremental badging / app-store-like landscape page</a:t>
             </a:r>
           </a:p>
           <a:p>
             <a:pPr lvl="1"/>
             <a:r>
-              <a:rPr lang="en-US" dirty="0" smtClean="0"/>
+              <a:rPr lang="en-US" dirty="0"/>
               <a:t>Active LTS conformance change requests (test criteria &amp; submitter form)</a:t>
             </a:r>
           </a:p>
           <a:p>
             <a:r>
-              <a:rPr lang="en-US" dirty="0" smtClean="0"/>
+              <a:rPr lang="en-US" dirty="0"/>
               <a:t>Increase focus on Outreach</a:t>
             </a:r>
           </a:p>
           <a:p>
             <a:pPr lvl="1"/>
             <a:r>
-              <a:rPr lang="en-US" dirty="0" smtClean="0"/>
+              <a:rPr lang="en-US" dirty="0"/>
               <a:t>Webinars &amp; Marketing</a:t>
             </a:r>
           </a:p>
           <a:p>
             <a:r>
-              <a:rPr lang="en-US" dirty="0" smtClean="0"/>
+              <a:rPr lang="en-US" dirty="0"/>
               <a:t>Improve Onboarding experience</a:t>
             </a:r>
           </a:p>
           <a:p>
             <a:pPr lvl="1"/>
             <a:r>
-              <a:rPr lang="en-US" dirty="0" smtClean="0"/>
+              <a:rPr lang="en-US" dirty="0"/>
               <a:t>Improve/influence Zowe.org website navigation</a:t>
             </a:r>
           </a:p>
           <a:p>
             <a:pPr lvl="1"/>
             <a:r>
-              <a:rPr lang="en-US" dirty="0" smtClean="0"/>
+              <a:rPr lang="en-US" dirty="0"/>
               <a:t>Accurately “direct” new-to-Zowe visitors</a:t>
             </a:r>
           </a:p>
           <a:p>
             <a:r>
-              <a:rPr lang="en-US" dirty="0" smtClean="0"/>
+              <a:rPr lang="en-US" dirty="0"/>
               <a:t>Continue and transition stat reporting (KPI-centric)</a:t>
             </a:r>
           </a:p>
           <a:p>
             <a:pPr lvl="1"/>
             <a:r>
-              <a:rPr lang="en-US" dirty="0" smtClean="0"/>
+              <a:rPr lang="en-US" dirty="0"/>
               <a:t>Identify trends &amp; influencers</a:t>
             </a:r>
           </a:p>
           <a:p>
             <a:pPr lvl="1"/>
             <a:r>
-              <a:rPr lang="en-US" dirty="0" smtClean="0"/>
+              <a:rPr lang="en-US" dirty="0"/>
               <a:t>Easy prep for all Zowe Communications</a:t>
             </a:r>
           </a:p>
@@ -6477,7 +6469,23 @@
           <a:p>
             <a:r>
               <a:rPr lang="en-US" sz="2000" dirty="0"/>
-              <a:t>Ashley?? (Squad Lead??)</a:t>
+              <a:t>Ashley</a:t>
+            </a:r>
+            <a:r>
+              <a:rPr lang="zh-CN" altLang="en-US" sz="2000" dirty="0"/>
+              <a:t> </a:t>
+            </a:r>
+            <a:r>
+              <a:rPr lang="en-US" altLang="zh-CN" sz="2000" dirty="0"/>
+              <a:t>Li</a:t>
+            </a:r>
+            <a:r>
+              <a:rPr lang="zh-CN" altLang="en-US" sz="2000" dirty="0"/>
+              <a:t> </a:t>
+            </a:r>
+            <a:r>
+              <a:rPr lang="en-US" sz="2000" dirty="0"/>
+              <a:t>(Squad Lead)</a:t>
             </a:r>
           </a:p>
         </p:txBody>
@@ -6559,20 +6567,258 @@
             <p:ph type="body" idx="1"/>
           </p:nvPr>
         </p:nvSpPr>
-        <p:spPr/>
+        <p:spPr>
+          <a:xfrm>
+            <a:off x="317499" y="741553"/>
+            <a:ext cx="8600869" cy="3889828"/>
+          </a:xfrm>
+        </p:spPr>
         <p:txBody>
           <a:bodyPr/>
           <a:lstStyle/>
           <a:p>
             <a:r>
-              <a:rPr lang="en-US" dirty="0"/>
-              <a:t>Focus </a:t>
-            </a:r>
-            <a:r>
-              <a:rPr lang="en-US" dirty="0" err="1"/>
-              <a:t>xxxx</a:t>
-            </a:r>
-            <a:endParaRPr lang="en-US" dirty="0"/>
+              <a:rPr lang="en-US" sz="1800" dirty="0"/>
+              <a:t>Create and </a:t>
+            </a:r>
+            <a:r>
+              <a:rPr lang="en-US" altLang="zh-CN" sz="1800" dirty="0"/>
+              <a:t>publish</a:t>
+            </a:r>
+            <a:r>
+              <a:rPr lang="en-US" sz="1800" dirty="0"/>
+              <a:t> content for different </a:t>
+            </a:r>
+            <a:r>
+              <a:rPr lang="en-US" sz="1800" dirty="0" err="1"/>
+              <a:t>Zowe</a:t>
+            </a:r>
+            <a:r>
+              <a:rPr lang="en-US" sz="1800" dirty="0"/>
+              <a:t> components</a:t>
+            </a:r>
+            <a:r>
+              <a:rPr lang="en-US" altLang="zh-CN" sz="1800" dirty="0"/>
+              <a:t>.</a:t>
+            </a:r>
+            <a:endParaRPr lang="en-US" sz="1800" dirty="0"/>
+          </a:p>
+          <a:p>
+            <a:r>
+              <a:rPr lang="en-US" sz="1800" dirty="0"/>
+              <a:t>Allow users to browse doc by area of interest, user role, and skill level</a:t>
+            </a:r>
+            <a:r>
+              <a:rPr lang="en-US" altLang="zh-CN" sz="1800" dirty="0"/>
+              <a:t>.</a:t>
+            </a:r>
+            <a:endParaRPr lang="en-US" sz="1800" dirty="0"/>
+          </a:p>
+          <a:p>
+            <a:r>
+              <a:rPr lang="en-US" sz="1800" dirty="0"/>
+              <a:t>Provide better </a:t>
+            </a:r>
+            <a:r>
+              <a:rPr lang="en-US" altLang="zh-CN" sz="1800" dirty="0"/>
+              <a:t>contribution</a:t>
+            </a:r>
+            <a:r>
+              <a:rPr lang="zh-CN" altLang="en-US" sz="1800" dirty="0"/>
+              <a:t> </a:t>
+            </a:r>
+            <a:r>
+              <a:rPr lang="en-US" sz="1800" dirty="0"/>
+              <a:t>doc </a:t>
+            </a:r>
+            <a:r>
+              <a:rPr lang="en-US" altLang="zh-CN" sz="1800" dirty="0"/>
+              <a:t>about</a:t>
+            </a:r>
+            <a:r>
+              <a:rPr lang="zh-CN" altLang="en-US" sz="1800" dirty="0"/>
+              <a:t> </a:t>
+            </a:r>
+            <a:r>
+              <a:rPr lang="en-US" altLang="zh-CN" sz="1800" dirty="0"/>
+              <a:t>contributing</a:t>
+            </a:r>
+            <a:r>
+              <a:rPr lang="zh-CN" altLang="en-US" sz="1800" dirty="0"/>
+              <a:t> </a:t>
+            </a:r>
+            <a:r>
+              <a:rPr lang="en-US" altLang="zh-CN" sz="1800" dirty="0"/>
+              <a:t>to</a:t>
+            </a:r>
+            <a:r>
+              <a:rPr lang="zh-CN" altLang="en-US" sz="1800" dirty="0"/>
+              <a:t> </a:t>
+            </a:r>
+            <a:r>
+              <a:rPr lang="en-US" sz="1800" dirty="0"/>
+              <a:t>doc and code</a:t>
+            </a:r>
+            <a:r>
+              <a:rPr lang="en-US" altLang="zh-CN" sz="1800" dirty="0"/>
+              <a:t>.</a:t>
+            </a:r>
+            <a:endParaRPr lang="en-US" sz="1800" dirty="0"/>
+          </a:p>
+          <a:p>
+            <a:r>
+              <a:rPr lang="en-US" altLang="zh-CN" sz="1800" dirty="0"/>
+              <a:t>Improve</a:t>
+            </a:r>
+            <a:r>
+              <a:rPr lang="en-US" sz="1800" dirty="0"/>
+              <a:t> release notes </a:t>
+            </a:r>
+            <a:r>
+              <a:rPr lang="en-US" altLang="zh-CN" sz="1800" dirty="0"/>
+              <a:t>by</a:t>
+            </a:r>
+            <a:r>
+              <a:rPr lang="zh-CN" altLang="en-US" sz="1800" dirty="0"/>
+              <a:t> </a:t>
+            </a:r>
+            <a:r>
+              <a:rPr lang="en-US" altLang="zh-CN" sz="1800" dirty="0"/>
+              <a:t>automating</a:t>
+            </a:r>
+            <a:r>
+              <a:rPr lang="zh-CN" altLang="en-US" sz="1800" dirty="0"/>
+              <a:t> </a:t>
+            </a:r>
+            <a:r>
+              <a:rPr lang="en-US" altLang="zh-CN" sz="1800" dirty="0"/>
+              <a:t>its</a:t>
+            </a:r>
+            <a:r>
+              <a:rPr lang="zh-CN" altLang="en-US" sz="1800" dirty="0"/>
+              <a:t> </a:t>
+            </a:r>
+            <a:r>
+              <a:rPr lang="en-US" altLang="zh-CN" sz="1800" dirty="0"/>
+              <a:t>generation</a:t>
+            </a:r>
+            <a:r>
+              <a:rPr lang="zh-CN" altLang="en-US" sz="1800" dirty="0"/>
+              <a:t> </a:t>
+            </a:r>
+            <a:r>
+              <a:rPr lang="en-US" sz="1800" dirty="0"/>
+              <a:t>from CHANGELOGs </a:t>
+            </a:r>
+            <a:r>
+              <a:rPr lang="en-US" altLang="zh-CN" sz="1800" dirty="0"/>
+              <a:t>and</a:t>
+            </a:r>
+            <a:r>
+              <a:rPr lang="zh-CN" altLang="en-US" sz="1800" dirty="0"/>
+              <a:t> </a:t>
+            </a:r>
+            <a:r>
+              <a:rPr lang="en-US" sz="1800" dirty="0"/>
+              <a:t>provid</a:t>
+            </a:r>
+            <a:r>
+              <a:rPr lang="en-US" altLang="zh-CN" sz="1800" dirty="0"/>
+              <a:t>ing</a:t>
+            </a:r>
+            <a:r>
+              <a:rPr lang="en-US" sz="1800" dirty="0"/>
+              <a:t> better business value</a:t>
+            </a:r>
+            <a:r>
+              <a:rPr lang="en-US" altLang="zh-CN" sz="1800" dirty="0"/>
+              <a:t>.</a:t>
+            </a:r>
+            <a:endParaRPr lang="en-US" sz="1800" dirty="0"/>
+          </a:p>
+          <a:p>
+            <a:r>
+              <a:rPr lang="en-US" altLang="zh-CN" sz="1800" dirty="0"/>
+              <a:t>Contribute</a:t>
+            </a:r>
+            <a:r>
+              <a:rPr lang="zh-CN" altLang="en-US" sz="1800" dirty="0"/>
+              <a:t> </a:t>
+            </a:r>
+            <a:r>
+              <a:rPr lang="en-US" altLang="zh-CN" sz="1800" dirty="0"/>
+              <a:t>to</a:t>
+            </a:r>
+            <a:r>
+              <a:rPr lang="en-US" sz="1800" dirty="0"/>
+              <a:t> the </a:t>
+            </a:r>
+            <a:r>
+              <a:rPr lang="en-US" sz="1800" dirty="0" err="1"/>
+              <a:t>Zowe.org</a:t>
+            </a:r>
+            <a:r>
+              <a:rPr lang="en-US" sz="1800" dirty="0"/>
+              <a:t> website design </a:t>
+            </a:r>
+            <a:r>
+              <a:rPr lang="en-US" altLang="zh-CN" sz="1800" dirty="0"/>
+              <a:t>enhancement.</a:t>
+            </a:r>
+            <a:endParaRPr lang="en-US" sz="1800" dirty="0"/>
+          </a:p>
+          <a:p>
+            <a:r>
+              <a:rPr lang="en-US" sz="1800" dirty="0"/>
+              <a:t>Provide and consolidate more multi-media and visual content (videos, interactive graphics, diagrams)</a:t>
+            </a:r>
+            <a:r>
+              <a:rPr lang="en-US" altLang="zh-CN" sz="1800" dirty="0"/>
+              <a:t>.</a:t>
+            </a:r>
+            <a:endParaRPr lang="en-US" sz="1800" dirty="0"/>
+          </a:p>
+          <a:p>
+            <a:r>
+              <a:rPr lang="en-US" altLang="zh-CN" sz="1800" dirty="0"/>
+              <a:t>Identify</a:t>
+            </a:r>
+            <a:r>
+              <a:rPr lang="zh-CN" altLang="en-US" sz="1800" dirty="0"/>
+              <a:t> </a:t>
+            </a:r>
+            <a:r>
+              <a:rPr lang="en-US" sz="1800" dirty="0"/>
+              <a:t>content gaps and improvement areas </a:t>
+            </a:r>
+            <a:r>
+              <a:rPr lang="en-US" altLang="zh-CN" sz="1800" dirty="0"/>
+              <a:t>by</a:t>
+            </a:r>
+            <a:r>
+              <a:rPr lang="zh-CN" altLang="en-US" sz="1800" dirty="0"/>
+              <a:t> </a:t>
+            </a:r>
+            <a:r>
+              <a:rPr lang="en-US" altLang="zh-CN" sz="1800" dirty="0"/>
+              <a:t>leveraging</a:t>
+            </a:r>
+            <a:r>
+              <a:rPr lang="zh-CN" altLang="en-US" sz="1800" dirty="0"/>
+              <a:t> </a:t>
+            </a:r>
+            <a:r>
+              <a:rPr lang="en-US" altLang="zh-CN" sz="1800" dirty="0"/>
+              <a:t>content</a:t>
+            </a:r>
+            <a:r>
+              <a:rPr lang="zh-CN" altLang="en-US" sz="1800" dirty="0"/>
+              <a:t> </a:t>
+            </a:r>
+            <a:r>
+              <a:rPr lang="en-US" sz="1800" dirty="0"/>
+              <a:t>analytics.</a:t>
+            </a:r>
           </a:p>
         </p:txBody>
       </p:sp>
@@ -6856,10 +7102,9 @@
           <a:lstStyle/>
           <a:p>
             <a:r>
-              <a:rPr lang="en-US" dirty="0" smtClean="0"/>
+              <a:rPr lang="en-US" dirty="0"/>
               <a:t>Feature 1</a:t>
             </a:r>
-            <a:endParaRPr lang="en-US" dirty="0"/>
           </a:p>
         </p:txBody>
       </p:sp>
@@ -6896,22 +7141,10 @@
               <a:rPr lang="en-US" u="sng" dirty="0">
                 <a:hlinkClick r:id="rId3"/>
               </a:rPr>
-              <a:t>x</a:t>
-            </a:r>
-            <a:r>
-              <a:rPr lang="en-US" u="sng" dirty="0" smtClean="0">
-                <a:hlinkClick r:id="rId3"/>
-              </a:rPr>
-              <a:t>.509 </a:t>
-            </a:r>
-            <a:r>
-              <a:rPr lang="en-US" u="sng" dirty="0">
-                <a:hlinkClick r:id="rId3"/>
-              </a:rPr>
-              <a:t>client certificate authentication support for API Mediation Layer</a:t>
-            </a:r>
-            <a:r>
-              <a:rPr lang="en-US" dirty="0" smtClean="0"/>
+              <a:t>x.509 client certificate authentication support for API Mediation Layer</a:t>
+            </a:r>
+            <a:r>
+              <a:rPr lang="en-US" dirty="0"/>
               <a:t> </a:t>
             </a:r>
           </a:p>
@@ -6920,23 +7153,15 @@
               <a:buNone/>
             </a:pPr>
             <a:r>
-              <a:rPr lang="en-US" dirty="0" smtClean="0"/>
-              <a:t>(</a:t>
-            </a:r>
-            <a:r>
               <a:rPr lang="en-US" dirty="0"/>
-              <a:t>in support of </a:t>
-            </a:r>
-            <a:r>
-              <a:rPr lang="en-US" dirty="0" smtClean="0"/>
-              <a:t>SECURITY theme)</a:t>
+              <a:t>(in support of SECURITY theme)</a:t>
             </a:r>
           </a:p>
           <a:p>
             <a:pPr marL="101600" indent="0">
               <a:buNone/>
             </a:pPr>
-            <a:endParaRPr lang="en-US" dirty="0" smtClean="0"/>
+            <a:endParaRPr lang="en-US" dirty="0"/>
           </a:p>
           <a:p>
             <a:pPr marL="101600" indent="0">
@@ -6944,23 +7169,7 @@
             </a:pPr>
             <a:r>
               <a:rPr lang="en-US" dirty="0"/>
-              <a:t>As a system admin </a:t>
-            </a:r>
-            <a:r>
-              <a:rPr lang="en-US" dirty="0" smtClean="0"/>
-              <a:t>/ </a:t>
-            </a:r>
-            <a:r>
-              <a:rPr lang="en-US" dirty="0"/>
-              <a:t>security admin, I want to allow my platform users (Michelle, Tyler) to </a:t>
-            </a:r>
-            <a:r>
-              <a:rPr lang="en-US" dirty="0" smtClean="0"/>
-              <a:t>authenticate </a:t>
-            </a:r>
-            <a:r>
-              <a:rPr lang="en-US" dirty="0"/>
-              <a:t>their custom client applications or </a:t>
+              <a:t>As a system admin / security admin, I want to allow my platform users (Michelle, Tyler) to authenticate their custom client applications or </a:t>
             </a:r>
             <a:r>
               <a:rPr lang="en-US" dirty="0" err="1"/>
@@ -6979,16 +7188,12 @@
               <a:t> explorer, cli, desktop) using client certificates (x.509) which are industry-proven to be more secure than </a:t>
             </a:r>
             <a:r>
-              <a:rPr lang="en-US" dirty="0" err="1" smtClean="0"/>
+              <a:rPr lang="en-US" dirty="0" err="1"/>
               <a:t>PassTickets</a:t>
             </a:r>
             <a:r>
               <a:rPr lang="en-US" dirty="0"/>
-              <a:t>, JWT or </a:t>
-            </a:r>
-            <a:r>
-              <a:rPr lang="en-US" dirty="0" smtClean="0"/>
-              <a:t>credential authentication.</a:t>
+              <a:t>, JWT or credential authentication.</a:t>
             </a:r>
           </a:p>
           <a:p>
@@ -7003,27 +7208,11 @@
             </a:pPr>
             <a:r>
               <a:rPr lang="en-US" b="1" dirty="0"/>
-              <a:t>Deliverable</a:t>
-            </a:r>
-            <a:r>
-              <a:rPr lang="en-US" b="1" dirty="0" smtClean="0"/>
-              <a:t>: </a:t>
-            </a:r>
-            <a:r>
-              <a:rPr lang="en-US" dirty="0" smtClean="0"/>
-              <a:t>APIML </a:t>
+              <a:t>Deliverable: </a:t>
             </a:r>
             <a:r>
               <a:rPr lang="en-US" dirty="0"/>
-              <a:t>can validate client certificates and exchange with the authentication mechanism that is native to the given service </a:t>
-            </a:r>
-            <a:r>
-              <a:rPr lang="en-US" dirty="0" smtClean="0"/>
-              <a:t>(e.g</a:t>
-            </a:r>
-            <a:r>
-              <a:rPr lang="en-US" dirty="0"/>
-              <a:t>. JWT, </a:t>
+              <a:t>APIML can validate client certificates and exchange with the authentication mechanism that is native to the given service (e.g. JWT, </a:t>
             </a:r>
             <a:r>
               <a:rPr lang="en-US" dirty="0" err="1"/>
@@ -7097,10 +7286,9 @@
           <a:lstStyle/>
           <a:p>
             <a:r>
-              <a:rPr lang="en-US" dirty="0" smtClean="0"/>
+              <a:rPr lang="en-US" dirty="0"/>
               <a:t>Feature 2</a:t>
             </a:r>
-            <a:endParaRPr lang="en-US" dirty="0"/>
           </a:p>
         </p:txBody>
       </p:sp>
@@ -7137,66 +7325,17 @@
               <a:rPr lang="en-US" u="sng" dirty="0">
                 <a:hlinkClick r:id="rId3"/>
               </a:rPr>
-              <a:t>Remove the dependency of APIML on z/OSMF for authentication and use SAF to obtain the JWT</a:t>
-            </a:r>
-            <a:r>
-              <a:rPr lang="en-US" u="sng" dirty="0" smtClean="0">
-                <a:hlinkClick r:id="rId3"/>
-              </a:rPr>
-              <a:t> </a:t>
-            </a:r>
-            <a:endParaRPr lang="en-US" u="sng" dirty="0" smtClean="0"/>
+              <a:t>Remove the dependency of APIML on z/OSMF for authentication and use SAF to obtain the JWT </a:t>
+            </a:r>
+            <a:endParaRPr lang="en-US" u="sng" dirty="0"/>
           </a:p>
           <a:p>
             <a:pPr marL="101600" indent="0">
               <a:buNone/>
             </a:pPr>
             <a:r>
-              <a:rPr lang="en-US" dirty="0" smtClean="0"/>
-              <a:t>(</a:t>
-            </a:r>
-            <a:r>
               <a:rPr lang="en-US" dirty="0"/>
-              <a:t>in support of </a:t>
-            </a:r>
-            <a:r>
-              <a:rPr lang="en-US" dirty="0" smtClean="0"/>
-              <a:t>SECURITY theme)</a:t>
-            </a:r>
-          </a:p>
-          <a:p>
-            <a:pPr marL="101600" indent="0">
-              <a:buNone/>
-            </a:pPr>
-            <a:endParaRPr lang="en-US" dirty="0" smtClean="0"/>
-          </a:p>
-          <a:p>
-            <a:pPr marL="101600" indent="0">
-              <a:buNone/>
-            </a:pPr>
-            <a:r>
-              <a:rPr lang="en-US" dirty="0"/>
-              <a:t>As a system admin </a:t>
-            </a:r>
-            <a:r>
-              <a:rPr lang="en-US" dirty="0" smtClean="0"/>
-              <a:t>/ </a:t>
-            </a:r>
-            <a:r>
-              <a:rPr lang="en-US" dirty="0"/>
-              <a:t>security admin, I want </a:t>
-            </a:r>
-            <a:r>
-              <a:rPr lang="en-US" dirty="0" smtClean="0"/>
-              <a:t>a configurable option at installation of </a:t>
-            </a:r>
-            <a:r>
-              <a:rPr lang="en-US" dirty="0" err="1" smtClean="0"/>
-              <a:t>Zowe</a:t>
-            </a:r>
-            <a:r>
-              <a:rPr lang="en-US" dirty="0" smtClean="0"/>
-              <a:t> to use SAF as my authentication provider, thereby eliminating the pre-requisite on z/OSMF, and removing a barrier to my adoption.</a:t>
+              <a:t>(in support of SECURITY theme)</a:t>
             </a:r>
           </a:p>
           <a:p>
@@ -7210,11 +7349,34 @@
               <a:buNone/>
             </a:pPr>
             <a:r>
-              <a:rPr lang="en-US" b="1" dirty="0" smtClean="0"/>
+              <a:rPr lang="en-US" dirty="0"/>
+              <a:t>As a system admin / security admin, I want a configurable option at installation of </a:t>
+            </a:r>
+            <a:r>
+              <a:rPr lang="en-US" dirty="0" err="1"/>
+              <a:t>Zowe</a:t>
+            </a:r>
+            <a:r>
+              <a:rPr lang="en-US" dirty="0"/>
+              <a:t> to use SAF as my authentication provider, thereby eliminating the pre-requisite on z/OSMF, and removing a barrier to my adoption.</a:t>
+            </a:r>
+          </a:p>
+          <a:p>
+            <a:pPr marL="101600" indent="0">
+              <a:buNone/>
+            </a:pPr>
+            <a:endParaRPr lang="en-US" dirty="0"/>
+          </a:p>
+          <a:p>
+            <a:pPr marL="101600" indent="0">
+              <a:buNone/>
+            </a:pPr>
+            <a:r>
+              <a:rPr lang="en-US" b="1" dirty="0"/>
               <a:t>Deliverable: </a:t>
             </a:r>
             <a:r>
-              <a:rPr lang="en-US" dirty="0" smtClean="0"/>
+              <a:rPr lang="en-US" dirty="0"/>
               <a:t>Instead of a call to z/OSMF, APIML will use Java SAF APIs to verify credentials.</a:t>
             </a:r>
             <a:r>
@@ -7233,35 +7395,14 @@
               <a:rPr lang="en-US" dirty="0">
                 <a:sym typeface="Arial"/>
               </a:rPr>
-              <a:t>This will be implemented as </a:t>
-            </a:r>
-            <a:r>
-              <a:rPr lang="en-US" dirty="0" smtClean="0">
-                <a:sym typeface="Arial"/>
-              </a:rPr>
-              <a:t>an additional </a:t>
-            </a:r>
-            <a:r>
-              <a:rPr lang="en-US" dirty="0">
-                <a:sym typeface="Arial"/>
-              </a:rPr>
-              <a:t>provider, the z/OSMF authentication provider will remain the </a:t>
-            </a:r>
-            <a:r>
-              <a:rPr lang="en-US" dirty="0" smtClean="0">
-                <a:sym typeface="Arial"/>
-              </a:rPr>
-              <a:t>default.</a:t>
-            </a:r>
-            <a:endParaRPr lang="en-US" dirty="0">
-              <a:sym typeface="Arial"/>
-            </a:endParaRPr>
+              <a:t>This will be implemented as an additional provider, the z/OSMF authentication provider will remain the default.</a:t>
+            </a:r>
           </a:p>
           <a:p>
             <a:pPr marL="101600" indent="0">
               <a:buNone/>
             </a:pPr>
-            <a:endParaRPr lang="en-US" dirty="0" smtClean="0"/>
+            <a:endParaRPr lang="en-US" dirty="0"/>
           </a:p>
           <a:p>
             <a:pPr marL="101600" indent="0">
@@ -7326,10 +7467,9 @@
           <a:lstStyle/>
           <a:p>
             <a:r>
-              <a:rPr lang="en-US" dirty="0" smtClean="0"/>
+              <a:rPr lang="en-US" dirty="0"/>
               <a:t>Feature 3</a:t>
             </a:r>
-            <a:endParaRPr lang="en-US" dirty="0"/>
           </a:p>
         </p:txBody>
       </p:sp>
@@ -7378,38 +7518,24 @@
               <a:rPr lang="en-US" u="sng" dirty="0">
                 <a:hlinkClick r:id="rId3"/>
               </a:rPr>
-              <a:t> distributor in API Mediation </a:t>
-            </a:r>
-            <a:r>
-              <a:rPr lang="en-US" u="sng" dirty="0" smtClean="0">
-                <a:hlinkClick r:id="rId3"/>
-              </a:rPr>
-              <a:t>Layer </a:t>
-            </a:r>
-            <a:endParaRPr lang="en-US" u="sng" dirty="0" smtClean="0"/>
+              <a:t> distributor in API Mediation Layer </a:t>
+            </a:r>
+            <a:endParaRPr lang="en-US" u="sng" dirty="0"/>
           </a:p>
           <a:p>
             <a:pPr marL="101600" indent="0">
               <a:buNone/>
             </a:pPr>
             <a:r>
-              <a:rPr lang="en-US" dirty="0" smtClean="0"/>
-              <a:t>(in </a:t>
-            </a:r>
-            <a:r>
               <a:rPr lang="en-US" dirty="0"/>
-              <a:t>support of </a:t>
-            </a:r>
-            <a:r>
-              <a:rPr lang="en-US" dirty="0" smtClean="0"/>
-              <a:t>RESILIENCE theme)</a:t>
+              <a:t>(in support of RESILIENCE theme)</a:t>
             </a:r>
           </a:p>
           <a:p>
             <a:pPr marL="101600" indent="0">
               <a:buNone/>
             </a:pPr>
-            <a:endParaRPr lang="en-US" dirty="0" smtClean="0"/>
+            <a:endParaRPr lang="en-US" dirty="0"/>
           </a:p>
           <a:p>
             <a:pPr marL="101600" indent="0">
@@ -7417,38 +7543,26 @@
             </a:pPr>
             <a:r>
               <a:rPr lang="en-US" dirty="0"/>
-              <a:t>As an API consumer, I’m able to rely on </a:t>
-            </a:r>
-            <a:r>
-              <a:rPr lang="en-US" dirty="0" smtClean="0"/>
-              <a:t>API </a:t>
+              <a:t>As an API consumer, I’m able to rely on API routing by APIML with an expectation of 24/7 SLA (given the LPAR remains up).</a:t>
+            </a:r>
+          </a:p>
+          <a:p>
+            <a:pPr marL="101600" indent="0">
+              <a:buNone/>
+            </a:pPr>
+            <a:endParaRPr lang="en-US" b="1" dirty="0"/>
+          </a:p>
+          <a:p>
+            <a:pPr marL="101600" indent="0">
+              <a:buNone/>
+            </a:pPr>
+            <a:r>
+              <a:rPr lang="en-US" b="1" dirty="0"/>
+              <a:t>Deliverable: </a:t>
             </a:r>
             <a:r>
               <a:rPr lang="en-US" dirty="0"/>
-              <a:t>routing by APIML with an expectation of 24/7 SLA (given the LPAR remains up).</a:t>
-            </a:r>
-          </a:p>
-          <a:p>
-            <a:pPr marL="101600" indent="0">
-              <a:buNone/>
-            </a:pPr>
-            <a:endParaRPr lang="en-US" b="1" dirty="0" smtClean="0"/>
-          </a:p>
-          <a:p>
-            <a:pPr marL="101600" indent="0">
-              <a:buNone/>
-            </a:pPr>
-            <a:r>
-              <a:rPr lang="en-US" b="1" dirty="0" smtClean="0"/>
-              <a:t>Deliverable: </a:t>
-            </a:r>
-            <a:r>
-              <a:rPr lang="en-US" dirty="0" smtClean="0"/>
-              <a:t>Dynamic </a:t>
-            </a:r>
-            <a:r>
-              <a:rPr lang="en-US" dirty="0"/>
-              <a:t>Virtual IP Address (DVIPA) will ensure that if an instance of Gateway and EUREKA fails on one system (LPAR1), the other system (LPAR2) continues to provide service functionality through a </a:t>
+              <a:t>Dynamic Virtual IP Address (DVIPA) will ensure that if an instance of Gateway and EUREKA fails on one system (LPAR1), the other system (LPAR2) continues to provide service functionality through a </a:t>
             </a:r>
             <a:r>
               <a:rPr lang="en-US" dirty="0" err="1"/>
@@ -7463,7 +7577,7 @@
             <a:pPr marL="101600" indent="0">
               <a:buNone/>
             </a:pPr>
-            <a:endParaRPr lang="en-US" dirty="0" smtClean="0"/>
+            <a:endParaRPr lang="en-US" dirty="0"/>
           </a:p>
           <a:p>
             <a:pPr marL="101600" indent="0">
@@ -8216,6 +8330,12 @@
 </file>
 
 <file path=customXml/item1.xml><?xml version="1.0" encoding="utf-8"?>
+<p:properties xmlns:p="http://schemas.microsoft.com/office/2006/metadata/properties" xmlns:xsi="http://www.w3.org/2001/XMLSchema-instance" xmlns:pc="http://schemas.microsoft.com/office/infopath/2007/PartnerControls">
+  <documentManagement/>
+</p:properties>
+</file>
+
+<file path=customXml/item2.xml><?xml version="1.0" encoding="utf-8"?>
 <ct:contentTypeSchema xmlns:ct="http://schemas.microsoft.com/office/2006/metadata/contentType" xmlns:ma="http://schemas.microsoft.com/office/2006/metadata/properties/metaAttributes" ct:_="" ma:_="" ma:contentTypeName="Document" ma:contentTypeID="0x01010078366F8B0CAC4944B54E4FE62E1853FF" ma:contentTypeVersion="13" ma:contentTypeDescription="Create a new document." ma:contentTypeScope="" ma:versionID="c0144efe8435d8d2a41eb877ff779f3d">
   <xsd:schema xmlns:xsd="http://www.w3.org/2001/XMLSchema" xmlns:xs="http://www.w3.org/2001/XMLSchema" xmlns:p="http://schemas.microsoft.com/office/2006/metadata/properties" xmlns:ns3="dc93a766-66e7-40cb-ae91-7d18686f06cb" xmlns:ns4="218ddd80-e909-418b-876b-6da869ab062e" targetNamespace="http://schemas.microsoft.com/office/2006/metadata/properties" ma:root="true" ma:fieldsID="98e515d43d9a7e057d5a8f41d3b12b29" ns3:_="" ns4:_="">
     <xsd:import namespace="dc93a766-66e7-40cb-ae91-7d18686f06cb"/>
@@ -8438,7 +8558,7 @@
 </ct:contentTypeSchema>
 </file>
 
-<file path=customXml/item2.xml><?xml version="1.0" encoding="utf-8"?>
+<file path=customXml/item3.xml><?xml version="1.0" encoding="utf-8"?>
 <?mso-contentType ?>
 <FormTemplates xmlns="http://schemas.microsoft.com/sharepoint/v3/contenttype/forms">
   <Display>DocumentLibraryForm</Display>
@@ -8447,13 +8567,24 @@
 </FormTemplates>
 </file>
 
-<file path=customXml/item3.xml><?xml version="1.0" encoding="utf-8"?>
-<p:properties xmlns:p="http://schemas.microsoft.com/office/2006/metadata/properties" xmlns:xsi="http://www.w3.org/2001/XMLSchema-instance" xmlns:pc="http://schemas.microsoft.com/office/infopath/2007/PartnerControls">
-  <documentManagement/>
-</p:properties>
+<file path=customXml/itemProps1.xml><?xml version="1.0" encoding="utf-8"?>
+<ds:datastoreItem xmlns:ds="http://schemas.openxmlformats.org/officeDocument/2006/customXml" ds:itemID="{0A54B724-95FE-4227-A509-89C0BE165019}">
+  <ds:schemaRefs>
+    <ds:schemaRef ds:uri="http://purl.org/dc/terms/"/>
+    <ds:schemaRef ds:uri="218ddd80-e909-418b-876b-6da869ab062e"/>
+    <ds:schemaRef ds:uri="http://purl.org/dc/dcmitype/"/>
+    <ds:schemaRef ds:uri="http://schemas.microsoft.com/office/infopath/2007/PartnerControls"/>
+    <ds:schemaRef ds:uri="http://purl.org/dc/elements/1.1/"/>
+    <ds:schemaRef ds:uri="http://schemas.microsoft.com/office/2006/metadata/properties"/>
+    <ds:schemaRef ds:uri="http://schemas.microsoft.com/office/2006/documentManagement/types"/>
+    <ds:schemaRef ds:uri="http://schemas.openxmlformats.org/package/2006/metadata/core-properties"/>
+    <ds:schemaRef ds:uri="dc93a766-66e7-40cb-ae91-7d18686f06cb"/>
+    <ds:schemaRef ds:uri="http://www.w3.org/XML/1998/namespace"/>
+  </ds:schemaRefs>
+</ds:datastoreItem>
 </file>
 
-<file path=customXml/itemProps1.xml><?xml version="1.0" encoding="utf-8"?>
+<file path=customXml/itemProps2.xml><?xml version="1.0" encoding="utf-8"?>
 <ds:datastoreItem xmlns:ds="http://schemas.openxmlformats.org/officeDocument/2006/customXml" ds:itemID="{75DFD259-8AF4-4CFA-9594-D45098FC5839}">
   <ds:schemaRefs>
     <ds:schemaRef ds:uri="http://schemas.microsoft.com/office/2006/metadata/contentType"/>
@@ -8472,27 +8603,10 @@
 </ds:datastoreItem>
 </file>
 
-<file path=customXml/itemProps2.xml><?xml version="1.0" encoding="utf-8"?>
+<file path=customXml/itemProps3.xml><?xml version="1.0" encoding="utf-8"?>
 <ds:datastoreItem xmlns:ds="http://schemas.openxmlformats.org/officeDocument/2006/customXml" ds:itemID="{B16FB3BA-9F7C-4CD8-B3AB-262CEFAAFDB4}">
   <ds:schemaRefs>
     <ds:schemaRef ds:uri="http://schemas.microsoft.com/sharepoint/v3/contenttype/forms"/>
   </ds:schemaRefs>
 </ds:datastoreItem>
-</file>
-
-<file path=customXml/itemProps3.xml><?xml version="1.0" encoding="utf-8"?>
-<ds:datastoreItem xmlns:ds="http://schemas.openxmlformats.org/officeDocument/2006/customXml" ds:itemID="{0A54B724-95FE-4227-A509-89C0BE165019}">
-  <ds:schemaRefs>
-    <ds:schemaRef ds:uri="http://purl.org/dc/terms/"/>
-    <ds:schemaRef ds:uri="218ddd80-e909-418b-876b-6da869ab062e"/>
-    <ds:schemaRef ds:uri="http://purl.org/dc/dcmitype/"/>
-    <ds:schemaRef ds:uri="http://schemas.microsoft.com/office/infopath/2007/PartnerControls"/>
-    <ds:schemaRef ds:uri="http://purl.org/dc/elements/1.1/"/>
-    <ds:schemaRef ds:uri="http://schemas.microsoft.com/office/2006/metadata/properties"/>
-    <ds:schemaRef ds:uri="http://schemas.microsoft.com/office/2006/documentManagement/types"/>
-    <ds:schemaRef ds:uri="http://schemas.openxmlformats.org/package/2006/metadata/core-properties"/>
-    <ds:schemaRef ds:uri="dc93a766-66e7-40cb-ae91-7d18686f06cb"/>
-    <ds:schemaRef ds:uri="http://www.w3.org/XML/1998/namespace"/>
-  </ds:schemaRefs>
-</ds:datastoreItem>
 </file>
</xml_diff>

<commit_message>
Add CLI Squad Focus
Signed-off-by: MikeBauerCA <35504792+MikeBauerCA@users.noreply.github.com>
</commit_message>
<xml_diff>
--- a/Project Management/20PI3 Planning/Zowe Community Squad Focus for 20PI3.pptx
+++ b/Project Management/20PI3 Planning/Zowe Community Squad Focus for 20PI3.pptx
@@ -5,7 +5,7 @@
     <p:sldMasterId id="2147483653" r:id="rId4"/>
   </p:sldMasterIdLst>
   <p:notesMasterIdLst>
-    <p:notesMasterId r:id="rId27"/>
+    <p:notesMasterId r:id="rId28"/>
   </p:notesMasterIdLst>
   <p:sldIdLst>
     <p:sldId id="279" r:id="rId5"/>
@@ -18,33 +18,34 @@
     <p:sldId id="2142532353" r:id="rId12"/>
     <p:sldId id="2142532361" r:id="rId13"/>
     <p:sldId id="2142532354" r:id="rId14"/>
-    <p:sldId id="2142532362" r:id="rId15"/>
-    <p:sldId id="2142532355" r:id="rId16"/>
-    <p:sldId id="2142532363" r:id="rId17"/>
-    <p:sldId id="2142532359" r:id="rId18"/>
-    <p:sldId id="2142532366" r:id="rId19"/>
-    <p:sldId id="2142532370" r:id="rId20"/>
-    <p:sldId id="2142532356" r:id="rId21"/>
-    <p:sldId id="2142532364" r:id="rId22"/>
-    <p:sldId id="2142532357" r:id="rId23"/>
-    <p:sldId id="2142532365" r:id="rId24"/>
-    <p:sldId id="2142532358" r:id="rId25"/>
-    <p:sldId id="2142532367" r:id="rId26"/>
+    <p:sldId id="2142532371" r:id="rId15"/>
+    <p:sldId id="2142532373" r:id="rId16"/>
+    <p:sldId id="2142532355" r:id="rId17"/>
+    <p:sldId id="2142532363" r:id="rId18"/>
+    <p:sldId id="2142532359" r:id="rId19"/>
+    <p:sldId id="2142532366" r:id="rId20"/>
+    <p:sldId id="2142532370" r:id="rId21"/>
+    <p:sldId id="2142532356" r:id="rId22"/>
+    <p:sldId id="2142532364" r:id="rId23"/>
+    <p:sldId id="2142532357" r:id="rId24"/>
+    <p:sldId id="2142532365" r:id="rId25"/>
+    <p:sldId id="2142532358" r:id="rId26"/>
+    <p:sldId id="2142532367" r:id="rId27"/>
   </p:sldIdLst>
   <p:sldSz cx="9144000" cy="5143500" type="screen16x9"/>
   <p:notesSz cx="6858000" cy="9144000"/>
   <p:embeddedFontLst>
     <p:embeddedFont>
       <p:font typeface="Calibri" panose="020F0502020204030204" pitchFamily="34" charset="0"/>
-      <p:regular r:id="rId28"/>
-      <p:bold r:id="rId29"/>
-      <p:italic r:id="rId30"/>
-      <p:boldItalic r:id="rId31"/>
+      <p:regular r:id="rId29"/>
+      <p:bold r:id="rId30"/>
+      <p:italic r:id="rId31"/>
+      <p:boldItalic r:id="rId32"/>
     </p:embeddedFont>
     <p:embeddedFont>
-      <p:font typeface="Gill Sans" panose="020B0502020104020203" pitchFamily="34" charset="-79"/>
-      <p:regular r:id="rId32"/>
-      <p:bold r:id="rId33"/>
+      <p:font typeface="Gill Sans" panose="020B0604020202020204" charset="0"/>
+      <p:regular r:id="rId33"/>
+      <p:bold r:id="rId34"/>
     </p:embeddedFont>
   </p:embeddedFontLst>
   <p:defaultTextStyle>
@@ -1414,6 +1415,232 @@
 </file>
 
 <file path=ppt/notesSlides/notesSlide5.xml><?xml version="1.0" encoding="utf-8"?>
+<p:notes xmlns:a="http://schemas.openxmlformats.org/drawingml/2006/main" xmlns:r="http://schemas.openxmlformats.org/officeDocument/2006/relationships" xmlns:p="http://schemas.openxmlformats.org/presentationml/2006/main">
+  <p:cSld>
+    <p:spTree>
+      <p:nvGrpSpPr>
+        <p:cNvPr id="1" name=""/>
+        <p:cNvGrpSpPr/>
+        <p:nvPr/>
+      </p:nvGrpSpPr>
+      <p:grpSpPr>
+        <a:xfrm>
+          <a:off x="0" y="0"/>
+          <a:ext cx="0" cy="0"/>
+          <a:chOff x="0" y="0"/>
+          <a:chExt cx="0" cy="0"/>
+        </a:xfrm>
+      </p:grpSpPr>
+      <p:sp>
+        <p:nvSpPr>
+          <p:cNvPr id="2" name="Slide Image Placeholder 1"/>
+          <p:cNvSpPr>
+            <a:spLocks noGrp="1" noRot="1" noChangeAspect="1"/>
+          </p:cNvSpPr>
+          <p:nvPr>
+            <p:ph type="sldImg"/>
+          </p:nvPr>
+        </p:nvSpPr>
+        <p:spPr>
+          <a:xfrm>
+            <a:off x="381000" y="685800"/>
+            <a:ext cx="6096000" cy="3429000"/>
+          </a:xfrm>
+        </p:spPr>
+      </p:sp>
+      <p:sp>
+        <p:nvSpPr>
+          <p:cNvPr id="3" name="Notes Placeholder 2"/>
+          <p:cNvSpPr>
+            <a:spLocks noGrp="1"/>
+          </p:cNvSpPr>
+          <p:nvPr>
+            <p:ph type="body" idx="1"/>
+          </p:nvPr>
+        </p:nvSpPr>
+        <p:spPr/>
+        <p:txBody>
+          <a:bodyPr/>
+          <a:lstStyle/>
+          <a:p>
+            <a:pPr marL="158750" indent="0" rtl="0">
+              <a:buNone/>
+            </a:pPr>
+            <a:r>
+              <a:rPr lang="en-US" sz="1100" b="0" i="0" u="none" strike="noStrike" cap="none" dirty="0">
+                <a:solidFill>
+                  <a:srgbClr val="000000"/>
+                </a:solidFill>
+                <a:effectLst/>
+                <a:latin typeface="Arial"/>
+                <a:ea typeface="Arial"/>
+                <a:cs typeface="Arial"/>
+                <a:sym typeface="Arial"/>
+              </a:rPr>
+              <a:t>Notes: </a:t>
+            </a:r>
+            <a:endParaRPr lang="en-US" b="0" dirty="0">
+              <a:effectLst/>
+            </a:endParaRPr>
+          </a:p>
+          <a:p>
+            <a:pPr marL="158750" indent="0" rtl="0" fontAlgn="base">
+              <a:buNone/>
+            </a:pPr>
+            <a:r>
+              <a:rPr lang="en-US" sz="1100" b="0" i="0" u="none" strike="noStrike" cap="none" dirty="0">
+                <a:solidFill>
+                  <a:srgbClr val="000000"/>
+                </a:solidFill>
+                <a:effectLst/>
+                <a:latin typeface="Arial"/>
+                <a:ea typeface="Arial"/>
+                <a:cs typeface="Arial"/>
+                <a:sym typeface="Arial"/>
+              </a:rPr>
+              <a:t>x.509 is one of the  industry standard ways of authenticating to backend services</a:t>
+            </a:r>
+          </a:p>
+          <a:p>
+            <a:pPr marL="158750" indent="0" rtl="0" fontAlgn="base">
+              <a:buNone/>
+            </a:pPr>
+            <a:r>
+              <a:rPr lang="en-US" sz="1100" b="0" i="0" u="none" strike="noStrike" cap="none" dirty="0" err="1">
+                <a:solidFill>
+                  <a:srgbClr val="000000"/>
+                </a:solidFill>
+                <a:effectLst/>
+                <a:latin typeface="Arial"/>
+                <a:ea typeface="Arial"/>
+                <a:cs typeface="Arial"/>
+                <a:sym typeface="Arial"/>
+              </a:rPr>
+              <a:t>Zowe</a:t>
+            </a:r>
+            <a:r>
+              <a:rPr lang="en-US" sz="1100" b="0" i="0" u="none" strike="noStrike" cap="none" dirty="0">
+                <a:solidFill>
+                  <a:srgbClr val="000000"/>
+                </a:solidFill>
+                <a:effectLst/>
+                <a:latin typeface="Arial"/>
+                <a:ea typeface="Arial"/>
+                <a:cs typeface="Arial"/>
+                <a:sym typeface="Arial"/>
+              </a:rPr>
+              <a:t> Client apps will need to be updated to support client certs</a:t>
+            </a:r>
+          </a:p>
+          <a:p>
+            <a:pPr marL="158750" indent="0" rtl="0" fontAlgn="base">
+              <a:buNone/>
+            </a:pPr>
+            <a:r>
+              <a:rPr lang="en-US" sz="1100" b="0" i="0" u="none" strike="noStrike" cap="none" dirty="0">
+                <a:solidFill>
+                  <a:srgbClr val="000000"/>
+                </a:solidFill>
+                <a:effectLst/>
+                <a:latin typeface="Arial"/>
+                <a:ea typeface="Arial"/>
+                <a:cs typeface="Arial"/>
+                <a:sym typeface="Arial"/>
+              </a:rPr>
+              <a:t>Customer apps may have their own way of supporting client certs</a:t>
+            </a:r>
+          </a:p>
+          <a:p>
+            <a:pPr marL="158750" indent="0">
+              <a:buNone/>
+            </a:pPr>
+            <a:endParaRPr lang="en-US" dirty="0"/>
+          </a:p>
+        </p:txBody>
+      </p:sp>
+    </p:spTree>
+    <p:extLst>
+      <p:ext uri="{BB962C8B-B14F-4D97-AF65-F5344CB8AC3E}">
+        <p14:creationId xmlns:p14="http://schemas.microsoft.com/office/powerpoint/2010/main" val="1014495597"/>
+      </p:ext>
+    </p:extLst>
+  </p:cSld>
+  <p:clrMapOvr>
+    <a:masterClrMapping/>
+  </p:clrMapOvr>
+</p:notes>
+</file>
+
+<file path=ppt/notesSlides/notesSlide6.xml><?xml version="1.0" encoding="utf-8"?>
+<p:notes xmlns:a="http://schemas.openxmlformats.org/drawingml/2006/main" xmlns:r="http://schemas.openxmlformats.org/officeDocument/2006/relationships" xmlns:p="http://schemas.openxmlformats.org/presentationml/2006/main">
+  <p:cSld>
+    <p:spTree>
+      <p:nvGrpSpPr>
+        <p:cNvPr id="1" name=""/>
+        <p:cNvGrpSpPr/>
+        <p:nvPr/>
+      </p:nvGrpSpPr>
+      <p:grpSpPr>
+        <a:xfrm>
+          <a:off x="0" y="0"/>
+          <a:ext cx="0" cy="0"/>
+          <a:chOff x="0" y="0"/>
+          <a:chExt cx="0" cy="0"/>
+        </a:xfrm>
+      </p:grpSpPr>
+      <p:sp>
+        <p:nvSpPr>
+          <p:cNvPr id="2" name="Slide Image Placeholder 1"/>
+          <p:cNvSpPr>
+            <a:spLocks noGrp="1" noRot="1" noChangeAspect="1"/>
+          </p:cNvSpPr>
+          <p:nvPr>
+            <p:ph type="sldImg"/>
+          </p:nvPr>
+        </p:nvSpPr>
+        <p:spPr>
+          <a:xfrm>
+            <a:off x="381000" y="685800"/>
+            <a:ext cx="6096000" cy="3429000"/>
+          </a:xfrm>
+        </p:spPr>
+      </p:sp>
+      <p:sp>
+        <p:nvSpPr>
+          <p:cNvPr id="3" name="Notes Placeholder 2"/>
+          <p:cNvSpPr>
+            <a:spLocks noGrp="1"/>
+          </p:cNvSpPr>
+          <p:nvPr>
+            <p:ph type="body" idx="1"/>
+          </p:nvPr>
+        </p:nvSpPr>
+        <p:spPr/>
+        <p:txBody>
+          <a:bodyPr/>
+          <a:lstStyle/>
+          <a:p>
+            <a:pPr marL="158750" indent="0">
+              <a:buNone/>
+            </a:pPr>
+            <a:endParaRPr lang="en-US" dirty="0"/>
+          </a:p>
+        </p:txBody>
+      </p:sp>
+    </p:spTree>
+    <p:extLst>
+      <p:ext uri="{BB962C8B-B14F-4D97-AF65-F5344CB8AC3E}">
+        <p14:creationId xmlns:p14="http://schemas.microsoft.com/office/powerpoint/2010/main" val="1121660626"/>
+      </p:ext>
+    </p:extLst>
+  </p:cSld>
+  <p:clrMapOvr>
+    <a:masterClrMapping/>
+  </p:clrMapOvr>
+</p:notes>
+</file>
+
+<file path=ppt/notesSlides/notesSlide7.xml><?xml version="1.0" encoding="utf-8"?>
 <p:notes xmlns:a="http://schemas.openxmlformats.org/drawingml/2006/main" xmlns:r="http://schemas.openxmlformats.org/officeDocument/2006/relationships" xmlns:p="http://schemas.openxmlformats.org/presentationml/2006/main">
   <p:cSld>
     <p:spTree>
@@ -5284,6 +5511,13 @@
   <p:clrMapOvr>
     <a:masterClrMapping/>
   </p:clrMapOvr>
+  <p:timing>
+    <p:tnLst>
+      <p:par>
+        <p:cTn id="1" dur="indefinite" restart="never" nodeType="tmRoot"/>
+      </p:par>
+    </p:tnLst>
+  </p:timing>
 </p:sld>
 </file>
 
@@ -5351,6 +5585,13 @@
   <p:transition spd="med">
     <p:fade/>
   </p:transition>
+  <p:timing>
+    <p:tnLst>
+      <p:par>
+        <p:cTn id="1" dur="indefinite" restart="never" nodeType="tmRoot"/>
+      </p:par>
+    </p:tnLst>
+  </p:timing>
 </p:sld>
 </file>
 
@@ -5394,7 +5635,7 @@
           <a:p>
             <a:r>
               <a:rPr lang="en-US" dirty="0"/>
-              <a:t>Features</a:t>
+              <a:t>Feature 1</a:t>
             </a:r>
           </a:p>
         </p:txBody>
@@ -5415,30 +5656,120 @@
             <p:ph type="body" idx="1"/>
           </p:nvPr>
         </p:nvSpPr>
-        <p:spPr/>
+        <p:spPr>
+          <a:xfrm>
+            <a:off x="306211" y="774096"/>
+            <a:ext cx="8369400" cy="4147860"/>
+          </a:xfrm>
+        </p:spPr>
         <p:txBody>
           <a:bodyPr/>
           <a:lstStyle/>
           <a:p>
+            <a:pPr marL="101600" indent="0">
+              <a:buNone/>
+            </a:pPr>
             <a:r>
               <a:rPr lang="en-US" dirty="0"/>
-              <a:t>Feature </a:t>
+              <a:t>Application developers and those developing scripts to drive interaction with z/OS </a:t>
+            </a:r>
+            <a:r>
+              <a:rPr lang="en-US" dirty="0" smtClean="0"/>
+              <a:t>can easily </a:t>
+            </a:r>
+            <a:r>
+              <a:rPr lang="en-US" dirty="0"/>
+              <a:t>learn about, access, and leverage </a:t>
             </a:r>
             <a:r>
               <a:rPr lang="en-US" dirty="0" err="1"/>
-              <a:t>xxxx</a:t>
+              <a:t>Zowe</a:t>
             </a:r>
             <a:r>
               <a:rPr lang="en-US" dirty="0"/>
-              <a:t> (in support of theme xxx)</a:t>
-            </a:r>
+              <a:t> SDKs to implement an initial use case.</a:t>
+            </a:r>
+            <a:endParaRPr lang="en-US" dirty="0"/>
+          </a:p>
+          <a:p>
+            <a:pPr marL="101600" indent="0">
+              <a:buNone/>
+            </a:pPr>
+            <a:r>
+              <a:rPr lang="en-US" u="sng" dirty="0" smtClean="0"/>
+              <a:t/>
+            </a:r>
+            <a:br>
+              <a:rPr lang="en-US" u="sng" dirty="0" smtClean="0"/>
+            </a:br>
+            <a:r>
+              <a:rPr lang="en-US" b="1" dirty="0" smtClean="0"/>
+              <a:t>Deliverables: </a:t>
+            </a:r>
+            <a:r>
+              <a:rPr lang="en-US" dirty="0" smtClean="0"/>
+              <a:t>Documentation is published on our </a:t>
+            </a:r>
+            <a:r>
+              <a:rPr lang="en-US" dirty="0" err="1" smtClean="0"/>
+              <a:t>Zowe</a:t>
+            </a:r>
+            <a:r>
+              <a:rPr lang="en-US" dirty="0" smtClean="0"/>
+              <a:t> Docs site covering the overview and use of the SDKs as well as documenting how the community can contribute to the technology. In addition, detailed samples that leverage the SDKs are provided within each repository.</a:t>
+            </a:r>
+            <a:br>
+              <a:rPr lang="en-US" dirty="0" smtClean="0"/>
+            </a:br>
+            <a:r>
+              <a:rPr lang="en-US" dirty="0" smtClean="0"/>
+              <a:t/>
+            </a:r>
+            <a:br>
+              <a:rPr lang="en-US" dirty="0" smtClean="0"/>
+            </a:br>
+            <a:r>
+              <a:rPr lang="en-US" dirty="0" smtClean="0"/>
+              <a:t>To further drive visibility and adoption, the </a:t>
+            </a:r>
+            <a:r>
+              <a:rPr lang="en-US" dirty="0" err="1" smtClean="0"/>
+              <a:t>Zowe</a:t>
+            </a:r>
+            <a:r>
+              <a:rPr lang="en-US" dirty="0" smtClean="0"/>
+              <a:t> Node SDK is published to public </a:t>
+            </a:r>
+            <a:r>
+              <a:rPr lang="en-US" dirty="0" err="1" smtClean="0"/>
+              <a:t>npm</a:t>
+            </a:r>
+            <a:r>
+              <a:rPr lang="en-US" dirty="0" smtClean="0"/>
+              <a:t> separate from the </a:t>
+            </a:r>
+            <a:r>
+              <a:rPr lang="en-US" dirty="0" err="1" smtClean="0"/>
+              <a:t>Zowe</a:t>
+            </a:r>
+            <a:r>
+              <a:rPr lang="en-US" dirty="0" smtClean="0"/>
+              <a:t> CLI.</a:t>
+            </a:r>
+            <a:endParaRPr lang="en-US" dirty="0"/>
+          </a:p>
+          <a:p>
+            <a:pPr marL="101600" indent="0">
+              <a:buNone/>
+            </a:pPr>
+            <a:endParaRPr lang="en-US" dirty="0"/>
           </a:p>
         </p:txBody>
       </p:sp>
     </p:spTree>
     <p:extLst>
       <p:ext uri="{BB962C8B-B14F-4D97-AF65-F5344CB8AC3E}">
-        <p14:creationId xmlns:p14="http://schemas.microsoft.com/office/powerpoint/2010/main" val="3888714458"/>
+        <p14:creationId xmlns:p14="http://schemas.microsoft.com/office/powerpoint/2010/main" val="2003776068"/>
       </p:ext>
     </p:extLst>
   </p:cSld>
@@ -5448,10 +5779,174 @@
   <p:transition spd="med">
     <p:fade thruBlk="1"/>
   </p:transition>
+  <p:timing>
+    <p:tnLst>
+      <p:par>
+        <p:cTn id="1" dur="indefinite" restart="never" nodeType="tmRoot"/>
+      </p:par>
+    </p:tnLst>
+  </p:timing>
 </p:sld>
 </file>
 
 <file path=ppt/slides/slide12.xml><?xml version="1.0" encoding="utf-8"?>
+<p:sld xmlns:a="http://schemas.openxmlformats.org/drawingml/2006/main" xmlns:r="http://schemas.openxmlformats.org/officeDocument/2006/relationships" xmlns:p="http://schemas.openxmlformats.org/presentationml/2006/main">
+  <p:cSld>
+    <p:spTree>
+      <p:nvGrpSpPr>
+        <p:cNvPr id="1" name=""/>
+        <p:cNvGrpSpPr/>
+        <p:nvPr/>
+      </p:nvGrpSpPr>
+      <p:grpSpPr>
+        <a:xfrm>
+          <a:off x="0" y="0"/>
+          <a:ext cx="0" cy="0"/>
+          <a:chOff x="0" y="0"/>
+          <a:chExt cx="0" cy="0"/>
+        </a:xfrm>
+      </p:grpSpPr>
+      <p:sp>
+        <p:nvSpPr>
+          <p:cNvPr id="3" name="Title 2">
+            <a:extLst>
+              <a:ext uri="{FF2B5EF4-FFF2-40B4-BE49-F238E27FC236}">
+                <a16:creationId xmlns:a16="http://schemas.microsoft.com/office/drawing/2014/main" id="{CFEEEE36-E132-0D40-A4B8-9BDC5C8B6528}"/>
+              </a:ext>
+            </a:extLst>
+          </p:cNvPr>
+          <p:cNvSpPr>
+            <a:spLocks noGrp="1"/>
+          </p:cNvSpPr>
+          <p:nvPr>
+            <p:ph type="title"/>
+          </p:nvPr>
+        </p:nvSpPr>
+        <p:spPr/>
+        <p:txBody>
+          <a:bodyPr/>
+          <a:lstStyle/>
+          <a:p>
+            <a:r>
+              <a:rPr lang="en-US" dirty="0"/>
+              <a:t>Feature </a:t>
+            </a:r>
+            <a:r>
+              <a:rPr lang="en-US" dirty="0" smtClean="0"/>
+              <a:t>2</a:t>
+            </a:r>
+            <a:endParaRPr lang="en-US" dirty="0"/>
+          </a:p>
+        </p:txBody>
+      </p:sp>
+      <p:sp>
+        <p:nvSpPr>
+          <p:cNvPr id="4" name="Text Placeholder 3">
+            <a:extLst>
+              <a:ext uri="{FF2B5EF4-FFF2-40B4-BE49-F238E27FC236}">
+                <a16:creationId xmlns:a16="http://schemas.microsoft.com/office/drawing/2014/main" id="{C0DB4ECB-A7D5-6B47-8180-75CB3C3DB7DE}"/>
+              </a:ext>
+            </a:extLst>
+          </p:cNvPr>
+          <p:cNvSpPr>
+            <a:spLocks noGrp="1"/>
+          </p:cNvSpPr>
+          <p:nvPr>
+            <p:ph type="body" idx="1"/>
+          </p:nvPr>
+        </p:nvSpPr>
+        <p:spPr>
+          <a:xfrm>
+            <a:off x="306211" y="774096"/>
+            <a:ext cx="8369400" cy="4147860"/>
+          </a:xfrm>
+        </p:spPr>
+        <p:txBody>
+          <a:bodyPr/>
+          <a:lstStyle/>
+          <a:p>
+            <a:pPr marL="101600" indent="0">
+              <a:buNone/>
+            </a:pPr>
+            <a:r>
+              <a:rPr lang="en-US" dirty="0"/>
+              <a:t>Those leveraging </a:t>
+            </a:r>
+            <a:r>
+              <a:rPr lang="en-US" dirty="0" err="1"/>
+              <a:t>Zowe</a:t>
+            </a:r>
+            <a:r>
+              <a:rPr lang="en-US" dirty="0"/>
+              <a:t> client technologies </a:t>
+            </a:r>
+            <a:r>
+              <a:rPr lang="en-US" dirty="0" smtClean="0"/>
+              <a:t>can store </a:t>
+            </a:r>
+            <a:r>
+              <a:rPr lang="en-US" dirty="0"/>
+              <a:t>all connection details and command option preferences in a single profile allowing for quick initial configuration and reduced effort when updating properties</a:t>
+            </a:r>
+            <a:r>
+              <a:rPr lang="en-US" dirty="0" smtClean="0"/>
+              <a:t>.</a:t>
+            </a:r>
+            <a:br>
+              <a:rPr lang="en-US" dirty="0" smtClean="0"/>
+            </a:br>
+            <a:endParaRPr lang="en-US" b="1" dirty="0"/>
+          </a:p>
+          <a:p>
+            <a:pPr marL="101600" indent="0">
+              <a:buNone/>
+            </a:pPr>
+            <a:r>
+              <a:rPr lang="en-US" b="1" dirty="0"/>
+              <a:t>Deliverable: </a:t>
+            </a:r>
+            <a:r>
+              <a:rPr lang="en-US" dirty="0" smtClean="0"/>
+              <a:t>Simplified </a:t>
+            </a:r>
+            <a:r>
+              <a:rPr lang="en-US" dirty="0"/>
+              <a:t>profile management by allowing all profile options to be specified in a single base profile. This is an enhancement to the core CLI.</a:t>
+            </a:r>
+            <a:endParaRPr lang="en-US" dirty="0"/>
+          </a:p>
+          <a:p>
+            <a:pPr marL="101600" indent="0">
+              <a:buNone/>
+            </a:pPr>
+            <a:endParaRPr lang="en-US" dirty="0"/>
+          </a:p>
+        </p:txBody>
+      </p:sp>
+    </p:spTree>
+    <p:extLst>
+      <p:ext uri="{BB962C8B-B14F-4D97-AF65-F5344CB8AC3E}">
+        <p14:creationId xmlns:p14="http://schemas.microsoft.com/office/powerpoint/2010/main" val="3854920584"/>
+      </p:ext>
+    </p:extLst>
+  </p:cSld>
+  <p:clrMapOvr>
+    <a:masterClrMapping/>
+  </p:clrMapOvr>
+  <p:transition spd="med">
+    <p:fade thruBlk="1"/>
+  </p:transition>
+  <p:timing>
+    <p:tnLst>
+      <p:par>
+        <p:cTn id="1" dur="indefinite" restart="never" nodeType="tmRoot"/>
+      </p:par>
+    </p:tnLst>
+  </p:timing>
+</p:sld>
+</file>
+
+<file path=ppt/slides/slide13.xml><?xml version="1.0" encoding="utf-8"?>
 <p:sld xmlns:a="http://schemas.openxmlformats.org/drawingml/2006/main" xmlns:r="http://schemas.openxmlformats.org/officeDocument/2006/relationships" xmlns:p="http://schemas.openxmlformats.org/presentationml/2006/main">
   <p:cSld>
     <p:spTree>
@@ -5527,10 +6022,17 @@
   <p:transition spd="med">
     <p:fade/>
   </p:transition>
+  <p:timing>
+    <p:tnLst>
+      <p:par>
+        <p:cTn id="1" dur="indefinite" restart="never" nodeType="tmRoot"/>
+      </p:par>
+    </p:tnLst>
+  </p:timing>
 </p:sld>
 </file>
 
-<file path=ppt/slides/slide13.xml><?xml version="1.0" encoding="utf-8"?>
+<file path=ppt/slides/slide14.xml><?xml version="1.0" encoding="utf-8"?>
 <p:sld xmlns:a="http://schemas.openxmlformats.org/drawingml/2006/main" xmlns:r="http://schemas.openxmlformats.org/officeDocument/2006/relationships" xmlns:p="http://schemas.openxmlformats.org/presentationml/2006/main">
   <p:cSld>
     <p:spTree>
@@ -5624,10 +6126,17 @@
   <p:transition spd="med">
     <p:fade thruBlk="1"/>
   </p:transition>
+  <p:timing>
+    <p:tnLst>
+      <p:par>
+        <p:cTn id="1" dur="indefinite" restart="never" nodeType="tmRoot"/>
+      </p:par>
+    </p:tnLst>
+  </p:timing>
 </p:sld>
 </file>
 
-<file path=ppt/slides/slide14.xml><?xml version="1.0" encoding="utf-8"?>
+<file path=ppt/slides/slide15.xml><?xml version="1.0" encoding="utf-8"?>
 <p:sld xmlns:a="http://schemas.openxmlformats.org/drawingml/2006/main" xmlns:r="http://schemas.openxmlformats.org/officeDocument/2006/relationships" xmlns:p="http://schemas.openxmlformats.org/presentationml/2006/main">
   <p:cSld>
     <p:spTree>
@@ -5691,100 +6200,13 @@
   <p:transition spd="med">
     <p:fade/>
   </p:transition>
-</p:sld>
-</file>
-
-<file path=ppt/slides/slide15.xml><?xml version="1.0" encoding="utf-8"?>
-<p:sld xmlns:a="http://schemas.openxmlformats.org/drawingml/2006/main" xmlns:r="http://schemas.openxmlformats.org/officeDocument/2006/relationships" xmlns:p="http://schemas.openxmlformats.org/presentationml/2006/main">
-  <p:cSld>
-    <p:spTree>
-      <p:nvGrpSpPr>
-        <p:cNvPr id="1" name=""/>
-        <p:cNvGrpSpPr/>
-        <p:nvPr/>
-      </p:nvGrpSpPr>
-      <p:grpSpPr>
-        <a:xfrm>
-          <a:off x="0" y="0"/>
-          <a:ext cx="0" cy="0"/>
-          <a:chOff x="0" y="0"/>
-          <a:chExt cx="0" cy="0"/>
-        </a:xfrm>
-      </p:grpSpPr>
-      <p:sp>
-        <p:nvSpPr>
-          <p:cNvPr id="3" name="Title 2">
-            <a:extLst>
-              <a:ext uri="{FF2B5EF4-FFF2-40B4-BE49-F238E27FC236}">
-                <a16:creationId xmlns:a16="http://schemas.microsoft.com/office/drawing/2014/main" id="{CFEEEE36-E132-0D40-A4B8-9BDC5C8B6528}"/>
-              </a:ext>
-            </a:extLst>
-          </p:cNvPr>
-          <p:cNvSpPr>
-            <a:spLocks noGrp="1"/>
-          </p:cNvSpPr>
-          <p:nvPr>
-            <p:ph type="title"/>
-          </p:nvPr>
-        </p:nvSpPr>
-        <p:spPr/>
-        <p:txBody>
-          <a:bodyPr/>
-          <a:lstStyle/>
-          <a:p>
-            <a:r>
-              <a:rPr lang="en-US" dirty="0"/>
-              <a:t>Focus</a:t>
-            </a:r>
-          </a:p>
-        </p:txBody>
-      </p:sp>
-      <p:sp>
-        <p:nvSpPr>
-          <p:cNvPr id="4" name="Text Placeholder 3">
-            <a:extLst>
-              <a:ext uri="{FF2B5EF4-FFF2-40B4-BE49-F238E27FC236}">
-                <a16:creationId xmlns:a16="http://schemas.microsoft.com/office/drawing/2014/main" id="{C0DB4ECB-A7D5-6B47-8180-75CB3C3DB7DE}"/>
-              </a:ext>
-            </a:extLst>
-          </p:cNvPr>
-          <p:cNvSpPr>
-            <a:spLocks noGrp="1"/>
-          </p:cNvSpPr>
-          <p:nvPr>
-            <p:ph type="body" idx="1"/>
-          </p:nvPr>
-        </p:nvSpPr>
-        <p:spPr/>
-        <p:txBody>
-          <a:bodyPr/>
-          <a:lstStyle/>
-          <a:p>
-            <a:r>
-              <a:rPr lang="en-US" dirty="0"/>
-              <a:t>Focus </a:t>
-            </a:r>
-            <a:r>
-              <a:rPr lang="en-US" dirty="0" err="1"/>
-              <a:t>xxxx</a:t>
-            </a:r>
-            <a:endParaRPr lang="en-US" dirty="0"/>
-          </a:p>
-        </p:txBody>
-      </p:sp>
-    </p:spTree>
-    <p:extLst>
-      <p:ext uri="{BB962C8B-B14F-4D97-AF65-F5344CB8AC3E}">
-        <p14:creationId xmlns:p14="http://schemas.microsoft.com/office/powerpoint/2010/main" val="2827431278"/>
-      </p:ext>
-    </p:extLst>
-  </p:cSld>
-  <p:clrMapOvr>
-    <a:masterClrMapping/>
-  </p:clrMapOvr>
-  <p:transition spd="med">
-    <p:fade thruBlk="1"/>
-  </p:transition>
+  <p:timing>
+    <p:tnLst>
+      <p:par>
+        <p:cTn id="1" dur="indefinite" restart="never" nodeType="tmRoot"/>
+      </p:par>
+    </p:tnLst>
+  </p:timing>
 </p:sld>
 </file>
 
@@ -5849,6 +6271,107 @@
             <p:ph type="body" idx="1"/>
           </p:nvPr>
         </p:nvSpPr>
+        <p:spPr/>
+        <p:txBody>
+          <a:bodyPr/>
+          <a:lstStyle/>
+          <a:p>
+            <a:r>
+              <a:rPr lang="en-US" dirty="0"/>
+              <a:t>Focus </a:t>
+            </a:r>
+            <a:r>
+              <a:rPr lang="en-US" dirty="0" err="1"/>
+              <a:t>xxxx</a:t>
+            </a:r>
+            <a:endParaRPr lang="en-US" dirty="0"/>
+          </a:p>
+        </p:txBody>
+      </p:sp>
+    </p:spTree>
+    <p:extLst>
+      <p:ext uri="{BB962C8B-B14F-4D97-AF65-F5344CB8AC3E}">
+        <p14:creationId xmlns:p14="http://schemas.microsoft.com/office/powerpoint/2010/main" val="2827431278"/>
+      </p:ext>
+    </p:extLst>
+  </p:cSld>
+  <p:clrMapOvr>
+    <a:masterClrMapping/>
+  </p:clrMapOvr>
+  <p:transition spd="med">
+    <p:fade thruBlk="1"/>
+  </p:transition>
+  <p:timing>
+    <p:tnLst>
+      <p:par>
+        <p:cTn id="1" dur="indefinite" restart="never" nodeType="tmRoot"/>
+      </p:par>
+    </p:tnLst>
+  </p:timing>
+</p:sld>
+</file>
+
+<file path=ppt/slides/slide17.xml><?xml version="1.0" encoding="utf-8"?>
+<p:sld xmlns:a="http://schemas.openxmlformats.org/drawingml/2006/main" xmlns:r="http://schemas.openxmlformats.org/officeDocument/2006/relationships" xmlns:p="http://schemas.openxmlformats.org/presentationml/2006/main">
+  <p:cSld>
+    <p:spTree>
+      <p:nvGrpSpPr>
+        <p:cNvPr id="1" name=""/>
+        <p:cNvGrpSpPr/>
+        <p:nvPr/>
+      </p:nvGrpSpPr>
+      <p:grpSpPr>
+        <a:xfrm>
+          <a:off x="0" y="0"/>
+          <a:ext cx="0" cy="0"/>
+          <a:chOff x="0" y="0"/>
+          <a:chExt cx="0" cy="0"/>
+        </a:xfrm>
+      </p:grpSpPr>
+      <p:sp>
+        <p:nvSpPr>
+          <p:cNvPr id="3" name="Title 2">
+            <a:extLst>
+              <a:ext uri="{FF2B5EF4-FFF2-40B4-BE49-F238E27FC236}">
+                <a16:creationId xmlns:a16="http://schemas.microsoft.com/office/drawing/2014/main" id="{CFEEEE36-E132-0D40-A4B8-9BDC5C8B6528}"/>
+              </a:ext>
+            </a:extLst>
+          </p:cNvPr>
+          <p:cNvSpPr>
+            <a:spLocks noGrp="1"/>
+          </p:cNvSpPr>
+          <p:nvPr>
+            <p:ph type="title"/>
+          </p:nvPr>
+        </p:nvSpPr>
+        <p:spPr/>
+        <p:txBody>
+          <a:bodyPr/>
+          <a:lstStyle/>
+          <a:p>
+            <a:r>
+              <a:rPr lang="en-US" dirty="0"/>
+              <a:t>Focus</a:t>
+            </a:r>
+          </a:p>
+        </p:txBody>
+      </p:sp>
+      <p:sp>
+        <p:nvSpPr>
+          <p:cNvPr id="4" name="Text Placeholder 3">
+            <a:extLst>
+              <a:ext uri="{FF2B5EF4-FFF2-40B4-BE49-F238E27FC236}">
+                <a16:creationId xmlns:a16="http://schemas.microsoft.com/office/drawing/2014/main" id="{C0DB4ECB-A7D5-6B47-8180-75CB3C3DB7DE}"/>
+              </a:ext>
+            </a:extLst>
+          </p:cNvPr>
+          <p:cNvSpPr>
+            <a:spLocks noGrp="1"/>
+          </p:cNvSpPr>
+          <p:nvPr>
+            <p:ph type="body" idx="1"/>
+          </p:nvPr>
+        </p:nvSpPr>
         <p:spPr>
           <a:xfrm>
             <a:off x="317500" y="943428"/>
@@ -5950,10 +6473,17 @@
   <p:transition spd="med">
     <p:fade thruBlk="1"/>
   </p:transition>
+  <p:timing>
+    <p:tnLst>
+      <p:par>
+        <p:cTn id="1" dur="indefinite" restart="never" nodeType="tmRoot"/>
+      </p:par>
+    </p:tnLst>
+  </p:timing>
 </p:sld>
 </file>
 
-<file path=ppt/slides/slide17.xml><?xml version="1.0" encoding="utf-8"?>
+<file path=ppt/slides/slide18.xml><?xml version="1.0" encoding="utf-8"?>
 <p:sld xmlns:a="http://schemas.openxmlformats.org/drawingml/2006/main" xmlns:r="http://schemas.openxmlformats.org/officeDocument/2006/relationships" xmlns:p="http://schemas.openxmlformats.org/presentationml/2006/main">
   <p:cSld>
     <p:spTree>
@@ -6025,10 +6555,17 @@
   <p:transition spd="med">
     <p:fade/>
   </p:transition>
+  <p:timing>
+    <p:tnLst>
+      <p:par>
+        <p:cTn id="1" dur="indefinite" restart="never" nodeType="tmRoot"/>
+      </p:par>
+    </p:tnLst>
+  </p:timing>
 </p:sld>
 </file>
 
-<file path=ppt/slides/slide18.xml><?xml version="1.0" encoding="utf-8"?>
+<file path=ppt/slides/slide19.xml><?xml version="1.0" encoding="utf-8"?>
 <p:sld xmlns:a="http://schemas.openxmlformats.org/drawingml/2006/main" xmlns:r="http://schemas.openxmlformats.org/officeDocument/2006/relationships" xmlns:p="http://schemas.openxmlformats.org/presentationml/2006/main">
   <p:cSld>
     <p:spTree>
@@ -6122,78 +6659,13 @@
   <p:transition spd="med">
     <p:fade thruBlk="1"/>
   </p:transition>
-</p:sld>
-</file>
-
-<file path=ppt/slides/slide19.xml><?xml version="1.0" encoding="utf-8"?>
-<p:sld xmlns:a="http://schemas.openxmlformats.org/drawingml/2006/main" xmlns:r="http://schemas.openxmlformats.org/officeDocument/2006/relationships" xmlns:p="http://schemas.openxmlformats.org/presentationml/2006/main">
-  <p:cSld>
-    <p:spTree>
-      <p:nvGrpSpPr>
-        <p:cNvPr id="1" name=""/>
-        <p:cNvGrpSpPr/>
-        <p:nvPr/>
-      </p:nvGrpSpPr>
-      <p:grpSpPr>
-        <a:xfrm>
-          <a:off x="0" y="0"/>
-          <a:ext cx="0" cy="0"/>
-          <a:chOff x="0" y="0"/>
-          <a:chExt cx="0" cy="0"/>
-        </a:xfrm>
-      </p:grpSpPr>
-      <p:sp>
-        <p:nvSpPr>
-          <p:cNvPr id="2" name="Text Placeholder 1">
-            <a:extLst>
-              <a:ext uri="{FF2B5EF4-FFF2-40B4-BE49-F238E27FC236}">
-                <a16:creationId xmlns:a16="http://schemas.microsoft.com/office/drawing/2014/main" id="{ADB2E00A-906F-6645-9A30-53C6D93DC43C}"/>
-              </a:ext>
-            </a:extLst>
-          </p:cNvPr>
-          <p:cNvSpPr>
-            <a:spLocks noGrp="1"/>
-          </p:cNvSpPr>
-          <p:nvPr>
-            <p:ph type="body" idx="1"/>
-          </p:nvPr>
-        </p:nvSpPr>
-        <p:spPr>
-          <a:xfrm>
-            <a:off x="308609" y="3525959"/>
-            <a:ext cx="6863371" cy="392400"/>
-          </a:xfrm>
-        </p:spPr>
-        <p:txBody>
-          <a:bodyPr/>
-          <a:lstStyle/>
-          <a:p>
-            <a:r>
-              <a:rPr lang="en-US" dirty="0"/>
-              <a:t>Expanded CI/CD work-group Focus</a:t>
-            </a:r>
-          </a:p>
-          <a:p>
-            <a:r>
-              <a:rPr lang="en-US" sz="2000" dirty="0"/>
-              <a:t>Steven Horsman (Squad Lead)</a:t>
-            </a:r>
-          </a:p>
-        </p:txBody>
-      </p:sp>
-    </p:spTree>
-    <p:extLst>
-      <p:ext uri="{BB962C8B-B14F-4D97-AF65-F5344CB8AC3E}">
-        <p14:creationId xmlns:p14="http://schemas.microsoft.com/office/powerpoint/2010/main" val="2927219770"/>
-      </p:ext>
-    </p:extLst>
-  </p:cSld>
-  <p:clrMapOvr>
-    <a:masterClrMapping/>
-  </p:clrMapOvr>
-  <p:transition spd="med">
-    <p:fade/>
-  </p:transition>
+  <p:timing>
+    <p:tnLst>
+      <p:par>
+        <p:cTn id="1" dur="indefinite" restart="never" nodeType="tmRoot"/>
+      </p:par>
+    </p:tnLst>
+  </p:timing>
 </p:sld>
 </file>
 
@@ -6323,10 +6795,96 @@
   <p:transition spd="med">
     <p:fade/>
   </p:transition>
+  <p:timing>
+    <p:tnLst>
+      <p:par>
+        <p:cTn id="1" dur="indefinite" restart="never" nodeType="tmRoot"/>
+      </p:par>
+    </p:tnLst>
+  </p:timing>
 </p:sld>
 </file>
 
 <file path=ppt/slides/slide20.xml><?xml version="1.0" encoding="utf-8"?>
+<p:sld xmlns:a="http://schemas.openxmlformats.org/drawingml/2006/main" xmlns:r="http://schemas.openxmlformats.org/officeDocument/2006/relationships" xmlns:p="http://schemas.openxmlformats.org/presentationml/2006/main">
+  <p:cSld>
+    <p:spTree>
+      <p:nvGrpSpPr>
+        <p:cNvPr id="1" name=""/>
+        <p:cNvGrpSpPr/>
+        <p:nvPr/>
+      </p:nvGrpSpPr>
+      <p:grpSpPr>
+        <a:xfrm>
+          <a:off x="0" y="0"/>
+          <a:ext cx="0" cy="0"/>
+          <a:chOff x="0" y="0"/>
+          <a:chExt cx="0" cy="0"/>
+        </a:xfrm>
+      </p:grpSpPr>
+      <p:sp>
+        <p:nvSpPr>
+          <p:cNvPr id="2" name="Text Placeholder 1">
+            <a:extLst>
+              <a:ext uri="{FF2B5EF4-FFF2-40B4-BE49-F238E27FC236}">
+                <a16:creationId xmlns:a16="http://schemas.microsoft.com/office/drawing/2014/main" id="{ADB2E00A-906F-6645-9A30-53C6D93DC43C}"/>
+              </a:ext>
+            </a:extLst>
+          </p:cNvPr>
+          <p:cNvSpPr>
+            <a:spLocks noGrp="1"/>
+          </p:cNvSpPr>
+          <p:nvPr>
+            <p:ph type="body" idx="1"/>
+          </p:nvPr>
+        </p:nvSpPr>
+        <p:spPr>
+          <a:xfrm>
+            <a:off x="308609" y="3525959"/>
+            <a:ext cx="6863371" cy="392400"/>
+          </a:xfrm>
+        </p:spPr>
+        <p:txBody>
+          <a:bodyPr/>
+          <a:lstStyle/>
+          <a:p>
+            <a:r>
+              <a:rPr lang="en-US" dirty="0"/>
+              <a:t>Expanded CI/CD work-group Focus</a:t>
+            </a:r>
+          </a:p>
+          <a:p>
+            <a:r>
+              <a:rPr lang="en-US" sz="2000" dirty="0"/>
+              <a:t>Steven Horsman (Squad Lead)</a:t>
+            </a:r>
+          </a:p>
+        </p:txBody>
+      </p:sp>
+    </p:spTree>
+    <p:extLst>
+      <p:ext uri="{BB962C8B-B14F-4D97-AF65-F5344CB8AC3E}">
+        <p14:creationId xmlns:p14="http://schemas.microsoft.com/office/powerpoint/2010/main" val="2927219770"/>
+      </p:ext>
+    </p:extLst>
+  </p:cSld>
+  <p:clrMapOvr>
+    <a:masterClrMapping/>
+  </p:clrMapOvr>
+  <p:transition spd="med">
+    <p:fade/>
+  </p:transition>
+  <p:timing>
+    <p:tnLst>
+      <p:par>
+        <p:cTn id="1" dur="indefinite" restart="never" nodeType="tmRoot"/>
+      </p:par>
+    </p:tnLst>
+  </p:timing>
+</p:sld>
+</file>
+
+<file path=ppt/slides/slide21.xml><?xml version="1.0" encoding="utf-8"?>
 <p:sld xmlns:a="http://schemas.openxmlformats.org/drawingml/2006/main" xmlns:r="http://schemas.openxmlformats.org/officeDocument/2006/relationships" xmlns:p="http://schemas.openxmlformats.org/presentationml/2006/main">
   <p:cSld>
     <p:spTree>
@@ -6420,10 +6978,17 @@
   <p:transition spd="med">
     <p:fade thruBlk="1"/>
   </p:transition>
+  <p:timing>
+    <p:tnLst>
+      <p:par>
+        <p:cTn id="1" dur="indefinite" restart="never" nodeType="tmRoot"/>
+      </p:par>
+    </p:tnLst>
+  </p:timing>
 </p:sld>
 </file>
 
-<file path=ppt/slides/slide21.xml><?xml version="1.0" encoding="utf-8"?>
+<file path=ppt/slides/slide22.xml><?xml version="1.0" encoding="utf-8"?>
 <p:sld xmlns:a="http://schemas.openxmlformats.org/drawingml/2006/main" xmlns:r="http://schemas.openxmlformats.org/officeDocument/2006/relationships" xmlns:p="http://schemas.openxmlformats.org/presentationml/2006/main">
   <p:cSld>
     <p:spTree>
@@ -6503,10 +7068,17 @@
   <p:transition spd="med">
     <p:fade/>
   </p:transition>
+  <p:timing>
+    <p:tnLst>
+      <p:par>
+        <p:cTn id="1" dur="indefinite" restart="never" nodeType="tmRoot"/>
+      </p:par>
+    </p:tnLst>
+  </p:timing>
 </p:sld>
 </file>
 
-<file path=ppt/slides/slide22.xml><?xml version="1.0" encoding="utf-8"?>
+<file path=ppt/slides/slide23.xml><?xml version="1.0" encoding="utf-8"?>
 <p:sld xmlns:a="http://schemas.openxmlformats.org/drawingml/2006/main" xmlns:r="http://schemas.openxmlformats.org/officeDocument/2006/relationships" xmlns:p="http://schemas.openxmlformats.org/presentationml/2006/main">
   <p:cSld>
     <p:spTree>
@@ -6835,6 +7407,13 @@
   <p:transition spd="med">
     <p:fade thruBlk="1"/>
   </p:transition>
+  <p:timing>
+    <p:tnLst>
+      <p:par>
+        <p:cTn id="1" dur="indefinite" restart="never" nodeType="tmRoot"/>
+      </p:par>
+    </p:tnLst>
+  </p:timing>
 </p:sld>
 </file>
 
@@ -6985,6 +7564,13 @@
   <p:transition spd="med">
     <p:fade thruBlk="1"/>
   </p:transition>
+  <p:timing>
+    <p:tnLst>
+      <p:par>
+        <p:cTn id="1" dur="indefinite" restart="never" nodeType="tmRoot"/>
+      </p:par>
+    </p:tnLst>
+  </p:timing>
 </p:sld>
 </file>
 
@@ -7060,6 +7646,13 @@
   <p:transition spd="med">
     <p:fade/>
   </p:transition>
+  <p:timing>
+    <p:tnLst>
+      <p:par>
+        <p:cTn id="1" dur="indefinite" restart="never" nodeType="tmRoot"/>
+      </p:par>
+    </p:tnLst>
+  </p:timing>
 </p:sld>
 </file>
 
@@ -7244,6 +7837,13 @@
   <p:transition spd="med">
     <p:fade thruBlk="1"/>
   </p:transition>
+  <p:timing>
+    <p:tnLst>
+      <p:par>
+        <p:cTn id="1" dur="indefinite" restart="never" nodeType="tmRoot"/>
+      </p:par>
+    </p:tnLst>
+  </p:timing>
 </p:sld>
 </file>
 
@@ -7425,6 +8025,13 @@
   <p:transition spd="med">
     <p:fade thruBlk="1"/>
   </p:transition>
+  <p:timing>
+    <p:tnLst>
+      <p:par>
+        <p:cTn id="1" dur="indefinite" restart="never" nodeType="tmRoot"/>
+      </p:par>
+    </p:tnLst>
+  </p:timing>
 </p:sld>
 </file>
 
@@ -7600,6 +8207,13 @@
   <p:transition spd="med">
     <p:fade thruBlk="1"/>
   </p:transition>
+  <p:timing>
+    <p:tnLst>
+      <p:par>
+        <p:cTn id="1" dur="indefinite" restart="never" nodeType="tmRoot"/>
+      </p:par>
+    </p:tnLst>
+  </p:timing>
 </p:sld>
 </file>
 
@@ -7667,6 +8281,13 @@
   <p:transition spd="med">
     <p:fade/>
   </p:transition>
+  <p:timing>
+    <p:tnLst>
+      <p:par>
+        <p:cTn id="1" dur="indefinite" restart="never" nodeType="tmRoot"/>
+      </p:par>
+    </p:tnLst>
+  </p:timing>
 </p:sld>
 </file>
 
@@ -7764,6 +8385,13 @@
   <p:transition spd="med">
     <p:fade thruBlk="1"/>
   </p:transition>
+  <p:timing>
+    <p:tnLst>
+      <p:par>
+        <p:cTn id="1" dur="indefinite" restart="never" nodeType="tmRoot"/>
+      </p:par>
+    </p:tnLst>
+  </p:timing>
 </p:sld>
 </file>
 
@@ -8330,12 +8958,6 @@
 </file>
 
 <file path=customXml/item1.xml><?xml version="1.0" encoding="utf-8"?>
-<p:properties xmlns:p="http://schemas.microsoft.com/office/2006/metadata/properties" xmlns:xsi="http://www.w3.org/2001/XMLSchema-instance" xmlns:pc="http://schemas.microsoft.com/office/infopath/2007/PartnerControls">
-  <documentManagement/>
-</p:properties>
-</file>
-
-<file path=customXml/item2.xml><?xml version="1.0" encoding="utf-8"?>
 <ct:contentTypeSchema xmlns:ct="http://schemas.microsoft.com/office/2006/metadata/contentType" xmlns:ma="http://schemas.microsoft.com/office/2006/metadata/properties/metaAttributes" ct:_="" ma:_="" ma:contentTypeName="Document" ma:contentTypeID="0x01010078366F8B0CAC4944B54E4FE62E1853FF" ma:contentTypeVersion="13" ma:contentTypeDescription="Create a new document." ma:contentTypeScope="" ma:versionID="c0144efe8435d8d2a41eb877ff779f3d">
   <xsd:schema xmlns:xsd="http://www.w3.org/2001/XMLSchema" xmlns:xs="http://www.w3.org/2001/XMLSchema" xmlns:p="http://schemas.microsoft.com/office/2006/metadata/properties" xmlns:ns3="dc93a766-66e7-40cb-ae91-7d18686f06cb" xmlns:ns4="218ddd80-e909-418b-876b-6da869ab062e" targetNamespace="http://schemas.microsoft.com/office/2006/metadata/properties" ma:root="true" ma:fieldsID="98e515d43d9a7e057d5a8f41d3b12b29" ns3:_="" ns4:_="">
     <xsd:import namespace="dc93a766-66e7-40cb-ae91-7d18686f06cb"/>
@@ -8558,6 +9180,12 @@
 </ct:contentTypeSchema>
 </file>
 
+<file path=customXml/item2.xml><?xml version="1.0" encoding="utf-8"?>
+<p:properties xmlns:p="http://schemas.microsoft.com/office/2006/metadata/properties" xmlns:xsi="http://www.w3.org/2001/XMLSchema-instance" xmlns:pc="http://schemas.microsoft.com/office/infopath/2007/PartnerControls">
+  <documentManagement/>
+</p:properties>
+</file>
+
 <file path=customXml/item3.xml><?xml version="1.0" encoding="utf-8"?>
 <?mso-contentType ?>
 <FormTemplates xmlns="http://schemas.microsoft.com/sharepoint/v3/contenttype/forms">
@@ -8568,23 +9196,6 @@
 </file>
 
 <file path=customXml/itemProps1.xml><?xml version="1.0" encoding="utf-8"?>
-<ds:datastoreItem xmlns:ds="http://schemas.openxmlformats.org/officeDocument/2006/customXml" ds:itemID="{0A54B724-95FE-4227-A509-89C0BE165019}">
-  <ds:schemaRefs>
-    <ds:schemaRef ds:uri="http://purl.org/dc/terms/"/>
-    <ds:schemaRef ds:uri="218ddd80-e909-418b-876b-6da869ab062e"/>
-    <ds:schemaRef ds:uri="http://purl.org/dc/dcmitype/"/>
-    <ds:schemaRef ds:uri="http://schemas.microsoft.com/office/infopath/2007/PartnerControls"/>
-    <ds:schemaRef ds:uri="http://purl.org/dc/elements/1.1/"/>
-    <ds:schemaRef ds:uri="http://schemas.microsoft.com/office/2006/metadata/properties"/>
-    <ds:schemaRef ds:uri="http://schemas.microsoft.com/office/2006/documentManagement/types"/>
-    <ds:schemaRef ds:uri="http://schemas.openxmlformats.org/package/2006/metadata/core-properties"/>
-    <ds:schemaRef ds:uri="dc93a766-66e7-40cb-ae91-7d18686f06cb"/>
-    <ds:schemaRef ds:uri="http://www.w3.org/XML/1998/namespace"/>
-  </ds:schemaRefs>
-</ds:datastoreItem>
-</file>
-
-<file path=customXml/itemProps2.xml><?xml version="1.0" encoding="utf-8"?>
 <ds:datastoreItem xmlns:ds="http://schemas.openxmlformats.org/officeDocument/2006/customXml" ds:itemID="{75DFD259-8AF4-4CFA-9594-D45098FC5839}">
   <ds:schemaRefs>
     <ds:schemaRef ds:uri="http://schemas.microsoft.com/office/2006/metadata/contentType"/>
@@ -8603,6 +9214,23 @@
 </ds:datastoreItem>
 </file>
 
+<file path=customXml/itemProps2.xml><?xml version="1.0" encoding="utf-8"?>
+<ds:datastoreItem xmlns:ds="http://schemas.openxmlformats.org/officeDocument/2006/customXml" ds:itemID="{0A54B724-95FE-4227-A509-89C0BE165019}">
+  <ds:schemaRefs>
+    <ds:schemaRef ds:uri="http://purl.org/dc/terms/"/>
+    <ds:schemaRef ds:uri="218ddd80-e909-418b-876b-6da869ab062e"/>
+    <ds:schemaRef ds:uri="http://purl.org/dc/dcmitype/"/>
+    <ds:schemaRef ds:uri="http://schemas.microsoft.com/office/infopath/2007/PartnerControls"/>
+    <ds:schemaRef ds:uri="http://purl.org/dc/elements/1.1/"/>
+    <ds:schemaRef ds:uri="http://schemas.microsoft.com/office/2006/metadata/properties"/>
+    <ds:schemaRef ds:uri="http://schemas.microsoft.com/office/2006/documentManagement/types"/>
+    <ds:schemaRef ds:uri="http://schemas.openxmlformats.org/package/2006/metadata/core-properties"/>
+    <ds:schemaRef ds:uri="dc93a766-66e7-40cb-ae91-7d18686f06cb"/>
+    <ds:schemaRef ds:uri="http://www.w3.org/XML/1998/namespace"/>
+  </ds:schemaRefs>
+</ds:datastoreItem>
+</file>
+
 <file path=customXml/itemProps3.xml><?xml version="1.0" encoding="utf-8"?>
 <ds:datastoreItem xmlns:ds="http://schemas.openxmlformats.org/officeDocument/2006/customXml" ds:itemID="{B16FB3BA-9F7C-4CD8-B3AB-262CEFAAFDB4}">
   <ds:schemaRefs>

</xml_diff>

<commit_message>
Adding Zowe Explorer - focus slide
Signed-off-by: zFernand0 <fernando.rijocedeno@broadcom.com>
</commit_message>
<xml_diff>
--- a/Project Management/20PI3 Planning/Zowe Community Squad Focus for 20PI3.pptx
+++ b/Project Management/20PI3 Planning/Zowe Community Squad Focus for 20PI3.pptx
@@ -5,7 +5,7 @@
     <p:sldMasterId id="2147483653" r:id="rId4"/>
   </p:sldMasterIdLst>
   <p:notesMasterIdLst>
-    <p:notesMasterId r:id="rId28"/>
+    <p:notesMasterId r:id="rId29"/>
   </p:notesMasterIdLst>
   <p:sldIdLst>
     <p:sldId id="279" r:id="rId5"/>
@@ -22,30 +22,31 @@
     <p:sldId id="2142532373" r:id="rId16"/>
     <p:sldId id="2142532355" r:id="rId17"/>
     <p:sldId id="2142532363" r:id="rId18"/>
-    <p:sldId id="2142532359" r:id="rId19"/>
-    <p:sldId id="2142532366" r:id="rId20"/>
-    <p:sldId id="2142532370" r:id="rId21"/>
-    <p:sldId id="2142532356" r:id="rId22"/>
-    <p:sldId id="2142532364" r:id="rId23"/>
-    <p:sldId id="2142532357" r:id="rId24"/>
-    <p:sldId id="2142532365" r:id="rId25"/>
-    <p:sldId id="2142532358" r:id="rId26"/>
-    <p:sldId id="2142532367" r:id="rId27"/>
+    <p:sldId id="2142532374" r:id="rId19"/>
+    <p:sldId id="2142532359" r:id="rId20"/>
+    <p:sldId id="2142532366" r:id="rId21"/>
+    <p:sldId id="2142532370" r:id="rId22"/>
+    <p:sldId id="2142532356" r:id="rId23"/>
+    <p:sldId id="2142532364" r:id="rId24"/>
+    <p:sldId id="2142532357" r:id="rId25"/>
+    <p:sldId id="2142532365" r:id="rId26"/>
+    <p:sldId id="2142532358" r:id="rId27"/>
+    <p:sldId id="2142532367" r:id="rId28"/>
   </p:sldIdLst>
   <p:sldSz cx="9144000" cy="5143500" type="screen16x9"/>
   <p:notesSz cx="6858000" cy="9144000"/>
   <p:embeddedFontLst>
     <p:embeddedFont>
-      <p:font typeface="Calibri" panose="020F0502020204030204" pitchFamily="34" charset="0"/>
-      <p:regular r:id="rId29"/>
-      <p:bold r:id="rId30"/>
-      <p:italic r:id="rId31"/>
-      <p:boldItalic r:id="rId32"/>
+      <p:font typeface="Gill Sans" panose="020B0604020202020204" charset="0"/>
+      <p:regular r:id="rId30"/>
+      <p:bold r:id="rId31"/>
     </p:embeddedFont>
     <p:embeddedFont>
-      <p:font typeface="Gill Sans" panose="020B0604020202020204" charset="0"/>
-      <p:regular r:id="rId33"/>
-      <p:bold r:id="rId34"/>
+      <p:font typeface="Calibri" panose="020F0502020204030204" pitchFamily="34" charset="0"/>
+      <p:regular r:id="rId32"/>
+      <p:bold r:id="rId33"/>
+      <p:italic r:id="rId34"/>
+      <p:boldItalic r:id="rId35"/>
     </p:embeddedFont>
   </p:embeddedFontLst>
   <p:defaultTextStyle>
@@ -5583,15 +5584,7 @@
             </a:pPr>
             <a:r>
               <a:rPr lang="en-US" dirty="0"/>
-              <a:t>Application developers and those developing scripts to drive interaction with z/OS </a:t>
-            </a:r>
-            <a:r>
-              <a:rPr lang="en-US" dirty="0" smtClean="0"/>
-              <a:t>can easily </a:t>
-            </a:r>
-            <a:r>
-              <a:rPr lang="en-US" dirty="0"/>
-              <a:t>learn about, access, and leverage </a:t>
+              <a:t>Application developers and those developing scripts to drive interaction with z/OS can easily learn about, access, and leverage </a:t>
             </a:r>
             <a:r>
               <a:rPr lang="en-US" dirty="0" err="1"/>
@@ -5607,67 +5600,66 @@
               <a:buNone/>
             </a:pPr>
             <a:r>
-              <a:rPr lang="en-US" u="sng" dirty="0" smtClean="0"/>
+              <a:rPr lang="en-US" u="sng" dirty="0"/>
               <a:t/>
             </a:r>
             <a:br>
-              <a:rPr lang="en-US" u="sng" dirty="0" smtClean="0"/>
+              <a:rPr lang="en-US" u="sng" dirty="0"/>
             </a:br>
             <a:r>
-              <a:rPr lang="en-US" b="1" dirty="0" smtClean="0"/>
+              <a:rPr lang="en-US" b="1" dirty="0"/>
               <a:t>Deliverables: </a:t>
             </a:r>
             <a:r>
-              <a:rPr lang="en-US" dirty="0" smtClean="0"/>
+              <a:rPr lang="en-US" dirty="0"/>
               <a:t>Documentation is published on our </a:t>
             </a:r>
             <a:r>
-              <a:rPr lang="en-US" dirty="0" err="1" smtClean="0"/>
+              <a:rPr lang="en-US" dirty="0" err="1"/>
               <a:t>Zowe</a:t>
             </a:r>
             <a:r>
-              <a:rPr lang="en-US" dirty="0" smtClean="0"/>
+              <a:rPr lang="en-US" dirty="0"/>
               <a:t> Docs site covering the overview and use of the SDKs as well as documenting how the community can contribute to the technology. In addition, detailed samples that leverage the SDKs are provided within each repository.</a:t>
             </a:r>
             <a:br>
-              <a:rPr lang="en-US" dirty="0" smtClean="0"/>
+              <a:rPr lang="en-US" dirty="0"/>
             </a:br>
             <a:r>
-              <a:rPr lang="en-US" dirty="0" smtClean="0"/>
+              <a:rPr lang="en-US" dirty="0"/>
               <a:t/>
             </a:r>
             <a:br>
-              <a:rPr lang="en-US" dirty="0" smtClean="0"/>
+              <a:rPr lang="en-US" dirty="0"/>
             </a:br>
             <a:r>
-              <a:rPr lang="en-US" dirty="0" smtClean="0"/>
+              <a:rPr lang="en-US" dirty="0"/>
               <a:t>To further drive visibility and adoption, the </a:t>
             </a:r>
             <a:r>
-              <a:rPr lang="en-US" dirty="0" err="1" smtClean="0"/>
+              <a:rPr lang="en-US" dirty="0" err="1"/>
               <a:t>Zowe</a:t>
             </a:r>
             <a:r>
-              <a:rPr lang="en-US" dirty="0" smtClean="0"/>
+              <a:rPr lang="en-US" dirty="0"/>
               <a:t> Node SDK is published to public </a:t>
             </a:r>
             <a:r>
-              <a:rPr lang="en-US" dirty="0" err="1" smtClean="0"/>
+              <a:rPr lang="en-US" dirty="0" err="1"/>
               <a:t>npm</a:t>
             </a:r>
             <a:r>
-              <a:rPr lang="en-US" dirty="0" smtClean="0"/>
+              <a:rPr lang="en-US" dirty="0"/>
               <a:t> separate from the </a:t>
             </a:r>
             <a:r>
-              <a:rPr lang="en-US" dirty="0" err="1" smtClean="0"/>
+              <a:rPr lang="en-US" dirty="0" err="1"/>
               <a:t>Zowe</a:t>
             </a:r>
             <a:r>
-              <a:rPr lang="en-US" dirty="0" smtClean="0"/>
+              <a:rPr lang="en-US" dirty="0"/>
               <a:t> CLI.</a:t>
             </a:r>
-            <a:endParaRPr lang="en-US" dirty="0"/>
           </a:p>
           <a:p>
             <a:pPr marL="101600" indent="0">
@@ -5789,22 +5781,10 @@
             </a:r>
             <a:r>
               <a:rPr lang="en-US" dirty="0"/>
-              <a:t> client technologies </a:t>
-            </a:r>
-            <a:r>
-              <a:rPr lang="en-US" dirty="0" smtClean="0"/>
-              <a:t>can store </a:t>
-            </a:r>
-            <a:r>
-              <a:rPr lang="en-US" dirty="0"/>
-              <a:t>all connection details and command option preferences in a single profile allowing for quick initial configuration and reduced effort when updating properties</a:t>
-            </a:r>
-            <a:r>
-              <a:rPr lang="en-US" dirty="0" smtClean="0"/>
-              <a:t>.</a:t>
+              <a:t> client technologies can store all connection details and command option preferences in a single profile allowing for quick initial configuration and reduced effort when updating properties.</a:t>
             </a:r>
             <a:br>
-              <a:rPr lang="en-US" dirty="0" smtClean="0"/>
+              <a:rPr lang="en-US" dirty="0"/>
             </a:br>
             <a:endParaRPr lang="en-US" b="1" dirty="0"/>
           </a:p>
@@ -5817,12 +5797,8 @@
               <a:t>Deliverable: </a:t>
             </a:r>
             <a:r>
-              <a:rPr lang="en-US" dirty="0" smtClean="0"/>
-              <a:t>Simplified </a:t>
-            </a:r>
-            <a:r>
-              <a:rPr lang="en-US" dirty="0"/>
-              <a:t>profile management by allowing all profile options to be specified in a single base profile. This is an enhancement to the core CLI.</a:t>
+              <a:rPr lang="en-US" dirty="0"/>
+              <a:t>Simplified profile management by allowing all profile options to be specified in a single base profile. This is an enhancement to the core CLI.</a:t>
             </a:r>
           </a:p>
           <a:p>
@@ -6003,23 +5979,163 @@
             <p:ph type="body" idx="1"/>
           </p:nvPr>
         </p:nvSpPr>
-        <p:spPr/>
+        <p:spPr>
+          <a:xfrm>
+            <a:off x="317500" y="943428"/>
+            <a:ext cx="8369400" cy="3742871"/>
+          </a:xfrm>
+        </p:spPr>
         <p:txBody>
           <a:bodyPr/>
           <a:lstStyle/>
           <a:p>
             <a:r>
-              <a:rPr lang="en-US" dirty="0"/>
-              <a:t>Feature </a:t>
+              <a:rPr lang="en-US" dirty="0" smtClean="0"/>
+              <a:t>Define and develop </a:t>
+            </a:r>
+            <a:r>
+              <a:rPr lang="en-US" dirty="0"/>
+              <a:t>a set of conformance guidelines to be consumed by extenders of the </a:t>
             </a:r>
             <a:r>
               <a:rPr lang="en-US" dirty="0" err="1"/>
-              <a:t>xxxx</a:t>
-            </a:r>
-            <a:r>
-              <a:rPr lang="en-US" dirty="0"/>
-              <a:t> (in support of theme xxx)</a:t>
-            </a:r>
+              <a:t>Zowe</a:t>
+            </a:r>
+            <a:r>
+              <a:rPr lang="en-US" dirty="0"/>
+              <a:t> </a:t>
+            </a:r>
+            <a:r>
+              <a:rPr lang="en-US" dirty="0" smtClean="0"/>
+              <a:t>Explorer. </a:t>
+            </a:r>
+            <a:r>
+              <a:rPr lang="en-US" dirty="0" smtClean="0">
+                <a:hlinkClick r:id="rId2"/>
+              </a:rPr>
+              <a:t>#</a:t>
+            </a:r>
+            <a:r>
+              <a:rPr lang="en-US" dirty="0" smtClean="0">
+                <a:hlinkClick r:id="rId2"/>
+              </a:rPr>
+              <a:t>837</a:t>
+            </a:r>
+            <a:endParaRPr lang="en-US" dirty="0" smtClean="0"/>
+          </a:p>
+          <a:p>
+            <a:pPr lvl="1"/>
+            <a:r>
+              <a:rPr lang="en-US" dirty="0" smtClean="0"/>
+              <a:t>To deliver standardized guidelines that Extenders </a:t>
+            </a:r>
+            <a:r>
+              <a:rPr lang="en-US" dirty="0"/>
+              <a:t>of the </a:t>
+            </a:r>
+            <a:r>
+              <a:rPr lang="en-US" dirty="0" err="1"/>
+              <a:t>Zowe</a:t>
+            </a:r>
+            <a:r>
+              <a:rPr lang="en-US" dirty="0"/>
+              <a:t> Explorer </a:t>
+            </a:r>
+            <a:r>
+              <a:rPr lang="en-US" dirty="0" smtClean="0"/>
+              <a:t>can follow in order to leverage </a:t>
+            </a:r>
+            <a:r>
+              <a:rPr lang="en-US" dirty="0"/>
+              <a:t>and grow the </a:t>
+            </a:r>
+            <a:r>
+              <a:rPr lang="en-US" dirty="0" err="1"/>
+              <a:t>Zowe</a:t>
+            </a:r>
+            <a:r>
+              <a:rPr lang="en-US" dirty="0"/>
+              <a:t> ecosystem</a:t>
+            </a:r>
+            <a:r>
+              <a:rPr lang="en-US" dirty="0" smtClean="0"/>
+              <a:t/>
+            </a:r>
+            <a:br>
+              <a:rPr lang="en-US" dirty="0" smtClean="0"/>
+            </a:br>
+            <a:endParaRPr lang="en-US" dirty="0" smtClean="0"/>
+          </a:p>
+          <a:p>
+            <a:r>
+              <a:rPr lang="en-US" dirty="0"/>
+              <a:t>Leverage the </a:t>
+            </a:r>
+            <a:r>
+              <a:rPr lang="en-US" dirty="0" err="1"/>
+              <a:t>Zowe</a:t>
+            </a:r>
+            <a:r>
+              <a:rPr lang="en-US" dirty="0"/>
+              <a:t> CLI security enhancements around MFA and SSO for an improved security experience in the </a:t>
+            </a:r>
+            <a:r>
+              <a:rPr lang="en-US" dirty="0" err="1"/>
+              <a:t>Zowe</a:t>
+            </a:r>
+            <a:r>
+              <a:rPr lang="en-US" dirty="0"/>
+              <a:t> </a:t>
+            </a:r>
+            <a:r>
+              <a:rPr lang="en-US" dirty="0" smtClean="0"/>
+              <a:t>Explorer</a:t>
+            </a:r>
+            <a:r>
+              <a:rPr lang="en-US" dirty="0" smtClean="0"/>
+              <a:t>.</a:t>
+            </a:r>
+          </a:p>
+          <a:p>
+            <a:pPr lvl="1"/>
+            <a:r>
+              <a:rPr lang="en-US" dirty="0" smtClean="0"/>
+              <a:t>To increase user confidence knowing </a:t>
+            </a:r>
+            <a:r>
+              <a:rPr lang="en-US" dirty="0"/>
+              <a:t>that </a:t>
+            </a:r>
+            <a:r>
+              <a:rPr lang="en-US" dirty="0" smtClean="0"/>
+              <a:t>the extension implements </a:t>
+            </a:r>
+            <a:r>
+              <a:rPr lang="en-US" dirty="0"/>
+              <a:t>best security practices </a:t>
+            </a:r>
+            <a:r>
+              <a:rPr lang="en-US" dirty="0" smtClean="0"/>
+              <a:t>in order to remain </a:t>
+            </a:r>
+            <a:r>
+              <a:rPr lang="en-US" dirty="0"/>
+              <a:t>compliant with corporate policies</a:t>
+            </a:r>
+            <a:r>
+              <a:rPr lang="en-US" dirty="0" smtClean="0"/>
+              <a:t>.</a:t>
+            </a:r>
+            <a:br>
+              <a:rPr lang="en-US" dirty="0" smtClean="0"/>
+            </a:br>
+            <a:endParaRPr lang="en-US" dirty="0" smtClean="0"/>
+          </a:p>
+          <a:p>
+            <a:pPr marL="101600" indent="0">
+              <a:buNone/>
+            </a:pPr>
+            <a:endParaRPr lang="en-US" dirty="0"/>
           </a:p>
         </p:txBody>
       </p:sp>
@@ -6065,10 +6181,38 @@
       </p:grpSpPr>
       <p:sp>
         <p:nvSpPr>
-          <p:cNvPr id="2" name="Text Placeholder 1">
+          <p:cNvPr id="3" name="Title 2">
             <a:extLst>
               <a:ext uri="{FF2B5EF4-FFF2-40B4-BE49-F238E27FC236}">
-                <a16:creationId xmlns:a16="http://schemas.microsoft.com/office/drawing/2014/main" id="{ADB2E00A-906F-6645-9A30-53C6D93DC43C}"/>
+                <a16:creationId xmlns:a16="http://schemas.microsoft.com/office/drawing/2014/main" id="{CFEEEE36-E132-0D40-A4B8-9BDC5C8B6528}"/>
+              </a:ext>
+            </a:extLst>
+          </p:cNvPr>
+          <p:cNvSpPr>
+            <a:spLocks noGrp="1"/>
+          </p:cNvSpPr>
+          <p:nvPr>
+            <p:ph type="title"/>
+          </p:nvPr>
+        </p:nvSpPr>
+        <p:spPr/>
+        <p:txBody>
+          <a:bodyPr/>
+          <a:lstStyle/>
+          <a:p>
+            <a:r>
+              <a:rPr lang="en-US" dirty="0"/>
+              <a:t>Features</a:t>
+            </a:r>
+          </a:p>
+        </p:txBody>
+      </p:sp>
+      <p:sp>
+        <p:nvSpPr>
+          <p:cNvPr id="4" name="Text Placeholder 3">
+            <a:extLst>
+              <a:ext uri="{FF2B5EF4-FFF2-40B4-BE49-F238E27FC236}">
+                <a16:creationId xmlns:a16="http://schemas.microsoft.com/office/drawing/2014/main" id="{C0DB4ECB-A7D5-6B47-8180-75CB3C3DB7DE}"/>
               </a:ext>
             </a:extLst>
           </p:cNvPr>
@@ -6079,28 +6223,167 @@
             <p:ph type="body" idx="1"/>
           </p:nvPr>
         </p:nvSpPr>
-        <p:spPr/>
+        <p:spPr>
+          <a:xfrm>
+            <a:off x="317500" y="943428"/>
+            <a:ext cx="8369400" cy="3963005"/>
+          </a:xfrm>
+        </p:spPr>
         <p:txBody>
           <a:bodyPr/>
           <a:lstStyle/>
           <a:p>
             <a:r>
               <a:rPr lang="en-US" dirty="0"/>
-              <a:t>Onboarding Squad Focus</a:t>
-            </a:r>
-          </a:p>
-          <a:p>
-            <a:r>
-              <a:rPr lang="en-US" sz="2000" dirty="0"/>
-              <a:t>Rose?? Joe W? (Squad Lead??)</a:t>
-            </a:r>
+              <a:t>Enhance the profile management user experience of </a:t>
+            </a:r>
+            <a:r>
+              <a:rPr lang="en-US" dirty="0" err="1"/>
+              <a:t>Zowe</a:t>
+            </a:r>
+            <a:r>
+              <a:rPr lang="en-US" dirty="0"/>
+              <a:t> Explorer (for new and regular users) (</a:t>
+            </a:r>
+            <a:r>
+              <a:rPr lang="en-US" dirty="0">
+                <a:hlinkClick r:id="rId2"/>
+              </a:rPr>
+              <a:t>Epic</a:t>
+            </a:r>
+            <a:r>
+              <a:rPr lang="en-US" dirty="0"/>
+              <a:t>) (</a:t>
+            </a:r>
+            <a:r>
+              <a:rPr lang="en-US" dirty="0">
+                <a:hlinkClick r:id="rId3"/>
+              </a:rPr>
+              <a:t>Issues</a:t>
+            </a:r>
+            <a:r>
+              <a:rPr lang="en-US" dirty="0" smtClean="0"/>
+              <a:t>)</a:t>
+            </a:r>
+          </a:p>
+          <a:p>
+            <a:pPr lvl="1"/>
+            <a:r>
+              <a:rPr lang="en-US" dirty="0" smtClean="0"/>
+              <a:t>To deliver a greater experience when configuring and managing connection details by addressing community related issues around profiles.</a:t>
+            </a:r>
+            <a:r>
+              <a:rPr lang="en-US" dirty="0"/>
+              <a:t/>
+            </a:r>
+            <a:br>
+              <a:rPr lang="en-US" dirty="0"/>
+            </a:br>
+            <a:endParaRPr lang="en-US" dirty="0"/>
+          </a:p>
+          <a:p>
+            <a:r>
+              <a:rPr lang="en-US" dirty="0"/>
+              <a:t>Enhance the z/OS Unix user experience of </a:t>
+            </a:r>
+            <a:r>
+              <a:rPr lang="en-US" dirty="0" err="1"/>
+              <a:t>Zowe</a:t>
+            </a:r>
+            <a:r>
+              <a:rPr lang="en-US" dirty="0"/>
+              <a:t> Explorer (</a:t>
+            </a:r>
+            <a:r>
+              <a:rPr lang="en-US" dirty="0">
+                <a:hlinkClick r:id="rId4"/>
+              </a:rPr>
+              <a:t>Epic</a:t>
+            </a:r>
+            <a:r>
+              <a:rPr lang="en-US" dirty="0"/>
+              <a:t>) (</a:t>
+            </a:r>
+            <a:r>
+              <a:rPr lang="en-US" dirty="0">
+                <a:hlinkClick r:id="rId5"/>
+              </a:rPr>
+              <a:t>Issues</a:t>
+            </a:r>
+            <a:r>
+              <a:rPr lang="en-US" dirty="0"/>
+              <a:t>)</a:t>
+            </a:r>
+          </a:p>
+          <a:p>
+            <a:pPr lvl="1"/>
+            <a:r>
+              <a:rPr lang="en-US" dirty="0"/>
+              <a:t>To deliver a greater experience when working with z/OS Unix by addressing community related issues.</a:t>
+            </a:r>
+          </a:p>
+          <a:p>
+            <a:pPr lvl="1"/>
+            <a:endParaRPr lang="en-US" dirty="0"/>
+          </a:p>
+          <a:p>
+            <a:r>
+              <a:rPr lang="en-US" dirty="0"/>
+              <a:t>Enhance the Dataset </a:t>
+            </a:r>
+            <a:r>
+              <a:rPr lang="en-US" dirty="0" smtClean="0"/>
+              <a:t>manipulation </a:t>
+            </a:r>
+            <a:r>
+              <a:rPr lang="en-US" dirty="0"/>
+              <a:t>user experience of the </a:t>
+            </a:r>
+            <a:r>
+              <a:rPr lang="en-US" dirty="0" err="1"/>
+              <a:t>Zowe</a:t>
+            </a:r>
+            <a:r>
+              <a:rPr lang="en-US" dirty="0"/>
+              <a:t> </a:t>
+            </a:r>
+            <a:r>
+              <a:rPr lang="en-US" dirty="0" smtClean="0"/>
+              <a:t>Explorer</a:t>
+            </a:r>
+          </a:p>
+          <a:p>
+            <a:pPr lvl="1"/>
+            <a:r>
+              <a:rPr lang="en-US" dirty="0" smtClean="0"/>
+              <a:t>To </a:t>
+            </a:r>
+            <a:r>
+              <a:rPr lang="en-US" dirty="0"/>
+              <a:t>deliver </a:t>
+            </a:r>
+            <a:r>
+              <a:rPr lang="en-US" dirty="0" smtClean="0"/>
+              <a:t>a customized experience for creating datasets so that users can </a:t>
+            </a:r>
+            <a:r>
+              <a:rPr lang="en-US" smtClean="0"/>
+              <a:t>specify desired allocation details.</a:t>
+            </a:r>
+            <a:endParaRPr lang="en-US" dirty="0"/>
+          </a:p>
+          <a:p>
+            <a:endParaRPr lang="en-US" dirty="0"/>
+          </a:p>
+          <a:p>
+            <a:endParaRPr lang="en-US" dirty="0" smtClean="0"/>
           </a:p>
         </p:txBody>
       </p:sp>
     </p:spTree>
     <p:extLst>
       <p:ext uri="{BB962C8B-B14F-4D97-AF65-F5344CB8AC3E}">
-        <p14:creationId xmlns:p14="http://schemas.microsoft.com/office/powerpoint/2010/main" val="322818001"/>
+        <p14:creationId xmlns:p14="http://schemas.microsoft.com/office/powerpoint/2010/main" val="1367409270"/>
       </p:ext>
     </p:extLst>
   </p:cSld>
@@ -6108,7 +6391,7 @@
     <a:masterClrMapping/>
   </p:clrMapOvr>
   <p:transition spd="med">
-    <p:fade/>
+    <p:fade thruBlk="1"/>
   </p:transition>
   <p:timing>
     <p:tnLst>
@@ -6139,38 +6422,10 @@
       </p:grpSpPr>
       <p:sp>
         <p:nvSpPr>
-          <p:cNvPr id="3" name="Title 2">
+          <p:cNvPr id="2" name="Text Placeholder 1">
             <a:extLst>
               <a:ext uri="{FF2B5EF4-FFF2-40B4-BE49-F238E27FC236}">
-                <a16:creationId xmlns:a16="http://schemas.microsoft.com/office/drawing/2014/main" id="{CFEEEE36-E132-0D40-A4B8-9BDC5C8B6528}"/>
-              </a:ext>
-            </a:extLst>
-          </p:cNvPr>
-          <p:cNvSpPr>
-            <a:spLocks noGrp="1"/>
-          </p:cNvSpPr>
-          <p:nvPr>
-            <p:ph type="title"/>
-          </p:nvPr>
-        </p:nvSpPr>
-        <p:spPr/>
-        <p:txBody>
-          <a:bodyPr/>
-          <a:lstStyle/>
-          <a:p>
-            <a:r>
-              <a:rPr lang="en-US" dirty="0"/>
-              <a:t>Focus</a:t>
-            </a:r>
-          </a:p>
-        </p:txBody>
-      </p:sp>
-      <p:sp>
-        <p:nvSpPr>
-          <p:cNvPr id="4" name="Text Placeholder 3">
-            <a:extLst>
-              <a:ext uri="{FF2B5EF4-FFF2-40B4-BE49-F238E27FC236}">
-                <a16:creationId xmlns:a16="http://schemas.microsoft.com/office/drawing/2014/main" id="{C0DB4ECB-A7D5-6B47-8180-75CB3C3DB7DE}"/>
+                <a16:creationId xmlns:a16="http://schemas.microsoft.com/office/drawing/2014/main" id="{ADB2E00A-906F-6645-9A30-53C6D93DC43C}"/>
               </a:ext>
             </a:extLst>
           </p:cNvPr>
@@ -6188,20 +6443,21 @@
           <a:p>
             <a:r>
               <a:rPr lang="en-US" dirty="0"/>
-              <a:t>Focus </a:t>
-            </a:r>
-            <a:r>
-              <a:rPr lang="en-US" dirty="0" err="1"/>
-              <a:t>xxxx</a:t>
-            </a:r>
-            <a:endParaRPr lang="en-US" dirty="0"/>
+              <a:t>Onboarding Squad Focus</a:t>
+            </a:r>
+          </a:p>
+          <a:p>
+            <a:r>
+              <a:rPr lang="en-US" sz="2000" dirty="0"/>
+              <a:t>Rose?? Joe W? (Squad Lead??)</a:t>
+            </a:r>
           </a:p>
         </p:txBody>
       </p:sp>
     </p:spTree>
     <p:extLst>
       <p:ext uri="{BB962C8B-B14F-4D97-AF65-F5344CB8AC3E}">
-        <p14:creationId xmlns:p14="http://schemas.microsoft.com/office/powerpoint/2010/main" val="2827431278"/>
+        <p14:creationId xmlns:p14="http://schemas.microsoft.com/office/powerpoint/2010/main" val="322818001"/>
       </p:ext>
     </p:extLst>
   </p:cSld>
@@ -6209,7 +6465,7 @@
     <a:masterClrMapping/>
   </p:clrMapOvr>
   <p:transition spd="med">
-    <p:fade thruBlk="1"/>
+    <p:fade/>
   </p:transition>
   <p:timing>
     <p:tnLst>
@@ -6282,90 +6538,19 @@
             <p:ph type="body" idx="1"/>
           </p:nvPr>
         </p:nvSpPr>
-        <p:spPr>
-          <a:xfrm>
-            <a:off x="317500" y="943428"/>
-            <a:ext cx="8369400" cy="4085772"/>
-          </a:xfrm>
-        </p:spPr>
+        <p:spPr/>
         <p:txBody>
           <a:bodyPr/>
           <a:lstStyle/>
           <a:p>
             <a:r>
               <a:rPr lang="en-US" dirty="0"/>
-              <a:t>Further Conformance Process Maturity</a:t>
-            </a:r>
-          </a:p>
-          <a:p>
-            <a:pPr lvl="1"/>
-            <a:r>
-              <a:rPr lang="en-US" dirty="0"/>
-              <a:t>Active LTS conformance test criteria updates / incremental badging / app-store-like landscape page</a:t>
-            </a:r>
-          </a:p>
-          <a:p>
-            <a:pPr lvl="1"/>
-            <a:r>
-              <a:rPr lang="en-US" dirty="0"/>
-              <a:t>Active LTS conformance change requests (test criteria &amp; submitter form)</a:t>
-            </a:r>
-          </a:p>
-          <a:p>
-            <a:r>
-              <a:rPr lang="en-US" dirty="0"/>
-              <a:t>Increase focus on Outreach</a:t>
-            </a:r>
-          </a:p>
-          <a:p>
-            <a:pPr lvl="1"/>
-            <a:r>
-              <a:rPr lang="en-US" dirty="0"/>
-              <a:t>Webinars &amp; Marketing</a:t>
-            </a:r>
-          </a:p>
-          <a:p>
-            <a:r>
-              <a:rPr lang="en-US" dirty="0"/>
-              <a:t>Improve Onboarding experience</a:t>
-            </a:r>
-          </a:p>
-          <a:p>
-            <a:pPr lvl="1"/>
-            <a:r>
-              <a:rPr lang="en-US" dirty="0"/>
-              <a:t>Improve/influence Zowe.org website navigation</a:t>
-            </a:r>
-          </a:p>
-          <a:p>
-            <a:pPr lvl="1"/>
-            <a:r>
-              <a:rPr lang="en-US" dirty="0"/>
-              <a:t>Accurately “direct” new-to-Zowe visitors</a:t>
-            </a:r>
-          </a:p>
-          <a:p>
-            <a:r>
-              <a:rPr lang="en-US" dirty="0"/>
-              <a:t>Continue and transition stat reporting (KPI-centric)</a:t>
-            </a:r>
-          </a:p>
-          <a:p>
-            <a:pPr lvl="1"/>
-            <a:r>
-              <a:rPr lang="en-US" dirty="0"/>
-              <a:t>Identify trends &amp; influencers</a:t>
-            </a:r>
-          </a:p>
-          <a:p>
-            <a:pPr lvl="1"/>
-            <a:r>
-              <a:rPr lang="en-US" dirty="0"/>
-              <a:t>Easy prep for all Zowe Communications</a:t>
-            </a:r>
-          </a:p>
-          <a:p>
-            <a:pPr lvl="1"/>
+              <a:t>Focus </a:t>
+            </a:r>
+            <a:r>
+              <a:rPr lang="en-US" dirty="0" err="1"/>
+              <a:t>xxxx</a:t>
+            </a:r>
             <a:endParaRPr lang="en-US" dirty="0"/>
           </a:p>
         </p:txBody>
@@ -6373,7 +6558,7 @@
     </p:spTree>
     <p:extLst>
       <p:ext uri="{BB962C8B-B14F-4D97-AF65-F5344CB8AC3E}">
-        <p14:creationId xmlns:p14="http://schemas.microsoft.com/office/powerpoint/2010/main" val="345901736"/>
+        <p14:creationId xmlns:p14="http://schemas.microsoft.com/office/powerpoint/2010/main" val="2827431278"/>
       </p:ext>
     </p:extLst>
   </p:cSld>
@@ -6412,10 +6597,38 @@
       </p:grpSpPr>
       <p:sp>
         <p:nvSpPr>
-          <p:cNvPr id="2" name="Text Placeholder 1">
+          <p:cNvPr id="3" name="Title 2">
             <a:extLst>
               <a:ext uri="{FF2B5EF4-FFF2-40B4-BE49-F238E27FC236}">
-                <a16:creationId xmlns:a16="http://schemas.microsoft.com/office/drawing/2014/main" id="{ADB2E00A-906F-6645-9A30-53C6D93DC43C}"/>
+                <a16:creationId xmlns:a16="http://schemas.microsoft.com/office/drawing/2014/main" id="{CFEEEE36-E132-0D40-A4B8-9BDC5C8B6528}"/>
+              </a:ext>
+            </a:extLst>
+          </p:cNvPr>
+          <p:cNvSpPr>
+            <a:spLocks noGrp="1"/>
+          </p:cNvSpPr>
+          <p:nvPr>
+            <p:ph type="title"/>
+          </p:nvPr>
+        </p:nvSpPr>
+        <p:spPr/>
+        <p:txBody>
+          <a:bodyPr/>
+          <a:lstStyle/>
+          <a:p>
+            <a:r>
+              <a:rPr lang="en-US" dirty="0"/>
+              <a:t>Focus</a:t>
+            </a:r>
+          </a:p>
+        </p:txBody>
+      </p:sp>
+      <p:sp>
+        <p:nvSpPr>
+          <p:cNvPr id="4" name="Text Placeholder 3">
+            <a:extLst>
+              <a:ext uri="{FF2B5EF4-FFF2-40B4-BE49-F238E27FC236}">
+                <a16:creationId xmlns:a16="http://schemas.microsoft.com/office/drawing/2014/main" id="{C0DB4ECB-A7D5-6B47-8180-75CB3C3DB7DE}"/>
               </a:ext>
             </a:extLst>
           </p:cNvPr>
@@ -6426,36 +6639,98 @@
             <p:ph type="body" idx="1"/>
           </p:nvPr>
         </p:nvSpPr>
-        <p:spPr/>
+        <p:spPr>
+          <a:xfrm>
+            <a:off x="317500" y="943428"/>
+            <a:ext cx="8369400" cy="4085772"/>
+          </a:xfrm>
+        </p:spPr>
         <p:txBody>
           <a:bodyPr/>
           <a:lstStyle/>
           <a:p>
             <a:r>
               <a:rPr lang="en-US" dirty="0"/>
-              <a:t>CI/CD Squad Focus</a:t>
-            </a:r>
-          </a:p>
-          <a:p>
-            <a:r>
-              <a:rPr lang="en-US" sz="2000" dirty="0"/>
-              <a:t>Mark </a:t>
-            </a:r>
-            <a:r>
-              <a:rPr lang="en-US" sz="2000" dirty="0" err="1"/>
-              <a:t>Ackert</a:t>
-            </a:r>
-            <a:r>
-              <a:rPr lang="en-US" sz="2000" dirty="0"/>
-              <a:t> (Squad Lead)</a:t>
-            </a:r>
+              <a:t>Further Conformance Process Maturity</a:t>
+            </a:r>
+          </a:p>
+          <a:p>
+            <a:pPr lvl="1"/>
+            <a:r>
+              <a:rPr lang="en-US" dirty="0"/>
+              <a:t>Active LTS conformance test criteria updates / incremental badging / app-store-like landscape page</a:t>
+            </a:r>
+          </a:p>
+          <a:p>
+            <a:pPr lvl="1"/>
+            <a:r>
+              <a:rPr lang="en-US" dirty="0"/>
+              <a:t>Active LTS conformance change requests (test criteria &amp; submitter form)</a:t>
+            </a:r>
+          </a:p>
+          <a:p>
+            <a:r>
+              <a:rPr lang="en-US" dirty="0"/>
+              <a:t>Increase focus on Outreach</a:t>
+            </a:r>
+          </a:p>
+          <a:p>
+            <a:pPr lvl="1"/>
+            <a:r>
+              <a:rPr lang="en-US" dirty="0"/>
+              <a:t>Webinars &amp; Marketing</a:t>
+            </a:r>
+          </a:p>
+          <a:p>
+            <a:r>
+              <a:rPr lang="en-US" dirty="0"/>
+              <a:t>Improve Onboarding experience</a:t>
+            </a:r>
+          </a:p>
+          <a:p>
+            <a:pPr lvl="1"/>
+            <a:r>
+              <a:rPr lang="en-US" dirty="0"/>
+              <a:t>Improve/influence Zowe.org website navigation</a:t>
+            </a:r>
+          </a:p>
+          <a:p>
+            <a:pPr lvl="1"/>
+            <a:r>
+              <a:rPr lang="en-US" dirty="0"/>
+              <a:t>Accurately “direct” new-to-Zowe visitors</a:t>
+            </a:r>
+          </a:p>
+          <a:p>
+            <a:r>
+              <a:rPr lang="en-US" dirty="0"/>
+              <a:t>Continue and transition stat reporting (KPI-centric)</a:t>
+            </a:r>
+          </a:p>
+          <a:p>
+            <a:pPr lvl="1"/>
+            <a:r>
+              <a:rPr lang="en-US" dirty="0"/>
+              <a:t>Identify trends &amp; influencers</a:t>
+            </a:r>
+          </a:p>
+          <a:p>
+            <a:pPr lvl="1"/>
+            <a:r>
+              <a:rPr lang="en-US" dirty="0"/>
+              <a:t>Easy prep for all Zowe Communications</a:t>
+            </a:r>
+          </a:p>
+          <a:p>
+            <a:pPr lvl="1"/>
+            <a:endParaRPr lang="en-US" dirty="0"/>
           </a:p>
         </p:txBody>
       </p:sp>
     </p:spTree>
     <p:extLst>
       <p:ext uri="{BB962C8B-B14F-4D97-AF65-F5344CB8AC3E}">
-        <p14:creationId xmlns:p14="http://schemas.microsoft.com/office/powerpoint/2010/main" val="2129516835"/>
+        <p14:creationId xmlns:p14="http://schemas.microsoft.com/office/powerpoint/2010/main" val="345901736"/>
       </p:ext>
     </p:extLst>
   </p:cSld>
@@ -6463,7 +6738,7 @@
     <a:masterClrMapping/>
   </p:clrMapOvr>
   <p:transition spd="med">
-    <p:fade/>
+    <p:fade thruBlk="1"/>
   </p:transition>
   <p:timing>
     <p:tnLst>
@@ -6494,38 +6769,10 @@
       </p:grpSpPr>
       <p:sp>
         <p:nvSpPr>
-          <p:cNvPr id="3" name="Title 2">
+          <p:cNvPr id="2" name="Text Placeholder 1">
             <a:extLst>
               <a:ext uri="{FF2B5EF4-FFF2-40B4-BE49-F238E27FC236}">
-                <a16:creationId xmlns:a16="http://schemas.microsoft.com/office/drawing/2014/main" id="{CFEEEE36-E132-0D40-A4B8-9BDC5C8B6528}"/>
-              </a:ext>
-            </a:extLst>
-          </p:cNvPr>
-          <p:cNvSpPr>
-            <a:spLocks noGrp="1"/>
-          </p:cNvSpPr>
-          <p:nvPr>
-            <p:ph type="title"/>
-          </p:nvPr>
-        </p:nvSpPr>
-        <p:spPr/>
-        <p:txBody>
-          <a:bodyPr/>
-          <a:lstStyle/>
-          <a:p>
-            <a:r>
-              <a:rPr lang="en-US" dirty="0"/>
-              <a:t>Features</a:t>
-            </a:r>
-          </a:p>
-        </p:txBody>
-      </p:sp>
-      <p:sp>
-        <p:nvSpPr>
-          <p:cNvPr id="4" name="Text Placeholder 3">
-            <a:extLst>
-              <a:ext uri="{FF2B5EF4-FFF2-40B4-BE49-F238E27FC236}">
-                <a16:creationId xmlns:a16="http://schemas.microsoft.com/office/drawing/2014/main" id="{C0DB4ECB-A7D5-6B47-8180-75CB3C3DB7DE}"/>
+                <a16:creationId xmlns:a16="http://schemas.microsoft.com/office/drawing/2014/main" id="{ADB2E00A-906F-6645-9A30-53C6D93DC43C}"/>
               </a:ext>
             </a:extLst>
           </p:cNvPr>
@@ -6543,15 +6790,21 @@
           <a:p>
             <a:r>
               <a:rPr lang="en-US" dirty="0"/>
-              <a:t>Feature </a:t>
-            </a:r>
-            <a:r>
-              <a:rPr lang="en-US" dirty="0" err="1"/>
-              <a:t>xxxx</a:t>
-            </a:r>
-            <a:r>
-              <a:rPr lang="en-US" dirty="0"/>
-              <a:t> (in support of theme xxx)</a:t>
+              <a:t>CI/CD Squad Focus</a:t>
+            </a:r>
+          </a:p>
+          <a:p>
+            <a:r>
+              <a:rPr lang="en-US" sz="2000" dirty="0"/>
+              <a:t>Mark </a:t>
+            </a:r>
+            <a:r>
+              <a:rPr lang="en-US" sz="2000" dirty="0" err="1"/>
+              <a:t>Ackert</a:t>
+            </a:r>
+            <a:r>
+              <a:rPr lang="en-US" sz="2000" dirty="0"/>
+              <a:t> (Squad Lead)</a:t>
             </a:r>
           </a:p>
         </p:txBody>
@@ -6559,7 +6812,7 @@
     </p:spTree>
     <p:extLst>
       <p:ext uri="{BB962C8B-B14F-4D97-AF65-F5344CB8AC3E}">
-        <p14:creationId xmlns:p14="http://schemas.microsoft.com/office/powerpoint/2010/main" val="2542653556"/>
+        <p14:creationId xmlns:p14="http://schemas.microsoft.com/office/powerpoint/2010/main" val="2129516835"/>
       </p:ext>
     </p:extLst>
   </p:cSld>
@@ -6567,7 +6820,7 @@
     <a:masterClrMapping/>
   </p:clrMapOvr>
   <p:transition spd="med">
-    <p:fade thruBlk="1"/>
+    <p:fade/>
   </p:transition>
   <p:timing>
     <p:tnLst>
@@ -6734,6 +6987,110 @@
       </p:grpSpPr>
       <p:sp>
         <p:nvSpPr>
+          <p:cNvPr id="3" name="Title 2">
+            <a:extLst>
+              <a:ext uri="{FF2B5EF4-FFF2-40B4-BE49-F238E27FC236}">
+                <a16:creationId xmlns:a16="http://schemas.microsoft.com/office/drawing/2014/main" id="{CFEEEE36-E132-0D40-A4B8-9BDC5C8B6528}"/>
+              </a:ext>
+            </a:extLst>
+          </p:cNvPr>
+          <p:cNvSpPr>
+            <a:spLocks noGrp="1"/>
+          </p:cNvSpPr>
+          <p:nvPr>
+            <p:ph type="title"/>
+          </p:nvPr>
+        </p:nvSpPr>
+        <p:spPr/>
+        <p:txBody>
+          <a:bodyPr/>
+          <a:lstStyle/>
+          <a:p>
+            <a:r>
+              <a:rPr lang="en-US" dirty="0"/>
+              <a:t>Features</a:t>
+            </a:r>
+          </a:p>
+        </p:txBody>
+      </p:sp>
+      <p:sp>
+        <p:nvSpPr>
+          <p:cNvPr id="4" name="Text Placeholder 3">
+            <a:extLst>
+              <a:ext uri="{FF2B5EF4-FFF2-40B4-BE49-F238E27FC236}">
+                <a16:creationId xmlns:a16="http://schemas.microsoft.com/office/drawing/2014/main" id="{C0DB4ECB-A7D5-6B47-8180-75CB3C3DB7DE}"/>
+              </a:ext>
+            </a:extLst>
+          </p:cNvPr>
+          <p:cNvSpPr>
+            <a:spLocks noGrp="1"/>
+          </p:cNvSpPr>
+          <p:nvPr>
+            <p:ph type="body" idx="1"/>
+          </p:nvPr>
+        </p:nvSpPr>
+        <p:spPr/>
+        <p:txBody>
+          <a:bodyPr/>
+          <a:lstStyle/>
+          <a:p>
+            <a:r>
+              <a:rPr lang="en-US" dirty="0"/>
+              <a:t>Feature </a:t>
+            </a:r>
+            <a:r>
+              <a:rPr lang="en-US" dirty="0" err="1"/>
+              <a:t>xxxx</a:t>
+            </a:r>
+            <a:r>
+              <a:rPr lang="en-US" dirty="0"/>
+              <a:t> (in support of theme xxx)</a:t>
+            </a:r>
+          </a:p>
+        </p:txBody>
+      </p:sp>
+    </p:spTree>
+    <p:extLst>
+      <p:ext uri="{BB962C8B-B14F-4D97-AF65-F5344CB8AC3E}">
+        <p14:creationId xmlns:p14="http://schemas.microsoft.com/office/powerpoint/2010/main" val="2542653556"/>
+      </p:ext>
+    </p:extLst>
+  </p:cSld>
+  <p:clrMapOvr>
+    <a:masterClrMapping/>
+  </p:clrMapOvr>
+  <p:transition spd="med">
+    <p:fade thruBlk="1"/>
+  </p:transition>
+  <p:timing>
+    <p:tnLst>
+      <p:par>
+        <p:cTn id="1" dur="indefinite" restart="never" nodeType="tmRoot"/>
+      </p:par>
+    </p:tnLst>
+  </p:timing>
+</p:sld>
+</file>
+
+<file path=ppt/slides/slide21.xml><?xml version="1.0" encoding="utf-8"?>
+<p:sld xmlns:a="http://schemas.openxmlformats.org/drawingml/2006/main" xmlns:r="http://schemas.openxmlformats.org/officeDocument/2006/relationships" xmlns:p="http://schemas.openxmlformats.org/presentationml/2006/main">
+  <p:cSld>
+    <p:spTree>
+      <p:nvGrpSpPr>
+        <p:cNvPr id="1" name=""/>
+        <p:cNvGrpSpPr/>
+        <p:nvPr/>
+      </p:nvGrpSpPr>
+      <p:grpSpPr>
+        <a:xfrm>
+          <a:off x="0" y="0"/>
+          <a:ext cx="0" cy="0"/>
+          <a:chOff x="0" y="0"/>
+          <a:chExt cx="0" cy="0"/>
+        </a:xfrm>
+      </p:grpSpPr>
+      <p:sp>
+        <p:nvSpPr>
           <p:cNvPr id="2" name="Text Placeholder 1">
             <a:extLst>
               <a:ext uri="{FF2B5EF4-FFF2-40B4-BE49-F238E27FC236}">
@@ -6794,7 +7151,7 @@
 </p:sld>
 </file>
 
-<file path=ppt/slides/slide21.xml><?xml version="1.0" encoding="utf-8"?>
+<file path=ppt/slides/slide22.xml><?xml version="1.0" encoding="utf-8"?>
 <p:sld xmlns:a="http://schemas.openxmlformats.org/drawingml/2006/main" xmlns:r="http://schemas.openxmlformats.org/officeDocument/2006/relationships" xmlns:p="http://schemas.openxmlformats.org/presentationml/2006/main">
   <p:cSld>
     <p:spTree>
@@ -6898,7 +7255,7 @@
 </p:sld>
 </file>
 
-<file path=ppt/slides/slide22.xml><?xml version="1.0" encoding="utf-8"?>
+<file path=ppt/slides/slide23.xml><?xml version="1.0" encoding="utf-8"?>
 <p:sld xmlns:a="http://schemas.openxmlformats.org/drawingml/2006/main" xmlns:r="http://schemas.openxmlformats.org/officeDocument/2006/relationships" xmlns:p="http://schemas.openxmlformats.org/presentationml/2006/main">
   <p:cSld>
     <p:spTree>
@@ -6988,7 +7345,7 @@
 </p:sld>
 </file>
 
-<file path=ppt/slides/slide23.xml><?xml version="1.0" encoding="utf-8"?>
+<file path=ppt/slides/slide24.xml><?xml version="1.0" encoding="utf-8"?>
 <p:sld xmlns:a="http://schemas.openxmlformats.org/drawingml/2006/main" xmlns:r="http://schemas.openxmlformats.org/officeDocument/2006/relationships" xmlns:p="http://schemas.openxmlformats.org/presentationml/2006/main">
   <p:cSld>
     <p:spTree>
@@ -8868,12 +9225,6 @@
 </file>
 
 <file path=customXml/item1.xml><?xml version="1.0" encoding="utf-8"?>
-<p:properties xmlns:p="http://schemas.microsoft.com/office/2006/metadata/properties" xmlns:xsi="http://www.w3.org/2001/XMLSchema-instance" xmlns:pc="http://schemas.microsoft.com/office/infopath/2007/PartnerControls">
-  <documentManagement/>
-</p:properties>
-</file>
-
-<file path=customXml/item2.xml><?xml version="1.0" encoding="utf-8"?>
 <ct:contentTypeSchema xmlns:ct="http://schemas.microsoft.com/office/2006/metadata/contentType" xmlns:ma="http://schemas.microsoft.com/office/2006/metadata/properties/metaAttributes" ct:_="" ma:_="" ma:contentTypeName="Document" ma:contentTypeID="0x01010078366F8B0CAC4944B54E4FE62E1853FF" ma:contentTypeVersion="13" ma:contentTypeDescription="Create a new document." ma:contentTypeScope="" ma:versionID="c0144efe8435d8d2a41eb877ff779f3d">
   <xsd:schema xmlns:xsd="http://www.w3.org/2001/XMLSchema" xmlns:xs="http://www.w3.org/2001/XMLSchema" xmlns:p="http://schemas.microsoft.com/office/2006/metadata/properties" xmlns:ns3="dc93a766-66e7-40cb-ae91-7d18686f06cb" xmlns:ns4="218ddd80-e909-418b-876b-6da869ab062e" targetNamespace="http://schemas.microsoft.com/office/2006/metadata/properties" ma:root="true" ma:fieldsID="98e515d43d9a7e057d5a8f41d3b12b29" ns3:_="" ns4:_="">
     <xsd:import namespace="dc93a766-66e7-40cb-ae91-7d18686f06cb"/>
@@ -9096,6 +9447,12 @@
 </ct:contentTypeSchema>
 </file>
 
+<file path=customXml/item2.xml><?xml version="1.0" encoding="utf-8"?>
+<p:properties xmlns:p="http://schemas.microsoft.com/office/2006/metadata/properties" xmlns:xsi="http://www.w3.org/2001/XMLSchema-instance" xmlns:pc="http://schemas.microsoft.com/office/infopath/2007/PartnerControls">
+  <documentManagement/>
+</p:properties>
+</file>
+
 <file path=customXml/item3.xml><?xml version="1.0" encoding="utf-8"?>
 <?mso-contentType ?>
 <FormTemplates xmlns="http://schemas.microsoft.com/sharepoint/v3/contenttype/forms">
@@ -9106,23 +9463,6 @@
 </file>
 
 <file path=customXml/itemProps1.xml><?xml version="1.0" encoding="utf-8"?>
-<ds:datastoreItem xmlns:ds="http://schemas.openxmlformats.org/officeDocument/2006/customXml" ds:itemID="{0A54B724-95FE-4227-A509-89C0BE165019}">
-  <ds:schemaRefs>
-    <ds:schemaRef ds:uri="http://purl.org/dc/terms/"/>
-    <ds:schemaRef ds:uri="218ddd80-e909-418b-876b-6da869ab062e"/>
-    <ds:schemaRef ds:uri="http://purl.org/dc/dcmitype/"/>
-    <ds:schemaRef ds:uri="http://schemas.microsoft.com/office/infopath/2007/PartnerControls"/>
-    <ds:schemaRef ds:uri="http://purl.org/dc/elements/1.1/"/>
-    <ds:schemaRef ds:uri="http://schemas.microsoft.com/office/2006/metadata/properties"/>
-    <ds:schemaRef ds:uri="http://schemas.microsoft.com/office/2006/documentManagement/types"/>
-    <ds:schemaRef ds:uri="http://schemas.openxmlformats.org/package/2006/metadata/core-properties"/>
-    <ds:schemaRef ds:uri="dc93a766-66e7-40cb-ae91-7d18686f06cb"/>
-    <ds:schemaRef ds:uri="http://www.w3.org/XML/1998/namespace"/>
-  </ds:schemaRefs>
-</ds:datastoreItem>
-</file>
-
-<file path=customXml/itemProps2.xml><?xml version="1.0" encoding="utf-8"?>
 <ds:datastoreItem xmlns:ds="http://schemas.openxmlformats.org/officeDocument/2006/customXml" ds:itemID="{75DFD259-8AF4-4CFA-9594-D45098FC5839}">
   <ds:schemaRefs>
     <ds:schemaRef ds:uri="http://schemas.microsoft.com/office/2006/metadata/contentType"/>
@@ -9141,6 +9481,23 @@
 </ds:datastoreItem>
 </file>
 
+<file path=customXml/itemProps2.xml><?xml version="1.0" encoding="utf-8"?>
+<ds:datastoreItem xmlns:ds="http://schemas.openxmlformats.org/officeDocument/2006/customXml" ds:itemID="{0A54B724-95FE-4227-A509-89C0BE165019}">
+  <ds:schemaRefs>
+    <ds:schemaRef ds:uri="http://purl.org/dc/terms/"/>
+    <ds:schemaRef ds:uri="218ddd80-e909-418b-876b-6da869ab062e"/>
+    <ds:schemaRef ds:uri="http://purl.org/dc/dcmitype/"/>
+    <ds:schemaRef ds:uri="http://schemas.microsoft.com/office/infopath/2007/PartnerControls"/>
+    <ds:schemaRef ds:uri="http://purl.org/dc/elements/1.1/"/>
+    <ds:schemaRef ds:uri="http://schemas.microsoft.com/office/2006/metadata/properties"/>
+    <ds:schemaRef ds:uri="http://schemas.microsoft.com/office/2006/documentManagement/types"/>
+    <ds:schemaRef ds:uri="http://schemas.openxmlformats.org/package/2006/metadata/core-properties"/>
+    <ds:schemaRef ds:uri="dc93a766-66e7-40cb-ae91-7d18686f06cb"/>
+    <ds:schemaRef ds:uri="http://www.w3.org/XML/1998/namespace"/>
+  </ds:schemaRefs>
+</ds:datastoreItem>
+</file>
+
 <file path=customXml/itemProps3.xml><?xml version="1.0" encoding="utf-8"?>
 <ds:datastoreItem xmlns:ds="http://schemas.openxmlformats.org/officeDocument/2006/customXml" ds:itemID="{B16FB3BA-9F7C-4CD8-B3AB-262CEFAAFDB4}">
   <ds:schemaRefs>

</xml_diff>

<commit_message>
merge/update squad focus charts
Signed-off-by: MarkAckert <mark.ackert@broadcom.com>
</commit_message>
<xml_diff>
--- a/Project Management/20PI3 Planning/Zowe Community Squad Focus for 20PI3.pptx
+++ b/Project Management/20PI3 Planning/Zowe Community Squad Focus for 20PI3.pptx
@@ -5,7 +5,7 @@
     <p:sldMasterId id="2147483653" r:id="rId4"/>
   </p:sldMasterIdLst>
   <p:notesMasterIdLst>
-    <p:notesMasterId r:id="rId27"/>
+    <p:notesMasterId r:id="rId29"/>
   </p:notesMasterIdLst>
   <p:sldIdLst>
     <p:sldId id="279" r:id="rId5"/>
@@ -18,33 +18,35 @@
     <p:sldId id="2142532353" r:id="rId12"/>
     <p:sldId id="2142532361" r:id="rId13"/>
     <p:sldId id="2142532354" r:id="rId14"/>
-    <p:sldId id="2142532362" r:id="rId15"/>
-    <p:sldId id="2142532355" r:id="rId16"/>
-    <p:sldId id="2142532363" r:id="rId17"/>
-    <p:sldId id="2142532359" r:id="rId18"/>
-    <p:sldId id="2142532366" r:id="rId19"/>
-    <p:sldId id="2142532370" r:id="rId20"/>
-    <p:sldId id="2142532356" r:id="rId21"/>
-    <p:sldId id="2142532364" r:id="rId22"/>
-    <p:sldId id="2142532357" r:id="rId23"/>
-    <p:sldId id="2142532365" r:id="rId24"/>
-    <p:sldId id="2142532358" r:id="rId25"/>
-    <p:sldId id="2142532367" r:id="rId26"/>
+    <p:sldId id="2142532371" r:id="rId15"/>
+    <p:sldId id="2142532373" r:id="rId16"/>
+    <p:sldId id="2142532355" r:id="rId17"/>
+    <p:sldId id="2142532363" r:id="rId18"/>
+    <p:sldId id="2142532374" r:id="rId19"/>
+    <p:sldId id="2142532359" r:id="rId20"/>
+    <p:sldId id="2142532366" r:id="rId21"/>
+    <p:sldId id="2142532370" r:id="rId22"/>
+    <p:sldId id="2142532356" r:id="rId23"/>
+    <p:sldId id="2142532364" r:id="rId24"/>
+    <p:sldId id="2142532357" r:id="rId25"/>
+    <p:sldId id="2142532365" r:id="rId26"/>
+    <p:sldId id="2142532358" r:id="rId27"/>
+    <p:sldId id="2142532367" r:id="rId28"/>
   </p:sldIdLst>
   <p:sldSz cx="9144000" cy="5143500" type="screen16x9"/>
   <p:notesSz cx="6858000" cy="9144000"/>
   <p:embeddedFontLst>
     <p:embeddedFont>
       <p:font typeface="Calibri" panose="020F0502020204030204" pitchFamily="34" charset="0"/>
-      <p:regular r:id="rId28"/>
-      <p:bold r:id="rId29"/>
-      <p:italic r:id="rId30"/>
-      <p:boldItalic r:id="rId31"/>
+      <p:regular r:id="rId30"/>
+      <p:bold r:id="rId31"/>
+      <p:italic r:id="rId32"/>
+      <p:boldItalic r:id="rId33"/>
     </p:embeddedFont>
     <p:embeddedFont>
       <p:font typeface="Gill Sans" panose="020B0502020104020203" pitchFamily="34" charset="-79"/>
-      <p:regular r:id="rId32"/>
-      <p:bold r:id="rId33"/>
+      <p:regular r:id="rId34"/>
+      <p:bold r:id="rId35"/>
     </p:embeddedFont>
   </p:embeddedFontLst>
   <p:defaultTextStyle>
@@ -282,14 +284,6 @@
     </p:ext>
   </p:extLst>
 </p:presentation>
-</file>
-
-<file path=ppt/revisionInfo.xml><?xml version="1.0" encoding="utf-8"?>
-<p1510:revInfo xmlns:a="http://schemas.openxmlformats.org/drawingml/2006/main" xmlns:r="http://schemas.openxmlformats.org/officeDocument/2006/relationships" xmlns:p1510="http://schemas.microsoft.com/office/powerpoint/2015/10/main">
-  <p1510:revLst>
-    <p1510:client id="{CC6E4D09-935D-43B9-8870-911B4420BDA4}" v="74" dt="2020-06-04T11:17:34.315"/>
-  </p1510:revLst>
-</p1510:revInfo>
 </file>
 
 <file path=ppt/notesMasters/notesMaster1.xml><?xml version="1.0" encoding="utf-8"?>
@@ -1470,6 +1464,144 @@
           <a:bodyPr/>
           <a:lstStyle/>
           <a:p>
+            <a:pPr marL="158750" indent="0">
+              <a:buNone/>
+            </a:pPr>
+            <a:endParaRPr lang="en-US" dirty="0"/>
+          </a:p>
+        </p:txBody>
+      </p:sp>
+    </p:spTree>
+    <p:extLst>
+      <p:ext uri="{BB962C8B-B14F-4D97-AF65-F5344CB8AC3E}">
+        <p14:creationId xmlns:p14="http://schemas.microsoft.com/office/powerpoint/2010/main" val="1014495597"/>
+      </p:ext>
+    </p:extLst>
+  </p:cSld>
+  <p:clrMapOvr>
+    <a:masterClrMapping/>
+  </p:clrMapOvr>
+</p:notes>
+</file>
+
+<file path=ppt/notesSlides/notesSlide6.xml><?xml version="1.0" encoding="utf-8"?>
+<p:notes xmlns:a="http://schemas.openxmlformats.org/drawingml/2006/main" xmlns:r="http://schemas.openxmlformats.org/officeDocument/2006/relationships" xmlns:p="http://schemas.openxmlformats.org/presentationml/2006/main">
+  <p:cSld>
+    <p:spTree>
+      <p:nvGrpSpPr>
+        <p:cNvPr id="1" name=""/>
+        <p:cNvGrpSpPr/>
+        <p:nvPr/>
+      </p:nvGrpSpPr>
+      <p:grpSpPr>
+        <a:xfrm>
+          <a:off x="0" y="0"/>
+          <a:ext cx="0" cy="0"/>
+          <a:chOff x="0" y="0"/>
+          <a:chExt cx="0" cy="0"/>
+        </a:xfrm>
+      </p:grpSpPr>
+      <p:sp>
+        <p:nvSpPr>
+          <p:cNvPr id="2" name="Slide Image Placeholder 1"/>
+          <p:cNvSpPr>
+            <a:spLocks noGrp="1" noRot="1" noChangeAspect="1"/>
+          </p:cNvSpPr>
+          <p:nvPr>
+            <p:ph type="sldImg"/>
+          </p:nvPr>
+        </p:nvSpPr>
+        <p:spPr>
+          <a:xfrm>
+            <a:off x="381000" y="685800"/>
+            <a:ext cx="6096000" cy="3429000"/>
+          </a:xfrm>
+        </p:spPr>
+      </p:sp>
+      <p:sp>
+        <p:nvSpPr>
+          <p:cNvPr id="3" name="Notes Placeholder 2"/>
+          <p:cNvSpPr>
+            <a:spLocks noGrp="1"/>
+          </p:cNvSpPr>
+          <p:nvPr>
+            <p:ph type="body" idx="1"/>
+          </p:nvPr>
+        </p:nvSpPr>
+        <p:spPr/>
+        <p:txBody>
+          <a:bodyPr/>
+          <a:lstStyle/>
+          <a:p>
+            <a:pPr marL="158750" indent="0">
+              <a:buNone/>
+            </a:pPr>
+            <a:endParaRPr lang="en-US" dirty="0"/>
+          </a:p>
+        </p:txBody>
+      </p:sp>
+    </p:spTree>
+    <p:extLst>
+      <p:ext uri="{BB962C8B-B14F-4D97-AF65-F5344CB8AC3E}">
+        <p14:creationId xmlns:p14="http://schemas.microsoft.com/office/powerpoint/2010/main" val="1121660626"/>
+      </p:ext>
+    </p:extLst>
+  </p:cSld>
+  <p:clrMapOvr>
+    <a:masterClrMapping/>
+  </p:clrMapOvr>
+</p:notes>
+</file>
+
+<file path=ppt/notesSlides/notesSlide7.xml><?xml version="1.0" encoding="utf-8"?>
+<p:notes xmlns:a="http://schemas.openxmlformats.org/drawingml/2006/main" xmlns:r="http://schemas.openxmlformats.org/officeDocument/2006/relationships" xmlns:p="http://schemas.openxmlformats.org/presentationml/2006/main">
+  <p:cSld>
+    <p:spTree>
+      <p:nvGrpSpPr>
+        <p:cNvPr id="1" name=""/>
+        <p:cNvGrpSpPr/>
+        <p:nvPr/>
+      </p:nvGrpSpPr>
+      <p:grpSpPr>
+        <a:xfrm>
+          <a:off x="0" y="0"/>
+          <a:ext cx="0" cy="0"/>
+          <a:chOff x="0" y="0"/>
+          <a:chExt cx="0" cy="0"/>
+        </a:xfrm>
+      </p:grpSpPr>
+      <p:sp>
+        <p:nvSpPr>
+          <p:cNvPr id="2" name="Slide Image Placeholder 1"/>
+          <p:cNvSpPr>
+            <a:spLocks noGrp="1" noRot="1" noChangeAspect="1"/>
+          </p:cNvSpPr>
+          <p:nvPr>
+            <p:ph type="sldImg"/>
+          </p:nvPr>
+        </p:nvSpPr>
+        <p:spPr>
+          <a:xfrm>
+            <a:off x="381000" y="685800"/>
+            <a:ext cx="6096000" cy="3429000"/>
+          </a:xfrm>
+        </p:spPr>
+      </p:sp>
+      <p:sp>
+        <p:nvSpPr>
+          <p:cNvPr id="3" name="Notes Placeholder 2"/>
+          <p:cNvSpPr>
+            <a:spLocks noGrp="1"/>
+          </p:cNvSpPr>
+          <p:nvPr>
+            <p:ph type="body" idx="1"/>
+          </p:nvPr>
+        </p:nvSpPr>
+        <p:spPr/>
+        <p:txBody>
+          <a:bodyPr/>
+          <a:lstStyle/>
+          <a:p>
             <a:pPr marL="457200" marR="0" lvl="0" indent="-298450" algn="l" defTabSz="914400" rtl="0" eaLnBrk="1" fontAlgn="auto" latinLnBrk="0" hangingPunct="1">
               <a:lnSpc>
                 <a:spcPct val="100000"/>
@@ -1506,6 +1638,72 @@
     <p:extLst>
       <p:ext uri="{BB962C8B-B14F-4D97-AF65-F5344CB8AC3E}">
         <p14:creationId xmlns:p14="http://schemas.microsoft.com/office/powerpoint/2010/main" val="1618876320"/>
+      </p:ext>
+    </p:extLst>
+  </p:cSld>
+  <p:clrMapOvr>
+    <a:masterClrMapping/>
+  </p:clrMapOvr>
+</p:notes>
+</file>
+
+<file path=ppt/notesSlides/notesSlide8.xml><?xml version="1.0" encoding="utf-8"?>
+<p:notes xmlns:a="http://schemas.openxmlformats.org/drawingml/2006/main" xmlns:r="http://schemas.openxmlformats.org/officeDocument/2006/relationships" xmlns:p="http://schemas.openxmlformats.org/presentationml/2006/main">
+  <p:cSld>
+    <p:spTree>
+      <p:nvGrpSpPr>
+        <p:cNvPr id="1" name=""/>
+        <p:cNvGrpSpPr/>
+        <p:nvPr/>
+      </p:nvGrpSpPr>
+      <p:grpSpPr>
+        <a:xfrm>
+          <a:off x="0" y="0"/>
+          <a:ext cx="0" cy="0"/>
+          <a:chOff x="0" y="0"/>
+          <a:chExt cx="0" cy="0"/>
+        </a:xfrm>
+      </p:grpSpPr>
+      <p:sp>
+        <p:nvSpPr>
+          <p:cNvPr id="2" name="Slide Image Placeholder 1"/>
+          <p:cNvSpPr>
+            <a:spLocks noGrp="1" noRot="1" noChangeAspect="1"/>
+          </p:cNvSpPr>
+          <p:nvPr>
+            <p:ph type="sldImg"/>
+          </p:nvPr>
+        </p:nvSpPr>
+        <p:spPr>
+          <a:xfrm>
+            <a:off x="381000" y="685800"/>
+            <a:ext cx="6096000" cy="3429000"/>
+          </a:xfrm>
+        </p:spPr>
+      </p:sp>
+      <p:sp>
+        <p:nvSpPr>
+          <p:cNvPr id="3" name="Notes Placeholder 2"/>
+          <p:cNvSpPr>
+            <a:spLocks noGrp="1"/>
+          </p:cNvSpPr>
+          <p:nvPr>
+            <p:ph type="body" idx="1"/>
+          </p:nvPr>
+        </p:nvSpPr>
+        <p:spPr/>
+        <p:txBody>
+          <a:bodyPr/>
+          <a:lstStyle/>
+          <a:p>
+            <a:endParaRPr lang="en-US" dirty="0"/>
+          </a:p>
+        </p:txBody>
+      </p:sp>
+    </p:spTree>
+    <p:extLst>
+      <p:ext uri="{BB962C8B-B14F-4D97-AF65-F5344CB8AC3E}">
+        <p14:creationId xmlns:p14="http://schemas.microsoft.com/office/powerpoint/2010/main" val="702557294"/>
       </p:ext>
     </p:extLst>
   </p:cSld>
@@ -5402,7 +5600,7 @@
           <a:p>
             <a:r>
               <a:rPr lang="en-US" dirty="0"/>
-              <a:t>Features</a:t>
+              <a:t>Feature 1</a:t>
             </a:r>
           </a:p>
         </p:txBody>
@@ -5423,30 +5621,102 @@
             <p:ph type="body" idx="1"/>
           </p:nvPr>
         </p:nvSpPr>
-        <p:spPr/>
+        <p:spPr>
+          <a:xfrm>
+            <a:off x="306211" y="774096"/>
+            <a:ext cx="8369400" cy="4147860"/>
+          </a:xfrm>
+        </p:spPr>
         <p:txBody>
           <a:bodyPr/>
           <a:lstStyle/>
           <a:p>
-            <a:r>
-              <a:rPr lang="en-US" dirty="0"/>
-              <a:t>Feature </a:t>
+            <a:pPr marL="101600" indent="0">
+              <a:buNone/>
+            </a:pPr>
+            <a:r>
+              <a:rPr lang="en-US" dirty="0"/>
+              <a:t>Application developers and those developing scripts to drive interaction with z/OS can easily learn about, access, and leverage </a:t>
             </a:r>
             <a:r>
               <a:rPr lang="en-US" dirty="0" err="1"/>
-              <a:t>xxxx</a:t>
-            </a:r>
-            <a:r>
-              <a:rPr lang="en-US" dirty="0"/>
-              <a:t> (in support of theme xxx)</a:t>
-            </a:r>
+              <a:t>Zowe</a:t>
+            </a:r>
+            <a:r>
+              <a:rPr lang="en-US" dirty="0"/>
+              <a:t> SDKs to implement an initial use case.</a:t>
+            </a:r>
+          </a:p>
+          <a:p>
+            <a:pPr marL="101600" indent="0">
+              <a:buNone/>
+            </a:pPr>
+            <a:br>
+              <a:rPr lang="en-US" u="sng" dirty="0"/>
+            </a:br>
+            <a:r>
+              <a:rPr lang="en-US" b="1" dirty="0"/>
+              <a:t>Deliverables: </a:t>
+            </a:r>
+            <a:r>
+              <a:rPr lang="en-US" dirty="0"/>
+              <a:t>Documentation is published on our </a:t>
+            </a:r>
+            <a:r>
+              <a:rPr lang="en-US" dirty="0" err="1"/>
+              <a:t>Zowe</a:t>
+            </a:r>
+            <a:r>
+              <a:rPr lang="en-US" dirty="0"/>
+              <a:t> Docs site covering the overview and use of the SDKs as well as documenting how the community can contribute to the technology. In addition, detailed samples that leverage the SDKs are provided within each repository.</a:t>
+            </a:r>
+            <a:br>
+              <a:rPr lang="en-US" dirty="0"/>
+            </a:br>
+            <a:br>
+              <a:rPr lang="en-US" dirty="0"/>
+            </a:br>
+            <a:r>
+              <a:rPr lang="en-US" dirty="0"/>
+              <a:t>To further drive visibility and adoption, the </a:t>
+            </a:r>
+            <a:r>
+              <a:rPr lang="en-US" dirty="0" err="1"/>
+              <a:t>Zowe</a:t>
+            </a:r>
+            <a:r>
+              <a:rPr lang="en-US" dirty="0"/>
+              <a:t> Node SDK is published to public </a:t>
+            </a:r>
+            <a:r>
+              <a:rPr lang="en-US" dirty="0" err="1"/>
+              <a:t>npm</a:t>
+            </a:r>
+            <a:r>
+              <a:rPr lang="en-US" dirty="0"/>
+              <a:t> separate from the </a:t>
+            </a:r>
+            <a:r>
+              <a:rPr lang="en-US" dirty="0" err="1"/>
+              <a:t>Zowe</a:t>
+            </a:r>
+            <a:r>
+              <a:rPr lang="en-US" dirty="0"/>
+              <a:t> CLI.</a:t>
+            </a:r>
+          </a:p>
+          <a:p>
+            <a:pPr marL="101600" indent="0">
+              <a:buNone/>
+            </a:pPr>
+            <a:endParaRPr lang="en-US" dirty="0"/>
           </a:p>
         </p:txBody>
       </p:sp>
     </p:spTree>
     <p:extLst>
       <p:ext uri="{BB962C8B-B14F-4D97-AF65-F5344CB8AC3E}">
-        <p14:creationId xmlns:p14="http://schemas.microsoft.com/office/powerpoint/2010/main" val="3888714458"/>
+        <p14:creationId xmlns:p14="http://schemas.microsoft.com/office/powerpoint/2010/main" val="2003776068"/>
       </p:ext>
     </p:extLst>
   </p:cSld>
@@ -5460,6 +5730,134 @@
 </file>
 
 <file path=ppt/slides/slide12.xml><?xml version="1.0" encoding="utf-8"?>
+<p:sld xmlns:a="http://schemas.openxmlformats.org/drawingml/2006/main" xmlns:r="http://schemas.openxmlformats.org/officeDocument/2006/relationships" xmlns:p="http://schemas.openxmlformats.org/presentationml/2006/main">
+  <p:cSld>
+    <p:spTree>
+      <p:nvGrpSpPr>
+        <p:cNvPr id="1" name=""/>
+        <p:cNvGrpSpPr/>
+        <p:nvPr/>
+      </p:nvGrpSpPr>
+      <p:grpSpPr>
+        <a:xfrm>
+          <a:off x="0" y="0"/>
+          <a:ext cx="0" cy="0"/>
+          <a:chOff x="0" y="0"/>
+          <a:chExt cx="0" cy="0"/>
+        </a:xfrm>
+      </p:grpSpPr>
+      <p:sp>
+        <p:nvSpPr>
+          <p:cNvPr id="3" name="Title 2">
+            <a:extLst>
+              <a:ext uri="{FF2B5EF4-FFF2-40B4-BE49-F238E27FC236}">
+                <a16:creationId xmlns:a16="http://schemas.microsoft.com/office/drawing/2014/main" id="{CFEEEE36-E132-0D40-A4B8-9BDC5C8B6528}"/>
+              </a:ext>
+            </a:extLst>
+          </p:cNvPr>
+          <p:cNvSpPr>
+            <a:spLocks noGrp="1"/>
+          </p:cNvSpPr>
+          <p:nvPr>
+            <p:ph type="title"/>
+          </p:nvPr>
+        </p:nvSpPr>
+        <p:spPr/>
+        <p:txBody>
+          <a:bodyPr/>
+          <a:lstStyle/>
+          <a:p>
+            <a:r>
+              <a:rPr lang="en-US" dirty="0"/>
+              <a:t>Feature 2</a:t>
+            </a:r>
+          </a:p>
+        </p:txBody>
+      </p:sp>
+      <p:sp>
+        <p:nvSpPr>
+          <p:cNvPr id="4" name="Text Placeholder 3">
+            <a:extLst>
+              <a:ext uri="{FF2B5EF4-FFF2-40B4-BE49-F238E27FC236}">
+                <a16:creationId xmlns:a16="http://schemas.microsoft.com/office/drawing/2014/main" id="{C0DB4ECB-A7D5-6B47-8180-75CB3C3DB7DE}"/>
+              </a:ext>
+            </a:extLst>
+          </p:cNvPr>
+          <p:cNvSpPr>
+            <a:spLocks noGrp="1"/>
+          </p:cNvSpPr>
+          <p:nvPr>
+            <p:ph type="body" idx="1"/>
+          </p:nvPr>
+        </p:nvSpPr>
+        <p:spPr>
+          <a:xfrm>
+            <a:off x="306211" y="774096"/>
+            <a:ext cx="8369400" cy="4147860"/>
+          </a:xfrm>
+        </p:spPr>
+        <p:txBody>
+          <a:bodyPr/>
+          <a:lstStyle/>
+          <a:p>
+            <a:pPr marL="101600" indent="0">
+              <a:buNone/>
+            </a:pPr>
+            <a:r>
+              <a:rPr lang="en-US" dirty="0"/>
+              <a:t>Those leveraging </a:t>
+            </a:r>
+            <a:r>
+              <a:rPr lang="en-US" dirty="0" err="1"/>
+              <a:t>Zowe</a:t>
+            </a:r>
+            <a:r>
+              <a:rPr lang="en-US" dirty="0"/>
+              <a:t> client technologies can store all connection details and command option preferences in a single profile allowing for quick initial configuration and reduced effort when updating properties.</a:t>
+            </a:r>
+            <a:br>
+              <a:rPr lang="en-US" dirty="0"/>
+            </a:br>
+            <a:endParaRPr lang="en-US" b="1" dirty="0"/>
+          </a:p>
+          <a:p>
+            <a:pPr marL="101600" indent="0">
+              <a:buNone/>
+            </a:pPr>
+            <a:r>
+              <a:rPr lang="en-US" b="1" dirty="0"/>
+              <a:t>Deliverable: </a:t>
+            </a:r>
+            <a:r>
+              <a:rPr lang="en-US" dirty="0"/>
+              <a:t>Simplified profile management by allowing all profile options to be specified in a single base profile. This is an enhancement to the core CLI.</a:t>
+            </a:r>
+          </a:p>
+          <a:p>
+            <a:pPr marL="101600" indent="0">
+              <a:buNone/>
+            </a:pPr>
+            <a:endParaRPr lang="en-US" dirty="0"/>
+          </a:p>
+        </p:txBody>
+      </p:sp>
+    </p:spTree>
+    <p:extLst>
+      <p:ext uri="{BB962C8B-B14F-4D97-AF65-F5344CB8AC3E}">
+        <p14:creationId xmlns:p14="http://schemas.microsoft.com/office/powerpoint/2010/main" val="3854920584"/>
+      </p:ext>
+    </p:extLst>
+  </p:cSld>
+  <p:clrMapOvr>
+    <a:masterClrMapping/>
+  </p:clrMapOvr>
+  <p:transition spd="med">
+    <p:fade thruBlk="1"/>
+  </p:transition>
+</p:sld>
+</file>
+
+<file path=ppt/slides/slide13.xml><?xml version="1.0" encoding="utf-8"?>
 <p:sld xmlns:a="http://schemas.openxmlformats.org/drawingml/2006/main" xmlns:r="http://schemas.openxmlformats.org/officeDocument/2006/relationships" xmlns:p="http://schemas.openxmlformats.org/presentationml/2006/main">
   <p:cSld>
     <p:spTree>
@@ -5538,7 +5936,7 @@
 </p:sld>
 </file>
 
-<file path=ppt/slides/slide13.xml><?xml version="1.0" encoding="utf-8"?>
+<file path=ppt/slides/slide14.xml><?xml version="1.0" encoding="utf-8"?>
 <p:sld xmlns:a="http://schemas.openxmlformats.org/drawingml/2006/main" xmlns:r="http://schemas.openxmlformats.org/officeDocument/2006/relationships" xmlns:p="http://schemas.openxmlformats.org/presentationml/2006/main">
   <p:cSld>
     <p:spTree>
@@ -5599,23 +5997,101 @@
             <p:ph type="body" idx="1"/>
           </p:nvPr>
         </p:nvSpPr>
-        <p:spPr/>
+        <p:spPr>
+          <a:xfrm>
+            <a:off x="317500" y="943428"/>
+            <a:ext cx="8369400" cy="3742871"/>
+          </a:xfrm>
+        </p:spPr>
         <p:txBody>
           <a:bodyPr/>
           <a:lstStyle/>
           <a:p>
             <a:r>
               <a:rPr lang="en-US" dirty="0"/>
-              <a:t>Feature </a:t>
+              <a:t>Define and develop a set of conformance guidelines to be consumed by extenders of the </a:t>
             </a:r>
             <a:r>
               <a:rPr lang="en-US" dirty="0" err="1"/>
-              <a:t>xxxx</a:t>
-            </a:r>
-            <a:r>
-              <a:rPr lang="en-US" dirty="0"/>
-              <a:t> (in support of theme xxx)</a:t>
-            </a:r>
+              <a:t>Zowe</a:t>
+            </a:r>
+            <a:r>
+              <a:rPr lang="en-US" dirty="0"/>
+              <a:t> Explorer. </a:t>
+            </a:r>
+            <a:r>
+              <a:rPr lang="en-US" dirty="0">
+                <a:hlinkClick r:id="rId2"/>
+              </a:rPr>
+              <a:t>#837</a:t>
+            </a:r>
+            <a:endParaRPr lang="en-US" dirty="0"/>
+          </a:p>
+          <a:p>
+            <a:pPr lvl="1"/>
+            <a:r>
+              <a:rPr lang="en-US" dirty="0"/>
+              <a:t>To deliver standardized guidelines that Extenders of the </a:t>
+            </a:r>
+            <a:r>
+              <a:rPr lang="en-US" dirty="0" err="1"/>
+              <a:t>Zowe</a:t>
+            </a:r>
+            <a:r>
+              <a:rPr lang="en-US" dirty="0"/>
+              <a:t> Explorer can follow in order to leverage and grow the </a:t>
+            </a:r>
+            <a:r>
+              <a:rPr lang="en-US" dirty="0" err="1"/>
+              <a:t>Zowe</a:t>
+            </a:r>
+            <a:r>
+              <a:rPr lang="en-US" dirty="0"/>
+              <a:t> ecosystem</a:t>
+            </a:r>
+            <a:br>
+              <a:rPr lang="en-US" dirty="0"/>
+            </a:br>
+            <a:endParaRPr lang="en-US" dirty="0"/>
+          </a:p>
+          <a:p>
+            <a:r>
+              <a:rPr lang="en-US" dirty="0"/>
+              <a:t>Leverage the </a:t>
+            </a:r>
+            <a:r>
+              <a:rPr lang="en-US" dirty="0" err="1"/>
+              <a:t>Zowe</a:t>
+            </a:r>
+            <a:r>
+              <a:rPr lang="en-US" dirty="0"/>
+              <a:t> CLI security enhancements around MFA and SSO for an improved security experience in the </a:t>
+            </a:r>
+            <a:r>
+              <a:rPr lang="en-US" dirty="0" err="1"/>
+              <a:t>Zowe</a:t>
+            </a:r>
+            <a:r>
+              <a:rPr lang="en-US" dirty="0"/>
+              <a:t> Explorer.</a:t>
+            </a:r>
+          </a:p>
+          <a:p>
+            <a:pPr lvl="1"/>
+            <a:r>
+              <a:rPr lang="en-US" dirty="0"/>
+              <a:t>To increase user confidence knowing that the extension implements best security practices in order to remain compliant with corporate policies.</a:t>
+            </a:r>
+            <a:br>
+              <a:rPr lang="en-US" dirty="0"/>
+            </a:br>
+            <a:endParaRPr lang="en-US" dirty="0"/>
+          </a:p>
+          <a:p>
+            <a:pPr marL="101600" indent="0">
+              <a:buNone/>
+            </a:pPr>
+            <a:endParaRPr lang="en-US" dirty="0"/>
           </a:p>
         </p:txBody>
       </p:sp>
@@ -5631,73 +6107,6 @@
   </p:clrMapOvr>
   <p:transition spd="med">
     <p:fade thruBlk="1"/>
-  </p:transition>
-</p:sld>
-</file>
-
-<file path=ppt/slides/slide14.xml><?xml version="1.0" encoding="utf-8"?>
-<p:sld xmlns:a="http://schemas.openxmlformats.org/drawingml/2006/main" xmlns:r="http://schemas.openxmlformats.org/officeDocument/2006/relationships" xmlns:p="http://schemas.openxmlformats.org/presentationml/2006/main">
-  <p:cSld>
-    <p:spTree>
-      <p:nvGrpSpPr>
-        <p:cNvPr id="1" name=""/>
-        <p:cNvGrpSpPr/>
-        <p:nvPr/>
-      </p:nvGrpSpPr>
-      <p:grpSpPr>
-        <a:xfrm>
-          <a:off x="0" y="0"/>
-          <a:ext cx="0" cy="0"/>
-          <a:chOff x="0" y="0"/>
-          <a:chExt cx="0" cy="0"/>
-        </a:xfrm>
-      </p:grpSpPr>
-      <p:sp>
-        <p:nvSpPr>
-          <p:cNvPr id="2" name="Text Placeholder 1">
-            <a:extLst>
-              <a:ext uri="{FF2B5EF4-FFF2-40B4-BE49-F238E27FC236}">
-                <a16:creationId xmlns:a16="http://schemas.microsoft.com/office/drawing/2014/main" id="{ADB2E00A-906F-6645-9A30-53C6D93DC43C}"/>
-              </a:ext>
-            </a:extLst>
-          </p:cNvPr>
-          <p:cNvSpPr>
-            <a:spLocks noGrp="1"/>
-          </p:cNvSpPr>
-          <p:nvPr>
-            <p:ph type="body" idx="1"/>
-          </p:nvPr>
-        </p:nvSpPr>
-        <p:spPr/>
-        <p:txBody>
-          <a:bodyPr/>
-          <a:lstStyle/>
-          <a:p>
-            <a:r>
-              <a:rPr lang="en-US" dirty="0"/>
-              <a:t>Onboarding Squad Focus</a:t>
-            </a:r>
-          </a:p>
-          <a:p>
-            <a:r>
-              <a:rPr lang="en-US" sz="2000" dirty="0"/>
-              <a:t>Rose?? Joe W? (Squad Lead??)</a:t>
-            </a:r>
-          </a:p>
-        </p:txBody>
-      </p:sp>
-    </p:spTree>
-    <p:extLst>
-      <p:ext uri="{BB962C8B-B14F-4D97-AF65-F5344CB8AC3E}">
-        <p14:creationId xmlns:p14="http://schemas.microsoft.com/office/powerpoint/2010/main" val="322818001"/>
-      </p:ext>
-    </p:extLst>
-  </p:cSld>
-  <p:clrMapOvr>
-    <a:masterClrMapping/>
-  </p:clrMapOvr>
-  <p:transition spd="med">
-    <p:fade/>
   </p:transition>
 </p:sld>
 </file>
@@ -5742,7 +6151,7 @@
           <a:p>
             <a:r>
               <a:rPr lang="en-US" dirty="0"/>
-              <a:t>Focus</a:t>
+              <a:t>Features</a:t>
             </a:r>
           </a:p>
         </p:txBody>
@@ -5763,19 +6172,135 @@
             <p:ph type="body" idx="1"/>
           </p:nvPr>
         </p:nvSpPr>
-        <p:spPr/>
+        <p:spPr>
+          <a:xfrm>
+            <a:off x="317500" y="943428"/>
+            <a:ext cx="8369400" cy="3963005"/>
+          </a:xfrm>
+        </p:spPr>
         <p:txBody>
           <a:bodyPr/>
           <a:lstStyle/>
           <a:p>
             <a:r>
               <a:rPr lang="en-US" dirty="0"/>
-              <a:t>Focus </a:t>
+              <a:t>Enhance the profile management user experience of </a:t>
             </a:r>
             <a:r>
               <a:rPr lang="en-US" dirty="0" err="1"/>
-              <a:t>xxxx</a:t>
-            </a:r>
+              <a:t>Zowe</a:t>
+            </a:r>
+            <a:r>
+              <a:rPr lang="en-US" dirty="0"/>
+              <a:t> Explorer (for new and regular users) (</a:t>
+            </a:r>
+            <a:r>
+              <a:rPr lang="en-US" dirty="0">
+                <a:hlinkClick r:id="rId2"/>
+              </a:rPr>
+              <a:t>Epic</a:t>
+            </a:r>
+            <a:r>
+              <a:rPr lang="en-US" dirty="0"/>
+              <a:t>) (</a:t>
+            </a:r>
+            <a:r>
+              <a:rPr lang="en-US" dirty="0">
+                <a:hlinkClick r:id="rId3"/>
+              </a:rPr>
+              <a:t>Issues</a:t>
+            </a:r>
+            <a:r>
+              <a:rPr lang="en-US" dirty="0"/>
+              <a:t>)</a:t>
+            </a:r>
+          </a:p>
+          <a:p>
+            <a:pPr lvl="1"/>
+            <a:r>
+              <a:rPr lang="en-US" dirty="0"/>
+              <a:t>To deliver a greater experience when configuring and managing connection details by addressing community related issues around profiles.</a:t>
+            </a:r>
+            <a:br>
+              <a:rPr lang="en-US" dirty="0"/>
+            </a:br>
+            <a:endParaRPr lang="en-US" dirty="0"/>
+          </a:p>
+          <a:p>
+            <a:r>
+              <a:rPr lang="en-US" dirty="0"/>
+              <a:t>Enhance the z/OS Unix user experience of </a:t>
+            </a:r>
+            <a:r>
+              <a:rPr lang="en-US" dirty="0" err="1"/>
+              <a:t>Zowe</a:t>
+            </a:r>
+            <a:r>
+              <a:rPr lang="en-US" dirty="0"/>
+              <a:t> Explorer (</a:t>
+            </a:r>
+            <a:r>
+              <a:rPr lang="en-US" dirty="0">
+                <a:hlinkClick r:id="rId4"/>
+              </a:rPr>
+              <a:t>Epic</a:t>
+            </a:r>
+            <a:r>
+              <a:rPr lang="en-US" dirty="0"/>
+              <a:t>) (</a:t>
+            </a:r>
+            <a:r>
+              <a:rPr lang="en-US" dirty="0">
+                <a:hlinkClick r:id="rId5"/>
+              </a:rPr>
+              <a:t>Issues</a:t>
+            </a:r>
+            <a:r>
+              <a:rPr lang="en-US" dirty="0"/>
+              <a:t>)</a:t>
+            </a:r>
+          </a:p>
+          <a:p>
+            <a:pPr lvl="1"/>
+            <a:r>
+              <a:rPr lang="en-US" dirty="0"/>
+              <a:t>To deliver a greater experience when working with z/OS Unix by addressing community related issues.</a:t>
+            </a:r>
+          </a:p>
+          <a:p>
+            <a:pPr lvl="1"/>
+            <a:endParaRPr lang="en-US" dirty="0"/>
+          </a:p>
+          <a:p>
+            <a:r>
+              <a:rPr lang="en-US" dirty="0"/>
+              <a:t>Enhance the Dataset manipulation user experience of the </a:t>
+            </a:r>
+            <a:r>
+              <a:rPr lang="en-US" dirty="0" err="1"/>
+              <a:t>Zowe</a:t>
+            </a:r>
+            <a:r>
+              <a:rPr lang="en-US" dirty="0"/>
+              <a:t> Explorer</a:t>
+            </a:r>
+          </a:p>
+          <a:p>
+            <a:pPr lvl="1"/>
+            <a:r>
+              <a:rPr lang="en-US" dirty="0"/>
+              <a:t>To deliver a customized experience for creating datasets so that users can </a:t>
+            </a:r>
+            <a:r>
+              <a:rPr lang="en-US"/>
+              <a:t>specify desired allocation details.</a:t>
+            </a:r>
+            <a:endParaRPr lang="en-US" dirty="0"/>
+          </a:p>
+          <a:p>
+            <a:endParaRPr lang="en-US" dirty="0"/>
+          </a:p>
+          <a:p>
             <a:endParaRPr lang="en-US" dirty="0"/>
           </a:p>
         </p:txBody>
@@ -5783,7 +6308,7 @@
     </p:spTree>
     <p:extLst>
       <p:ext uri="{BB962C8B-B14F-4D97-AF65-F5344CB8AC3E}">
-        <p14:creationId xmlns:p14="http://schemas.microsoft.com/office/powerpoint/2010/main" val="2827431278"/>
+        <p14:creationId xmlns:p14="http://schemas.microsoft.com/office/powerpoint/2010/main" val="1367409270"/>
       </p:ext>
     </p:extLst>
   </p:cSld>
@@ -5797,6 +6322,73 @@
 </file>
 
 <file path=ppt/slides/slide16.xml><?xml version="1.0" encoding="utf-8"?>
+<p:sld xmlns:a="http://schemas.openxmlformats.org/drawingml/2006/main" xmlns:r="http://schemas.openxmlformats.org/officeDocument/2006/relationships" xmlns:p="http://schemas.openxmlformats.org/presentationml/2006/main">
+  <p:cSld>
+    <p:spTree>
+      <p:nvGrpSpPr>
+        <p:cNvPr id="1" name=""/>
+        <p:cNvGrpSpPr/>
+        <p:nvPr/>
+      </p:nvGrpSpPr>
+      <p:grpSpPr>
+        <a:xfrm>
+          <a:off x="0" y="0"/>
+          <a:ext cx="0" cy="0"/>
+          <a:chOff x="0" y="0"/>
+          <a:chExt cx="0" cy="0"/>
+        </a:xfrm>
+      </p:grpSpPr>
+      <p:sp>
+        <p:nvSpPr>
+          <p:cNvPr id="2" name="Text Placeholder 1">
+            <a:extLst>
+              <a:ext uri="{FF2B5EF4-FFF2-40B4-BE49-F238E27FC236}">
+                <a16:creationId xmlns:a16="http://schemas.microsoft.com/office/drawing/2014/main" id="{ADB2E00A-906F-6645-9A30-53C6D93DC43C}"/>
+              </a:ext>
+            </a:extLst>
+          </p:cNvPr>
+          <p:cNvSpPr>
+            <a:spLocks noGrp="1"/>
+          </p:cNvSpPr>
+          <p:nvPr>
+            <p:ph type="body" idx="1"/>
+          </p:nvPr>
+        </p:nvSpPr>
+        <p:spPr/>
+        <p:txBody>
+          <a:bodyPr/>
+          <a:lstStyle/>
+          <a:p>
+            <a:r>
+              <a:rPr lang="en-US" dirty="0"/>
+              <a:t>Onboarding Squad Focus</a:t>
+            </a:r>
+          </a:p>
+          <a:p>
+            <a:r>
+              <a:rPr lang="en-US" sz="2000" dirty="0"/>
+              <a:t>Rose?? Joe W? (Squad Lead??)</a:t>
+            </a:r>
+          </a:p>
+        </p:txBody>
+      </p:sp>
+    </p:spTree>
+    <p:extLst>
+      <p:ext uri="{BB962C8B-B14F-4D97-AF65-F5344CB8AC3E}">
+        <p14:creationId xmlns:p14="http://schemas.microsoft.com/office/powerpoint/2010/main" val="322818001"/>
+      </p:ext>
+    </p:extLst>
+  </p:cSld>
+  <p:clrMapOvr>
+    <a:masterClrMapping/>
+  </p:clrMapOvr>
+  <p:transition spd="med">
+    <p:fade/>
+  </p:transition>
+</p:sld>
+</file>
+
+<file path=ppt/slides/slide17.xml><?xml version="1.0" encoding="utf-8"?>
 <p:sld xmlns:a="http://schemas.openxmlformats.org/drawingml/2006/main" xmlns:r="http://schemas.openxmlformats.org/officeDocument/2006/relationships" xmlns:p="http://schemas.openxmlformats.org/presentationml/2006/main">
   <p:cSld>
     <p:spTree>
@@ -5857,90 +6449,19 @@
             <p:ph type="body" idx="1"/>
           </p:nvPr>
         </p:nvSpPr>
-        <p:spPr>
-          <a:xfrm>
-            <a:off x="317500" y="943428"/>
-            <a:ext cx="8369400" cy="4085772"/>
-          </a:xfrm>
-        </p:spPr>
+        <p:spPr/>
         <p:txBody>
           <a:bodyPr/>
           <a:lstStyle/>
           <a:p>
             <a:r>
               <a:rPr lang="en-US" dirty="0"/>
-              <a:t>Further Conformance Process Maturity</a:t>
-            </a:r>
-          </a:p>
-          <a:p>
-            <a:pPr lvl="1"/>
-            <a:r>
-              <a:rPr lang="en-US" dirty="0"/>
-              <a:t>Active LTS conformance test criteria updates / incremental badging / app-store-like landscape page</a:t>
-            </a:r>
-          </a:p>
-          <a:p>
-            <a:pPr lvl="1"/>
-            <a:r>
-              <a:rPr lang="en-US" dirty="0"/>
-              <a:t>Active LTS conformance change requests (test criteria &amp; submitter form)</a:t>
-            </a:r>
-          </a:p>
-          <a:p>
-            <a:r>
-              <a:rPr lang="en-US" dirty="0"/>
-              <a:t>Increase focus on Outreach</a:t>
-            </a:r>
-          </a:p>
-          <a:p>
-            <a:pPr lvl="1"/>
-            <a:r>
-              <a:rPr lang="en-US" dirty="0"/>
-              <a:t>Webinars &amp; Marketing</a:t>
-            </a:r>
-          </a:p>
-          <a:p>
-            <a:r>
-              <a:rPr lang="en-US" dirty="0"/>
-              <a:t>Improve Onboarding experience</a:t>
-            </a:r>
-          </a:p>
-          <a:p>
-            <a:pPr lvl="1"/>
-            <a:r>
-              <a:rPr lang="en-US" dirty="0"/>
-              <a:t>Improve/influence Zowe.org website navigation</a:t>
-            </a:r>
-          </a:p>
-          <a:p>
-            <a:pPr lvl="1"/>
-            <a:r>
-              <a:rPr lang="en-US" dirty="0"/>
-              <a:t>Accurately “direct” new-to-Zowe visitors</a:t>
-            </a:r>
-          </a:p>
-          <a:p>
-            <a:r>
-              <a:rPr lang="en-US" dirty="0"/>
-              <a:t>Continue and transition stat reporting (KPI-centric)</a:t>
-            </a:r>
-          </a:p>
-          <a:p>
-            <a:pPr lvl="1"/>
-            <a:r>
-              <a:rPr lang="en-US" dirty="0"/>
-              <a:t>Identify trends &amp; influencers</a:t>
-            </a:r>
-          </a:p>
-          <a:p>
-            <a:pPr lvl="1"/>
-            <a:r>
-              <a:rPr lang="en-US" dirty="0"/>
-              <a:t>Easy prep for all Zowe Communications</a:t>
-            </a:r>
-          </a:p>
-          <a:p>
-            <a:pPr lvl="1"/>
+              <a:t>Focus </a:t>
+            </a:r>
+            <a:r>
+              <a:rPr lang="en-US" dirty="0" err="1"/>
+              <a:t>xxxx</a:t>
+            </a:r>
             <a:endParaRPr lang="en-US" dirty="0"/>
           </a:p>
         </p:txBody>
@@ -5948,7 +6469,7 @@
     </p:spTree>
     <p:extLst>
       <p:ext uri="{BB962C8B-B14F-4D97-AF65-F5344CB8AC3E}">
-        <p14:creationId xmlns:p14="http://schemas.microsoft.com/office/powerpoint/2010/main" val="345901736"/>
+        <p14:creationId xmlns:p14="http://schemas.microsoft.com/office/powerpoint/2010/main" val="2827431278"/>
       </p:ext>
     </p:extLst>
   </p:cSld>
@@ -5957,91 +6478,6 @@
   </p:clrMapOvr>
   <p:transition spd="med">
     <p:fade thruBlk="1"/>
-  </p:transition>
-</p:sld>
-</file>
-
-<file path=ppt/slides/slide17.xml><?xml version="1.0" encoding="utf-8"?>
-<p:sld xmlns:a="http://schemas.openxmlformats.org/drawingml/2006/main" xmlns:r="http://schemas.openxmlformats.org/officeDocument/2006/relationships" xmlns:p="http://schemas.openxmlformats.org/presentationml/2006/main">
-  <p:cSld>
-    <p:spTree>
-      <p:nvGrpSpPr>
-        <p:cNvPr id="1" name=""/>
-        <p:cNvGrpSpPr/>
-        <p:nvPr/>
-      </p:nvGrpSpPr>
-      <p:grpSpPr>
-        <a:xfrm>
-          <a:off x="0" y="0"/>
-          <a:ext cx="0" cy="0"/>
-          <a:chOff x="0" y="0"/>
-          <a:chExt cx="0" cy="0"/>
-        </a:xfrm>
-      </p:grpSpPr>
-      <p:sp>
-        <p:nvSpPr>
-          <p:cNvPr id="2" name="Text Placeholder 1">
-            <a:extLst>
-              <a:ext uri="{FF2B5EF4-FFF2-40B4-BE49-F238E27FC236}">
-                <a16:creationId xmlns:a16="http://schemas.microsoft.com/office/drawing/2014/main" id="{ADB2E00A-906F-6645-9A30-53C6D93DC43C}"/>
-              </a:ext>
-            </a:extLst>
-          </p:cNvPr>
-          <p:cNvSpPr>
-            <a:spLocks noGrp="1"/>
-          </p:cNvSpPr>
-          <p:nvPr>
-            <p:ph type="body" idx="1"/>
-          </p:nvPr>
-        </p:nvSpPr>
-        <p:spPr/>
-        <p:txBody>
-          <a:bodyPr/>
-          <a:lstStyle/>
-          <a:p>
-            <a:r>
-              <a:rPr lang="en-US" dirty="0"/>
-              <a:t>Systems Squad Focus</a:t>
-            </a:r>
-          </a:p>
-          <a:p>
-            <a:r>
-              <a:rPr lang="en-US" sz="2000" dirty="0"/>
-              <a:t>Mark </a:t>
-            </a:r>
-            <a:r>
-              <a:rPr lang="en-US" sz="2000" dirty="0" err="1"/>
-              <a:t>Ackert</a:t>
-            </a:r>
-            <a:r>
-              <a:rPr lang="en-US" sz="2000" dirty="0"/>
-              <a:t> (Squad Lead)</a:t>
-            </a:r>
-          </a:p>
-          <a:p>
-            <a:r>
-              <a:rPr lang="en-US" sz="2000" dirty="0" err="1"/>
-              <a:t>f.k.a</a:t>
-            </a:r>
-            <a:r>
-              <a:rPr lang="en-US" sz="2000" dirty="0"/>
-              <a:t>. CI/CD Squad</a:t>
-            </a:r>
-          </a:p>
-        </p:txBody>
-      </p:sp>
-    </p:spTree>
-    <p:extLst>
-      <p:ext uri="{BB962C8B-B14F-4D97-AF65-F5344CB8AC3E}">
-        <p14:creationId xmlns:p14="http://schemas.microsoft.com/office/powerpoint/2010/main" val="2129516835"/>
-      </p:ext>
-    </p:extLst>
-  </p:cSld>
-  <p:clrMapOvr>
-    <a:masterClrMapping/>
-  </p:clrMapOvr>
-  <p:transition spd="med">
-    <p:fade/>
   </p:transition>
 </p:sld>
 </file>
@@ -6107,96 +6543,98 @@
             <p:ph type="body" idx="1"/>
           </p:nvPr>
         </p:nvSpPr>
-        <p:spPr/>
+        <p:spPr>
+          <a:xfrm>
+            <a:off x="317500" y="943428"/>
+            <a:ext cx="8369400" cy="4085772"/>
+          </a:xfrm>
+        </p:spPr>
         <p:txBody>
           <a:bodyPr/>
           <a:lstStyle/>
           <a:p>
             <a:r>
               <a:rPr lang="en-US" dirty="0"/>
-              <a:t>Expand system testing in the community</a:t>
+              <a:t>Further Conformance Process Maturity</a:t>
             </a:r>
           </a:p>
           <a:p>
             <a:pPr lvl="1"/>
             <a:r>
               <a:rPr lang="en-US" dirty="0"/>
-              <a:t>Component integration testing on Marist systems</a:t>
+              <a:t>Active LTS conformance test criteria updates / incremental badging / app-store-like landscape page</a:t>
             </a:r>
           </a:p>
           <a:p>
             <a:pPr lvl="1"/>
             <a:r>
-              <a:rPr lang="en-US" dirty="0" err="1"/>
-              <a:t>Zowe</a:t>
-            </a:r>
-            <a:r>
-              <a:rPr lang="en-US" dirty="0"/>
-              <a:t> “release” smoke and integration testing</a:t>
-            </a:r>
-          </a:p>
-          <a:p>
-            <a:r>
-              <a:rPr lang="en-US" dirty="0"/>
-              <a:t>Build out </a:t>
-            </a:r>
-            <a:r>
-              <a:rPr lang="en-US" dirty="0" err="1"/>
-              <a:t>Zowe</a:t>
-            </a:r>
-            <a:r>
-              <a:rPr lang="en-US" dirty="0"/>
-              <a:t> “release” Performance Testing</a:t>
+              <a:rPr lang="en-US" dirty="0"/>
+              <a:t>Active LTS conformance change requests (test criteria &amp; submitter form)</a:t>
+            </a:r>
+          </a:p>
+          <a:p>
+            <a:r>
+              <a:rPr lang="en-US" dirty="0"/>
+              <a:t>Increase focus on Outreach</a:t>
             </a:r>
           </a:p>
           <a:p>
             <a:pPr lvl="1"/>
             <a:r>
               <a:rPr lang="en-US" dirty="0"/>
-              <a:t>Standardize infrastructure and tooling, extensible code-base for squad contribution</a:t>
-            </a:r>
-          </a:p>
-          <a:p>
-            <a:r>
-              <a:rPr lang="en-US" dirty="0"/>
-              <a:t>Design </a:t>
-            </a:r>
-            <a:r>
-              <a:rPr lang="en-US" dirty="0" err="1"/>
-              <a:t>Zowe</a:t>
-            </a:r>
-            <a:r>
-              <a:rPr lang="en-US" dirty="0"/>
-              <a:t> HA Infrastructure</a:t>
-            </a:r>
-          </a:p>
-          <a:p>
-            <a:r>
-              <a:rPr lang="en-US" dirty="0"/>
-              <a:t>Continue </a:t>
-            </a:r>
-            <a:r>
-              <a:rPr lang="en-US" dirty="0" err="1"/>
-              <a:t>Zowe</a:t>
-            </a:r>
-            <a:r>
-              <a:rPr lang="en-US" dirty="0"/>
-              <a:t> Release activities and improvements</a:t>
+              <a:t>Webinars &amp; Marketing</a:t>
+            </a:r>
+          </a:p>
+          <a:p>
+            <a:r>
+              <a:rPr lang="en-US" dirty="0"/>
+              <a:t>Improve Onboarding experience</a:t>
             </a:r>
           </a:p>
           <a:p>
             <a:pPr lvl="1"/>
             <a:r>
               <a:rPr lang="en-US" dirty="0"/>
-              <a:t>Second Nightly “Stable” Build</a:t>
-            </a:r>
+              <a:t>Improve/influence Zowe.org website navigation</a:t>
+            </a:r>
+          </a:p>
+          <a:p>
+            <a:pPr lvl="1"/>
+            <a:r>
+              <a:rPr lang="en-US" dirty="0"/>
+              <a:t>Accurately “direct” new-to-Zowe visitors</a:t>
+            </a:r>
+          </a:p>
+          <a:p>
+            <a:r>
+              <a:rPr lang="en-US" dirty="0"/>
+              <a:t>Continue and transition stat reporting (KPI-centric)</a:t>
+            </a:r>
+          </a:p>
+          <a:p>
+            <a:pPr lvl="1"/>
+            <a:r>
+              <a:rPr lang="en-US" dirty="0"/>
+              <a:t>Identify trends &amp; influencers</a:t>
+            </a:r>
+          </a:p>
+          <a:p>
+            <a:pPr lvl="1"/>
+            <a:r>
+              <a:rPr lang="en-US" dirty="0"/>
+              <a:t>Easy prep for all Zowe Communications</a:t>
+            </a:r>
+          </a:p>
+          <a:p>
+            <a:pPr lvl="1"/>
+            <a:endParaRPr lang="en-US" dirty="0"/>
           </a:p>
         </p:txBody>
       </p:sp>
     </p:spTree>
     <p:extLst>
       <p:ext uri="{BB962C8B-B14F-4D97-AF65-F5344CB8AC3E}">
-        <p14:creationId xmlns:p14="http://schemas.microsoft.com/office/powerpoint/2010/main" val="2542653556"/>
+        <p14:creationId xmlns:p14="http://schemas.microsoft.com/office/powerpoint/2010/main" val="345901736"/>
       </p:ext>
     </p:extLst>
   </p:cSld>
@@ -6242,33 +6680,28 @@
             <p:ph type="body" idx="1"/>
           </p:nvPr>
         </p:nvSpPr>
-        <p:spPr>
-          <a:xfrm>
-            <a:off x="308609" y="3525959"/>
-            <a:ext cx="6863371" cy="392400"/>
-          </a:xfrm>
-        </p:spPr>
+        <p:spPr/>
         <p:txBody>
           <a:bodyPr/>
           <a:lstStyle/>
           <a:p>
             <a:r>
               <a:rPr lang="en-US" dirty="0"/>
-              <a:t>“Deployments” Working Group Focus</a:t>
+              <a:t>Systems Squad Focus</a:t>
             </a:r>
           </a:p>
           <a:p>
             <a:r>
               <a:rPr lang="en-US" sz="2000" dirty="0"/>
-              <a:t>Steven </a:t>
-            </a:r>
-            <a:r>
-              <a:rPr lang="en-US" sz="2000"/>
-              <a:t>Horsman (Lead</a:t>
+              <a:t>Mark </a:t>
+            </a:r>
+            <a:r>
+              <a:rPr lang="en-US" sz="2000" dirty="0" err="1"/>
+              <a:t>Ackert</a:t>
             </a:r>
             <a:r>
               <a:rPr lang="en-US" sz="2000" dirty="0"/>
-              <a:t>)</a:t>
+              <a:t> (Squad Lead)</a:t>
             </a:r>
           </a:p>
           <a:p>
@@ -6278,7 +6711,7 @@
             </a:r>
             <a:r>
               <a:rPr lang="en-US" sz="2000" dirty="0"/>
-              <a:t>. CUPIDs</a:t>
+              <a:t>. CI/CD Squad</a:t>
             </a:r>
           </a:p>
         </p:txBody>
@@ -6286,7 +6719,7 @@
     </p:spTree>
     <p:extLst>
       <p:ext uri="{BB962C8B-B14F-4D97-AF65-F5344CB8AC3E}">
-        <p14:creationId xmlns:p14="http://schemas.microsoft.com/office/powerpoint/2010/main" val="2927219770"/>
+        <p14:creationId xmlns:p14="http://schemas.microsoft.com/office/powerpoint/2010/main" val="2949732729"/>
       </p:ext>
     </p:extLst>
   </p:cSld>
@@ -6468,7 +6901,7 @@
           <a:p>
             <a:r>
               <a:rPr lang="en-US" dirty="0"/>
-              <a:t>Features</a:t>
+              <a:t>Focus</a:t>
             </a:r>
           </a:p>
         </p:txBody>
@@ -6495,19 +6928,32 @@
           <a:lstStyle/>
           <a:p>
             <a:r>
+              <a:rPr lang="en-US" dirty="0"/>
+              <a:t>Expand system testing in the community</a:t>
+            </a:r>
+          </a:p>
+          <a:p>
+            <a:pPr lvl="1"/>
+            <a:r>
+              <a:rPr lang="en-US" dirty="0"/>
+              <a:t>Component integration testing on Marist systems</a:t>
+            </a:r>
+          </a:p>
+          <a:p>
+            <a:pPr lvl="1"/>
+            <a:r>
               <a:rPr lang="en-US" dirty="0" err="1"/>
               <a:t>Zowe</a:t>
             </a:r>
             <a:r>
               <a:rPr lang="en-US" dirty="0"/>
-              <a:t> Extensions rework</a:t>
-            </a:r>
-          </a:p>
-          <a:p>
-            <a:pPr lvl="1"/>
-            <a:r>
-              <a:rPr lang="en-US" dirty="0"/>
-              <a:t>Improve both </a:t>
+              <a:t> “release” smoke and integration testing</a:t>
+            </a:r>
+          </a:p>
+          <a:p>
+            <a:r>
+              <a:rPr lang="en-US" dirty="0"/>
+              <a:t>Build out </a:t>
             </a:r>
             <a:r>
               <a:rPr lang="en-US" dirty="0" err="1"/>
@@ -6515,7 +6961,20 @@
             </a:r>
             <a:r>
               <a:rPr lang="en-US" dirty="0"/>
-              <a:t> administrator and </a:t>
+              <a:t> “release” Performance Testing</a:t>
+            </a:r>
+          </a:p>
+          <a:p>
+            <a:pPr lvl="1"/>
+            <a:r>
+              <a:rPr lang="en-US" dirty="0"/>
+              <a:t>Standardize infrastructure and tooling, extensible code-base for squad contribution</a:t>
+            </a:r>
+          </a:p>
+          <a:p>
+            <a:r>
+              <a:rPr lang="en-US" dirty="0"/>
+              <a:t>Continue </a:t>
             </a:r>
             <a:r>
               <a:rPr lang="en-US" dirty="0" err="1"/>
@@ -6523,7 +6982,20 @@
             </a:r>
             <a:r>
               <a:rPr lang="en-US" dirty="0"/>
-              <a:t> extender user experiences when deploying </a:t>
+              <a:t> Release activities and improvements</a:t>
+            </a:r>
+          </a:p>
+          <a:p>
+            <a:pPr lvl="1"/>
+            <a:r>
+              <a:rPr lang="en-US" dirty="0"/>
+              <a:t>Second Nightly “Stable” Build</a:t>
+            </a:r>
+          </a:p>
+          <a:p>
+            <a:r>
+              <a:rPr lang="en-US" dirty="0"/>
+              <a:t>Design </a:t>
             </a:r>
             <a:r>
               <a:rPr lang="en-US" dirty="0" err="1"/>
@@ -6531,25 +7003,7 @@
             </a:r>
             <a:r>
               <a:rPr lang="en-US" dirty="0"/>
-              <a:t> extensions.</a:t>
-            </a:r>
-          </a:p>
-          <a:p>
-            <a:r>
-              <a:rPr lang="en-US" dirty="0"/>
-              <a:t>Research and POC containerization of </a:t>
-            </a:r>
-            <a:r>
-              <a:rPr lang="en-US" dirty="0" err="1"/>
-              <a:t>Zowe</a:t>
-            </a:r>
-            <a:endParaRPr lang="en-US" dirty="0"/>
-          </a:p>
-          <a:p>
-            <a:pPr lvl="1"/>
-            <a:r>
-              <a:rPr lang="en-US" dirty="0"/>
-              <a:t>Initially targeted for developers</a:t>
+              <a:t> HA Infrastructure</a:t>
             </a:r>
           </a:p>
         </p:txBody>
@@ -6557,7 +7011,7 @@
     </p:spTree>
     <p:extLst>
       <p:ext uri="{BB962C8B-B14F-4D97-AF65-F5344CB8AC3E}">
-        <p14:creationId xmlns:p14="http://schemas.microsoft.com/office/powerpoint/2010/main" val="3391740602"/>
+        <p14:creationId xmlns:p14="http://schemas.microsoft.com/office/powerpoint/2010/main" val="1613972798"/>
       </p:ext>
     </p:extLst>
   </p:cSld>
@@ -6603,20 +7057,35 @@
             <p:ph type="body" idx="1"/>
           </p:nvPr>
         </p:nvSpPr>
-        <p:spPr/>
+        <p:spPr>
+          <a:xfrm>
+            <a:off x="308609" y="3525959"/>
+            <a:ext cx="7459078" cy="392400"/>
+          </a:xfrm>
+        </p:spPr>
         <p:txBody>
           <a:bodyPr/>
           <a:lstStyle/>
           <a:p>
             <a:r>
               <a:rPr lang="en-US" dirty="0"/>
-              <a:t>Doc Squad Focus</a:t>
+              <a:t>“Deployments” Working Group Focus</a:t>
             </a:r>
           </a:p>
           <a:p>
             <a:r>
               <a:rPr lang="en-US" sz="2000" dirty="0"/>
-              <a:t>Ashley?? (Squad Lead??)</a:t>
+              <a:t>Steven Horsman, Joe Winchester, Sean Grady contributing</a:t>
+            </a:r>
+          </a:p>
+          <a:p>
+            <a:r>
+              <a:rPr lang="en-US" sz="2000" dirty="0" err="1"/>
+              <a:t>f.k.a</a:t>
+            </a:r>
+            <a:r>
+              <a:rPr lang="en-US" sz="2000" dirty="0"/>
+              <a:t>. CUPIDs</a:t>
             </a:r>
           </a:p>
         </p:txBody>
@@ -6624,7 +7093,7 @@
     </p:spTree>
     <p:extLst>
       <p:ext uri="{BB962C8B-B14F-4D97-AF65-F5344CB8AC3E}">
-        <p14:creationId xmlns:p14="http://schemas.microsoft.com/office/powerpoint/2010/main" val="1157146962"/>
+        <p14:creationId xmlns:p14="http://schemas.microsoft.com/office/powerpoint/2010/main" val="2429280223"/>
       </p:ext>
     </p:extLst>
   </p:cSld>
@@ -6705,13 +7174,505 @@
           <a:p>
             <a:r>
               <a:rPr lang="en-US" dirty="0"/>
-              <a:t>Focus </a:t>
+              <a:t>Design and Begin </a:t>
             </a:r>
             <a:r>
               <a:rPr lang="en-US" dirty="0" err="1"/>
-              <a:t>xxxx</a:t>
-            </a:r>
-            <a:endParaRPr lang="en-US" dirty="0"/>
+              <a:t>Zowe</a:t>
+            </a:r>
+            <a:r>
+              <a:rPr lang="en-US" dirty="0"/>
+              <a:t> Extensions Refactor  [Steve, Joe]</a:t>
+            </a:r>
+          </a:p>
+          <a:p>
+            <a:pPr lvl="1"/>
+            <a:r>
+              <a:rPr lang="en-US" dirty="0"/>
+              <a:t>Improve both </a:t>
+            </a:r>
+            <a:r>
+              <a:rPr lang="en-US" dirty="0" err="1"/>
+              <a:t>Zowe</a:t>
+            </a:r>
+            <a:r>
+              <a:rPr lang="en-US" dirty="0"/>
+              <a:t> administrator and </a:t>
+            </a:r>
+            <a:r>
+              <a:rPr lang="en-US" dirty="0" err="1"/>
+              <a:t>Zowe</a:t>
+            </a:r>
+            <a:r>
+              <a:rPr lang="en-US" dirty="0"/>
+              <a:t> extender user experiences when developing and deploying </a:t>
+            </a:r>
+            <a:r>
+              <a:rPr lang="en-US" dirty="0" err="1"/>
+              <a:t>Zowe</a:t>
+            </a:r>
+            <a:r>
+              <a:rPr lang="en-US" dirty="0"/>
+              <a:t> extensions by streamlining packaging, install, upgrade, and configuration.</a:t>
+            </a:r>
+          </a:p>
+          <a:p>
+            <a:pPr lvl="1"/>
+            <a:r>
+              <a:rPr lang="en-US" dirty="0"/>
+              <a:t>Unify existing </a:t>
+            </a:r>
+            <a:r>
+              <a:rPr lang="en-US" dirty="0" err="1"/>
+              <a:t>Zowe</a:t>
+            </a:r>
+            <a:r>
+              <a:rPr lang="en-US" dirty="0"/>
+              <a:t> extensions with the new extension design and rebuild documentation</a:t>
+            </a:r>
+          </a:p>
+          <a:p>
+            <a:pPr lvl="1"/>
+            <a:r>
+              <a:rPr lang="en-US" dirty="0"/>
+              <a:t>This may shift into v2 if breaking changes are required</a:t>
+            </a:r>
+          </a:p>
+          <a:p>
+            <a:r>
+              <a:rPr lang="en-US" dirty="0"/>
+              <a:t>Research and POC containerization of </a:t>
+            </a:r>
+            <a:r>
+              <a:rPr lang="en-US" dirty="0" err="1"/>
+              <a:t>Zowe</a:t>
+            </a:r>
+            <a:r>
+              <a:rPr lang="en-US" dirty="0"/>
+              <a:t>. [Sean]</a:t>
+            </a:r>
+          </a:p>
+          <a:p>
+            <a:pPr lvl="1"/>
+            <a:r>
+              <a:rPr lang="en-US" dirty="0"/>
+              <a:t>Initially targeted for developers</a:t>
+            </a:r>
+          </a:p>
+        </p:txBody>
+      </p:sp>
+    </p:spTree>
+    <p:extLst>
+      <p:ext uri="{BB962C8B-B14F-4D97-AF65-F5344CB8AC3E}">
+        <p14:creationId xmlns:p14="http://schemas.microsoft.com/office/powerpoint/2010/main" val="209280467"/>
+      </p:ext>
+    </p:extLst>
+  </p:cSld>
+  <p:clrMapOvr>
+    <a:masterClrMapping/>
+  </p:clrMapOvr>
+  <p:transition spd="med">
+    <p:fade thruBlk="1"/>
+  </p:transition>
+</p:sld>
+</file>
+
+<file path=ppt/slides/slide23.xml><?xml version="1.0" encoding="utf-8"?>
+<p:sld xmlns:a="http://schemas.openxmlformats.org/drawingml/2006/main" xmlns:r="http://schemas.openxmlformats.org/officeDocument/2006/relationships" xmlns:p="http://schemas.openxmlformats.org/presentationml/2006/main">
+  <p:cSld>
+    <p:spTree>
+      <p:nvGrpSpPr>
+        <p:cNvPr id="1" name=""/>
+        <p:cNvGrpSpPr/>
+        <p:nvPr/>
+      </p:nvGrpSpPr>
+      <p:grpSpPr>
+        <a:xfrm>
+          <a:off x="0" y="0"/>
+          <a:ext cx="0" cy="0"/>
+          <a:chOff x="0" y="0"/>
+          <a:chExt cx="0" cy="0"/>
+        </a:xfrm>
+      </p:grpSpPr>
+      <p:sp>
+        <p:nvSpPr>
+          <p:cNvPr id="2" name="Text Placeholder 1">
+            <a:extLst>
+              <a:ext uri="{FF2B5EF4-FFF2-40B4-BE49-F238E27FC236}">
+                <a16:creationId xmlns:a16="http://schemas.microsoft.com/office/drawing/2014/main" id="{ADB2E00A-906F-6645-9A30-53C6D93DC43C}"/>
+              </a:ext>
+            </a:extLst>
+          </p:cNvPr>
+          <p:cNvSpPr>
+            <a:spLocks noGrp="1"/>
+          </p:cNvSpPr>
+          <p:nvPr>
+            <p:ph type="body" idx="1"/>
+          </p:nvPr>
+        </p:nvSpPr>
+        <p:spPr/>
+        <p:txBody>
+          <a:bodyPr/>
+          <a:lstStyle/>
+          <a:p>
+            <a:r>
+              <a:rPr lang="en-US" dirty="0"/>
+              <a:t>Doc Squad Focus</a:t>
+            </a:r>
+          </a:p>
+          <a:p>
+            <a:r>
+              <a:rPr lang="en-US" sz="2000" dirty="0"/>
+              <a:t>Ashley</a:t>
+            </a:r>
+            <a:r>
+              <a:rPr lang="zh-CN" altLang="en-US" sz="2000" dirty="0"/>
+              <a:t> </a:t>
+            </a:r>
+            <a:r>
+              <a:rPr lang="en-US" altLang="zh-CN" sz="2000" dirty="0"/>
+              <a:t>Li</a:t>
+            </a:r>
+            <a:r>
+              <a:rPr lang="zh-CN" altLang="en-US" sz="2000" dirty="0"/>
+              <a:t> </a:t>
+            </a:r>
+            <a:r>
+              <a:rPr lang="en-US" sz="2000" dirty="0"/>
+              <a:t>(Squad Lead)</a:t>
+            </a:r>
+          </a:p>
+        </p:txBody>
+      </p:sp>
+    </p:spTree>
+    <p:extLst>
+      <p:ext uri="{BB962C8B-B14F-4D97-AF65-F5344CB8AC3E}">
+        <p14:creationId xmlns:p14="http://schemas.microsoft.com/office/powerpoint/2010/main" val="1157146962"/>
+      </p:ext>
+    </p:extLst>
+  </p:cSld>
+  <p:clrMapOvr>
+    <a:masterClrMapping/>
+  </p:clrMapOvr>
+  <p:transition spd="med">
+    <p:fade/>
+  </p:transition>
+</p:sld>
+</file>
+
+<file path=ppt/slides/slide24.xml><?xml version="1.0" encoding="utf-8"?>
+<p:sld xmlns:a="http://schemas.openxmlformats.org/drawingml/2006/main" xmlns:r="http://schemas.openxmlformats.org/officeDocument/2006/relationships" xmlns:p="http://schemas.openxmlformats.org/presentationml/2006/main">
+  <p:cSld>
+    <p:spTree>
+      <p:nvGrpSpPr>
+        <p:cNvPr id="1" name=""/>
+        <p:cNvGrpSpPr/>
+        <p:nvPr/>
+      </p:nvGrpSpPr>
+      <p:grpSpPr>
+        <a:xfrm>
+          <a:off x="0" y="0"/>
+          <a:ext cx="0" cy="0"/>
+          <a:chOff x="0" y="0"/>
+          <a:chExt cx="0" cy="0"/>
+        </a:xfrm>
+      </p:grpSpPr>
+      <p:sp>
+        <p:nvSpPr>
+          <p:cNvPr id="3" name="Title 2">
+            <a:extLst>
+              <a:ext uri="{FF2B5EF4-FFF2-40B4-BE49-F238E27FC236}">
+                <a16:creationId xmlns:a16="http://schemas.microsoft.com/office/drawing/2014/main" id="{CFEEEE36-E132-0D40-A4B8-9BDC5C8B6528}"/>
+              </a:ext>
+            </a:extLst>
+          </p:cNvPr>
+          <p:cNvSpPr>
+            <a:spLocks noGrp="1"/>
+          </p:cNvSpPr>
+          <p:nvPr>
+            <p:ph type="title"/>
+          </p:nvPr>
+        </p:nvSpPr>
+        <p:spPr/>
+        <p:txBody>
+          <a:bodyPr/>
+          <a:lstStyle/>
+          <a:p>
+            <a:r>
+              <a:rPr lang="en-US" dirty="0"/>
+              <a:t>Focus</a:t>
+            </a:r>
+          </a:p>
+        </p:txBody>
+      </p:sp>
+      <p:sp>
+        <p:nvSpPr>
+          <p:cNvPr id="4" name="Text Placeholder 3">
+            <a:extLst>
+              <a:ext uri="{FF2B5EF4-FFF2-40B4-BE49-F238E27FC236}">
+                <a16:creationId xmlns:a16="http://schemas.microsoft.com/office/drawing/2014/main" id="{C0DB4ECB-A7D5-6B47-8180-75CB3C3DB7DE}"/>
+              </a:ext>
+            </a:extLst>
+          </p:cNvPr>
+          <p:cNvSpPr>
+            <a:spLocks noGrp="1"/>
+          </p:cNvSpPr>
+          <p:nvPr>
+            <p:ph type="body" idx="1"/>
+          </p:nvPr>
+        </p:nvSpPr>
+        <p:spPr>
+          <a:xfrm>
+            <a:off x="317499" y="741553"/>
+            <a:ext cx="8600869" cy="3889828"/>
+          </a:xfrm>
+        </p:spPr>
+        <p:txBody>
+          <a:bodyPr/>
+          <a:lstStyle/>
+          <a:p>
+            <a:r>
+              <a:rPr lang="en-US" sz="1800" dirty="0"/>
+              <a:t>Create and </a:t>
+            </a:r>
+            <a:r>
+              <a:rPr lang="en-US" altLang="zh-CN" sz="1800" dirty="0"/>
+              <a:t>publish</a:t>
+            </a:r>
+            <a:r>
+              <a:rPr lang="en-US" sz="1800" dirty="0"/>
+              <a:t> content for different </a:t>
+            </a:r>
+            <a:r>
+              <a:rPr lang="en-US" sz="1800" dirty="0" err="1"/>
+              <a:t>Zowe</a:t>
+            </a:r>
+            <a:r>
+              <a:rPr lang="en-US" sz="1800" dirty="0"/>
+              <a:t> components</a:t>
+            </a:r>
+            <a:r>
+              <a:rPr lang="en-US" altLang="zh-CN" sz="1800" dirty="0"/>
+              <a:t>.</a:t>
+            </a:r>
+            <a:endParaRPr lang="en-US" sz="1800" dirty="0"/>
+          </a:p>
+          <a:p>
+            <a:r>
+              <a:rPr lang="en-US" sz="1800" dirty="0"/>
+              <a:t>Allow users to browse doc by area of interest, user role, and skill level</a:t>
+            </a:r>
+            <a:r>
+              <a:rPr lang="en-US" altLang="zh-CN" sz="1800" dirty="0"/>
+              <a:t>.</a:t>
+            </a:r>
+            <a:endParaRPr lang="en-US" sz="1800" dirty="0"/>
+          </a:p>
+          <a:p>
+            <a:r>
+              <a:rPr lang="en-US" sz="1800" dirty="0"/>
+              <a:t>Provide better </a:t>
+            </a:r>
+            <a:r>
+              <a:rPr lang="en-US" altLang="zh-CN" sz="1800" dirty="0"/>
+              <a:t>contribution</a:t>
+            </a:r>
+            <a:r>
+              <a:rPr lang="zh-CN" altLang="en-US" sz="1800" dirty="0"/>
+              <a:t> </a:t>
+            </a:r>
+            <a:r>
+              <a:rPr lang="en-US" sz="1800" dirty="0"/>
+              <a:t>doc </a:t>
+            </a:r>
+            <a:r>
+              <a:rPr lang="en-US" altLang="zh-CN" sz="1800" dirty="0"/>
+              <a:t>about</a:t>
+            </a:r>
+            <a:r>
+              <a:rPr lang="zh-CN" altLang="en-US" sz="1800" dirty="0"/>
+              <a:t> </a:t>
+            </a:r>
+            <a:r>
+              <a:rPr lang="en-US" altLang="zh-CN" sz="1800" dirty="0"/>
+              <a:t>contributing</a:t>
+            </a:r>
+            <a:r>
+              <a:rPr lang="zh-CN" altLang="en-US" sz="1800" dirty="0"/>
+              <a:t> </a:t>
+            </a:r>
+            <a:r>
+              <a:rPr lang="en-US" altLang="zh-CN" sz="1800" dirty="0"/>
+              <a:t>to</a:t>
+            </a:r>
+            <a:r>
+              <a:rPr lang="zh-CN" altLang="en-US" sz="1800" dirty="0"/>
+              <a:t> </a:t>
+            </a:r>
+            <a:r>
+              <a:rPr lang="en-US" sz="1800" dirty="0"/>
+              <a:t>doc and code</a:t>
+            </a:r>
+            <a:r>
+              <a:rPr lang="en-US" altLang="zh-CN" sz="1800" dirty="0"/>
+              <a:t>.</a:t>
+            </a:r>
+            <a:endParaRPr lang="en-US" sz="1800" dirty="0"/>
+          </a:p>
+          <a:p>
+            <a:r>
+              <a:rPr lang="en-US" altLang="zh-CN" sz="1800" dirty="0"/>
+              <a:t>Improve</a:t>
+            </a:r>
+            <a:r>
+              <a:rPr lang="en-US" sz="1800" dirty="0"/>
+              <a:t> release notes </a:t>
+            </a:r>
+            <a:r>
+              <a:rPr lang="en-US" altLang="zh-CN" sz="1800" dirty="0"/>
+              <a:t>by</a:t>
+            </a:r>
+            <a:r>
+              <a:rPr lang="zh-CN" altLang="en-US" sz="1800" dirty="0"/>
+              <a:t> </a:t>
+            </a:r>
+            <a:r>
+              <a:rPr lang="en-US" altLang="zh-CN" sz="1800" dirty="0"/>
+              <a:t>automating</a:t>
+            </a:r>
+            <a:r>
+              <a:rPr lang="zh-CN" altLang="en-US" sz="1800" dirty="0"/>
+              <a:t> </a:t>
+            </a:r>
+            <a:r>
+              <a:rPr lang="en-US" altLang="zh-CN" sz="1800" dirty="0"/>
+              <a:t>its</a:t>
+            </a:r>
+            <a:r>
+              <a:rPr lang="zh-CN" altLang="en-US" sz="1800" dirty="0"/>
+              <a:t> </a:t>
+            </a:r>
+            <a:r>
+              <a:rPr lang="en-US" altLang="zh-CN" sz="1800" dirty="0"/>
+              <a:t>generation</a:t>
+            </a:r>
+            <a:r>
+              <a:rPr lang="zh-CN" altLang="en-US" sz="1800" dirty="0"/>
+              <a:t> </a:t>
+            </a:r>
+            <a:r>
+              <a:rPr lang="en-US" sz="1800" dirty="0"/>
+              <a:t>from CHANGELOGs </a:t>
+            </a:r>
+            <a:r>
+              <a:rPr lang="en-US" altLang="zh-CN" sz="1800" dirty="0"/>
+              <a:t>and</a:t>
+            </a:r>
+            <a:r>
+              <a:rPr lang="zh-CN" altLang="en-US" sz="1800" dirty="0"/>
+              <a:t> </a:t>
+            </a:r>
+            <a:r>
+              <a:rPr lang="en-US" sz="1800" dirty="0"/>
+              <a:t>provid</a:t>
+            </a:r>
+            <a:r>
+              <a:rPr lang="en-US" altLang="zh-CN" sz="1800" dirty="0"/>
+              <a:t>ing</a:t>
+            </a:r>
+            <a:r>
+              <a:rPr lang="en-US" sz="1800" dirty="0"/>
+              <a:t> better business value</a:t>
+            </a:r>
+            <a:r>
+              <a:rPr lang="en-US" altLang="zh-CN" sz="1800" dirty="0"/>
+              <a:t>.</a:t>
+            </a:r>
+            <a:endParaRPr lang="en-US" sz="1800" dirty="0"/>
+          </a:p>
+          <a:p>
+            <a:r>
+              <a:rPr lang="en-US" altLang="zh-CN" sz="1800" dirty="0"/>
+              <a:t>Contribute</a:t>
+            </a:r>
+            <a:r>
+              <a:rPr lang="zh-CN" altLang="en-US" sz="1800" dirty="0"/>
+              <a:t> </a:t>
+            </a:r>
+            <a:r>
+              <a:rPr lang="en-US" altLang="zh-CN" sz="1800" dirty="0"/>
+              <a:t>to</a:t>
+            </a:r>
+            <a:r>
+              <a:rPr lang="en-US" sz="1800" dirty="0"/>
+              <a:t> the </a:t>
+            </a:r>
+            <a:r>
+              <a:rPr lang="en-US" sz="1800" dirty="0" err="1"/>
+              <a:t>Zowe.org</a:t>
+            </a:r>
+            <a:r>
+              <a:rPr lang="en-US" sz="1800" dirty="0"/>
+              <a:t> website design </a:t>
+            </a:r>
+            <a:r>
+              <a:rPr lang="en-US" altLang="zh-CN" sz="1800" dirty="0"/>
+              <a:t>enhancement.</a:t>
+            </a:r>
+            <a:endParaRPr lang="en-US" sz="1800" dirty="0"/>
+          </a:p>
+          <a:p>
+            <a:r>
+              <a:rPr lang="en-US" sz="1800" dirty="0"/>
+              <a:t>Provide and consolidate more multi-media and visual content (videos, interactive graphics, diagrams)</a:t>
+            </a:r>
+            <a:r>
+              <a:rPr lang="en-US" altLang="zh-CN" sz="1800" dirty="0"/>
+              <a:t>.</a:t>
+            </a:r>
+            <a:endParaRPr lang="en-US" sz="1800" dirty="0"/>
+          </a:p>
+          <a:p>
+            <a:r>
+              <a:rPr lang="en-US" altLang="zh-CN" sz="1800" dirty="0"/>
+              <a:t>Identify</a:t>
+            </a:r>
+            <a:r>
+              <a:rPr lang="zh-CN" altLang="en-US" sz="1800" dirty="0"/>
+              <a:t> </a:t>
+            </a:r>
+            <a:r>
+              <a:rPr lang="en-US" sz="1800" dirty="0"/>
+              <a:t>content gaps and improvement areas </a:t>
+            </a:r>
+            <a:r>
+              <a:rPr lang="en-US" altLang="zh-CN" sz="1800" dirty="0"/>
+              <a:t>by</a:t>
+            </a:r>
+            <a:r>
+              <a:rPr lang="zh-CN" altLang="en-US" sz="1800" dirty="0"/>
+              <a:t> </a:t>
+            </a:r>
+            <a:r>
+              <a:rPr lang="en-US" altLang="zh-CN" sz="1800" dirty="0"/>
+              <a:t>leveraging</a:t>
+            </a:r>
+            <a:r>
+              <a:rPr lang="zh-CN" altLang="en-US" sz="1800" dirty="0"/>
+              <a:t> </a:t>
+            </a:r>
+            <a:r>
+              <a:rPr lang="en-US" altLang="zh-CN" sz="1800" dirty="0"/>
+              <a:t>content</a:t>
+            </a:r>
+            <a:r>
+              <a:rPr lang="zh-CN" altLang="en-US" sz="1800" dirty="0"/>
+              <a:t> </a:t>
+            </a:r>
+            <a:r>
+              <a:rPr lang="en-US" sz="1800" dirty="0"/>
+              <a:t>analytics.</a:t>
+            </a:r>
           </a:p>
         </p:txBody>
       </p:sp>
@@ -8223,12 +9184,9 @@
 </file>
 
 <file path=customXml/item1.xml><?xml version="1.0" encoding="utf-8"?>
-<?mso-contentType ?>
-<FormTemplates xmlns="http://schemas.microsoft.com/sharepoint/v3/contenttype/forms">
-  <Display>DocumentLibraryForm</Display>
-  <Edit>DocumentLibraryForm</Edit>
-  <New>DocumentLibraryForm</New>
-</FormTemplates>
+<p:properties xmlns:p="http://schemas.microsoft.com/office/2006/metadata/properties" xmlns:xsi="http://www.w3.org/2001/XMLSchema-instance" xmlns:pc="http://schemas.microsoft.com/office/infopath/2007/PartnerControls">
+  <documentManagement/>
+</p:properties>
 </file>
 
 <file path=customXml/item2.xml><?xml version="1.0" encoding="utf-8"?>
@@ -8455,15 +9413,27 @@
 </file>
 
 <file path=customXml/item3.xml><?xml version="1.0" encoding="utf-8"?>
-<p:properties xmlns:p="http://schemas.microsoft.com/office/2006/metadata/properties" xmlns:xsi="http://www.w3.org/2001/XMLSchema-instance" xmlns:pc="http://schemas.microsoft.com/office/infopath/2007/PartnerControls">
-  <documentManagement/>
-</p:properties>
+<?mso-contentType ?>
+<FormTemplates xmlns="http://schemas.microsoft.com/sharepoint/v3/contenttype/forms">
+  <Display>DocumentLibraryForm</Display>
+  <Edit>DocumentLibraryForm</Edit>
+  <New>DocumentLibraryForm</New>
+</FormTemplates>
 </file>
 
 <file path=customXml/itemProps1.xml><?xml version="1.0" encoding="utf-8"?>
-<ds:datastoreItem xmlns:ds="http://schemas.openxmlformats.org/officeDocument/2006/customXml" ds:itemID="{B16FB3BA-9F7C-4CD8-B3AB-262CEFAAFDB4}">
+<ds:datastoreItem xmlns:ds="http://schemas.openxmlformats.org/officeDocument/2006/customXml" ds:itemID="{0A54B724-95FE-4227-A509-89C0BE165019}">
   <ds:schemaRefs>
-    <ds:schemaRef ds:uri="http://schemas.microsoft.com/sharepoint/v3/contenttype/forms"/>
+    <ds:schemaRef ds:uri="http://purl.org/dc/terms/"/>
+    <ds:schemaRef ds:uri="218ddd80-e909-418b-876b-6da869ab062e"/>
+    <ds:schemaRef ds:uri="http://purl.org/dc/dcmitype/"/>
+    <ds:schemaRef ds:uri="http://schemas.microsoft.com/office/infopath/2007/PartnerControls"/>
+    <ds:schemaRef ds:uri="http://purl.org/dc/elements/1.1/"/>
+    <ds:schemaRef ds:uri="http://schemas.microsoft.com/office/2006/metadata/properties"/>
+    <ds:schemaRef ds:uri="http://schemas.microsoft.com/office/2006/documentManagement/types"/>
+    <ds:schemaRef ds:uri="http://schemas.openxmlformats.org/package/2006/metadata/core-properties"/>
+    <ds:schemaRef ds:uri="dc93a766-66e7-40cb-ae91-7d18686f06cb"/>
+    <ds:schemaRef ds:uri="http://www.w3.org/XML/1998/namespace"/>
   </ds:schemaRefs>
 </ds:datastoreItem>
 </file>
@@ -8488,18 +9458,9 @@
 </file>
 
 <file path=customXml/itemProps3.xml><?xml version="1.0" encoding="utf-8"?>
-<ds:datastoreItem xmlns:ds="http://schemas.openxmlformats.org/officeDocument/2006/customXml" ds:itemID="{0A54B724-95FE-4227-A509-89C0BE165019}">
+<ds:datastoreItem xmlns:ds="http://schemas.openxmlformats.org/officeDocument/2006/customXml" ds:itemID="{B16FB3BA-9F7C-4CD8-B3AB-262CEFAAFDB4}">
   <ds:schemaRefs>
-    <ds:schemaRef ds:uri="http://purl.org/dc/terms/"/>
-    <ds:schemaRef ds:uri="218ddd80-e909-418b-876b-6da869ab062e"/>
-    <ds:schemaRef ds:uri="http://purl.org/dc/dcmitype/"/>
-    <ds:schemaRef ds:uri="http://schemas.microsoft.com/office/infopath/2007/PartnerControls"/>
-    <ds:schemaRef ds:uri="http://purl.org/dc/elements/1.1/"/>
-    <ds:schemaRef ds:uri="http://schemas.microsoft.com/office/2006/metadata/properties"/>
-    <ds:schemaRef ds:uri="http://schemas.microsoft.com/office/2006/documentManagement/types"/>
-    <ds:schemaRef ds:uri="http://schemas.openxmlformats.org/package/2006/metadata/core-properties"/>
-    <ds:schemaRef ds:uri="dc93a766-66e7-40cb-ae91-7d18686f06cb"/>
-    <ds:schemaRef ds:uri="http://www.w3.org/XML/1998/namespace"/>
+    <ds:schemaRef ds:uri="http://schemas.microsoft.com/sharepoint/v3/contenttype/forms"/>
   </ds:schemaRefs>
 </ds:datastoreItem>
 </file>
</xml_diff>

<commit_message>
Add Dependencies to PPT Deck
Signed-off-by: Nicholas Kocsis <kocsis@ca.ibm.com>
</commit_message>
<xml_diff>
--- a/Project Management/20PI3 Planning/Zowe Community Squad Focus for 20PI3.pptx
+++ b/Project Management/20PI3 Planning/Zowe Community Squad Focus for 20PI3.pptx
@@ -5,48 +5,56 @@
     <p:sldMasterId id="2147483653" r:id="rId4"/>
   </p:sldMasterIdLst>
   <p:notesMasterIdLst>
-    <p:notesMasterId r:id="rId29"/>
+    <p:notesMasterId r:id="rId37"/>
   </p:notesMasterIdLst>
   <p:sldIdLst>
     <p:sldId id="279" r:id="rId5"/>
     <p:sldId id="2142532337" r:id="rId6"/>
     <p:sldId id="2142532351" r:id="rId7"/>
     <p:sldId id="2142532352" r:id="rId8"/>
-    <p:sldId id="2142532360" r:id="rId9"/>
-    <p:sldId id="2142532368" r:id="rId10"/>
-    <p:sldId id="2142532369" r:id="rId11"/>
-    <p:sldId id="2142532353" r:id="rId12"/>
-    <p:sldId id="2142532361" r:id="rId13"/>
-    <p:sldId id="2142532354" r:id="rId14"/>
-    <p:sldId id="2142532371" r:id="rId15"/>
-    <p:sldId id="2142532373" r:id="rId16"/>
-    <p:sldId id="2142532355" r:id="rId17"/>
-    <p:sldId id="2142532363" r:id="rId18"/>
-    <p:sldId id="2142532374" r:id="rId19"/>
-    <p:sldId id="2142532359" r:id="rId20"/>
-    <p:sldId id="2142532366" r:id="rId21"/>
-    <p:sldId id="2142532370" r:id="rId22"/>
-    <p:sldId id="2142532356" r:id="rId23"/>
-    <p:sldId id="2142532364" r:id="rId24"/>
-    <p:sldId id="2142532357" r:id="rId25"/>
-    <p:sldId id="2142532365" r:id="rId26"/>
-    <p:sldId id="2142532358" r:id="rId27"/>
-    <p:sldId id="2142532367" r:id="rId28"/>
+    <p:sldId id="2142532376" r:id="rId9"/>
+    <p:sldId id="2142532360" r:id="rId10"/>
+    <p:sldId id="2142532368" r:id="rId11"/>
+    <p:sldId id="2142532369" r:id="rId12"/>
+    <p:sldId id="2142532353" r:id="rId13"/>
+    <p:sldId id="2142532377" r:id="rId14"/>
+    <p:sldId id="2142532361" r:id="rId15"/>
+    <p:sldId id="2142532354" r:id="rId16"/>
+    <p:sldId id="2142532378" r:id="rId17"/>
+    <p:sldId id="2142532371" r:id="rId18"/>
+    <p:sldId id="2142532373" r:id="rId19"/>
+    <p:sldId id="2142532355" r:id="rId20"/>
+    <p:sldId id="2142532379" r:id="rId21"/>
+    <p:sldId id="2142532363" r:id="rId22"/>
+    <p:sldId id="2142532374" r:id="rId23"/>
+    <p:sldId id="2142532359" r:id="rId24"/>
+    <p:sldId id="2142532380" r:id="rId25"/>
+    <p:sldId id="2142532366" r:id="rId26"/>
+    <p:sldId id="2142532370" r:id="rId27"/>
+    <p:sldId id="2142532356" r:id="rId28"/>
+    <p:sldId id="2142532381" r:id="rId29"/>
+    <p:sldId id="2142532364" r:id="rId30"/>
+    <p:sldId id="2142532357" r:id="rId31"/>
+    <p:sldId id="2142532382" r:id="rId32"/>
+    <p:sldId id="2142532365" r:id="rId33"/>
+    <p:sldId id="2142532358" r:id="rId34"/>
+    <p:sldId id="2142532383" r:id="rId35"/>
+    <p:sldId id="2142532367" r:id="rId36"/>
   </p:sldIdLst>
   <p:sldSz cx="9144000" cy="5143500" type="screen16x9"/>
   <p:notesSz cx="6858000" cy="9144000"/>
   <p:embeddedFontLst>
     <p:embeddedFont>
       <p:font typeface="Calibri" panose="020F0502020204030204" pitchFamily="34" charset="0"/>
-      <p:regular r:id="rId30"/>
-      <p:bold r:id="rId31"/>
-      <p:italic r:id="rId32"/>
-      <p:boldItalic r:id="rId33"/>
+      <p:regular r:id="rId38"/>
+      <p:bold r:id="rId39"/>
+      <p:italic r:id="rId40"/>
+      <p:boldItalic r:id="rId41"/>
     </p:embeddedFont>
     <p:embeddedFont>
       <p:font typeface="Gill Sans" panose="020B0502020104020203" pitchFamily="34" charset="-79"/>
-      <p:regular r:id="rId34"/>
-      <p:bold r:id="rId35"/>
+      <p:regular r:id="rId42"/>
+      <p:bold r:id="rId43"/>
     </p:embeddedFont>
   </p:embeddedFontLst>
   <p:defaultTextStyle>
@@ -984,6 +992,511 @@
 </p:notes>
 </file>
 
+<file path=ppt/notesSlides/notesSlide10.xml><?xml version="1.0" encoding="utf-8"?>
+<p:notes xmlns:a="http://schemas.openxmlformats.org/drawingml/2006/main" xmlns:r="http://schemas.openxmlformats.org/officeDocument/2006/relationships" xmlns:p="http://schemas.openxmlformats.org/presentationml/2006/main">
+  <p:cSld>
+    <p:spTree>
+      <p:nvGrpSpPr>
+        <p:cNvPr id="1" name=""/>
+        <p:cNvGrpSpPr/>
+        <p:nvPr/>
+      </p:nvGrpSpPr>
+      <p:grpSpPr>
+        <a:xfrm>
+          <a:off x="0" y="0"/>
+          <a:ext cx="0" cy="0"/>
+          <a:chOff x="0" y="0"/>
+          <a:chExt cx="0" cy="0"/>
+        </a:xfrm>
+      </p:grpSpPr>
+      <p:sp>
+        <p:nvSpPr>
+          <p:cNvPr id="2" name="Slide Image Placeholder 1"/>
+          <p:cNvSpPr>
+            <a:spLocks noGrp="1" noRot="1" noChangeAspect="1"/>
+          </p:cNvSpPr>
+          <p:nvPr>
+            <p:ph type="sldImg"/>
+          </p:nvPr>
+        </p:nvSpPr>
+        <p:spPr>
+          <a:xfrm>
+            <a:off x="381000" y="685800"/>
+            <a:ext cx="6096000" cy="3429000"/>
+          </a:xfrm>
+        </p:spPr>
+      </p:sp>
+      <p:sp>
+        <p:nvSpPr>
+          <p:cNvPr id="3" name="Notes Placeholder 2"/>
+          <p:cNvSpPr>
+            <a:spLocks noGrp="1"/>
+          </p:cNvSpPr>
+          <p:nvPr>
+            <p:ph type="body" idx="1"/>
+          </p:nvPr>
+        </p:nvSpPr>
+        <p:spPr/>
+        <p:txBody>
+          <a:bodyPr/>
+          <a:lstStyle/>
+          <a:p>
+            <a:pPr marL="158750" indent="0">
+              <a:buNone/>
+            </a:pPr>
+            <a:endParaRPr lang="en-US" dirty="0"/>
+          </a:p>
+        </p:txBody>
+      </p:sp>
+    </p:spTree>
+    <p:extLst>
+      <p:ext uri="{BB962C8B-B14F-4D97-AF65-F5344CB8AC3E}">
+        <p14:creationId xmlns:p14="http://schemas.microsoft.com/office/powerpoint/2010/main" val="2275415211"/>
+      </p:ext>
+    </p:extLst>
+  </p:cSld>
+  <p:clrMapOvr>
+    <a:masterClrMapping/>
+  </p:clrMapOvr>
+</p:notes>
+</file>
+
+<file path=ppt/notesSlides/notesSlide11.xml><?xml version="1.0" encoding="utf-8"?>
+<p:notes xmlns:a="http://schemas.openxmlformats.org/drawingml/2006/main" xmlns:r="http://schemas.openxmlformats.org/officeDocument/2006/relationships" xmlns:p="http://schemas.openxmlformats.org/presentationml/2006/main">
+  <p:cSld>
+    <p:spTree>
+      <p:nvGrpSpPr>
+        <p:cNvPr id="1" name=""/>
+        <p:cNvGrpSpPr/>
+        <p:nvPr/>
+      </p:nvGrpSpPr>
+      <p:grpSpPr>
+        <a:xfrm>
+          <a:off x="0" y="0"/>
+          <a:ext cx="0" cy="0"/>
+          <a:chOff x="0" y="0"/>
+          <a:chExt cx="0" cy="0"/>
+        </a:xfrm>
+      </p:grpSpPr>
+      <p:sp>
+        <p:nvSpPr>
+          <p:cNvPr id="2" name="Slide Image Placeholder 1"/>
+          <p:cNvSpPr>
+            <a:spLocks noGrp="1" noRot="1" noChangeAspect="1"/>
+          </p:cNvSpPr>
+          <p:nvPr>
+            <p:ph type="sldImg"/>
+          </p:nvPr>
+        </p:nvSpPr>
+        <p:spPr>
+          <a:xfrm>
+            <a:off x="381000" y="685800"/>
+            <a:ext cx="6096000" cy="3429000"/>
+          </a:xfrm>
+        </p:spPr>
+      </p:sp>
+      <p:sp>
+        <p:nvSpPr>
+          <p:cNvPr id="3" name="Notes Placeholder 2"/>
+          <p:cNvSpPr>
+            <a:spLocks noGrp="1"/>
+          </p:cNvSpPr>
+          <p:nvPr>
+            <p:ph type="body" idx="1"/>
+          </p:nvPr>
+        </p:nvSpPr>
+        <p:spPr/>
+        <p:txBody>
+          <a:bodyPr/>
+          <a:lstStyle/>
+          <a:p>
+            <a:pPr marL="158750" indent="0">
+              <a:buNone/>
+            </a:pPr>
+            <a:endParaRPr lang="en-US" dirty="0"/>
+          </a:p>
+        </p:txBody>
+      </p:sp>
+    </p:spTree>
+    <p:extLst>
+      <p:ext uri="{BB962C8B-B14F-4D97-AF65-F5344CB8AC3E}">
+        <p14:creationId xmlns:p14="http://schemas.microsoft.com/office/powerpoint/2010/main" val="594138897"/>
+      </p:ext>
+    </p:extLst>
+  </p:cSld>
+  <p:clrMapOvr>
+    <a:masterClrMapping/>
+  </p:clrMapOvr>
+</p:notes>
+</file>
+
+<file path=ppt/notesSlides/notesSlide12.xml><?xml version="1.0" encoding="utf-8"?>
+<p:notes xmlns:a="http://schemas.openxmlformats.org/drawingml/2006/main" xmlns:r="http://schemas.openxmlformats.org/officeDocument/2006/relationships" xmlns:p="http://schemas.openxmlformats.org/presentationml/2006/main">
+  <p:cSld>
+    <p:spTree>
+      <p:nvGrpSpPr>
+        <p:cNvPr id="1" name=""/>
+        <p:cNvGrpSpPr/>
+        <p:nvPr/>
+      </p:nvGrpSpPr>
+      <p:grpSpPr>
+        <a:xfrm>
+          <a:off x="0" y="0"/>
+          <a:ext cx="0" cy="0"/>
+          <a:chOff x="0" y="0"/>
+          <a:chExt cx="0" cy="0"/>
+        </a:xfrm>
+      </p:grpSpPr>
+      <p:sp>
+        <p:nvSpPr>
+          <p:cNvPr id="2" name="Slide Image Placeholder 1"/>
+          <p:cNvSpPr>
+            <a:spLocks noGrp="1" noRot="1" noChangeAspect="1"/>
+          </p:cNvSpPr>
+          <p:nvPr>
+            <p:ph type="sldImg"/>
+          </p:nvPr>
+        </p:nvSpPr>
+        <p:spPr>
+          <a:xfrm>
+            <a:off x="381000" y="685800"/>
+            <a:ext cx="6096000" cy="3429000"/>
+          </a:xfrm>
+        </p:spPr>
+      </p:sp>
+      <p:sp>
+        <p:nvSpPr>
+          <p:cNvPr id="3" name="Notes Placeholder 2"/>
+          <p:cNvSpPr>
+            <a:spLocks noGrp="1"/>
+          </p:cNvSpPr>
+          <p:nvPr>
+            <p:ph type="body" idx="1"/>
+          </p:nvPr>
+        </p:nvSpPr>
+        <p:spPr/>
+        <p:txBody>
+          <a:bodyPr/>
+          <a:lstStyle/>
+          <a:p>
+            <a:pPr marL="457200" marR="0" lvl="0" indent="-298450" algn="l" defTabSz="914400" rtl="0" eaLnBrk="1" fontAlgn="auto" latinLnBrk="0" hangingPunct="1">
+              <a:lnSpc>
+                <a:spcPct val="100000"/>
+              </a:lnSpc>
+              <a:spcBef>
+                <a:spcPts val="0"/>
+              </a:spcBef>
+              <a:spcAft>
+                <a:spcPts val="0"/>
+              </a:spcAft>
+              <a:buClr>
+                <a:srgbClr val="000000"/>
+              </a:buClr>
+              <a:buSzPts val="1100"/>
+              <a:buFont typeface="Arial"/>
+              <a:buChar char="●"/>
+              <a:tabLst/>
+              <a:defRPr/>
+            </a:pPr>
+            <a:r>
+              <a:rPr lang="en-US" dirty="0"/>
+              <a:t>Leverage new UX members / design thinking / persona identification Onboarding New Members</a:t>
+            </a:r>
+          </a:p>
+          <a:p>
+            <a:pPr marL="158750" indent="0">
+              <a:buNone/>
+            </a:pPr>
+            <a:endParaRPr lang="en-US" dirty="0"/>
+          </a:p>
+        </p:txBody>
+      </p:sp>
+    </p:spTree>
+    <p:extLst>
+      <p:ext uri="{BB962C8B-B14F-4D97-AF65-F5344CB8AC3E}">
+        <p14:creationId xmlns:p14="http://schemas.microsoft.com/office/powerpoint/2010/main" val="1618876320"/>
+      </p:ext>
+    </p:extLst>
+  </p:cSld>
+  <p:clrMapOvr>
+    <a:masterClrMapping/>
+  </p:clrMapOvr>
+</p:notes>
+</file>
+
+<file path=ppt/notesSlides/notesSlide13.xml><?xml version="1.0" encoding="utf-8"?>
+<p:notes xmlns:a="http://schemas.openxmlformats.org/drawingml/2006/main" xmlns:r="http://schemas.openxmlformats.org/officeDocument/2006/relationships" xmlns:p="http://schemas.openxmlformats.org/presentationml/2006/main">
+  <p:cSld>
+    <p:spTree>
+      <p:nvGrpSpPr>
+        <p:cNvPr id="1" name=""/>
+        <p:cNvGrpSpPr/>
+        <p:nvPr/>
+      </p:nvGrpSpPr>
+      <p:grpSpPr>
+        <a:xfrm>
+          <a:off x="0" y="0"/>
+          <a:ext cx="0" cy="0"/>
+          <a:chOff x="0" y="0"/>
+          <a:chExt cx="0" cy="0"/>
+        </a:xfrm>
+      </p:grpSpPr>
+      <p:sp>
+        <p:nvSpPr>
+          <p:cNvPr id="2" name="Slide Image Placeholder 1"/>
+          <p:cNvSpPr>
+            <a:spLocks noGrp="1" noRot="1" noChangeAspect="1"/>
+          </p:cNvSpPr>
+          <p:nvPr>
+            <p:ph type="sldImg"/>
+          </p:nvPr>
+        </p:nvSpPr>
+        <p:spPr>
+          <a:xfrm>
+            <a:off x="381000" y="685800"/>
+            <a:ext cx="6096000" cy="3429000"/>
+          </a:xfrm>
+        </p:spPr>
+      </p:sp>
+      <p:sp>
+        <p:nvSpPr>
+          <p:cNvPr id="3" name="Notes Placeholder 2"/>
+          <p:cNvSpPr>
+            <a:spLocks noGrp="1"/>
+          </p:cNvSpPr>
+          <p:nvPr>
+            <p:ph type="body" idx="1"/>
+          </p:nvPr>
+        </p:nvSpPr>
+        <p:spPr/>
+        <p:txBody>
+          <a:bodyPr/>
+          <a:lstStyle/>
+          <a:p>
+            <a:pPr marL="158750" indent="0">
+              <a:buNone/>
+            </a:pPr>
+            <a:endParaRPr lang="en-US" dirty="0"/>
+          </a:p>
+        </p:txBody>
+      </p:sp>
+    </p:spTree>
+    <p:extLst>
+      <p:ext uri="{BB962C8B-B14F-4D97-AF65-F5344CB8AC3E}">
+        <p14:creationId xmlns:p14="http://schemas.microsoft.com/office/powerpoint/2010/main" val="2155591195"/>
+      </p:ext>
+    </p:extLst>
+  </p:cSld>
+  <p:clrMapOvr>
+    <a:masterClrMapping/>
+  </p:clrMapOvr>
+</p:notes>
+</file>
+
+<file path=ppt/notesSlides/notesSlide14.xml><?xml version="1.0" encoding="utf-8"?>
+<p:notes xmlns:a="http://schemas.openxmlformats.org/drawingml/2006/main" xmlns:r="http://schemas.openxmlformats.org/officeDocument/2006/relationships" xmlns:p="http://schemas.openxmlformats.org/presentationml/2006/main">
+  <p:cSld>
+    <p:spTree>
+      <p:nvGrpSpPr>
+        <p:cNvPr id="1" name=""/>
+        <p:cNvGrpSpPr/>
+        <p:nvPr/>
+      </p:nvGrpSpPr>
+      <p:grpSpPr>
+        <a:xfrm>
+          <a:off x="0" y="0"/>
+          <a:ext cx="0" cy="0"/>
+          <a:chOff x="0" y="0"/>
+          <a:chExt cx="0" cy="0"/>
+        </a:xfrm>
+      </p:grpSpPr>
+      <p:sp>
+        <p:nvSpPr>
+          <p:cNvPr id="2" name="Slide Image Placeholder 1"/>
+          <p:cNvSpPr>
+            <a:spLocks noGrp="1" noRot="1" noChangeAspect="1"/>
+          </p:cNvSpPr>
+          <p:nvPr>
+            <p:ph type="sldImg"/>
+          </p:nvPr>
+        </p:nvSpPr>
+        <p:spPr>
+          <a:xfrm>
+            <a:off x="381000" y="685800"/>
+            <a:ext cx="6096000" cy="3429000"/>
+          </a:xfrm>
+        </p:spPr>
+      </p:sp>
+      <p:sp>
+        <p:nvSpPr>
+          <p:cNvPr id="3" name="Notes Placeholder 2"/>
+          <p:cNvSpPr>
+            <a:spLocks noGrp="1"/>
+          </p:cNvSpPr>
+          <p:nvPr>
+            <p:ph type="body" idx="1"/>
+          </p:nvPr>
+        </p:nvSpPr>
+        <p:spPr/>
+        <p:txBody>
+          <a:bodyPr/>
+          <a:lstStyle/>
+          <a:p>
+            <a:pPr marL="158750" indent="0">
+              <a:buNone/>
+            </a:pPr>
+            <a:endParaRPr lang="en-US" dirty="0"/>
+          </a:p>
+        </p:txBody>
+      </p:sp>
+    </p:spTree>
+    <p:extLst>
+      <p:ext uri="{BB962C8B-B14F-4D97-AF65-F5344CB8AC3E}">
+        <p14:creationId xmlns:p14="http://schemas.microsoft.com/office/powerpoint/2010/main" val="3851968929"/>
+      </p:ext>
+    </p:extLst>
+  </p:cSld>
+  <p:clrMapOvr>
+    <a:masterClrMapping/>
+  </p:clrMapOvr>
+</p:notes>
+</file>
+
+<file path=ppt/notesSlides/notesSlide15.xml><?xml version="1.0" encoding="utf-8"?>
+<p:notes xmlns:a="http://schemas.openxmlformats.org/drawingml/2006/main" xmlns:r="http://schemas.openxmlformats.org/officeDocument/2006/relationships" xmlns:p="http://schemas.openxmlformats.org/presentationml/2006/main">
+  <p:cSld>
+    <p:spTree>
+      <p:nvGrpSpPr>
+        <p:cNvPr id="1" name=""/>
+        <p:cNvGrpSpPr/>
+        <p:nvPr/>
+      </p:nvGrpSpPr>
+      <p:grpSpPr>
+        <a:xfrm>
+          <a:off x="0" y="0"/>
+          <a:ext cx="0" cy="0"/>
+          <a:chOff x="0" y="0"/>
+          <a:chExt cx="0" cy="0"/>
+        </a:xfrm>
+      </p:grpSpPr>
+      <p:sp>
+        <p:nvSpPr>
+          <p:cNvPr id="2" name="Slide Image Placeholder 1"/>
+          <p:cNvSpPr>
+            <a:spLocks noGrp="1" noRot="1" noChangeAspect="1"/>
+          </p:cNvSpPr>
+          <p:nvPr>
+            <p:ph type="sldImg"/>
+          </p:nvPr>
+        </p:nvSpPr>
+        <p:spPr>
+          <a:xfrm>
+            <a:off x="381000" y="685800"/>
+            <a:ext cx="6096000" cy="3429000"/>
+          </a:xfrm>
+        </p:spPr>
+      </p:sp>
+      <p:sp>
+        <p:nvSpPr>
+          <p:cNvPr id="3" name="Notes Placeholder 2"/>
+          <p:cNvSpPr>
+            <a:spLocks noGrp="1"/>
+          </p:cNvSpPr>
+          <p:nvPr>
+            <p:ph type="body" idx="1"/>
+          </p:nvPr>
+        </p:nvSpPr>
+        <p:spPr/>
+        <p:txBody>
+          <a:bodyPr/>
+          <a:lstStyle/>
+          <a:p>
+            <a:endParaRPr lang="en-US" dirty="0"/>
+          </a:p>
+        </p:txBody>
+      </p:sp>
+    </p:spTree>
+    <p:extLst>
+      <p:ext uri="{BB962C8B-B14F-4D97-AF65-F5344CB8AC3E}">
+        <p14:creationId xmlns:p14="http://schemas.microsoft.com/office/powerpoint/2010/main" val="702557294"/>
+      </p:ext>
+    </p:extLst>
+  </p:cSld>
+  <p:clrMapOvr>
+    <a:masterClrMapping/>
+  </p:clrMapOvr>
+</p:notes>
+</file>
+
+<file path=ppt/notesSlides/notesSlide16.xml><?xml version="1.0" encoding="utf-8"?>
+<p:notes xmlns:a="http://schemas.openxmlformats.org/drawingml/2006/main" xmlns:r="http://schemas.openxmlformats.org/officeDocument/2006/relationships" xmlns:p="http://schemas.openxmlformats.org/presentationml/2006/main">
+  <p:cSld>
+    <p:spTree>
+      <p:nvGrpSpPr>
+        <p:cNvPr id="1" name=""/>
+        <p:cNvGrpSpPr/>
+        <p:nvPr/>
+      </p:nvGrpSpPr>
+      <p:grpSpPr>
+        <a:xfrm>
+          <a:off x="0" y="0"/>
+          <a:ext cx="0" cy="0"/>
+          <a:chOff x="0" y="0"/>
+          <a:chExt cx="0" cy="0"/>
+        </a:xfrm>
+      </p:grpSpPr>
+      <p:sp>
+        <p:nvSpPr>
+          <p:cNvPr id="2" name="Slide Image Placeholder 1"/>
+          <p:cNvSpPr>
+            <a:spLocks noGrp="1" noRot="1" noChangeAspect="1"/>
+          </p:cNvSpPr>
+          <p:nvPr>
+            <p:ph type="sldImg"/>
+          </p:nvPr>
+        </p:nvSpPr>
+        <p:spPr>
+          <a:xfrm>
+            <a:off x="381000" y="685800"/>
+            <a:ext cx="6096000" cy="3429000"/>
+          </a:xfrm>
+        </p:spPr>
+      </p:sp>
+      <p:sp>
+        <p:nvSpPr>
+          <p:cNvPr id="3" name="Notes Placeholder 2"/>
+          <p:cNvSpPr>
+            <a:spLocks noGrp="1"/>
+          </p:cNvSpPr>
+          <p:nvPr>
+            <p:ph type="body" idx="1"/>
+          </p:nvPr>
+        </p:nvSpPr>
+        <p:spPr/>
+        <p:txBody>
+          <a:bodyPr/>
+          <a:lstStyle/>
+          <a:p>
+            <a:pPr marL="158750" indent="0">
+              <a:buNone/>
+            </a:pPr>
+            <a:endParaRPr lang="en-US" dirty="0"/>
+          </a:p>
+        </p:txBody>
+      </p:sp>
+    </p:spTree>
+    <p:extLst>
+      <p:ext uri="{BB962C8B-B14F-4D97-AF65-F5344CB8AC3E}">
+        <p14:creationId xmlns:p14="http://schemas.microsoft.com/office/powerpoint/2010/main" val="1454580225"/>
+      </p:ext>
+    </p:extLst>
+  </p:cSld>
+  <p:clrMapOvr>
+    <a:masterClrMapping/>
+  </p:clrMapOvr>
+</p:notes>
+</file>
+
 <file path=ppt/notesSlides/notesSlide2.xml><?xml version="1.0" encoding="utf-8"?>
 <p:notes xmlns:a="http://schemas.openxmlformats.org/drawingml/2006/main" xmlns:r="http://schemas.openxmlformats.org/officeDocument/2006/relationships" xmlns:p="http://schemas.openxmlformats.org/presentationml/2006/main">
   <p:cSld>
@@ -1033,94 +1546,6 @@
           <a:bodyPr/>
           <a:lstStyle/>
           <a:p>
-            <a:pPr marL="158750" indent="0" rtl="0">
-              <a:buNone/>
-            </a:pPr>
-            <a:r>
-              <a:rPr lang="en-US" sz="1100" b="0" i="0" u="none" strike="noStrike" cap="none" dirty="0">
-                <a:solidFill>
-                  <a:srgbClr val="000000"/>
-                </a:solidFill>
-                <a:effectLst/>
-                <a:latin typeface="Arial"/>
-                <a:ea typeface="Arial"/>
-                <a:cs typeface="Arial"/>
-                <a:sym typeface="Arial"/>
-              </a:rPr>
-              <a:t>Notes: </a:t>
-            </a:r>
-            <a:endParaRPr lang="en-US" b="0" dirty="0">
-              <a:effectLst/>
-            </a:endParaRPr>
-          </a:p>
-          <a:p>
-            <a:pPr marL="158750" indent="0" rtl="0" fontAlgn="base">
-              <a:buNone/>
-            </a:pPr>
-            <a:r>
-              <a:rPr lang="en-US" sz="1100" b="0" i="0" u="none" strike="noStrike" cap="none" dirty="0">
-                <a:solidFill>
-                  <a:srgbClr val="000000"/>
-                </a:solidFill>
-                <a:effectLst/>
-                <a:latin typeface="Arial"/>
-                <a:ea typeface="Arial"/>
-                <a:cs typeface="Arial"/>
-                <a:sym typeface="Arial"/>
-              </a:rPr>
-              <a:t>x.509 is one of the  industry standard ways of authenticating to backend services</a:t>
-            </a:r>
-          </a:p>
-          <a:p>
-            <a:pPr marL="158750" indent="0" rtl="0" fontAlgn="base">
-              <a:buNone/>
-            </a:pPr>
-            <a:r>
-              <a:rPr lang="en-US" sz="1100" b="0" i="0" u="none" strike="noStrike" cap="none" dirty="0" err="1">
-                <a:solidFill>
-                  <a:srgbClr val="000000"/>
-                </a:solidFill>
-                <a:effectLst/>
-                <a:latin typeface="Arial"/>
-                <a:ea typeface="Arial"/>
-                <a:cs typeface="Arial"/>
-                <a:sym typeface="Arial"/>
-              </a:rPr>
-              <a:t>Zowe</a:t>
-            </a:r>
-            <a:r>
-              <a:rPr lang="en-US" sz="1100" b="0" i="0" u="none" strike="noStrike" cap="none" dirty="0">
-                <a:solidFill>
-                  <a:srgbClr val="000000"/>
-                </a:solidFill>
-                <a:effectLst/>
-                <a:latin typeface="Arial"/>
-                <a:ea typeface="Arial"/>
-                <a:cs typeface="Arial"/>
-                <a:sym typeface="Arial"/>
-              </a:rPr>
-              <a:t> Client apps will need to be updated to support client certs</a:t>
-            </a:r>
-          </a:p>
-          <a:p>
-            <a:pPr marL="158750" indent="0" rtl="0" fontAlgn="base">
-              <a:buNone/>
-            </a:pPr>
-            <a:r>
-              <a:rPr lang="en-US" sz="1100" b="0" i="0" u="none" strike="noStrike" cap="none" dirty="0">
-                <a:solidFill>
-                  <a:srgbClr val="000000"/>
-                </a:solidFill>
-                <a:effectLst/>
-                <a:latin typeface="Arial"/>
-                <a:ea typeface="Arial"/>
-                <a:cs typeface="Arial"/>
-                <a:sym typeface="Arial"/>
-              </a:rPr>
-              <a:t>Customer apps may have their own way of supporting client certs</a:t>
-            </a:r>
-          </a:p>
-          <a:p>
             <a:pPr marL="158750" indent="0">
               <a:buNone/>
             </a:pPr>
@@ -1131,7 +1556,7 @@
     </p:spTree>
     <p:extLst>
       <p:ext uri="{BB962C8B-B14F-4D97-AF65-F5344CB8AC3E}">
-        <p14:creationId xmlns:p14="http://schemas.microsoft.com/office/powerpoint/2010/main" val="2057346315"/>
+        <p14:creationId xmlns:p14="http://schemas.microsoft.com/office/powerpoint/2010/main" val="929225044"/>
       </p:ext>
     </p:extLst>
   </p:cSld>
@@ -1190,7 +1615,46 @@
           <a:bodyPr/>
           <a:lstStyle/>
           <a:p>
-            <a:pPr marL="158750" indent="0">
+            <a:pPr marL="158750" indent="0" rtl="0">
+              <a:buNone/>
+            </a:pPr>
+            <a:r>
+              <a:rPr lang="en-US" sz="1100" b="0" i="0" u="none" strike="noStrike" cap="none" dirty="0">
+                <a:solidFill>
+                  <a:srgbClr val="000000"/>
+                </a:solidFill>
+                <a:effectLst/>
+                <a:latin typeface="Arial"/>
+                <a:ea typeface="Arial"/>
+                <a:cs typeface="Arial"/>
+                <a:sym typeface="Arial"/>
+              </a:rPr>
+              <a:t>Notes: </a:t>
+            </a:r>
+            <a:endParaRPr lang="en-US" b="0" dirty="0">
+              <a:effectLst/>
+            </a:endParaRPr>
+          </a:p>
+          <a:p>
+            <a:pPr marL="158750" indent="0" rtl="0" fontAlgn="base">
+              <a:buNone/>
+            </a:pPr>
+            <a:r>
+              <a:rPr lang="en-US" sz="1100" b="0" i="0" u="none" strike="noStrike" cap="none" dirty="0">
+                <a:solidFill>
+                  <a:srgbClr val="000000"/>
+                </a:solidFill>
+                <a:effectLst/>
+                <a:latin typeface="Arial"/>
+                <a:ea typeface="Arial"/>
+                <a:cs typeface="Arial"/>
+                <a:sym typeface="Arial"/>
+              </a:rPr>
+              <a:t>x.509 is one of the  industry standard ways of authenticating to backend services</a:t>
+            </a:r>
+          </a:p>
+          <a:p>
+            <a:pPr marL="158750" indent="0" rtl="0" fontAlgn="base">
               <a:buNone/>
             </a:pPr>
             <a:r>
@@ -1217,11 +1681,11 @@
                 <a:cs typeface="Arial"/>
                 <a:sym typeface="Arial"/>
               </a:rPr>
-              <a:t> APIML currently depends on z/OSMF to be installed in the same security domain for authentication.</a:t>
-            </a:r>
-          </a:p>
-          <a:p>
-            <a:pPr marL="158750" indent="0">
+              <a:t> Client apps will need to be updated to support client certs</a:t>
+            </a:r>
+          </a:p>
+          <a:p>
+            <a:pPr marL="158750" indent="0" rtl="0" fontAlgn="base">
               <a:buNone/>
             </a:pPr>
             <a:r>
@@ -1235,100 +1699,13 @@
                 <a:cs typeface="Arial"/>
                 <a:sym typeface="Arial"/>
               </a:rPr>
-              <a:t>There are use cases where just APIML is needed on some systems and there is z/OSMF on other systems or any system in the same security domain.</a:t>
+              <a:t>Customer apps may have their own way of supporting client certs</a:t>
             </a:r>
           </a:p>
           <a:p>
             <a:pPr marL="158750" indent="0">
               <a:buNone/>
             </a:pPr>
-            <a:r>
-              <a:rPr lang="en-US" sz="1100" b="0" i="0" u="none" strike="noStrike" cap="none" dirty="0">
-                <a:solidFill>
-                  <a:srgbClr val="000000"/>
-                </a:solidFill>
-                <a:effectLst/>
-                <a:latin typeface="Arial"/>
-                <a:ea typeface="Arial"/>
-                <a:cs typeface="Arial"/>
-                <a:sym typeface="Arial"/>
-              </a:rPr>
-              <a:t>This is a request to:</a:t>
-            </a:r>
-          </a:p>
-          <a:p>
-            <a:pPr marL="158750" indent="0">
-              <a:buNone/>
-            </a:pPr>
-            <a:r>
-              <a:rPr lang="en-US" sz="1100" b="0" i="0" u="none" strike="noStrike" cap="none" dirty="0">
-                <a:solidFill>
-                  <a:srgbClr val="000000"/>
-                </a:solidFill>
-                <a:effectLst/>
-                <a:latin typeface="Arial"/>
-                <a:ea typeface="Arial"/>
-                <a:cs typeface="Arial"/>
-                <a:sym typeface="Arial"/>
-              </a:rPr>
-              <a:t>Remove the dependency of APIML on z/OSMF for authentication and use SAF to obtain the JWT</a:t>
-            </a:r>
-          </a:p>
-          <a:p>
-            <a:pPr marL="615950" lvl="1" indent="0">
-              <a:buNone/>
-            </a:pPr>
-            <a:r>
-              <a:rPr lang="en-US" sz="1100" b="0" i="0" u="none" strike="noStrike" cap="none" dirty="0">
-                <a:solidFill>
-                  <a:srgbClr val="000000"/>
-                </a:solidFill>
-                <a:effectLst/>
-                <a:latin typeface="Arial"/>
-                <a:ea typeface="Arial"/>
-                <a:cs typeface="Arial"/>
-                <a:sym typeface="Arial"/>
-              </a:rPr>
-              <a:t>This will be implemented as a different provider, the z/OSMF authentication provider will remain the default</a:t>
-            </a:r>
-          </a:p>
-          <a:p>
-            <a:pPr marL="615950" lvl="1" indent="0">
-              <a:buNone/>
-            </a:pPr>
-            <a:r>
-              <a:rPr lang="en-US" sz="1100" b="0" i="0" u="none" strike="noStrike" cap="none" dirty="0">
-                <a:solidFill>
-                  <a:srgbClr val="000000"/>
-                </a:solidFill>
-                <a:effectLst/>
-                <a:latin typeface="Arial"/>
-                <a:ea typeface="Arial"/>
-                <a:cs typeface="Arial"/>
-                <a:sym typeface="Arial"/>
-              </a:rPr>
-              <a:t>z/OSMF will not be accessible via API ML if z/OSMF will not trust SAF JWT</a:t>
-            </a:r>
-          </a:p>
-          <a:p>
-            <a:pPr marL="158750" indent="0">
-              <a:buNone/>
-            </a:pPr>
-            <a:r>
-              <a:rPr lang="en-US" sz="1100" b="0" i="0" u="none" strike="noStrike" cap="none" dirty="0">
-                <a:solidFill>
-                  <a:srgbClr val="000000"/>
-                </a:solidFill>
-                <a:effectLst/>
-                <a:latin typeface="Arial"/>
-                <a:ea typeface="Arial"/>
-                <a:cs typeface="Arial"/>
-                <a:sym typeface="Arial"/>
-              </a:rPr>
-              <a:t>Update the installation process to allow this option</a:t>
-            </a:r>
-          </a:p>
-          <a:p>
             <a:endParaRPr lang="en-US" dirty="0"/>
           </a:p>
         </p:txBody>
@@ -1336,7 +1713,7 @@
     </p:spTree>
     <p:extLst>
       <p:ext uri="{BB962C8B-B14F-4D97-AF65-F5344CB8AC3E}">
-        <p14:creationId xmlns:p14="http://schemas.microsoft.com/office/powerpoint/2010/main" val="3924070904"/>
+        <p14:creationId xmlns:p14="http://schemas.microsoft.com/office/powerpoint/2010/main" val="2057346315"/>
       </p:ext>
     </p:extLst>
   </p:cSld>
@@ -1398,6 +1775,142 @@
             <a:pPr marL="158750" indent="0">
               <a:buNone/>
             </a:pPr>
+            <a:r>
+              <a:rPr lang="en-US" sz="1100" b="0" i="0" u="none" strike="noStrike" cap="none" dirty="0" err="1">
+                <a:solidFill>
+                  <a:srgbClr val="000000"/>
+                </a:solidFill>
+                <a:effectLst/>
+                <a:latin typeface="Arial"/>
+                <a:ea typeface="Arial"/>
+                <a:cs typeface="Arial"/>
+                <a:sym typeface="Arial"/>
+              </a:rPr>
+              <a:t>Zowe</a:t>
+            </a:r>
+            <a:r>
+              <a:rPr lang="en-US" sz="1100" b="0" i="0" u="none" strike="noStrike" cap="none" dirty="0">
+                <a:solidFill>
+                  <a:srgbClr val="000000"/>
+                </a:solidFill>
+                <a:effectLst/>
+                <a:latin typeface="Arial"/>
+                <a:ea typeface="Arial"/>
+                <a:cs typeface="Arial"/>
+                <a:sym typeface="Arial"/>
+              </a:rPr>
+              <a:t> APIML currently depends on z/OSMF to be installed in the same security domain for authentication.</a:t>
+            </a:r>
+          </a:p>
+          <a:p>
+            <a:pPr marL="158750" indent="0">
+              <a:buNone/>
+            </a:pPr>
+            <a:r>
+              <a:rPr lang="en-US" sz="1100" b="0" i="0" u="none" strike="noStrike" cap="none" dirty="0">
+                <a:solidFill>
+                  <a:srgbClr val="000000"/>
+                </a:solidFill>
+                <a:effectLst/>
+                <a:latin typeface="Arial"/>
+                <a:ea typeface="Arial"/>
+                <a:cs typeface="Arial"/>
+                <a:sym typeface="Arial"/>
+              </a:rPr>
+              <a:t>There are use cases where just APIML is needed on some systems and there is z/OSMF on other systems or any system in the same security domain.</a:t>
+            </a:r>
+          </a:p>
+          <a:p>
+            <a:pPr marL="158750" indent="0">
+              <a:buNone/>
+            </a:pPr>
+            <a:r>
+              <a:rPr lang="en-US" sz="1100" b="0" i="0" u="none" strike="noStrike" cap="none" dirty="0">
+                <a:solidFill>
+                  <a:srgbClr val="000000"/>
+                </a:solidFill>
+                <a:effectLst/>
+                <a:latin typeface="Arial"/>
+                <a:ea typeface="Arial"/>
+                <a:cs typeface="Arial"/>
+                <a:sym typeface="Arial"/>
+              </a:rPr>
+              <a:t>This is a request to:</a:t>
+            </a:r>
+          </a:p>
+          <a:p>
+            <a:pPr marL="158750" indent="0">
+              <a:buNone/>
+            </a:pPr>
+            <a:r>
+              <a:rPr lang="en-US" sz="1100" b="0" i="0" u="none" strike="noStrike" cap="none" dirty="0">
+                <a:solidFill>
+                  <a:srgbClr val="000000"/>
+                </a:solidFill>
+                <a:effectLst/>
+                <a:latin typeface="Arial"/>
+                <a:ea typeface="Arial"/>
+                <a:cs typeface="Arial"/>
+                <a:sym typeface="Arial"/>
+              </a:rPr>
+              <a:t>Remove the dependency of APIML on z/OSMF for authentication and use SAF to obtain the JWT</a:t>
+            </a:r>
+          </a:p>
+          <a:p>
+            <a:pPr marL="615950" lvl="1" indent="0">
+              <a:buNone/>
+            </a:pPr>
+            <a:r>
+              <a:rPr lang="en-US" sz="1100" b="0" i="0" u="none" strike="noStrike" cap="none" dirty="0">
+                <a:solidFill>
+                  <a:srgbClr val="000000"/>
+                </a:solidFill>
+                <a:effectLst/>
+                <a:latin typeface="Arial"/>
+                <a:ea typeface="Arial"/>
+                <a:cs typeface="Arial"/>
+                <a:sym typeface="Arial"/>
+              </a:rPr>
+              <a:t>This will be implemented as a different provider, the z/OSMF authentication provider will remain the default</a:t>
+            </a:r>
+          </a:p>
+          <a:p>
+            <a:pPr marL="615950" lvl="1" indent="0">
+              <a:buNone/>
+            </a:pPr>
+            <a:r>
+              <a:rPr lang="en-US" sz="1100" b="0" i="0" u="none" strike="noStrike" cap="none" dirty="0">
+                <a:solidFill>
+                  <a:srgbClr val="000000"/>
+                </a:solidFill>
+                <a:effectLst/>
+                <a:latin typeface="Arial"/>
+                <a:ea typeface="Arial"/>
+                <a:cs typeface="Arial"/>
+                <a:sym typeface="Arial"/>
+              </a:rPr>
+              <a:t>z/OSMF will not be accessible via API ML if z/OSMF will not trust SAF JWT</a:t>
+            </a:r>
+          </a:p>
+          <a:p>
+            <a:pPr marL="158750" indent="0">
+              <a:buNone/>
+            </a:pPr>
+            <a:r>
+              <a:rPr lang="en-US" sz="1100" b="0" i="0" u="none" strike="noStrike" cap="none" dirty="0">
+                <a:solidFill>
+                  <a:srgbClr val="000000"/>
+                </a:solidFill>
+                <a:effectLst/>
+                <a:latin typeface="Arial"/>
+                <a:ea typeface="Arial"/>
+                <a:cs typeface="Arial"/>
+                <a:sym typeface="Arial"/>
+              </a:rPr>
+              <a:t>Update the installation process to allow this option</a:t>
+            </a:r>
+          </a:p>
+          <a:p>
             <a:endParaRPr lang="en-US" dirty="0"/>
           </a:p>
         </p:txBody>
@@ -1405,7 +1918,7 @@
     </p:spTree>
     <p:extLst>
       <p:ext uri="{BB962C8B-B14F-4D97-AF65-F5344CB8AC3E}">
-        <p14:creationId xmlns:p14="http://schemas.microsoft.com/office/powerpoint/2010/main" val="2138370677"/>
+        <p14:creationId xmlns:p14="http://schemas.microsoft.com/office/powerpoint/2010/main" val="3924070904"/>
       </p:ext>
     </p:extLst>
   </p:cSld>
@@ -1474,7 +1987,7 @@
     </p:spTree>
     <p:extLst>
       <p:ext uri="{BB962C8B-B14F-4D97-AF65-F5344CB8AC3E}">
-        <p14:creationId xmlns:p14="http://schemas.microsoft.com/office/powerpoint/2010/main" val="1014495597"/>
+        <p14:creationId xmlns:p14="http://schemas.microsoft.com/office/powerpoint/2010/main" val="2138370677"/>
       </p:ext>
     </p:extLst>
   </p:cSld>
@@ -1543,7 +2056,7 @@
     </p:spTree>
     <p:extLst>
       <p:ext uri="{BB962C8B-B14F-4D97-AF65-F5344CB8AC3E}">
-        <p14:creationId xmlns:p14="http://schemas.microsoft.com/office/powerpoint/2010/main" val="1121660626"/>
+        <p14:creationId xmlns:p14="http://schemas.microsoft.com/office/powerpoint/2010/main" val="1774465855"/>
       </p:ext>
     </p:extLst>
   </p:cSld>
@@ -1602,31 +2115,6 @@
           <a:bodyPr/>
           <a:lstStyle/>
           <a:p>
-            <a:pPr marL="457200" marR="0" lvl="0" indent="-298450" algn="l" defTabSz="914400" rtl="0" eaLnBrk="1" fontAlgn="auto" latinLnBrk="0" hangingPunct="1">
-              <a:lnSpc>
-                <a:spcPct val="100000"/>
-              </a:lnSpc>
-              <a:spcBef>
-                <a:spcPts val="0"/>
-              </a:spcBef>
-              <a:spcAft>
-                <a:spcPts val="0"/>
-              </a:spcAft>
-              <a:buClr>
-                <a:srgbClr val="000000"/>
-              </a:buClr>
-              <a:buSzPts val="1100"/>
-              <a:buFont typeface="Arial"/>
-              <a:buChar char="●"/>
-              <a:tabLst/>
-              <a:defRPr/>
-            </a:pPr>
-            <a:r>
-              <a:rPr lang="en-US" dirty="0"/>
-              <a:t>Leverage new UX members / design thinking / persona identification Onboarding New Members</a:t>
-            </a:r>
-          </a:p>
-          <a:p>
             <a:pPr marL="158750" indent="0">
               <a:buNone/>
             </a:pPr>
@@ -1637,7 +2125,7 @@
     </p:spTree>
     <p:extLst>
       <p:ext uri="{BB962C8B-B14F-4D97-AF65-F5344CB8AC3E}">
-        <p14:creationId xmlns:p14="http://schemas.microsoft.com/office/powerpoint/2010/main" val="1618876320"/>
+        <p14:creationId xmlns:p14="http://schemas.microsoft.com/office/powerpoint/2010/main" val="1063351652"/>
       </p:ext>
     </p:extLst>
   </p:cSld>
@@ -1696,6 +2184,9 @@
           <a:bodyPr/>
           <a:lstStyle/>
           <a:p>
+            <a:pPr marL="158750" indent="0">
+              <a:buNone/>
+            </a:pPr>
             <a:endParaRPr lang="en-US" dirty="0"/>
           </a:p>
         </p:txBody>
@@ -1703,7 +2194,76 @@
     </p:spTree>
     <p:extLst>
       <p:ext uri="{BB962C8B-B14F-4D97-AF65-F5344CB8AC3E}">
-        <p14:creationId xmlns:p14="http://schemas.microsoft.com/office/powerpoint/2010/main" val="702557294"/>
+        <p14:creationId xmlns:p14="http://schemas.microsoft.com/office/powerpoint/2010/main" val="1014495597"/>
+      </p:ext>
+    </p:extLst>
+  </p:cSld>
+  <p:clrMapOvr>
+    <a:masterClrMapping/>
+  </p:clrMapOvr>
+</p:notes>
+</file>
+
+<file path=ppt/notesSlides/notesSlide9.xml><?xml version="1.0" encoding="utf-8"?>
+<p:notes xmlns:a="http://schemas.openxmlformats.org/drawingml/2006/main" xmlns:r="http://schemas.openxmlformats.org/officeDocument/2006/relationships" xmlns:p="http://schemas.openxmlformats.org/presentationml/2006/main">
+  <p:cSld>
+    <p:spTree>
+      <p:nvGrpSpPr>
+        <p:cNvPr id="1" name=""/>
+        <p:cNvGrpSpPr/>
+        <p:nvPr/>
+      </p:nvGrpSpPr>
+      <p:grpSpPr>
+        <a:xfrm>
+          <a:off x="0" y="0"/>
+          <a:ext cx="0" cy="0"/>
+          <a:chOff x="0" y="0"/>
+          <a:chExt cx="0" cy="0"/>
+        </a:xfrm>
+      </p:grpSpPr>
+      <p:sp>
+        <p:nvSpPr>
+          <p:cNvPr id="2" name="Slide Image Placeholder 1"/>
+          <p:cNvSpPr>
+            <a:spLocks noGrp="1" noRot="1" noChangeAspect="1"/>
+          </p:cNvSpPr>
+          <p:nvPr>
+            <p:ph type="sldImg"/>
+          </p:nvPr>
+        </p:nvSpPr>
+        <p:spPr>
+          <a:xfrm>
+            <a:off x="381000" y="685800"/>
+            <a:ext cx="6096000" cy="3429000"/>
+          </a:xfrm>
+        </p:spPr>
+      </p:sp>
+      <p:sp>
+        <p:nvSpPr>
+          <p:cNvPr id="3" name="Notes Placeholder 2"/>
+          <p:cNvSpPr>
+            <a:spLocks noGrp="1"/>
+          </p:cNvSpPr>
+          <p:nvPr>
+            <p:ph type="body" idx="1"/>
+          </p:nvPr>
+        </p:nvSpPr>
+        <p:spPr/>
+        <p:txBody>
+          <a:bodyPr/>
+          <a:lstStyle/>
+          <a:p>
+            <a:pPr marL="158750" indent="0">
+              <a:buNone/>
+            </a:pPr>
+            <a:endParaRPr lang="en-US" dirty="0"/>
+          </a:p>
+        </p:txBody>
+      </p:sp>
+    </p:spTree>
+    <p:extLst>
+      <p:ext uri="{BB962C8B-B14F-4D97-AF65-F5344CB8AC3E}">
+        <p14:creationId xmlns:p14="http://schemas.microsoft.com/office/powerpoint/2010/main" val="1121660626"/>
       </p:ext>
     </p:extLst>
   </p:cSld>
@@ -5512,10 +6072,38 @@
       </p:grpSpPr>
       <p:sp>
         <p:nvSpPr>
-          <p:cNvPr id="2" name="Text Placeholder 1">
+          <p:cNvPr id="3" name="Title 2">
             <a:extLst>
               <a:ext uri="{FF2B5EF4-FFF2-40B4-BE49-F238E27FC236}">
-                <a16:creationId xmlns:a16="http://schemas.microsoft.com/office/drawing/2014/main" id="{ADB2E00A-906F-6645-9A30-53C6D93DC43C}"/>
+                <a16:creationId xmlns:a16="http://schemas.microsoft.com/office/drawing/2014/main" id="{CFEEEE36-E132-0D40-A4B8-9BDC5C8B6528}"/>
+              </a:ext>
+            </a:extLst>
+          </p:cNvPr>
+          <p:cNvSpPr>
+            <a:spLocks noGrp="1"/>
+          </p:cNvSpPr>
+          <p:nvPr>
+            <p:ph type="title"/>
+          </p:nvPr>
+        </p:nvSpPr>
+        <p:spPr/>
+        <p:txBody>
+          <a:bodyPr/>
+          <a:lstStyle/>
+          <a:p>
+            <a:r>
+              <a:rPr lang="en-US" dirty="0"/>
+              <a:t>Dependencies</a:t>
+            </a:r>
+          </a:p>
+        </p:txBody>
+      </p:sp>
+      <p:sp>
+        <p:nvSpPr>
+          <p:cNvPr id="4" name="Text Placeholder 3">
+            <a:extLst>
+              <a:ext uri="{FF2B5EF4-FFF2-40B4-BE49-F238E27FC236}">
+                <a16:creationId xmlns:a16="http://schemas.microsoft.com/office/drawing/2014/main" id="{C0DB4ECB-A7D5-6B47-8180-75CB3C3DB7DE}"/>
               </a:ext>
             </a:extLst>
           </p:cNvPr>
@@ -5526,28 +6114,42 @@
             <p:ph type="body" idx="1"/>
           </p:nvPr>
         </p:nvSpPr>
-        <p:spPr/>
+        <p:spPr>
+          <a:xfrm>
+            <a:off x="306211" y="774096"/>
+            <a:ext cx="8369400" cy="4147860"/>
+          </a:xfrm>
+        </p:spPr>
         <p:txBody>
           <a:bodyPr/>
           <a:lstStyle/>
           <a:p>
             <a:r>
               <a:rPr lang="en-US" dirty="0"/>
-              <a:t>CLI Squad Focus</a:t>
-            </a:r>
-          </a:p>
-          <a:p>
-            <a:r>
-              <a:rPr lang="en-US" sz="2000" dirty="0"/>
-              <a:t>Mike Bauer (Squad Lead)</a:t>
-            </a:r>
+              <a:t>Cross Squad Dependencies 1</a:t>
+            </a:r>
+          </a:p>
+          <a:p>
+            <a:r>
+              <a:rPr lang="en-US" dirty="0"/>
+              <a:t>Cross Squad Dependencies 2</a:t>
+            </a:r>
+          </a:p>
+          <a:p>
+            <a:endParaRPr lang="en-US" dirty="0"/>
+          </a:p>
+          <a:p>
+            <a:pPr marL="101600" indent="0">
+              <a:buNone/>
+            </a:pPr>
+            <a:endParaRPr lang="en-US" dirty="0"/>
           </a:p>
         </p:txBody>
       </p:sp>
     </p:spTree>
     <p:extLst>
       <p:ext uri="{BB962C8B-B14F-4D97-AF65-F5344CB8AC3E}">
-        <p14:creationId xmlns:p14="http://schemas.microsoft.com/office/powerpoint/2010/main" val="3971072508"/>
+        <p14:creationId xmlns:p14="http://schemas.microsoft.com/office/powerpoint/2010/main" val="4207504317"/>
       </p:ext>
     </p:extLst>
   </p:cSld>
@@ -5555,7 +6157,7 @@
     <a:masterClrMapping/>
   </p:clrMapOvr>
   <p:transition spd="med">
-    <p:fade/>
+    <p:fade thruBlk="1"/>
   </p:transition>
 </p:sld>
 </file>
@@ -5600,7 +6202,7 @@
           <a:p>
             <a:r>
               <a:rPr lang="en-US" dirty="0"/>
-              <a:t>Feature 1</a:t>
+              <a:t>Features</a:t>
             </a:r>
           </a:p>
         </p:txBody>
@@ -5621,102 +6223,30 @@
             <p:ph type="body" idx="1"/>
           </p:nvPr>
         </p:nvSpPr>
-        <p:spPr>
-          <a:xfrm>
-            <a:off x="306211" y="774096"/>
-            <a:ext cx="8369400" cy="4147860"/>
-          </a:xfrm>
-        </p:spPr>
+        <p:spPr/>
         <p:txBody>
           <a:bodyPr/>
           <a:lstStyle/>
           <a:p>
-            <a:pPr marL="101600" indent="0">
-              <a:buNone/>
-            </a:pPr>
-            <a:r>
-              <a:rPr lang="en-US" dirty="0"/>
-              <a:t>Application developers and those developing scripts to drive interaction with z/OS can easily learn about, access, and leverage </a:t>
+            <a:r>
+              <a:rPr lang="en-US" dirty="0"/>
+              <a:t>Feature </a:t>
             </a:r>
             <a:r>
               <a:rPr lang="en-US" dirty="0" err="1"/>
-              <a:t>Zowe</a:t>
-            </a:r>
-            <a:r>
-              <a:rPr lang="en-US" dirty="0"/>
-              <a:t> SDKs to implement an initial use case.</a:t>
-            </a:r>
-          </a:p>
-          <a:p>
-            <a:pPr marL="101600" indent="0">
-              <a:buNone/>
-            </a:pPr>
-            <a:br>
-              <a:rPr lang="en-US" u="sng" dirty="0"/>
-            </a:br>
-            <a:r>
-              <a:rPr lang="en-US" b="1" dirty="0"/>
-              <a:t>Deliverables: </a:t>
-            </a:r>
-            <a:r>
-              <a:rPr lang="en-US" dirty="0"/>
-              <a:t>Documentation is published on our </a:t>
-            </a:r>
-            <a:r>
-              <a:rPr lang="en-US" dirty="0" err="1"/>
-              <a:t>Zowe</a:t>
-            </a:r>
-            <a:r>
-              <a:rPr lang="en-US" dirty="0"/>
-              <a:t> Docs site covering the overview and use of the SDKs as well as documenting how the community can contribute to the technology. In addition, detailed samples that leverage the SDKs are provided within each repository.</a:t>
-            </a:r>
-            <a:br>
-              <a:rPr lang="en-US" dirty="0"/>
-            </a:br>
-            <a:br>
-              <a:rPr lang="en-US" dirty="0"/>
-            </a:br>
-            <a:r>
-              <a:rPr lang="en-US" dirty="0"/>
-              <a:t>To further drive visibility and adoption, the </a:t>
-            </a:r>
-            <a:r>
-              <a:rPr lang="en-US" dirty="0" err="1"/>
-              <a:t>Zowe</a:t>
-            </a:r>
-            <a:r>
-              <a:rPr lang="en-US" dirty="0"/>
-              <a:t> Node SDK is published to public </a:t>
-            </a:r>
-            <a:r>
-              <a:rPr lang="en-US" dirty="0" err="1"/>
-              <a:t>npm</a:t>
-            </a:r>
-            <a:r>
-              <a:rPr lang="en-US" dirty="0"/>
-              <a:t> separate from the </a:t>
-            </a:r>
-            <a:r>
-              <a:rPr lang="en-US" dirty="0" err="1"/>
-              <a:t>Zowe</a:t>
-            </a:r>
-            <a:r>
-              <a:rPr lang="en-US" dirty="0"/>
-              <a:t> CLI.</a:t>
-            </a:r>
-          </a:p>
-          <a:p>
-            <a:pPr marL="101600" indent="0">
-              <a:buNone/>
-            </a:pPr>
-            <a:endParaRPr lang="en-US" dirty="0"/>
+              <a:t>xxxx</a:t>
+            </a:r>
+            <a:r>
+              <a:rPr lang="en-US" dirty="0"/>
+              <a:t> (in support of theme xxx)</a:t>
+            </a:r>
           </a:p>
         </p:txBody>
       </p:sp>
     </p:spTree>
     <p:extLst>
       <p:ext uri="{BB962C8B-B14F-4D97-AF65-F5344CB8AC3E}">
-        <p14:creationId xmlns:p14="http://schemas.microsoft.com/office/powerpoint/2010/main" val="2003776068"/>
+        <p14:creationId xmlns:p14="http://schemas.microsoft.com/office/powerpoint/2010/main" val="1714517199"/>
       </p:ext>
     </p:extLst>
   </p:cSld>
@@ -5730,6 +6260,73 @@
 </file>
 
 <file path=ppt/slides/slide12.xml><?xml version="1.0" encoding="utf-8"?>
+<p:sld xmlns:a="http://schemas.openxmlformats.org/drawingml/2006/main" xmlns:r="http://schemas.openxmlformats.org/officeDocument/2006/relationships" xmlns:p="http://schemas.openxmlformats.org/presentationml/2006/main">
+  <p:cSld>
+    <p:spTree>
+      <p:nvGrpSpPr>
+        <p:cNvPr id="1" name=""/>
+        <p:cNvGrpSpPr/>
+        <p:nvPr/>
+      </p:nvGrpSpPr>
+      <p:grpSpPr>
+        <a:xfrm>
+          <a:off x="0" y="0"/>
+          <a:ext cx="0" cy="0"/>
+          <a:chOff x="0" y="0"/>
+          <a:chExt cx="0" cy="0"/>
+        </a:xfrm>
+      </p:grpSpPr>
+      <p:sp>
+        <p:nvSpPr>
+          <p:cNvPr id="2" name="Text Placeholder 1">
+            <a:extLst>
+              <a:ext uri="{FF2B5EF4-FFF2-40B4-BE49-F238E27FC236}">
+                <a16:creationId xmlns:a16="http://schemas.microsoft.com/office/drawing/2014/main" id="{ADB2E00A-906F-6645-9A30-53C6D93DC43C}"/>
+              </a:ext>
+            </a:extLst>
+          </p:cNvPr>
+          <p:cNvSpPr>
+            <a:spLocks noGrp="1"/>
+          </p:cNvSpPr>
+          <p:nvPr>
+            <p:ph type="body" idx="1"/>
+          </p:nvPr>
+        </p:nvSpPr>
+        <p:spPr/>
+        <p:txBody>
+          <a:bodyPr/>
+          <a:lstStyle/>
+          <a:p>
+            <a:r>
+              <a:rPr lang="en-US" dirty="0"/>
+              <a:t>CLI Squad Focus</a:t>
+            </a:r>
+          </a:p>
+          <a:p>
+            <a:r>
+              <a:rPr lang="en-US" sz="2000" dirty="0"/>
+              <a:t>Mike Bauer (Squad Lead)</a:t>
+            </a:r>
+          </a:p>
+        </p:txBody>
+      </p:sp>
+    </p:spTree>
+    <p:extLst>
+      <p:ext uri="{BB962C8B-B14F-4D97-AF65-F5344CB8AC3E}">
+        <p14:creationId xmlns:p14="http://schemas.microsoft.com/office/powerpoint/2010/main" val="3971072508"/>
+      </p:ext>
+    </p:extLst>
+  </p:cSld>
+  <p:clrMapOvr>
+    <a:masterClrMapping/>
+  </p:clrMapOvr>
+  <p:transition spd="med">
+    <p:fade/>
+  </p:transition>
+</p:sld>
+</file>
+
+<file path=ppt/slides/slide13.xml><?xml version="1.0" encoding="utf-8"?>
 <p:sld xmlns:a="http://schemas.openxmlformats.org/drawingml/2006/main" xmlns:r="http://schemas.openxmlformats.org/officeDocument/2006/relationships" xmlns:p="http://schemas.openxmlformats.org/presentationml/2006/main">
   <p:cSld>
     <p:spTree>
@@ -5769,7 +6366,7 @@
           <a:p>
             <a:r>
               <a:rPr lang="en-US" dirty="0"/>
-              <a:t>Feature 2</a:t>
+              <a:t>Dependencies</a:t>
             </a:r>
           </a:p>
         </p:txBody>
@@ -5800,38 +6397,19 @@
           <a:bodyPr/>
           <a:lstStyle/>
           <a:p>
-            <a:pPr marL="101600" indent="0">
-              <a:buNone/>
-            </a:pPr>
-            <a:r>
-              <a:rPr lang="en-US" dirty="0"/>
-              <a:t>Those leveraging </a:t>
-            </a:r>
-            <a:r>
-              <a:rPr lang="en-US" dirty="0" err="1"/>
-              <a:t>Zowe</a:t>
-            </a:r>
-            <a:r>
-              <a:rPr lang="en-US" dirty="0"/>
-              <a:t> client technologies can store all connection details and command option preferences in a single profile allowing for quick initial configuration and reduced effort when updating properties.</a:t>
-            </a:r>
-            <a:br>
-              <a:rPr lang="en-US" dirty="0"/>
-            </a:br>
-            <a:endParaRPr lang="en-US" b="1" dirty="0"/>
-          </a:p>
-          <a:p>
-            <a:pPr marL="101600" indent="0">
-              <a:buNone/>
-            </a:pPr>
-            <a:r>
-              <a:rPr lang="en-US" b="1" dirty="0"/>
-              <a:t>Deliverable: </a:t>
-            </a:r>
-            <a:r>
-              <a:rPr lang="en-US" dirty="0"/>
-              <a:t>Simplified profile management by allowing all profile options to be specified in a single base profile. This is an enhancement to the core CLI.</a:t>
-            </a:r>
+            <a:r>
+              <a:rPr lang="en-US" dirty="0"/>
+              <a:t>Cross Squad Dependencies 1</a:t>
+            </a:r>
+          </a:p>
+          <a:p>
+            <a:r>
+              <a:rPr lang="en-US" dirty="0"/>
+              <a:t>Cross Squad Dependencies 2</a:t>
+            </a:r>
+          </a:p>
+          <a:p>
+            <a:endParaRPr lang="en-US" dirty="0"/>
           </a:p>
           <a:p>
             <a:pPr marL="101600" indent="0">
@@ -5844,7 +6422,7 @@
     </p:spTree>
     <p:extLst>
       <p:ext uri="{BB962C8B-B14F-4D97-AF65-F5344CB8AC3E}">
-        <p14:creationId xmlns:p14="http://schemas.microsoft.com/office/powerpoint/2010/main" val="3854920584"/>
+        <p14:creationId xmlns:p14="http://schemas.microsoft.com/office/powerpoint/2010/main" val="2764869177"/>
       </p:ext>
     </p:extLst>
   </p:cSld>
@@ -5853,85 +6431,6 @@
   </p:clrMapOvr>
   <p:transition spd="med">
     <p:fade thruBlk="1"/>
-  </p:transition>
-</p:sld>
-</file>
-
-<file path=ppt/slides/slide13.xml><?xml version="1.0" encoding="utf-8"?>
-<p:sld xmlns:a="http://schemas.openxmlformats.org/drawingml/2006/main" xmlns:r="http://schemas.openxmlformats.org/officeDocument/2006/relationships" xmlns:p="http://schemas.openxmlformats.org/presentationml/2006/main">
-  <p:cSld>
-    <p:spTree>
-      <p:nvGrpSpPr>
-        <p:cNvPr id="1" name=""/>
-        <p:cNvGrpSpPr/>
-        <p:nvPr/>
-      </p:nvGrpSpPr>
-      <p:grpSpPr>
-        <a:xfrm>
-          <a:off x="0" y="0"/>
-          <a:ext cx="0" cy="0"/>
-          <a:chOff x="0" y="0"/>
-          <a:chExt cx="0" cy="0"/>
-        </a:xfrm>
-      </p:grpSpPr>
-      <p:sp>
-        <p:nvSpPr>
-          <p:cNvPr id="2" name="Text Placeholder 1">
-            <a:extLst>
-              <a:ext uri="{FF2B5EF4-FFF2-40B4-BE49-F238E27FC236}">
-                <a16:creationId xmlns:a16="http://schemas.microsoft.com/office/drawing/2014/main" id="{ADB2E00A-906F-6645-9A30-53C6D93DC43C}"/>
-              </a:ext>
-            </a:extLst>
-          </p:cNvPr>
-          <p:cNvSpPr>
-            <a:spLocks noGrp="1"/>
-          </p:cNvSpPr>
-          <p:nvPr>
-            <p:ph type="body" idx="1"/>
-          </p:nvPr>
-        </p:nvSpPr>
-        <p:spPr/>
-        <p:txBody>
-          <a:bodyPr/>
-          <a:lstStyle/>
-          <a:p>
-            <a:r>
-              <a:rPr lang="en-US" dirty="0" err="1"/>
-              <a:t>Zowe</a:t>
-            </a:r>
-            <a:r>
-              <a:rPr lang="en-US" dirty="0"/>
-              <a:t> Explorer Squad Focus</a:t>
-            </a:r>
-          </a:p>
-          <a:p>
-            <a:r>
-              <a:rPr lang="en-US" sz="2000" dirty="0"/>
-              <a:t>Fernando </a:t>
-            </a:r>
-            <a:r>
-              <a:rPr lang="en-US" sz="2000" dirty="0" err="1"/>
-              <a:t>Rijo</a:t>
-            </a:r>
-            <a:r>
-              <a:rPr lang="en-US" sz="2000" dirty="0"/>
-              <a:t> Cedeno (Squad Lead)</a:t>
-            </a:r>
-          </a:p>
-        </p:txBody>
-      </p:sp>
-    </p:spTree>
-    <p:extLst>
-      <p:ext uri="{BB962C8B-B14F-4D97-AF65-F5344CB8AC3E}">
-        <p14:creationId xmlns:p14="http://schemas.microsoft.com/office/powerpoint/2010/main" val="3410406107"/>
-      </p:ext>
-    </p:extLst>
-  </p:cSld>
-  <p:clrMapOvr>
-    <a:masterClrMapping/>
-  </p:clrMapOvr>
-  <p:transition spd="med">
-    <p:fade/>
   </p:transition>
 </p:sld>
 </file>
@@ -5976,7 +6475,7 @@
           <a:p>
             <a:r>
               <a:rPr lang="en-US" dirty="0"/>
-              <a:t>Features</a:t>
+              <a:t>Feature 1</a:t>
             </a:r>
           </a:p>
         </p:txBody>
@@ -5999,17 +6498,20 @@
         </p:nvSpPr>
         <p:spPr>
           <a:xfrm>
-            <a:off x="317500" y="943428"/>
-            <a:ext cx="8369400" cy="3742871"/>
+            <a:off x="306211" y="774096"/>
+            <a:ext cx="8369400" cy="4147860"/>
           </a:xfrm>
         </p:spPr>
         <p:txBody>
           <a:bodyPr/>
           <a:lstStyle/>
           <a:p>
-            <a:r>
-              <a:rPr lang="en-US" dirty="0"/>
-              <a:t>Define and develop a set of conformance guidelines to be consumed by extenders of the </a:t>
+            <a:pPr marL="101600" indent="0">
+              <a:buNone/>
+            </a:pPr>
+            <a:r>
+              <a:rPr lang="en-US" dirty="0"/>
+              <a:t>Application developers and those developing scripts to drive interaction with z/OS can easily learn about, access, and leverage </a:t>
             </a:r>
             <a:r>
               <a:rPr lang="en-US" dirty="0" err="1"/>
@@ -6017,21 +6519,23 @@
             </a:r>
             <a:r>
               <a:rPr lang="en-US" dirty="0"/>
-              <a:t> Explorer. </a:t>
-            </a:r>
-            <a:r>
-              <a:rPr lang="en-US" dirty="0">
-                <a:hlinkClick r:id="rId2"/>
-              </a:rPr>
-              <a:t>#837</a:t>
-            </a:r>
-            <a:endParaRPr lang="en-US" dirty="0"/>
-          </a:p>
-          <a:p>
-            <a:pPr lvl="1"/>
-            <a:r>
-              <a:rPr lang="en-US" dirty="0"/>
-              <a:t>To deliver standardized guidelines that Extenders of the </a:t>
+              <a:t> SDKs to implement an initial use case.</a:t>
+            </a:r>
+          </a:p>
+          <a:p>
+            <a:pPr marL="101600" indent="0">
+              <a:buNone/>
+            </a:pPr>
+            <a:br>
+              <a:rPr lang="en-US" u="sng" dirty="0"/>
+            </a:br>
+            <a:r>
+              <a:rPr lang="en-US" b="1" dirty="0"/>
+              <a:t>Deliverables: </a:t>
+            </a:r>
+            <a:r>
+              <a:rPr lang="en-US" dirty="0"/>
+              <a:t>Documentation is published on our </a:t>
             </a:r>
             <a:r>
               <a:rPr lang="en-US" dirty="0" err="1"/>
@@ -6039,7 +6543,17 @@
             </a:r>
             <a:r>
               <a:rPr lang="en-US" dirty="0"/>
-              <a:t> Explorer can follow in order to leverage and grow the </a:t>
+              <a:t> Docs site covering the overview and use of the SDKs as well as documenting how the community can contribute to the technology. In addition, detailed samples that leverage the SDKs are provided within each repository.</a:t>
+            </a:r>
+            <a:br>
+              <a:rPr lang="en-US" dirty="0"/>
+            </a:br>
+            <a:br>
+              <a:rPr lang="en-US" dirty="0"/>
+            </a:br>
+            <a:r>
+              <a:rPr lang="en-US" dirty="0"/>
+              <a:t>To further drive visibility and adoption, the </a:t>
             </a:r>
             <a:r>
               <a:rPr lang="en-US" dirty="0" err="1"/>
@@ -6047,17 +6561,15 @@
             </a:r>
             <a:r>
               <a:rPr lang="en-US" dirty="0"/>
-              <a:t> ecosystem</a:t>
-            </a:r>
-            <a:br>
-              <a:rPr lang="en-US" dirty="0"/>
-            </a:br>
-            <a:endParaRPr lang="en-US" dirty="0"/>
-          </a:p>
-          <a:p>
-            <a:r>
-              <a:rPr lang="en-US" dirty="0"/>
-              <a:t>Leverage the </a:t>
+              <a:t> Node SDK is published to public </a:t>
+            </a:r>
+            <a:r>
+              <a:rPr lang="en-US" dirty="0" err="1"/>
+              <a:t>npm</a:t>
+            </a:r>
+            <a:r>
+              <a:rPr lang="en-US" dirty="0"/>
+              <a:t> separate from the </a:t>
             </a:r>
             <a:r>
               <a:rPr lang="en-US" dirty="0" err="1"/>
@@ -6065,27 +6577,8 @@
             </a:r>
             <a:r>
               <a:rPr lang="en-US" dirty="0"/>
-              <a:t> CLI security enhancements around MFA and SSO for an improved security experience in the </a:t>
-            </a:r>
-            <a:r>
-              <a:rPr lang="en-US" dirty="0" err="1"/>
-              <a:t>Zowe</a:t>
-            </a:r>
-            <a:r>
-              <a:rPr lang="en-US" dirty="0"/>
-              <a:t> Explorer.</a:t>
-            </a:r>
-          </a:p>
-          <a:p>
-            <a:pPr lvl="1"/>
-            <a:r>
-              <a:rPr lang="en-US" dirty="0"/>
-              <a:t>To increase user confidence knowing that the extension implements best security practices in order to remain compliant with corporate policies.</a:t>
-            </a:r>
-            <a:br>
-              <a:rPr lang="en-US" dirty="0"/>
-            </a:br>
-            <a:endParaRPr lang="en-US" dirty="0"/>
+              <a:t> CLI.</a:t>
+            </a:r>
           </a:p>
           <a:p>
             <a:pPr marL="101600" indent="0">
@@ -6098,7 +6591,7 @@
     </p:spTree>
     <p:extLst>
       <p:ext uri="{BB962C8B-B14F-4D97-AF65-F5344CB8AC3E}">
-        <p14:creationId xmlns:p14="http://schemas.microsoft.com/office/powerpoint/2010/main" val="183851054"/>
+        <p14:creationId xmlns:p14="http://schemas.microsoft.com/office/powerpoint/2010/main" val="2003776068"/>
       </p:ext>
     </p:extLst>
   </p:cSld>
@@ -6151,7 +6644,7 @@
           <a:p>
             <a:r>
               <a:rPr lang="en-US" dirty="0"/>
-              <a:t>Features</a:t>
+              <a:t>Feature 2</a:t>
             </a:r>
           </a:p>
         </p:txBody>
@@ -6174,17 +6667,20 @@
         </p:nvSpPr>
         <p:spPr>
           <a:xfrm>
-            <a:off x="317500" y="943428"/>
-            <a:ext cx="8369400" cy="3963005"/>
+            <a:off x="306211" y="774096"/>
+            <a:ext cx="8369400" cy="4147860"/>
           </a:xfrm>
         </p:spPr>
         <p:txBody>
           <a:bodyPr/>
           <a:lstStyle/>
           <a:p>
-            <a:r>
-              <a:rPr lang="en-US" dirty="0"/>
-              <a:t>Enhance the profile management user experience of </a:t>
+            <a:pPr marL="101600" indent="0">
+              <a:buNone/>
+            </a:pPr>
+            <a:r>
+              <a:rPr lang="en-US" dirty="0"/>
+              <a:t>Those leveraging </a:t>
             </a:r>
             <a:r>
               <a:rPr lang="en-US" dirty="0" err="1"/>
@@ -6192,115 +6688,30 @@
             </a:r>
             <a:r>
               <a:rPr lang="en-US" dirty="0"/>
-              <a:t> Explorer (for new and regular users) (</a:t>
-            </a:r>
-            <a:r>
-              <a:rPr lang="en-US" dirty="0">
-                <a:hlinkClick r:id="rId2"/>
-              </a:rPr>
-              <a:t>Epic</a:t>
-            </a:r>
-            <a:r>
-              <a:rPr lang="en-US" dirty="0"/>
-              <a:t>) (</a:t>
-            </a:r>
-            <a:r>
-              <a:rPr lang="en-US" dirty="0">
-                <a:hlinkClick r:id="rId3"/>
-              </a:rPr>
-              <a:t>Issues</a:t>
-            </a:r>
-            <a:r>
-              <a:rPr lang="en-US" dirty="0"/>
-              <a:t>)</a:t>
-            </a:r>
-          </a:p>
-          <a:p>
-            <a:pPr lvl="1"/>
-            <a:r>
-              <a:rPr lang="en-US" dirty="0"/>
-              <a:t>To deliver a greater experience when configuring and managing connection details by addressing community related issues around profiles.</a:t>
+              <a:t> client technologies can store all connection details and command option preferences in a single profile allowing for quick initial configuration and reduced effort when updating properties.</a:t>
             </a:r>
             <a:br>
               <a:rPr lang="en-US" dirty="0"/>
             </a:br>
-            <a:endParaRPr lang="en-US" dirty="0"/>
-          </a:p>
-          <a:p>
-            <a:r>
-              <a:rPr lang="en-US" dirty="0"/>
-              <a:t>Enhance the z/OS Unix user experience of </a:t>
-            </a:r>
-            <a:r>
-              <a:rPr lang="en-US" dirty="0" err="1"/>
-              <a:t>Zowe</a:t>
-            </a:r>
-            <a:r>
-              <a:rPr lang="en-US" dirty="0"/>
-              <a:t> Explorer (</a:t>
-            </a:r>
-            <a:r>
-              <a:rPr lang="en-US" dirty="0">
-                <a:hlinkClick r:id="rId4"/>
-              </a:rPr>
-              <a:t>Epic</a:t>
-            </a:r>
-            <a:r>
-              <a:rPr lang="en-US" dirty="0"/>
-              <a:t>) (</a:t>
-            </a:r>
-            <a:r>
-              <a:rPr lang="en-US" dirty="0">
-                <a:hlinkClick r:id="rId5"/>
-              </a:rPr>
-              <a:t>Issues</a:t>
-            </a:r>
-            <a:r>
-              <a:rPr lang="en-US" dirty="0"/>
-              <a:t>)</a:t>
-            </a:r>
-          </a:p>
-          <a:p>
-            <a:pPr lvl="1"/>
-            <a:r>
-              <a:rPr lang="en-US" dirty="0"/>
-              <a:t>To deliver a greater experience when working with z/OS Unix by addressing community related issues.</a:t>
-            </a:r>
-          </a:p>
-          <a:p>
-            <a:pPr lvl="1"/>
-            <a:endParaRPr lang="en-US" dirty="0"/>
-          </a:p>
-          <a:p>
-            <a:r>
-              <a:rPr lang="en-US" dirty="0"/>
-              <a:t>Enhance the Dataset manipulation user experience of the </a:t>
-            </a:r>
-            <a:r>
-              <a:rPr lang="en-US" dirty="0" err="1"/>
-              <a:t>Zowe</a:t>
-            </a:r>
-            <a:r>
-              <a:rPr lang="en-US" dirty="0"/>
-              <a:t> Explorer</a:t>
-            </a:r>
-          </a:p>
-          <a:p>
-            <a:pPr lvl="1"/>
-            <a:r>
-              <a:rPr lang="en-US" dirty="0"/>
-              <a:t>To deliver a customized experience for creating datasets so that users can </a:t>
-            </a:r>
-            <a:r>
-              <a:rPr lang="en-US"/>
-              <a:t>specify desired allocation details.</a:t>
-            </a:r>
-            <a:endParaRPr lang="en-US" dirty="0"/>
-          </a:p>
-          <a:p>
-            <a:endParaRPr lang="en-US" dirty="0"/>
-          </a:p>
-          <a:p>
+            <a:endParaRPr lang="en-US" b="1" dirty="0"/>
+          </a:p>
+          <a:p>
+            <a:pPr marL="101600" indent="0">
+              <a:buNone/>
+            </a:pPr>
+            <a:r>
+              <a:rPr lang="en-US" b="1" dirty="0"/>
+              <a:t>Deliverable: </a:t>
+            </a:r>
+            <a:r>
+              <a:rPr lang="en-US" dirty="0"/>
+              <a:t>Simplified profile management by allowing all profile options to be specified in a single base profile. This is an enhancement to the core CLI.</a:t>
+            </a:r>
+          </a:p>
+          <a:p>
+            <a:pPr marL="101600" indent="0">
+              <a:buNone/>
+            </a:pPr>
             <a:endParaRPr lang="en-US" dirty="0"/>
           </a:p>
         </p:txBody>
@@ -6308,7 +6719,7 @@
     </p:spTree>
     <p:extLst>
       <p:ext uri="{BB962C8B-B14F-4D97-AF65-F5344CB8AC3E}">
-        <p14:creationId xmlns:p14="http://schemas.microsoft.com/office/powerpoint/2010/main" val="1367409270"/>
+        <p14:creationId xmlns:p14="http://schemas.microsoft.com/office/powerpoint/2010/main" val="3854920584"/>
       </p:ext>
     </p:extLst>
   </p:cSld>
@@ -6360,14 +6771,26 @@
           <a:lstStyle/>
           <a:p>
             <a:r>
-              <a:rPr lang="en-US" dirty="0"/>
-              <a:t>Onboarding Squad Focus</a:t>
+              <a:rPr lang="en-US" dirty="0" err="1"/>
+              <a:t>Zowe</a:t>
+            </a:r>
+            <a:r>
+              <a:rPr lang="en-US" dirty="0"/>
+              <a:t> Explorer Squad Focus</a:t>
             </a:r>
           </a:p>
           <a:p>
             <a:r>
               <a:rPr lang="en-US" sz="2000" dirty="0"/>
-              <a:t>Rose?? Joe W? (Squad Lead??)</a:t>
+              <a:t>Fernando </a:t>
+            </a:r>
+            <a:r>
+              <a:rPr lang="en-US" sz="2000" dirty="0" err="1"/>
+              <a:t>Rijo</a:t>
+            </a:r>
+            <a:r>
+              <a:rPr lang="en-US" sz="2000" dirty="0"/>
+              <a:t> Cedeno (Squad Lead)</a:t>
             </a:r>
           </a:p>
         </p:txBody>
@@ -6375,7 +6798,7 @@
     </p:spTree>
     <p:extLst>
       <p:ext uri="{BB962C8B-B14F-4D97-AF65-F5344CB8AC3E}">
-        <p14:creationId xmlns:p14="http://schemas.microsoft.com/office/powerpoint/2010/main" val="322818001"/>
+        <p14:creationId xmlns:p14="http://schemas.microsoft.com/office/powerpoint/2010/main" val="3410406107"/>
       </p:ext>
     </p:extLst>
   </p:cSld>
@@ -6428,7 +6851,7 @@
           <a:p>
             <a:r>
               <a:rPr lang="en-US" dirty="0"/>
-              <a:t>Focus</a:t>
+              <a:t>Dependencies</a:t>
             </a:r>
           </a:p>
         </p:txBody>
@@ -6449,19 +6872,34 @@
             <p:ph type="body" idx="1"/>
           </p:nvPr>
         </p:nvSpPr>
-        <p:spPr/>
+        <p:spPr>
+          <a:xfrm>
+            <a:off x="306211" y="774096"/>
+            <a:ext cx="8369400" cy="4147860"/>
+          </a:xfrm>
+        </p:spPr>
         <p:txBody>
           <a:bodyPr/>
           <a:lstStyle/>
           <a:p>
             <a:r>
               <a:rPr lang="en-US" dirty="0"/>
-              <a:t>Focus </a:t>
-            </a:r>
-            <a:r>
-              <a:rPr lang="en-US" dirty="0" err="1"/>
-              <a:t>xxxx</a:t>
-            </a:r>
+              <a:t>Cross Squad Dependencies 1</a:t>
+            </a:r>
+          </a:p>
+          <a:p>
+            <a:r>
+              <a:rPr lang="en-US" dirty="0"/>
+              <a:t>Cross Squad Dependencies 2</a:t>
+            </a:r>
+          </a:p>
+          <a:p>
+            <a:endParaRPr lang="en-US" dirty="0"/>
+          </a:p>
+          <a:p>
+            <a:pPr marL="101600" indent="0">
+              <a:buNone/>
+            </a:pPr>
             <a:endParaRPr lang="en-US" dirty="0"/>
           </a:p>
         </p:txBody>
@@ -6469,7 +6907,7 @@
     </p:spTree>
     <p:extLst>
       <p:ext uri="{BB962C8B-B14F-4D97-AF65-F5344CB8AC3E}">
-        <p14:creationId xmlns:p14="http://schemas.microsoft.com/office/powerpoint/2010/main" val="2827431278"/>
+        <p14:creationId xmlns:p14="http://schemas.microsoft.com/office/powerpoint/2010/main" val="2060212065"/>
       </p:ext>
     </p:extLst>
   </p:cSld>
@@ -6522,7 +6960,7 @@
           <a:p>
             <a:r>
               <a:rPr lang="en-US" dirty="0"/>
-              <a:t>Focus</a:t>
+              <a:t>Features</a:t>
             </a:r>
           </a:p>
         </p:txBody>
@@ -6546,7 +6984,7 @@
         <p:spPr>
           <a:xfrm>
             <a:off x="317500" y="943428"/>
-            <a:ext cx="8369400" cy="4085772"/>
+            <a:ext cx="8369400" cy="3742871"/>
           </a:xfrm>
         </p:spPr>
         <p:txBody>
@@ -6555,78 +6993,88 @@
           <a:p>
             <a:r>
               <a:rPr lang="en-US" dirty="0"/>
-              <a:t>Further Conformance Process Maturity</a:t>
-            </a:r>
+              <a:t>Define and develop a set of conformance guidelines to be consumed by extenders of the </a:t>
+            </a:r>
+            <a:r>
+              <a:rPr lang="en-US" dirty="0" err="1"/>
+              <a:t>Zowe</a:t>
+            </a:r>
+            <a:r>
+              <a:rPr lang="en-US" dirty="0"/>
+              <a:t> Explorer. </a:t>
+            </a:r>
+            <a:r>
+              <a:rPr lang="en-US" dirty="0">
+                <a:hlinkClick r:id="rId2"/>
+              </a:rPr>
+              <a:t>#837</a:t>
+            </a:r>
+            <a:endParaRPr lang="en-US" dirty="0"/>
           </a:p>
           <a:p>
             <a:pPr lvl="1"/>
             <a:r>
               <a:rPr lang="en-US" dirty="0"/>
-              <a:t>Active LTS conformance test criteria updates / incremental badging / app-store-like landscape page</a:t>
+              <a:t>To deliver standardized guidelines that Extenders of the </a:t>
+            </a:r>
+            <a:r>
+              <a:rPr lang="en-US" dirty="0" err="1"/>
+              <a:t>Zowe</a:t>
+            </a:r>
+            <a:r>
+              <a:rPr lang="en-US" dirty="0"/>
+              <a:t> Explorer can follow in order to leverage and grow the </a:t>
+            </a:r>
+            <a:r>
+              <a:rPr lang="en-US" dirty="0" err="1"/>
+              <a:t>Zowe</a:t>
+            </a:r>
+            <a:r>
+              <a:rPr lang="en-US" dirty="0"/>
+              <a:t> ecosystem</a:t>
+            </a:r>
+            <a:br>
+              <a:rPr lang="en-US" dirty="0"/>
+            </a:br>
+            <a:endParaRPr lang="en-US" dirty="0"/>
+          </a:p>
+          <a:p>
+            <a:r>
+              <a:rPr lang="en-US" dirty="0"/>
+              <a:t>Leverage the </a:t>
+            </a:r>
+            <a:r>
+              <a:rPr lang="en-US" dirty="0" err="1"/>
+              <a:t>Zowe</a:t>
+            </a:r>
+            <a:r>
+              <a:rPr lang="en-US" dirty="0"/>
+              <a:t> CLI security enhancements around MFA and SSO for an improved security experience in the </a:t>
+            </a:r>
+            <a:r>
+              <a:rPr lang="en-US" dirty="0" err="1"/>
+              <a:t>Zowe</a:t>
+            </a:r>
+            <a:r>
+              <a:rPr lang="en-US" dirty="0"/>
+              <a:t> Explorer.</a:t>
             </a:r>
           </a:p>
           <a:p>
             <a:pPr lvl="1"/>
             <a:r>
               <a:rPr lang="en-US" dirty="0"/>
-              <a:t>Active LTS conformance change requests (test criteria &amp; submitter form)</a:t>
-            </a:r>
-          </a:p>
-          <a:p>
-            <a:r>
-              <a:rPr lang="en-US" dirty="0"/>
-              <a:t>Increase focus on Outreach</a:t>
-            </a:r>
-          </a:p>
-          <a:p>
-            <a:pPr lvl="1"/>
-            <a:r>
-              <a:rPr lang="en-US" dirty="0"/>
-              <a:t>Webinars &amp; Marketing</a:t>
-            </a:r>
-          </a:p>
-          <a:p>
-            <a:r>
-              <a:rPr lang="en-US" dirty="0"/>
-              <a:t>Improve Onboarding experience</a:t>
-            </a:r>
-          </a:p>
-          <a:p>
-            <a:pPr lvl="1"/>
-            <a:r>
-              <a:rPr lang="en-US" dirty="0"/>
-              <a:t>Improve/influence Zowe.org website navigation</a:t>
-            </a:r>
-          </a:p>
-          <a:p>
-            <a:pPr lvl="1"/>
-            <a:r>
-              <a:rPr lang="en-US" dirty="0"/>
-              <a:t>Accurately “direct” new-to-Zowe visitors</a:t>
-            </a:r>
-          </a:p>
-          <a:p>
-            <a:r>
-              <a:rPr lang="en-US" dirty="0"/>
-              <a:t>Continue and transition stat reporting (KPI-centric)</a:t>
-            </a:r>
-          </a:p>
-          <a:p>
-            <a:pPr lvl="1"/>
-            <a:r>
-              <a:rPr lang="en-US" dirty="0"/>
-              <a:t>Identify trends &amp; influencers</a:t>
-            </a:r>
-          </a:p>
-          <a:p>
-            <a:pPr lvl="1"/>
-            <a:r>
-              <a:rPr lang="en-US" dirty="0"/>
-              <a:t>Easy prep for all Zowe Communications</a:t>
-            </a:r>
-          </a:p>
-          <a:p>
-            <a:pPr lvl="1"/>
+              <a:t>To increase user confidence knowing that the extension implements best security practices in order to remain compliant with corporate policies.</a:t>
+            </a:r>
+            <a:br>
+              <a:rPr lang="en-US" dirty="0"/>
+            </a:br>
+            <a:endParaRPr lang="en-US" dirty="0"/>
+          </a:p>
+          <a:p>
+            <a:pPr marL="101600" indent="0">
+              <a:buNone/>
+            </a:pPr>
             <a:endParaRPr lang="en-US" dirty="0"/>
           </a:p>
         </p:txBody>
@@ -6634,7 +7082,7 @@
     </p:spTree>
     <p:extLst>
       <p:ext uri="{BB962C8B-B14F-4D97-AF65-F5344CB8AC3E}">
-        <p14:creationId xmlns:p14="http://schemas.microsoft.com/office/powerpoint/2010/main" val="345901736"/>
+        <p14:creationId xmlns:p14="http://schemas.microsoft.com/office/powerpoint/2010/main" val="183851054"/>
       </p:ext>
     </p:extLst>
   </p:cSld>
@@ -6666,10 +7114,38 @@
       </p:grpSpPr>
       <p:sp>
         <p:nvSpPr>
-          <p:cNvPr id="2" name="Text Placeholder 1">
+          <p:cNvPr id="3" name="Title 2">
             <a:extLst>
               <a:ext uri="{FF2B5EF4-FFF2-40B4-BE49-F238E27FC236}">
-                <a16:creationId xmlns:a16="http://schemas.microsoft.com/office/drawing/2014/main" id="{ADB2E00A-906F-6645-9A30-53C6D93DC43C}"/>
+                <a16:creationId xmlns:a16="http://schemas.microsoft.com/office/drawing/2014/main" id="{CFEEEE36-E132-0D40-A4B8-9BDC5C8B6528}"/>
+              </a:ext>
+            </a:extLst>
+          </p:cNvPr>
+          <p:cNvSpPr>
+            <a:spLocks noGrp="1"/>
+          </p:cNvSpPr>
+          <p:nvPr>
+            <p:ph type="title"/>
+          </p:nvPr>
+        </p:nvSpPr>
+        <p:spPr/>
+        <p:txBody>
+          <a:bodyPr/>
+          <a:lstStyle/>
+          <a:p>
+            <a:r>
+              <a:rPr lang="en-US" dirty="0"/>
+              <a:t>Features</a:t>
+            </a:r>
+          </a:p>
+        </p:txBody>
+      </p:sp>
+      <p:sp>
+        <p:nvSpPr>
+          <p:cNvPr id="4" name="Text Placeholder 3">
+            <a:extLst>
+              <a:ext uri="{FF2B5EF4-FFF2-40B4-BE49-F238E27FC236}">
+                <a16:creationId xmlns:a16="http://schemas.microsoft.com/office/drawing/2014/main" id="{C0DB4ECB-A7D5-6B47-8180-75CB3C3DB7DE}"/>
               </a:ext>
             </a:extLst>
           </p:cNvPr>
@@ -6680,46 +7156,143 @@
             <p:ph type="body" idx="1"/>
           </p:nvPr>
         </p:nvSpPr>
-        <p:spPr/>
+        <p:spPr>
+          <a:xfrm>
+            <a:off x="317500" y="943428"/>
+            <a:ext cx="8369400" cy="3963005"/>
+          </a:xfrm>
+        </p:spPr>
         <p:txBody>
           <a:bodyPr/>
           <a:lstStyle/>
           <a:p>
             <a:r>
               <a:rPr lang="en-US" dirty="0"/>
-              <a:t>Systems Squad Focus</a:t>
-            </a:r>
-          </a:p>
-          <a:p>
-            <a:r>
-              <a:rPr lang="en-US" sz="2000" dirty="0"/>
-              <a:t>Mark </a:t>
-            </a:r>
-            <a:r>
-              <a:rPr lang="en-US" sz="2000" dirty="0" err="1"/>
-              <a:t>Ackert</a:t>
-            </a:r>
-            <a:r>
-              <a:rPr lang="en-US" sz="2000" dirty="0"/>
-              <a:t> (Squad Lead)</a:t>
-            </a:r>
-          </a:p>
-          <a:p>
-            <a:r>
-              <a:rPr lang="en-US" sz="2000" dirty="0" err="1"/>
-              <a:t>f.k.a</a:t>
-            </a:r>
-            <a:r>
-              <a:rPr lang="en-US" sz="2000" dirty="0"/>
-              <a:t>. CI/CD Squad</a:t>
-            </a:r>
+              <a:t>Enhance the profile management user experience of </a:t>
+            </a:r>
+            <a:r>
+              <a:rPr lang="en-US" dirty="0" err="1"/>
+              <a:t>Zowe</a:t>
+            </a:r>
+            <a:r>
+              <a:rPr lang="en-US" dirty="0"/>
+              <a:t> Explorer (for new and regular users) (</a:t>
+            </a:r>
+            <a:r>
+              <a:rPr lang="en-US" dirty="0">
+                <a:hlinkClick r:id="rId2"/>
+              </a:rPr>
+              <a:t>Epic</a:t>
+            </a:r>
+            <a:r>
+              <a:rPr lang="en-US" dirty="0"/>
+              <a:t>) (</a:t>
+            </a:r>
+            <a:r>
+              <a:rPr lang="en-US" dirty="0">
+                <a:hlinkClick r:id="rId3"/>
+              </a:rPr>
+              <a:t>Issues</a:t>
+            </a:r>
+            <a:r>
+              <a:rPr lang="en-US" dirty="0"/>
+              <a:t>)</a:t>
+            </a:r>
+          </a:p>
+          <a:p>
+            <a:pPr lvl="1"/>
+            <a:r>
+              <a:rPr lang="en-US" dirty="0"/>
+              <a:t>To deliver a greater experience when configuring and managing connection details by addressing community related issues around profiles.</a:t>
+            </a:r>
+            <a:br>
+              <a:rPr lang="en-US" dirty="0"/>
+            </a:br>
+            <a:endParaRPr lang="en-US" dirty="0"/>
+          </a:p>
+          <a:p>
+            <a:r>
+              <a:rPr lang="en-US" dirty="0"/>
+              <a:t>Enhance the z/OS Unix user experience of </a:t>
+            </a:r>
+            <a:r>
+              <a:rPr lang="en-US" dirty="0" err="1"/>
+              <a:t>Zowe</a:t>
+            </a:r>
+            <a:r>
+              <a:rPr lang="en-US" dirty="0"/>
+              <a:t> Explorer (</a:t>
+            </a:r>
+            <a:r>
+              <a:rPr lang="en-US" dirty="0">
+                <a:hlinkClick r:id="rId4"/>
+              </a:rPr>
+              <a:t>Epic</a:t>
+            </a:r>
+            <a:r>
+              <a:rPr lang="en-US" dirty="0"/>
+              <a:t>) (</a:t>
+            </a:r>
+            <a:r>
+              <a:rPr lang="en-US" dirty="0">
+                <a:hlinkClick r:id="rId5"/>
+              </a:rPr>
+              <a:t>Issues</a:t>
+            </a:r>
+            <a:r>
+              <a:rPr lang="en-US" dirty="0"/>
+              <a:t>)</a:t>
+            </a:r>
+          </a:p>
+          <a:p>
+            <a:pPr lvl="1"/>
+            <a:r>
+              <a:rPr lang="en-US" dirty="0"/>
+              <a:t>To deliver a greater experience when working with z/OS Unix by addressing community related issues.</a:t>
+            </a:r>
+          </a:p>
+          <a:p>
+            <a:pPr lvl="1"/>
+            <a:endParaRPr lang="en-US" dirty="0"/>
+          </a:p>
+          <a:p>
+            <a:r>
+              <a:rPr lang="en-US" dirty="0"/>
+              <a:t>Enhance the Dataset manipulation user experience of the </a:t>
+            </a:r>
+            <a:r>
+              <a:rPr lang="en-US" dirty="0" err="1"/>
+              <a:t>Zowe</a:t>
+            </a:r>
+            <a:r>
+              <a:rPr lang="en-US" dirty="0"/>
+              <a:t> Explorer</a:t>
+            </a:r>
+          </a:p>
+          <a:p>
+            <a:pPr lvl="1"/>
+            <a:r>
+              <a:rPr lang="en-US" dirty="0"/>
+              <a:t>To deliver a customized experience for creating datasets so that users can </a:t>
+            </a:r>
+            <a:r>
+              <a:rPr lang="en-US"/>
+              <a:t>specify desired allocation details.</a:t>
+            </a:r>
+            <a:endParaRPr lang="en-US" dirty="0"/>
+          </a:p>
+          <a:p>
+            <a:endParaRPr lang="en-US" dirty="0"/>
+          </a:p>
+          <a:p>
+            <a:endParaRPr lang="en-US" dirty="0"/>
           </a:p>
         </p:txBody>
       </p:sp>
     </p:spTree>
     <p:extLst>
       <p:ext uri="{BB962C8B-B14F-4D97-AF65-F5344CB8AC3E}">
-        <p14:creationId xmlns:p14="http://schemas.microsoft.com/office/powerpoint/2010/main" val="2949732729"/>
+        <p14:creationId xmlns:p14="http://schemas.microsoft.com/office/powerpoint/2010/main" val="1367409270"/>
       </p:ext>
     </p:extLst>
   </p:cSld>
@@ -6727,7 +7300,7 @@
     <a:masterClrMapping/>
   </p:clrMapOvr>
   <p:transition spd="med">
-    <p:fade/>
+    <p:fade thruBlk="1"/>
   </p:transition>
 </p:sld>
 </file>
@@ -6880,6 +7453,182 @@
       </p:grpSpPr>
       <p:sp>
         <p:nvSpPr>
+          <p:cNvPr id="2" name="Text Placeholder 1">
+            <a:extLst>
+              <a:ext uri="{FF2B5EF4-FFF2-40B4-BE49-F238E27FC236}">
+                <a16:creationId xmlns:a16="http://schemas.microsoft.com/office/drawing/2014/main" id="{ADB2E00A-906F-6645-9A30-53C6D93DC43C}"/>
+              </a:ext>
+            </a:extLst>
+          </p:cNvPr>
+          <p:cNvSpPr>
+            <a:spLocks noGrp="1"/>
+          </p:cNvSpPr>
+          <p:nvPr>
+            <p:ph type="body" idx="1"/>
+          </p:nvPr>
+        </p:nvSpPr>
+        <p:spPr/>
+        <p:txBody>
+          <a:bodyPr/>
+          <a:lstStyle/>
+          <a:p>
+            <a:r>
+              <a:rPr lang="en-US" dirty="0"/>
+              <a:t>Onboarding Squad Focus</a:t>
+            </a:r>
+          </a:p>
+          <a:p>
+            <a:r>
+              <a:rPr lang="en-US" sz="2000" dirty="0"/>
+              <a:t>Rose?? Joe W? (Squad Lead??)</a:t>
+            </a:r>
+          </a:p>
+        </p:txBody>
+      </p:sp>
+    </p:spTree>
+    <p:extLst>
+      <p:ext uri="{BB962C8B-B14F-4D97-AF65-F5344CB8AC3E}">
+        <p14:creationId xmlns:p14="http://schemas.microsoft.com/office/powerpoint/2010/main" val="322818001"/>
+      </p:ext>
+    </p:extLst>
+  </p:cSld>
+  <p:clrMapOvr>
+    <a:masterClrMapping/>
+  </p:clrMapOvr>
+  <p:transition spd="med">
+    <p:fade/>
+  </p:transition>
+</p:sld>
+</file>
+
+<file path=ppt/slides/slide21.xml><?xml version="1.0" encoding="utf-8"?>
+<p:sld xmlns:a="http://schemas.openxmlformats.org/drawingml/2006/main" xmlns:r="http://schemas.openxmlformats.org/officeDocument/2006/relationships" xmlns:p="http://schemas.openxmlformats.org/presentationml/2006/main">
+  <p:cSld>
+    <p:spTree>
+      <p:nvGrpSpPr>
+        <p:cNvPr id="1" name=""/>
+        <p:cNvGrpSpPr/>
+        <p:nvPr/>
+      </p:nvGrpSpPr>
+      <p:grpSpPr>
+        <a:xfrm>
+          <a:off x="0" y="0"/>
+          <a:ext cx="0" cy="0"/>
+          <a:chOff x="0" y="0"/>
+          <a:chExt cx="0" cy="0"/>
+        </a:xfrm>
+      </p:grpSpPr>
+      <p:sp>
+        <p:nvSpPr>
+          <p:cNvPr id="3" name="Title 2">
+            <a:extLst>
+              <a:ext uri="{FF2B5EF4-FFF2-40B4-BE49-F238E27FC236}">
+                <a16:creationId xmlns:a16="http://schemas.microsoft.com/office/drawing/2014/main" id="{CFEEEE36-E132-0D40-A4B8-9BDC5C8B6528}"/>
+              </a:ext>
+            </a:extLst>
+          </p:cNvPr>
+          <p:cNvSpPr>
+            <a:spLocks noGrp="1"/>
+          </p:cNvSpPr>
+          <p:nvPr>
+            <p:ph type="title"/>
+          </p:nvPr>
+        </p:nvSpPr>
+        <p:spPr/>
+        <p:txBody>
+          <a:bodyPr/>
+          <a:lstStyle/>
+          <a:p>
+            <a:r>
+              <a:rPr lang="en-US" dirty="0"/>
+              <a:t>Dependencies</a:t>
+            </a:r>
+          </a:p>
+        </p:txBody>
+      </p:sp>
+      <p:sp>
+        <p:nvSpPr>
+          <p:cNvPr id="4" name="Text Placeholder 3">
+            <a:extLst>
+              <a:ext uri="{FF2B5EF4-FFF2-40B4-BE49-F238E27FC236}">
+                <a16:creationId xmlns:a16="http://schemas.microsoft.com/office/drawing/2014/main" id="{C0DB4ECB-A7D5-6B47-8180-75CB3C3DB7DE}"/>
+              </a:ext>
+            </a:extLst>
+          </p:cNvPr>
+          <p:cNvSpPr>
+            <a:spLocks noGrp="1"/>
+          </p:cNvSpPr>
+          <p:nvPr>
+            <p:ph type="body" idx="1"/>
+          </p:nvPr>
+        </p:nvSpPr>
+        <p:spPr>
+          <a:xfrm>
+            <a:off x="306211" y="774096"/>
+            <a:ext cx="8369400" cy="4147860"/>
+          </a:xfrm>
+        </p:spPr>
+        <p:txBody>
+          <a:bodyPr/>
+          <a:lstStyle/>
+          <a:p>
+            <a:r>
+              <a:rPr lang="en-US" dirty="0"/>
+              <a:t>Cross Squad Dependencies 1</a:t>
+            </a:r>
+          </a:p>
+          <a:p>
+            <a:r>
+              <a:rPr lang="en-US" dirty="0"/>
+              <a:t>Cross Squad Dependencies 2</a:t>
+            </a:r>
+          </a:p>
+          <a:p>
+            <a:endParaRPr lang="en-US" dirty="0"/>
+          </a:p>
+          <a:p>
+            <a:pPr marL="101600" indent="0">
+              <a:buNone/>
+            </a:pPr>
+            <a:endParaRPr lang="en-US" dirty="0"/>
+          </a:p>
+        </p:txBody>
+      </p:sp>
+    </p:spTree>
+    <p:extLst>
+      <p:ext uri="{BB962C8B-B14F-4D97-AF65-F5344CB8AC3E}">
+        <p14:creationId xmlns:p14="http://schemas.microsoft.com/office/powerpoint/2010/main" val="995374145"/>
+      </p:ext>
+    </p:extLst>
+  </p:cSld>
+  <p:clrMapOvr>
+    <a:masterClrMapping/>
+  </p:clrMapOvr>
+  <p:transition spd="med">
+    <p:fade thruBlk="1"/>
+  </p:transition>
+</p:sld>
+</file>
+
+<file path=ppt/slides/slide22.xml><?xml version="1.0" encoding="utf-8"?>
+<p:sld xmlns:a="http://schemas.openxmlformats.org/drawingml/2006/main" xmlns:r="http://schemas.openxmlformats.org/officeDocument/2006/relationships" xmlns:p="http://schemas.openxmlformats.org/presentationml/2006/main">
+  <p:cSld>
+    <p:spTree>
+      <p:nvGrpSpPr>
+        <p:cNvPr id="1" name=""/>
+        <p:cNvGrpSpPr/>
+        <p:nvPr/>
+      </p:nvGrpSpPr>
+      <p:grpSpPr>
+        <a:xfrm>
+          <a:off x="0" y="0"/>
+          <a:ext cx="0" cy="0"/>
+          <a:chOff x="0" y="0"/>
+          <a:chExt cx="0" cy="0"/>
+        </a:xfrm>
+      </p:grpSpPr>
+      <p:sp>
+        <p:nvSpPr>
           <p:cNvPr id="3" name="Title 2">
             <a:extLst>
               <a:ext uri="{FF2B5EF4-FFF2-40B4-BE49-F238E27FC236}">
@@ -6929,6 +7678,459 @@
           <a:p>
             <a:r>
               <a:rPr lang="en-US" dirty="0"/>
+              <a:t>Focus </a:t>
+            </a:r>
+            <a:r>
+              <a:rPr lang="en-US" dirty="0" err="1"/>
+              <a:t>xxxx</a:t>
+            </a:r>
+            <a:endParaRPr lang="en-US" dirty="0"/>
+          </a:p>
+        </p:txBody>
+      </p:sp>
+    </p:spTree>
+    <p:extLst>
+      <p:ext uri="{BB962C8B-B14F-4D97-AF65-F5344CB8AC3E}">
+        <p14:creationId xmlns:p14="http://schemas.microsoft.com/office/powerpoint/2010/main" val="2827431278"/>
+      </p:ext>
+    </p:extLst>
+  </p:cSld>
+  <p:clrMapOvr>
+    <a:masterClrMapping/>
+  </p:clrMapOvr>
+  <p:transition spd="med">
+    <p:fade thruBlk="1"/>
+  </p:transition>
+</p:sld>
+</file>
+
+<file path=ppt/slides/slide23.xml><?xml version="1.0" encoding="utf-8"?>
+<p:sld xmlns:a="http://schemas.openxmlformats.org/drawingml/2006/main" xmlns:r="http://schemas.openxmlformats.org/officeDocument/2006/relationships" xmlns:p="http://schemas.openxmlformats.org/presentationml/2006/main">
+  <p:cSld>
+    <p:spTree>
+      <p:nvGrpSpPr>
+        <p:cNvPr id="1" name=""/>
+        <p:cNvGrpSpPr/>
+        <p:nvPr/>
+      </p:nvGrpSpPr>
+      <p:grpSpPr>
+        <a:xfrm>
+          <a:off x="0" y="0"/>
+          <a:ext cx="0" cy="0"/>
+          <a:chOff x="0" y="0"/>
+          <a:chExt cx="0" cy="0"/>
+        </a:xfrm>
+      </p:grpSpPr>
+      <p:sp>
+        <p:nvSpPr>
+          <p:cNvPr id="3" name="Title 2">
+            <a:extLst>
+              <a:ext uri="{FF2B5EF4-FFF2-40B4-BE49-F238E27FC236}">
+                <a16:creationId xmlns:a16="http://schemas.microsoft.com/office/drawing/2014/main" id="{CFEEEE36-E132-0D40-A4B8-9BDC5C8B6528}"/>
+              </a:ext>
+            </a:extLst>
+          </p:cNvPr>
+          <p:cNvSpPr>
+            <a:spLocks noGrp="1"/>
+          </p:cNvSpPr>
+          <p:nvPr>
+            <p:ph type="title"/>
+          </p:nvPr>
+        </p:nvSpPr>
+        <p:spPr/>
+        <p:txBody>
+          <a:bodyPr/>
+          <a:lstStyle/>
+          <a:p>
+            <a:r>
+              <a:rPr lang="en-US" dirty="0"/>
+              <a:t>Focus</a:t>
+            </a:r>
+          </a:p>
+        </p:txBody>
+      </p:sp>
+      <p:sp>
+        <p:nvSpPr>
+          <p:cNvPr id="4" name="Text Placeholder 3">
+            <a:extLst>
+              <a:ext uri="{FF2B5EF4-FFF2-40B4-BE49-F238E27FC236}">
+                <a16:creationId xmlns:a16="http://schemas.microsoft.com/office/drawing/2014/main" id="{C0DB4ECB-A7D5-6B47-8180-75CB3C3DB7DE}"/>
+              </a:ext>
+            </a:extLst>
+          </p:cNvPr>
+          <p:cNvSpPr>
+            <a:spLocks noGrp="1"/>
+          </p:cNvSpPr>
+          <p:nvPr>
+            <p:ph type="body" idx="1"/>
+          </p:nvPr>
+        </p:nvSpPr>
+        <p:spPr>
+          <a:xfrm>
+            <a:off x="317500" y="943428"/>
+            <a:ext cx="8369400" cy="4085772"/>
+          </a:xfrm>
+        </p:spPr>
+        <p:txBody>
+          <a:bodyPr/>
+          <a:lstStyle/>
+          <a:p>
+            <a:r>
+              <a:rPr lang="en-US" dirty="0"/>
+              <a:t>Further Conformance Process Maturity</a:t>
+            </a:r>
+          </a:p>
+          <a:p>
+            <a:pPr lvl="1"/>
+            <a:r>
+              <a:rPr lang="en-US" dirty="0"/>
+              <a:t>Active LTS conformance test criteria updates / incremental badging / app-store-like landscape page</a:t>
+            </a:r>
+          </a:p>
+          <a:p>
+            <a:pPr lvl="1"/>
+            <a:r>
+              <a:rPr lang="en-US" dirty="0"/>
+              <a:t>Active LTS conformance change requests (test criteria &amp; submitter form)</a:t>
+            </a:r>
+          </a:p>
+          <a:p>
+            <a:r>
+              <a:rPr lang="en-US" dirty="0"/>
+              <a:t>Increase focus on Outreach</a:t>
+            </a:r>
+          </a:p>
+          <a:p>
+            <a:pPr lvl="1"/>
+            <a:r>
+              <a:rPr lang="en-US" dirty="0"/>
+              <a:t>Webinars &amp; Marketing</a:t>
+            </a:r>
+          </a:p>
+          <a:p>
+            <a:r>
+              <a:rPr lang="en-US" dirty="0"/>
+              <a:t>Improve Onboarding experience</a:t>
+            </a:r>
+          </a:p>
+          <a:p>
+            <a:pPr lvl="1"/>
+            <a:r>
+              <a:rPr lang="en-US" dirty="0"/>
+              <a:t>Improve/influence Zowe.org website navigation</a:t>
+            </a:r>
+          </a:p>
+          <a:p>
+            <a:pPr lvl="1"/>
+            <a:r>
+              <a:rPr lang="en-US" dirty="0"/>
+              <a:t>Accurately “direct” new-to-Zowe visitors</a:t>
+            </a:r>
+          </a:p>
+          <a:p>
+            <a:r>
+              <a:rPr lang="en-US" dirty="0"/>
+              <a:t>Continue and transition stat reporting (KPI-centric)</a:t>
+            </a:r>
+          </a:p>
+          <a:p>
+            <a:pPr lvl="1"/>
+            <a:r>
+              <a:rPr lang="en-US" dirty="0"/>
+              <a:t>Identify trends &amp; influencers</a:t>
+            </a:r>
+          </a:p>
+          <a:p>
+            <a:pPr lvl="1"/>
+            <a:r>
+              <a:rPr lang="en-US" dirty="0"/>
+              <a:t>Easy prep for all Zowe Communications</a:t>
+            </a:r>
+          </a:p>
+          <a:p>
+            <a:pPr lvl="1"/>
+            <a:endParaRPr lang="en-US" dirty="0"/>
+          </a:p>
+        </p:txBody>
+      </p:sp>
+    </p:spTree>
+    <p:extLst>
+      <p:ext uri="{BB962C8B-B14F-4D97-AF65-F5344CB8AC3E}">
+        <p14:creationId xmlns:p14="http://schemas.microsoft.com/office/powerpoint/2010/main" val="345901736"/>
+      </p:ext>
+    </p:extLst>
+  </p:cSld>
+  <p:clrMapOvr>
+    <a:masterClrMapping/>
+  </p:clrMapOvr>
+  <p:transition spd="med">
+    <p:fade thruBlk="1"/>
+  </p:transition>
+</p:sld>
+</file>
+
+<file path=ppt/slides/slide24.xml><?xml version="1.0" encoding="utf-8"?>
+<p:sld xmlns:a="http://schemas.openxmlformats.org/drawingml/2006/main" xmlns:r="http://schemas.openxmlformats.org/officeDocument/2006/relationships" xmlns:p="http://schemas.openxmlformats.org/presentationml/2006/main">
+  <p:cSld>
+    <p:spTree>
+      <p:nvGrpSpPr>
+        <p:cNvPr id="1" name=""/>
+        <p:cNvGrpSpPr/>
+        <p:nvPr/>
+      </p:nvGrpSpPr>
+      <p:grpSpPr>
+        <a:xfrm>
+          <a:off x="0" y="0"/>
+          <a:ext cx="0" cy="0"/>
+          <a:chOff x="0" y="0"/>
+          <a:chExt cx="0" cy="0"/>
+        </a:xfrm>
+      </p:grpSpPr>
+      <p:sp>
+        <p:nvSpPr>
+          <p:cNvPr id="2" name="Text Placeholder 1">
+            <a:extLst>
+              <a:ext uri="{FF2B5EF4-FFF2-40B4-BE49-F238E27FC236}">
+                <a16:creationId xmlns:a16="http://schemas.microsoft.com/office/drawing/2014/main" id="{ADB2E00A-906F-6645-9A30-53C6D93DC43C}"/>
+              </a:ext>
+            </a:extLst>
+          </p:cNvPr>
+          <p:cNvSpPr>
+            <a:spLocks noGrp="1"/>
+          </p:cNvSpPr>
+          <p:nvPr>
+            <p:ph type="body" idx="1"/>
+          </p:nvPr>
+        </p:nvSpPr>
+        <p:spPr/>
+        <p:txBody>
+          <a:bodyPr/>
+          <a:lstStyle/>
+          <a:p>
+            <a:r>
+              <a:rPr lang="en-US" dirty="0"/>
+              <a:t>Systems Squad Focus</a:t>
+            </a:r>
+          </a:p>
+          <a:p>
+            <a:r>
+              <a:rPr lang="en-US" sz="2000" dirty="0"/>
+              <a:t>Mark </a:t>
+            </a:r>
+            <a:r>
+              <a:rPr lang="en-US" sz="2000" dirty="0" err="1"/>
+              <a:t>Ackert</a:t>
+            </a:r>
+            <a:r>
+              <a:rPr lang="en-US" sz="2000" dirty="0"/>
+              <a:t> (Squad Lead)</a:t>
+            </a:r>
+          </a:p>
+          <a:p>
+            <a:r>
+              <a:rPr lang="en-US" sz="2000" dirty="0" err="1"/>
+              <a:t>f.k.a</a:t>
+            </a:r>
+            <a:r>
+              <a:rPr lang="en-US" sz="2000" dirty="0"/>
+              <a:t>. CI/CD Squad</a:t>
+            </a:r>
+          </a:p>
+        </p:txBody>
+      </p:sp>
+    </p:spTree>
+    <p:extLst>
+      <p:ext uri="{BB962C8B-B14F-4D97-AF65-F5344CB8AC3E}">
+        <p14:creationId xmlns:p14="http://schemas.microsoft.com/office/powerpoint/2010/main" val="2949732729"/>
+      </p:ext>
+    </p:extLst>
+  </p:cSld>
+  <p:clrMapOvr>
+    <a:masterClrMapping/>
+  </p:clrMapOvr>
+  <p:transition spd="med">
+    <p:fade/>
+  </p:transition>
+</p:sld>
+</file>
+
+<file path=ppt/slides/slide25.xml><?xml version="1.0" encoding="utf-8"?>
+<p:sld xmlns:a="http://schemas.openxmlformats.org/drawingml/2006/main" xmlns:r="http://schemas.openxmlformats.org/officeDocument/2006/relationships" xmlns:p="http://schemas.openxmlformats.org/presentationml/2006/main">
+  <p:cSld>
+    <p:spTree>
+      <p:nvGrpSpPr>
+        <p:cNvPr id="1" name=""/>
+        <p:cNvGrpSpPr/>
+        <p:nvPr/>
+      </p:nvGrpSpPr>
+      <p:grpSpPr>
+        <a:xfrm>
+          <a:off x="0" y="0"/>
+          <a:ext cx="0" cy="0"/>
+          <a:chOff x="0" y="0"/>
+          <a:chExt cx="0" cy="0"/>
+        </a:xfrm>
+      </p:grpSpPr>
+      <p:sp>
+        <p:nvSpPr>
+          <p:cNvPr id="3" name="Title 2">
+            <a:extLst>
+              <a:ext uri="{FF2B5EF4-FFF2-40B4-BE49-F238E27FC236}">
+                <a16:creationId xmlns:a16="http://schemas.microsoft.com/office/drawing/2014/main" id="{CFEEEE36-E132-0D40-A4B8-9BDC5C8B6528}"/>
+              </a:ext>
+            </a:extLst>
+          </p:cNvPr>
+          <p:cNvSpPr>
+            <a:spLocks noGrp="1"/>
+          </p:cNvSpPr>
+          <p:nvPr>
+            <p:ph type="title"/>
+          </p:nvPr>
+        </p:nvSpPr>
+        <p:spPr/>
+        <p:txBody>
+          <a:bodyPr/>
+          <a:lstStyle/>
+          <a:p>
+            <a:r>
+              <a:rPr lang="en-US" dirty="0"/>
+              <a:t>Dependencies</a:t>
+            </a:r>
+          </a:p>
+        </p:txBody>
+      </p:sp>
+      <p:sp>
+        <p:nvSpPr>
+          <p:cNvPr id="4" name="Text Placeholder 3">
+            <a:extLst>
+              <a:ext uri="{FF2B5EF4-FFF2-40B4-BE49-F238E27FC236}">
+                <a16:creationId xmlns:a16="http://schemas.microsoft.com/office/drawing/2014/main" id="{C0DB4ECB-A7D5-6B47-8180-75CB3C3DB7DE}"/>
+              </a:ext>
+            </a:extLst>
+          </p:cNvPr>
+          <p:cNvSpPr>
+            <a:spLocks noGrp="1"/>
+          </p:cNvSpPr>
+          <p:nvPr>
+            <p:ph type="body" idx="1"/>
+          </p:nvPr>
+        </p:nvSpPr>
+        <p:spPr>
+          <a:xfrm>
+            <a:off x="306211" y="774096"/>
+            <a:ext cx="8369400" cy="4147860"/>
+          </a:xfrm>
+        </p:spPr>
+        <p:txBody>
+          <a:bodyPr/>
+          <a:lstStyle/>
+          <a:p>
+            <a:r>
+              <a:rPr lang="en-US" dirty="0"/>
+              <a:t>Cross Squad Dependencies 1</a:t>
+            </a:r>
+          </a:p>
+          <a:p>
+            <a:r>
+              <a:rPr lang="en-US" dirty="0"/>
+              <a:t>Cross Squad Dependencies 2</a:t>
+            </a:r>
+          </a:p>
+          <a:p>
+            <a:endParaRPr lang="en-US" dirty="0"/>
+          </a:p>
+          <a:p>
+            <a:pPr marL="101600" indent="0">
+              <a:buNone/>
+            </a:pPr>
+            <a:endParaRPr lang="en-US" dirty="0"/>
+          </a:p>
+        </p:txBody>
+      </p:sp>
+    </p:spTree>
+    <p:extLst>
+      <p:ext uri="{BB962C8B-B14F-4D97-AF65-F5344CB8AC3E}">
+        <p14:creationId xmlns:p14="http://schemas.microsoft.com/office/powerpoint/2010/main" val="1515987240"/>
+      </p:ext>
+    </p:extLst>
+  </p:cSld>
+  <p:clrMapOvr>
+    <a:masterClrMapping/>
+  </p:clrMapOvr>
+  <p:transition spd="med">
+    <p:fade thruBlk="1"/>
+  </p:transition>
+</p:sld>
+</file>
+
+<file path=ppt/slides/slide26.xml><?xml version="1.0" encoding="utf-8"?>
+<p:sld xmlns:a="http://schemas.openxmlformats.org/drawingml/2006/main" xmlns:r="http://schemas.openxmlformats.org/officeDocument/2006/relationships" xmlns:p="http://schemas.openxmlformats.org/presentationml/2006/main">
+  <p:cSld>
+    <p:spTree>
+      <p:nvGrpSpPr>
+        <p:cNvPr id="1" name=""/>
+        <p:cNvGrpSpPr/>
+        <p:nvPr/>
+      </p:nvGrpSpPr>
+      <p:grpSpPr>
+        <a:xfrm>
+          <a:off x="0" y="0"/>
+          <a:ext cx="0" cy="0"/>
+          <a:chOff x="0" y="0"/>
+          <a:chExt cx="0" cy="0"/>
+        </a:xfrm>
+      </p:grpSpPr>
+      <p:sp>
+        <p:nvSpPr>
+          <p:cNvPr id="3" name="Title 2">
+            <a:extLst>
+              <a:ext uri="{FF2B5EF4-FFF2-40B4-BE49-F238E27FC236}">
+                <a16:creationId xmlns:a16="http://schemas.microsoft.com/office/drawing/2014/main" id="{CFEEEE36-E132-0D40-A4B8-9BDC5C8B6528}"/>
+              </a:ext>
+            </a:extLst>
+          </p:cNvPr>
+          <p:cNvSpPr>
+            <a:spLocks noGrp="1"/>
+          </p:cNvSpPr>
+          <p:nvPr>
+            <p:ph type="title"/>
+          </p:nvPr>
+        </p:nvSpPr>
+        <p:spPr/>
+        <p:txBody>
+          <a:bodyPr/>
+          <a:lstStyle/>
+          <a:p>
+            <a:r>
+              <a:rPr lang="en-US" dirty="0"/>
+              <a:t>Focus</a:t>
+            </a:r>
+          </a:p>
+        </p:txBody>
+      </p:sp>
+      <p:sp>
+        <p:nvSpPr>
+          <p:cNvPr id="4" name="Text Placeholder 3">
+            <a:extLst>
+              <a:ext uri="{FF2B5EF4-FFF2-40B4-BE49-F238E27FC236}">
+                <a16:creationId xmlns:a16="http://schemas.microsoft.com/office/drawing/2014/main" id="{C0DB4ECB-A7D5-6B47-8180-75CB3C3DB7DE}"/>
+              </a:ext>
+            </a:extLst>
+          </p:cNvPr>
+          <p:cNvSpPr>
+            <a:spLocks noGrp="1"/>
+          </p:cNvSpPr>
+          <p:nvPr>
+            <p:ph type="body" idx="1"/>
+          </p:nvPr>
+        </p:nvSpPr>
+        <p:spPr/>
+        <p:txBody>
+          <a:bodyPr/>
+          <a:lstStyle/>
+          <a:p>
+            <a:r>
+              <a:rPr lang="en-US" dirty="0"/>
               <a:t>Expand system testing in the community</a:t>
             </a:r>
           </a:p>
@@ -7024,7 +8226,7 @@
 </p:sld>
 </file>
 
-<file path=ppt/slides/slide21.xml><?xml version="1.0" encoding="utf-8"?>
+<file path=ppt/slides/slide27.xml><?xml version="1.0" encoding="utf-8"?>
 <p:sld xmlns:a="http://schemas.openxmlformats.org/drawingml/2006/main" xmlns:r="http://schemas.openxmlformats.org/officeDocument/2006/relationships" xmlns:p="http://schemas.openxmlformats.org/presentationml/2006/main">
   <p:cSld>
     <p:spTree>
@@ -7106,7 +8308,7 @@
 </p:sld>
 </file>
 
-<file path=ppt/slides/slide22.xml><?xml version="1.0" encoding="utf-8"?>
+<file path=ppt/slides/slide28.xml><?xml version="1.0" encoding="utf-8"?>
 <p:sld xmlns:a="http://schemas.openxmlformats.org/drawingml/2006/main" xmlns:r="http://schemas.openxmlformats.org/officeDocument/2006/relationships" xmlns:p="http://schemas.openxmlformats.org/presentationml/2006/main">
   <p:cSld>
     <p:spTree>
@@ -7146,7 +8348,7 @@
           <a:p>
             <a:r>
               <a:rPr lang="en-US" dirty="0"/>
-              <a:t>Focus</a:t>
+              <a:t>Dependencies</a:t>
             </a:r>
           </a:p>
         </p:txBody>
@@ -7167,104 +8369,42 @@
             <p:ph type="body" idx="1"/>
           </p:nvPr>
         </p:nvSpPr>
-        <p:spPr/>
+        <p:spPr>
+          <a:xfrm>
+            <a:off x="306211" y="774096"/>
+            <a:ext cx="8369400" cy="4147860"/>
+          </a:xfrm>
+        </p:spPr>
         <p:txBody>
           <a:bodyPr/>
           <a:lstStyle/>
           <a:p>
             <a:r>
               <a:rPr lang="en-US" dirty="0"/>
-              <a:t>Design and Begin </a:t>
-            </a:r>
-            <a:r>
-              <a:rPr lang="en-US" dirty="0" err="1"/>
-              <a:t>Zowe</a:t>
-            </a:r>
-            <a:r>
-              <a:rPr lang="en-US" dirty="0"/>
-              <a:t> Extensions Refactor  [Steve, Joe]</a:t>
-            </a:r>
-          </a:p>
-          <a:p>
-            <a:pPr lvl="1"/>
-            <a:r>
-              <a:rPr lang="en-US" dirty="0"/>
-              <a:t>Improve both </a:t>
-            </a:r>
-            <a:r>
-              <a:rPr lang="en-US" dirty="0" err="1"/>
-              <a:t>Zowe</a:t>
-            </a:r>
-            <a:r>
-              <a:rPr lang="en-US" dirty="0"/>
-              <a:t> administrator and </a:t>
-            </a:r>
-            <a:r>
-              <a:rPr lang="en-US" dirty="0" err="1"/>
-              <a:t>Zowe</a:t>
-            </a:r>
-            <a:r>
-              <a:rPr lang="en-US" dirty="0"/>
-              <a:t> extender user experiences when developing and deploying </a:t>
-            </a:r>
-            <a:r>
-              <a:rPr lang="en-US" dirty="0" err="1"/>
-              <a:t>Zowe</a:t>
-            </a:r>
-            <a:r>
-              <a:rPr lang="en-US" dirty="0"/>
-              <a:t> extensions by streamlining packaging, install, upgrade, and configuration.</a:t>
-            </a:r>
-          </a:p>
-          <a:p>
-            <a:pPr lvl="1"/>
-            <a:r>
-              <a:rPr lang="en-US" dirty="0"/>
-              <a:t>Unify existing </a:t>
-            </a:r>
-            <a:r>
-              <a:rPr lang="en-US" dirty="0" err="1"/>
-              <a:t>Zowe</a:t>
-            </a:r>
-            <a:r>
-              <a:rPr lang="en-US" dirty="0"/>
-              <a:t> extensions with the new extension design and rebuild documentation</a:t>
-            </a:r>
-          </a:p>
-          <a:p>
-            <a:pPr lvl="1"/>
-            <a:r>
-              <a:rPr lang="en-US" dirty="0"/>
-              <a:t>This may shift into v2 if breaking changes are required</a:t>
-            </a:r>
-          </a:p>
-          <a:p>
-            <a:r>
-              <a:rPr lang="en-US" dirty="0"/>
-              <a:t>Research and POC containerization of </a:t>
-            </a:r>
-            <a:r>
-              <a:rPr lang="en-US" dirty="0" err="1"/>
-              <a:t>Zowe</a:t>
-            </a:r>
-            <a:r>
-              <a:rPr lang="en-US" dirty="0"/>
-              <a:t>. [Sean]</a:t>
-            </a:r>
-          </a:p>
-          <a:p>
-            <a:pPr lvl="1"/>
-            <a:r>
-              <a:rPr lang="en-US" dirty="0"/>
-              <a:t>Initially targeted for developers</a:t>
-            </a:r>
+              <a:t>Cross Squad Dependencies 1</a:t>
+            </a:r>
+          </a:p>
+          <a:p>
+            <a:r>
+              <a:rPr lang="en-US" dirty="0"/>
+              <a:t>Cross Squad Dependencies 2</a:t>
+            </a:r>
+          </a:p>
+          <a:p>
+            <a:endParaRPr lang="en-US" dirty="0"/>
+          </a:p>
+          <a:p>
+            <a:pPr marL="101600" indent="0">
+              <a:buNone/>
+            </a:pPr>
+            <a:endParaRPr lang="en-US" dirty="0"/>
           </a:p>
         </p:txBody>
       </p:sp>
     </p:spTree>
     <p:extLst>
       <p:ext uri="{BB962C8B-B14F-4D97-AF65-F5344CB8AC3E}">
-        <p14:creationId xmlns:p14="http://schemas.microsoft.com/office/powerpoint/2010/main" val="209280467"/>
+        <p14:creationId xmlns:p14="http://schemas.microsoft.com/office/powerpoint/2010/main" val="1120286917"/>
       </p:ext>
     </p:extLst>
   </p:cSld>
@@ -7277,90 +8417,7 @@
 </p:sld>
 </file>
 
-<file path=ppt/slides/slide23.xml><?xml version="1.0" encoding="utf-8"?>
-<p:sld xmlns:a="http://schemas.openxmlformats.org/drawingml/2006/main" xmlns:r="http://schemas.openxmlformats.org/officeDocument/2006/relationships" xmlns:p="http://schemas.openxmlformats.org/presentationml/2006/main">
-  <p:cSld>
-    <p:spTree>
-      <p:nvGrpSpPr>
-        <p:cNvPr id="1" name=""/>
-        <p:cNvGrpSpPr/>
-        <p:nvPr/>
-      </p:nvGrpSpPr>
-      <p:grpSpPr>
-        <a:xfrm>
-          <a:off x="0" y="0"/>
-          <a:ext cx="0" cy="0"/>
-          <a:chOff x="0" y="0"/>
-          <a:chExt cx="0" cy="0"/>
-        </a:xfrm>
-      </p:grpSpPr>
-      <p:sp>
-        <p:nvSpPr>
-          <p:cNvPr id="2" name="Text Placeholder 1">
-            <a:extLst>
-              <a:ext uri="{FF2B5EF4-FFF2-40B4-BE49-F238E27FC236}">
-                <a16:creationId xmlns:a16="http://schemas.microsoft.com/office/drawing/2014/main" id="{ADB2E00A-906F-6645-9A30-53C6D93DC43C}"/>
-              </a:ext>
-            </a:extLst>
-          </p:cNvPr>
-          <p:cNvSpPr>
-            <a:spLocks noGrp="1"/>
-          </p:cNvSpPr>
-          <p:nvPr>
-            <p:ph type="body" idx="1"/>
-          </p:nvPr>
-        </p:nvSpPr>
-        <p:spPr/>
-        <p:txBody>
-          <a:bodyPr/>
-          <a:lstStyle/>
-          <a:p>
-            <a:r>
-              <a:rPr lang="en-US" dirty="0"/>
-              <a:t>Doc Squad Focus</a:t>
-            </a:r>
-          </a:p>
-          <a:p>
-            <a:r>
-              <a:rPr lang="en-US" sz="2000" dirty="0"/>
-              <a:t>Ashley</a:t>
-            </a:r>
-            <a:r>
-              <a:rPr lang="zh-CN" altLang="en-US" sz="2000" dirty="0"/>
-              <a:t> </a:t>
-            </a:r>
-            <a:r>
-              <a:rPr lang="en-US" altLang="zh-CN" sz="2000" dirty="0"/>
-              <a:t>Li</a:t>
-            </a:r>
-            <a:r>
-              <a:rPr lang="zh-CN" altLang="en-US" sz="2000" dirty="0"/>
-              <a:t> </a:t>
-            </a:r>
-            <a:r>
-              <a:rPr lang="en-US" sz="2000" dirty="0"/>
-              <a:t>(Squad Lead)</a:t>
-            </a:r>
-          </a:p>
-        </p:txBody>
-      </p:sp>
-    </p:spTree>
-    <p:extLst>
-      <p:ext uri="{BB962C8B-B14F-4D97-AF65-F5344CB8AC3E}">
-        <p14:creationId xmlns:p14="http://schemas.microsoft.com/office/powerpoint/2010/main" val="1157146962"/>
-      </p:ext>
-    </p:extLst>
-  </p:cSld>
-  <p:clrMapOvr>
-    <a:masterClrMapping/>
-  </p:clrMapOvr>
-  <p:transition spd="med">
-    <p:fade/>
-  </p:transition>
-</p:sld>
-</file>
-
-<file path=ppt/slides/slide24.xml><?xml version="1.0" encoding="utf-8"?>
+<file path=ppt/slides/slide29.xml><?xml version="1.0" encoding="utf-8"?>
 <p:sld xmlns:a="http://schemas.openxmlformats.org/drawingml/2006/main" xmlns:r="http://schemas.openxmlformats.org/officeDocument/2006/relationships" xmlns:p="http://schemas.openxmlformats.org/presentationml/2006/main">
   <p:cSld>
     <p:spTree>
@@ -7421,257 +8478,96 @@
             <p:ph type="body" idx="1"/>
           </p:nvPr>
         </p:nvSpPr>
-        <p:spPr>
-          <a:xfrm>
-            <a:off x="317499" y="741553"/>
-            <a:ext cx="8600869" cy="3889828"/>
-          </a:xfrm>
-        </p:spPr>
+        <p:spPr/>
         <p:txBody>
           <a:bodyPr/>
           <a:lstStyle/>
           <a:p>
             <a:r>
-              <a:rPr lang="en-US" sz="1800" dirty="0"/>
-              <a:t>Create and </a:t>
-            </a:r>
-            <a:r>
-              <a:rPr lang="en-US" altLang="zh-CN" sz="1800" dirty="0"/>
-              <a:t>publish</a:t>
-            </a:r>
-            <a:r>
-              <a:rPr lang="en-US" sz="1800" dirty="0"/>
-              <a:t> content for different </a:t>
-            </a:r>
-            <a:r>
-              <a:rPr lang="en-US" sz="1800" dirty="0" err="1"/>
+              <a:rPr lang="en-US" dirty="0"/>
+              <a:t>Design and Begin </a:t>
+            </a:r>
+            <a:r>
+              <a:rPr lang="en-US" dirty="0" err="1"/>
               <a:t>Zowe</a:t>
             </a:r>
             <a:r>
-              <a:rPr lang="en-US" sz="1800" dirty="0"/>
-              <a:t> components</a:t>
-            </a:r>
-            <a:r>
-              <a:rPr lang="en-US" altLang="zh-CN" sz="1800" dirty="0"/>
-              <a:t>.</a:t>
-            </a:r>
-            <a:endParaRPr lang="en-US" sz="1800" dirty="0"/>
-          </a:p>
-          <a:p>
-            <a:r>
-              <a:rPr lang="en-US" sz="1800" dirty="0"/>
-              <a:t>Allow users to browse doc by area of interest, user role, and skill level</a:t>
-            </a:r>
-            <a:r>
-              <a:rPr lang="en-US" altLang="zh-CN" sz="1800" dirty="0"/>
-              <a:t>.</a:t>
-            </a:r>
-            <a:endParaRPr lang="en-US" sz="1800" dirty="0"/>
-          </a:p>
-          <a:p>
-            <a:r>
-              <a:rPr lang="en-US" sz="1800" dirty="0"/>
-              <a:t>Provide better </a:t>
-            </a:r>
-            <a:r>
-              <a:rPr lang="en-US" altLang="zh-CN" sz="1800" dirty="0"/>
-              <a:t>contribution</a:t>
-            </a:r>
-            <a:r>
-              <a:rPr lang="zh-CN" altLang="en-US" sz="1800" dirty="0"/>
-              <a:t> </a:t>
-            </a:r>
-            <a:r>
-              <a:rPr lang="en-US" sz="1800" dirty="0"/>
-              <a:t>doc </a:t>
-            </a:r>
-            <a:r>
-              <a:rPr lang="en-US" altLang="zh-CN" sz="1800" dirty="0"/>
-              <a:t>about</a:t>
-            </a:r>
-            <a:r>
-              <a:rPr lang="zh-CN" altLang="en-US" sz="1800" dirty="0"/>
-              <a:t> </a:t>
-            </a:r>
-            <a:r>
-              <a:rPr lang="en-US" altLang="zh-CN" sz="1800" dirty="0"/>
-              <a:t>contributing</a:t>
-            </a:r>
-            <a:r>
-              <a:rPr lang="zh-CN" altLang="en-US" sz="1800" dirty="0"/>
-              <a:t> </a:t>
-            </a:r>
-            <a:r>
-              <a:rPr lang="en-US" altLang="zh-CN" sz="1800" dirty="0"/>
-              <a:t>to</a:t>
-            </a:r>
-            <a:r>
-              <a:rPr lang="zh-CN" altLang="en-US" sz="1800" dirty="0"/>
-              <a:t> </a:t>
-            </a:r>
-            <a:r>
-              <a:rPr lang="en-US" sz="1800" dirty="0"/>
-              <a:t>doc and code</a:t>
-            </a:r>
-            <a:r>
-              <a:rPr lang="en-US" altLang="zh-CN" sz="1800" dirty="0"/>
-              <a:t>.</a:t>
-            </a:r>
-            <a:endParaRPr lang="en-US" sz="1800" dirty="0"/>
-          </a:p>
-          <a:p>
-            <a:r>
-              <a:rPr lang="en-US" altLang="zh-CN" sz="1800" dirty="0"/>
-              <a:t>Improve</a:t>
-            </a:r>
-            <a:r>
-              <a:rPr lang="en-US" sz="1800" dirty="0"/>
-              <a:t> release notes </a:t>
-            </a:r>
-            <a:r>
-              <a:rPr lang="en-US" altLang="zh-CN" sz="1800" dirty="0"/>
-              <a:t>by</a:t>
-            </a:r>
-            <a:r>
-              <a:rPr lang="zh-CN" altLang="en-US" sz="1800" dirty="0"/>
-              <a:t> </a:t>
-            </a:r>
-            <a:r>
-              <a:rPr lang="en-US" altLang="zh-CN" sz="1800" dirty="0"/>
-              <a:t>automating</a:t>
-            </a:r>
-            <a:r>
-              <a:rPr lang="zh-CN" altLang="en-US" sz="1800" dirty="0"/>
-              <a:t> </a:t>
-            </a:r>
-            <a:r>
-              <a:rPr lang="en-US" altLang="zh-CN" sz="1800" dirty="0"/>
-              <a:t>its</a:t>
-            </a:r>
-            <a:r>
-              <a:rPr lang="zh-CN" altLang="en-US" sz="1800" dirty="0"/>
-              <a:t> </a:t>
-            </a:r>
-            <a:r>
-              <a:rPr lang="en-US" altLang="zh-CN" sz="1800" dirty="0"/>
-              <a:t>generation</a:t>
-            </a:r>
-            <a:r>
-              <a:rPr lang="zh-CN" altLang="en-US" sz="1800" dirty="0"/>
-              <a:t> </a:t>
-            </a:r>
-            <a:r>
-              <a:rPr lang="en-US" sz="1800" dirty="0"/>
-              <a:t>from CHANGELOGs </a:t>
-            </a:r>
-            <a:r>
-              <a:rPr lang="en-US" altLang="zh-CN" sz="1800" dirty="0"/>
-              <a:t>and</a:t>
-            </a:r>
-            <a:r>
-              <a:rPr lang="zh-CN" altLang="en-US" sz="1800" dirty="0"/>
-              <a:t> </a:t>
-            </a:r>
-            <a:r>
-              <a:rPr lang="en-US" sz="1800" dirty="0"/>
-              <a:t>provid</a:t>
-            </a:r>
-            <a:r>
-              <a:rPr lang="en-US" altLang="zh-CN" sz="1800" dirty="0"/>
-              <a:t>ing</a:t>
-            </a:r>
-            <a:r>
-              <a:rPr lang="en-US" sz="1800" dirty="0"/>
-              <a:t> better business value</a:t>
-            </a:r>
-            <a:r>
-              <a:rPr lang="en-US" altLang="zh-CN" sz="1800" dirty="0"/>
-              <a:t>.</a:t>
-            </a:r>
-            <a:endParaRPr lang="en-US" sz="1800" dirty="0"/>
-          </a:p>
-          <a:p>
-            <a:r>
-              <a:rPr lang="en-US" altLang="zh-CN" sz="1800" dirty="0"/>
-              <a:t>Contribute</a:t>
-            </a:r>
-            <a:r>
-              <a:rPr lang="zh-CN" altLang="en-US" sz="1800" dirty="0"/>
-              <a:t> </a:t>
-            </a:r>
-            <a:r>
-              <a:rPr lang="en-US" altLang="zh-CN" sz="1800" dirty="0"/>
-              <a:t>to</a:t>
-            </a:r>
-            <a:r>
-              <a:rPr lang="en-US" sz="1800" dirty="0"/>
-              <a:t> the </a:t>
-            </a:r>
-            <a:r>
-              <a:rPr lang="en-US" sz="1800" dirty="0" err="1"/>
-              <a:t>Zowe.org</a:t>
-            </a:r>
-            <a:r>
-              <a:rPr lang="en-US" sz="1800" dirty="0"/>
-              <a:t> website design </a:t>
-            </a:r>
-            <a:r>
-              <a:rPr lang="en-US" altLang="zh-CN" sz="1800" dirty="0"/>
-              <a:t>enhancement.</a:t>
-            </a:r>
-            <a:endParaRPr lang="en-US" sz="1800" dirty="0"/>
-          </a:p>
-          <a:p>
-            <a:r>
-              <a:rPr lang="en-US" sz="1800" dirty="0"/>
-              <a:t>Provide and consolidate more multi-media and visual content (videos, interactive graphics, diagrams)</a:t>
-            </a:r>
-            <a:r>
-              <a:rPr lang="en-US" altLang="zh-CN" sz="1800" dirty="0"/>
-              <a:t>.</a:t>
-            </a:r>
-            <a:endParaRPr lang="en-US" sz="1800" dirty="0"/>
-          </a:p>
-          <a:p>
-            <a:r>
-              <a:rPr lang="en-US" altLang="zh-CN" sz="1800" dirty="0"/>
-              <a:t>Identify</a:t>
-            </a:r>
-            <a:r>
-              <a:rPr lang="zh-CN" altLang="en-US" sz="1800" dirty="0"/>
-              <a:t> </a:t>
-            </a:r>
-            <a:r>
-              <a:rPr lang="en-US" sz="1800" dirty="0"/>
-              <a:t>content gaps and improvement areas </a:t>
-            </a:r>
-            <a:r>
-              <a:rPr lang="en-US" altLang="zh-CN" sz="1800" dirty="0"/>
-              <a:t>by</a:t>
-            </a:r>
-            <a:r>
-              <a:rPr lang="zh-CN" altLang="en-US" sz="1800" dirty="0"/>
-              <a:t> </a:t>
-            </a:r>
-            <a:r>
-              <a:rPr lang="en-US" altLang="zh-CN" sz="1800" dirty="0"/>
-              <a:t>leveraging</a:t>
-            </a:r>
-            <a:r>
-              <a:rPr lang="zh-CN" altLang="en-US" sz="1800" dirty="0"/>
-              <a:t> </a:t>
-            </a:r>
-            <a:r>
-              <a:rPr lang="en-US" altLang="zh-CN" sz="1800" dirty="0"/>
-              <a:t>content</a:t>
-            </a:r>
-            <a:r>
-              <a:rPr lang="zh-CN" altLang="en-US" sz="1800" dirty="0"/>
-              <a:t> </a:t>
-            </a:r>
-            <a:r>
-              <a:rPr lang="en-US" sz="1800" dirty="0"/>
-              <a:t>analytics.</a:t>
+              <a:rPr lang="en-US" dirty="0"/>
+              <a:t> Extensions Refactor  [Steve, Joe]</a:t>
+            </a:r>
+          </a:p>
+          <a:p>
+            <a:pPr lvl="1"/>
+            <a:r>
+              <a:rPr lang="en-US" dirty="0"/>
+              <a:t>Improve both </a:t>
+            </a:r>
+            <a:r>
+              <a:rPr lang="en-US" dirty="0" err="1"/>
+              <a:t>Zowe</a:t>
+            </a:r>
+            <a:r>
+              <a:rPr lang="en-US" dirty="0"/>
+              <a:t> administrator and </a:t>
+            </a:r>
+            <a:r>
+              <a:rPr lang="en-US" dirty="0" err="1"/>
+              <a:t>Zowe</a:t>
+            </a:r>
+            <a:r>
+              <a:rPr lang="en-US" dirty="0"/>
+              <a:t> extender user experiences when developing and deploying </a:t>
+            </a:r>
+            <a:r>
+              <a:rPr lang="en-US" dirty="0" err="1"/>
+              <a:t>Zowe</a:t>
+            </a:r>
+            <a:r>
+              <a:rPr lang="en-US" dirty="0"/>
+              <a:t> extensions by streamlining packaging, install, upgrade, and configuration.</a:t>
+            </a:r>
+          </a:p>
+          <a:p>
+            <a:pPr lvl="1"/>
+            <a:r>
+              <a:rPr lang="en-US" dirty="0"/>
+              <a:t>Unify existing </a:t>
+            </a:r>
+            <a:r>
+              <a:rPr lang="en-US" dirty="0" err="1"/>
+              <a:t>Zowe</a:t>
+            </a:r>
+            <a:r>
+              <a:rPr lang="en-US" dirty="0"/>
+              <a:t> extensions with the new extension design and rebuild documentation</a:t>
+            </a:r>
+          </a:p>
+          <a:p>
+            <a:pPr lvl="1"/>
+            <a:r>
+              <a:rPr lang="en-US" dirty="0"/>
+              <a:t>This may shift into v2 if breaking changes are required</a:t>
+            </a:r>
+          </a:p>
+          <a:p>
+            <a:r>
+              <a:rPr lang="en-US" dirty="0"/>
+              <a:t>Research and POC containerization of </a:t>
+            </a:r>
+            <a:r>
+              <a:rPr lang="en-US" dirty="0" err="1"/>
+              <a:t>Zowe</a:t>
+            </a:r>
+            <a:r>
+              <a:rPr lang="en-US" dirty="0"/>
+              <a:t>. [Sean]</a:t>
+            </a:r>
+          </a:p>
+          <a:p>
+            <a:pPr lvl="1"/>
+            <a:r>
+              <a:rPr lang="en-US" dirty="0"/>
+              <a:t>Initially targeted for developers</a:t>
             </a:r>
           </a:p>
         </p:txBody>
@@ -7679,7 +8575,7 @@
     </p:spTree>
     <p:extLst>
       <p:ext uri="{BB962C8B-B14F-4D97-AF65-F5344CB8AC3E}">
-        <p14:creationId xmlns:p14="http://schemas.microsoft.com/office/powerpoint/2010/main" val="3125166612"/>
+        <p14:creationId xmlns:p14="http://schemas.microsoft.com/office/powerpoint/2010/main" val="209280467"/>
       </p:ext>
     </p:extLst>
   </p:cSld>
@@ -7830,6 +8726,530 @@
     <p:extLst>
       <p:ext uri="{BB962C8B-B14F-4D97-AF65-F5344CB8AC3E}">
         <p14:creationId xmlns:p14="http://schemas.microsoft.com/office/powerpoint/2010/main" val="4057575309"/>
+      </p:ext>
+    </p:extLst>
+  </p:cSld>
+  <p:clrMapOvr>
+    <a:masterClrMapping/>
+  </p:clrMapOvr>
+  <p:transition spd="med">
+    <p:fade thruBlk="1"/>
+  </p:transition>
+</p:sld>
+</file>
+
+<file path=ppt/slides/slide30.xml><?xml version="1.0" encoding="utf-8"?>
+<p:sld xmlns:a="http://schemas.openxmlformats.org/drawingml/2006/main" xmlns:r="http://schemas.openxmlformats.org/officeDocument/2006/relationships" xmlns:p="http://schemas.openxmlformats.org/presentationml/2006/main">
+  <p:cSld>
+    <p:spTree>
+      <p:nvGrpSpPr>
+        <p:cNvPr id="1" name=""/>
+        <p:cNvGrpSpPr/>
+        <p:nvPr/>
+      </p:nvGrpSpPr>
+      <p:grpSpPr>
+        <a:xfrm>
+          <a:off x="0" y="0"/>
+          <a:ext cx="0" cy="0"/>
+          <a:chOff x="0" y="0"/>
+          <a:chExt cx="0" cy="0"/>
+        </a:xfrm>
+      </p:grpSpPr>
+      <p:sp>
+        <p:nvSpPr>
+          <p:cNvPr id="2" name="Text Placeholder 1">
+            <a:extLst>
+              <a:ext uri="{FF2B5EF4-FFF2-40B4-BE49-F238E27FC236}">
+                <a16:creationId xmlns:a16="http://schemas.microsoft.com/office/drawing/2014/main" id="{ADB2E00A-906F-6645-9A30-53C6D93DC43C}"/>
+              </a:ext>
+            </a:extLst>
+          </p:cNvPr>
+          <p:cNvSpPr>
+            <a:spLocks noGrp="1"/>
+          </p:cNvSpPr>
+          <p:nvPr>
+            <p:ph type="body" idx="1"/>
+          </p:nvPr>
+        </p:nvSpPr>
+        <p:spPr/>
+        <p:txBody>
+          <a:bodyPr/>
+          <a:lstStyle/>
+          <a:p>
+            <a:r>
+              <a:rPr lang="en-US" dirty="0"/>
+              <a:t>Doc Squad Focus</a:t>
+            </a:r>
+          </a:p>
+          <a:p>
+            <a:r>
+              <a:rPr lang="en-US" sz="2000" dirty="0"/>
+              <a:t>Ashley</a:t>
+            </a:r>
+            <a:r>
+              <a:rPr lang="zh-CN" altLang="en-US" sz="2000" dirty="0"/>
+              <a:t> </a:t>
+            </a:r>
+            <a:r>
+              <a:rPr lang="en-US" altLang="zh-CN" sz="2000" dirty="0"/>
+              <a:t>Li</a:t>
+            </a:r>
+            <a:r>
+              <a:rPr lang="zh-CN" altLang="en-US" sz="2000" dirty="0"/>
+              <a:t> </a:t>
+            </a:r>
+            <a:r>
+              <a:rPr lang="en-US" sz="2000" dirty="0"/>
+              <a:t>(Squad Lead)</a:t>
+            </a:r>
+          </a:p>
+        </p:txBody>
+      </p:sp>
+    </p:spTree>
+    <p:extLst>
+      <p:ext uri="{BB962C8B-B14F-4D97-AF65-F5344CB8AC3E}">
+        <p14:creationId xmlns:p14="http://schemas.microsoft.com/office/powerpoint/2010/main" val="1157146962"/>
+      </p:ext>
+    </p:extLst>
+  </p:cSld>
+  <p:clrMapOvr>
+    <a:masterClrMapping/>
+  </p:clrMapOvr>
+  <p:transition spd="med">
+    <p:fade/>
+  </p:transition>
+</p:sld>
+</file>
+
+<file path=ppt/slides/slide31.xml><?xml version="1.0" encoding="utf-8"?>
+<p:sld xmlns:a="http://schemas.openxmlformats.org/drawingml/2006/main" xmlns:r="http://schemas.openxmlformats.org/officeDocument/2006/relationships" xmlns:p="http://schemas.openxmlformats.org/presentationml/2006/main">
+  <p:cSld>
+    <p:spTree>
+      <p:nvGrpSpPr>
+        <p:cNvPr id="1" name=""/>
+        <p:cNvGrpSpPr/>
+        <p:nvPr/>
+      </p:nvGrpSpPr>
+      <p:grpSpPr>
+        <a:xfrm>
+          <a:off x="0" y="0"/>
+          <a:ext cx="0" cy="0"/>
+          <a:chOff x="0" y="0"/>
+          <a:chExt cx="0" cy="0"/>
+        </a:xfrm>
+      </p:grpSpPr>
+      <p:sp>
+        <p:nvSpPr>
+          <p:cNvPr id="3" name="Title 2">
+            <a:extLst>
+              <a:ext uri="{FF2B5EF4-FFF2-40B4-BE49-F238E27FC236}">
+                <a16:creationId xmlns:a16="http://schemas.microsoft.com/office/drawing/2014/main" id="{CFEEEE36-E132-0D40-A4B8-9BDC5C8B6528}"/>
+              </a:ext>
+            </a:extLst>
+          </p:cNvPr>
+          <p:cNvSpPr>
+            <a:spLocks noGrp="1"/>
+          </p:cNvSpPr>
+          <p:nvPr>
+            <p:ph type="title"/>
+          </p:nvPr>
+        </p:nvSpPr>
+        <p:spPr/>
+        <p:txBody>
+          <a:bodyPr/>
+          <a:lstStyle/>
+          <a:p>
+            <a:r>
+              <a:rPr lang="en-US" dirty="0"/>
+              <a:t>Dependencies</a:t>
+            </a:r>
+          </a:p>
+        </p:txBody>
+      </p:sp>
+      <p:sp>
+        <p:nvSpPr>
+          <p:cNvPr id="4" name="Text Placeholder 3">
+            <a:extLst>
+              <a:ext uri="{FF2B5EF4-FFF2-40B4-BE49-F238E27FC236}">
+                <a16:creationId xmlns:a16="http://schemas.microsoft.com/office/drawing/2014/main" id="{C0DB4ECB-A7D5-6B47-8180-75CB3C3DB7DE}"/>
+              </a:ext>
+            </a:extLst>
+          </p:cNvPr>
+          <p:cNvSpPr>
+            <a:spLocks noGrp="1"/>
+          </p:cNvSpPr>
+          <p:nvPr>
+            <p:ph type="body" idx="1"/>
+          </p:nvPr>
+        </p:nvSpPr>
+        <p:spPr>
+          <a:xfrm>
+            <a:off x="306211" y="774096"/>
+            <a:ext cx="8369400" cy="4147860"/>
+          </a:xfrm>
+        </p:spPr>
+        <p:txBody>
+          <a:bodyPr/>
+          <a:lstStyle/>
+          <a:p>
+            <a:r>
+              <a:rPr lang="en-US" dirty="0"/>
+              <a:t>Cross Squad Dependencies 1</a:t>
+            </a:r>
+          </a:p>
+          <a:p>
+            <a:r>
+              <a:rPr lang="en-US" dirty="0"/>
+              <a:t>Cross Squad Dependencies 2</a:t>
+            </a:r>
+          </a:p>
+          <a:p>
+            <a:endParaRPr lang="en-US" dirty="0"/>
+          </a:p>
+          <a:p>
+            <a:pPr marL="101600" indent="0">
+              <a:buNone/>
+            </a:pPr>
+            <a:endParaRPr lang="en-US" dirty="0"/>
+          </a:p>
+        </p:txBody>
+      </p:sp>
+    </p:spTree>
+    <p:extLst>
+      <p:ext uri="{BB962C8B-B14F-4D97-AF65-F5344CB8AC3E}">
+        <p14:creationId xmlns:p14="http://schemas.microsoft.com/office/powerpoint/2010/main" val="3222625966"/>
+      </p:ext>
+    </p:extLst>
+  </p:cSld>
+  <p:clrMapOvr>
+    <a:masterClrMapping/>
+  </p:clrMapOvr>
+  <p:transition spd="med">
+    <p:fade thruBlk="1"/>
+  </p:transition>
+</p:sld>
+</file>
+
+<file path=ppt/slides/slide32.xml><?xml version="1.0" encoding="utf-8"?>
+<p:sld xmlns:a="http://schemas.openxmlformats.org/drawingml/2006/main" xmlns:r="http://schemas.openxmlformats.org/officeDocument/2006/relationships" xmlns:p="http://schemas.openxmlformats.org/presentationml/2006/main">
+  <p:cSld>
+    <p:spTree>
+      <p:nvGrpSpPr>
+        <p:cNvPr id="1" name=""/>
+        <p:cNvGrpSpPr/>
+        <p:nvPr/>
+      </p:nvGrpSpPr>
+      <p:grpSpPr>
+        <a:xfrm>
+          <a:off x="0" y="0"/>
+          <a:ext cx="0" cy="0"/>
+          <a:chOff x="0" y="0"/>
+          <a:chExt cx="0" cy="0"/>
+        </a:xfrm>
+      </p:grpSpPr>
+      <p:sp>
+        <p:nvSpPr>
+          <p:cNvPr id="3" name="Title 2">
+            <a:extLst>
+              <a:ext uri="{FF2B5EF4-FFF2-40B4-BE49-F238E27FC236}">
+                <a16:creationId xmlns:a16="http://schemas.microsoft.com/office/drawing/2014/main" id="{CFEEEE36-E132-0D40-A4B8-9BDC5C8B6528}"/>
+              </a:ext>
+            </a:extLst>
+          </p:cNvPr>
+          <p:cNvSpPr>
+            <a:spLocks noGrp="1"/>
+          </p:cNvSpPr>
+          <p:nvPr>
+            <p:ph type="title"/>
+          </p:nvPr>
+        </p:nvSpPr>
+        <p:spPr/>
+        <p:txBody>
+          <a:bodyPr/>
+          <a:lstStyle/>
+          <a:p>
+            <a:r>
+              <a:rPr lang="en-US" dirty="0"/>
+              <a:t>Focus</a:t>
+            </a:r>
+          </a:p>
+        </p:txBody>
+      </p:sp>
+      <p:sp>
+        <p:nvSpPr>
+          <p:cNvPr id="4" name="Text Placeholder 3">
+            <a:extLst>
+              <a:ext uri="{FF2B5EF4-FFF2-40B4-BE49-F238E27FC236}">
+                <a16:creationId xmlns:a16="http://schemas.microsoft.com/office/drawing/2014/main" id="{C0DB4ECB-A7D5-6B47-8180-75CB3C3DB7DE}"/>
+              </a:ext>
+            </a:extLst>
+          </p:cNvPr>
+          <p:cNvSpPr>
+            <a:spLocks noGrp="1"/>
+          </p:cNvSpPr>
+          <p:nvPr>
+            <p:ph type="body" idx="1"/>
+          </p:nvPr>
+        </p:nvSpPr>
+        <p:spPr>
+          <a:xfrm>
+            <a:off x="317499" y="741553"/>
+            <a:ext cx="8600869" cy="3889828"/>
+          </a:xfrm>
+        </p:spPr>
+        <p:txBody>
+          <a:bodyPr/>
+          <a:lstStyle/>
+          <a:p>
+            <a:r>
+              <a:rPr lang="en-US" sz="1800" dirty="0"/>
+              <a:t>Create and </a:t>
+            </a:r>
+            <a:r>
+              <a:rPr lang="en-US" altLang="zh-CN" sz="1800" dirty="0"/>
+              <a:t>publish</a:t>
+            </a:r>
+            <a:r>
+              <a:rPr lang="en-US" sz="1800" dirty="0"/>
+              <a:t> content for different </a:t>
+            </a:r>
+            <a:r>
+              <a:rPr lang="en-US" sz="1800" dirty="0" err="1"/>
+              <a:t>Zowe</a:t>
+            </a:r>
+            <a:r>
+              <a:rPr lang="en-US" sz="1800" dirty="0"/>
+              <a:t> components</a:t>
+            </a:r>
+            <a:r>
+              <a:rPr lang="en-US" altLang="zh-CN" sz="1800" dirty="0"/>
+              <a:t>.</a:t>
+            </a:r>
+            <a:endParaRPr lang="en-US" sz="1800" dirty="0"/>
+          </a:p>
+          <a:p>
+            <a:r>
+              <a:rPr lang="en-US" sz="1800" dirty="0"/>
+              <a:t>Allow users to browse doc by area of interest, user role, and skill level</a:t>
+            </a:r>
+            <a:r>
+              <a:rPr lang="en-US" altLang="zh-CN" sz="1800" dirty="0"/>
+              <a:t>.</a:t>
+            </a:r>
+            <a:endParaRPr lang="en-US" sz="1800" dirty="0"/>
+          </a:p>
+          <a:p>
+            <a:r>
+              <a:rPr lang="en-US" sz="1800" dirty="0"/>
+              <a:t>Provide better </a:t>
+            </a:r>
+            <a:r>
+              <a:rPr lang="en-US" altLang="zh-CN" sz="1800" dirty="0"/>
+              <a:t>contribution</a:t>
+            </a:r>
+            <a:r>
+              <a:rPr lang="zh-CN" altLang="en-US" sz="1800" dirty="0"/>
+              <a:t> </a:t>
+            </a:r>
+            <a:r>
+              <a:rPr lang="en-US" sz="1800" dirty="0"/>
+              <a:t>doc </a:t>
+            </a:r>
+            <a:r>
+              <a:rPr lang="en-US" altLang="zh-CN" sz="1800" dirty="0"/>
+              <a:t>about</a:t>
+            </a:r>
+            <a:r>
+              <a:rPr lang="zh-CN" altLang="en-US" sz="1800" dirty="0"/>
+              <a:t> </a:t>
+            </a:r>
+            <a:r>
+              <a:rPr lang="en-US" altLang="zh-CN" sz="1800" dirty="0"/>
+              <a:t>contributing</a:t>
+            </a:r>
+            <a:r>
+              <a:rPr lang="zh-CN" altLang="en-US" sz="1800" dirty="0"/>
+              <a:t> </a:t>
+            </a:r>
+            <a:r>
+              <a:rPr lang="en-US" altLang="zh-CN" sz="1800" dirty="0"/>
+              <a:t>to</a:t>
+            </a:r>
+            <a:r>
+              <a:rPr lang="zh-CN" altLang="en-US" sz="1800" dirty="0"/>
+              <a:t> </a:t>
+            </a:r>
+            <a:r>
+              <a:rPr lang="en-US" sz="1800" dirty="0"/>
+              <a:t>doc and code</a:t>
+            </a:r>
+            <a:r>
+              <a:rPr lang="en-US" altLang="zh-CN" sz="1800" dirty="0"/>
+              <a:t>.</a:t>
+            </a:r>
+            <a:endParaRPr lang="en-US" sz="1800" dirty="0"/>
+          </a:p>
+          <a:p>
+            <a:r>
+              <a:rPr lang="en-US" altLang="zh-CN" sz="1800" dirty="0"/>
+              <a:t>Improve</a:t>
+            </a:r>
+            <a:r>
+              <a:rPr lang="en-US" sz="1800" dirty="0"/>
+              <a:t> release notes </a:t>
+            </a:r>
+            <a:r>
+              <a:rPr lang="en-US" altLang="zh-CN" sz="1800" dirty="0"/>
+              <a:t>by</a:t>
+            </a:r>
+            <a:r>
+              <a:rPr lang="zh-CN" altLang="en-US" sz="1800" dirty="0"/>
+              <a:t> </a:t>
+            </a:r>
+            <a:r>
+              <a:rPr lang="en-US" altLang="zh-CN" sz="1800" dirty="0"/>
+              <a:t>automating</a:t>
+            </a:r>
+            <a:r>
+              <a:rPr lang="zh-CN" altLang="en-US" sz="1800" dirty="0"/>
+              <a:t> </a:t>
+            </a:r>
+            <a:r>
+              <a:rPr lang="en-US" altLang="zh-CN" sz="1800" dirty="0"/>
+              <a:t>its</a:t>
+            </a:r>
+            <a:r>
+              <a:rPr lang="zh-CN" altLang="en-US" sz="1800" dirty="0"/>
+              <a:t> </a:t>
+            </a:r>
+            <a:r>
+              <a:rPr lang="en-US" altLang="zh-CN" sz="1800" dirty="0"/>
+              <a:t>generation</a:t>
+            </a:r>
+            <a:r>
+              <a:rPr lang="zh-CN" altLang="en-US" sz="1800" dirty="0"/>
+              <a:t> </a:t>
+            </a:r>
+            <a:r>
+              <a:rPr lang="en-US" sz="1800" dirty="0"/>
+              <a:t>from CHANGELOGs </a:t>
+            </a:r>
+            <a:r>
+              <a:rPr lang="en-US" altLang="zh-CN" sz="1800" dirty="0"/>
+              <a:t>and</a:t>
+            </a:r>
+            <a:r>
+              <a:rPr lang="zh-CN" altLang="en-US" sz="1800" dirty="0"/>
+              <a:t> </a:t>
+            </a:r>
+            <a:r>
+              <a:rPr lang="en-US" sz="1800" dirty="0"/>
+              <a:t>provid</a:t>
+            </a:r>
+            <a:r>
+              <a:rPr lang="en-US" altLang="zh-CN" sz="1800" dirty="0"/>
+              <a:t>ing</a:t>
+            </a:r>
+            <a:r>
+              <a:rPr lang="en-US" sz="1800" dirty="0"/>
+              <a:t> better business value</a:t>
+            </a:r>
+            <a:r>
+              <a:rPr lang="en-US" altLang="zh-CN" sz="1800" dirty="0"/>
+              <a:t>.</a:t>
+            </a:r>
+            <a:endParaRPr lang="en-US" sz="1800" dirty="0"/>
+          </a:p>
+          <a:p>
+            <a:r>
+              <a:rPr lang="en-US" altLang="zh-CN" sz="1800" dirty="0"/>
+              <a:t>Contribute</a:t>
+            </a:r>
+            <a:r>
+              <a:rPr lang="zh-CN" altLang="en-US" sz="1800" dirty="0"/>
+              <a:t> </a:t>
+            </a:r>
+            <a:r>
+              <a:rPr lang="en-US" altLang="zh-CN" sz="1800" dirty="0"/>
+              <a:t>to</a:t>
+            </a:r>
+            <a:r>
+              <a:rPr lang="en-US" sz="1800" dirty="0"/>
+              <a:t> the </a:t>
+            </a:r>
+            <a:r>
+              <a:rPr lang="en-US" sz="1800" dirty="0" err="1"/>
+              <a:t>Zowe.org</a:t>
+            </a:r>
+            <a:r>
+              <a:rPr lang="en-US" sz="1800" dirty="0"/>
+              <a:t> website design </a:t>
+            </a:r>
+            <a:r>
+              <a:rPr lang="en-US" altLang="zh-CN" sz="1800" dirty="0"/>
+              <a:t>enhancement.</a:t>
+            </a:r>
+            <a:endParaRPr lang="en-US" sz="1800" dirty="0"/>
+          </a:p>
+          <a:p>
+            <a:r>
+              <a:rPr lang="en-US" sz="1800" dirty="0"/>
+              <a:t>Provide and consolidate more multi-media and visual content (videos, interactive graphics, diagrams)</a:t>
+            </a:r>
+            <a:r>
+              <a:rPr lang="en-US" altLang="zh-CN" sz="1800" dirty="0"/>
+              <a:t>.</a:t>
+            </a:r>
+            <a:endParaRPr lang="en-US" sz="1800" dirty="0"/>
+          </a:p>
+          <a:p>
+            <a:r>
+              <a:rPr lang="en-US" altLang="zh-CN" sz="1800" dirty="0"/>
+              <a:t>Identify</a:t>
+            </a:r>
+            <a:r>
+              <a:rPr lang="zh-CN" altLang="en-US" sz="1800" dirty="0"/>
+              <a:t> </a:t>
+            </a:r>
+            <a:r>
+              <a:rPr lang="en-US" sz="1800" dirty="0"/>
+              <a:t>content gaps and improvement areas </a:t>
+            </a:r>
+            <a:r>
+              <a:rPr lang="en-US" altLang="zh-CN" sz="1800" dirty="0"/>
+              <a:t>by</a:t>
+            </a:r>
+            <a:r>
+              <a:rPr lang="zh-CN" altLang="en-US" sz="1800" dirty="0"/>
+              <a:t> </a:t>
+            </a:r>
+            <a:r>
+              <a:rPr lang="en-US" altLang="zh-CN" sz="1800" dirty="0"/>
+              <a:t>leveraging</a:t>
+            </a:r>
+            <a:r>
+              <a:rPr lang="zh-CN" altLang="en-US" sz="1800" dirty="0"/>
+              <a:t> </a:t>
+            </a:r>
+            <a:r>
+              <a:rPr lang="en-US" altLang="zh-CN" sz="1800" dirty="0"/>
+              <a:t>content</a:t>
+            </a:r>
+            <a:r>
+              <a:rPr lang="zh-CN" altLang="en-US" sz="1800" dirty="0"/>
+              <a:t> </a:t>
+            </a:r>
+            <a:r>
+              <a:rPr lang="en-US" sz="1800" dirty="0"/>
+              <a:t>analytics.</a:t>
+            </a:r>
+          </a:p>
+        </p:txBody>
+      </p:sp>
+    </p:spTree>
+    <p:extLst>
+      <p:ext uri="{BB962C8B-B14F-4D97-AF65-F5344CB8AC3E}">
+        <p14:creationId xmlns:p14="http://schemas.microsoft.com/office/powerpoint/2010/main" val="3125166612"/>
       </p:ext>
     </p:extLst>
   </p:cSld>
@@ -7957,7 +9377,7 @@
           <a:p>
             <a:r>
               <a:rPr lang="en-US" dirty="0"/>
-              <a:t>Feature 1</a:t>
+              <a:t>Dependencies</a:t>
             </a:r>
           </a:p>
         </p:txBody>
@@ -7988,94 +9408,19 @@
           <a:bodyPr/>
           <a:lstStyle/>
           <a:p>
-            <a:pPr marL="101600" indent="0">
-              <a:buNone/>
-            </a:pPr>
-            <a:r>
-              <a:rPr lang="en-US" u="sng" dirty="0">
-                <a:hlinkClick r:id="rId3"/>
-              </a:rPr>
-              <a:t>x.509 client certificate authentication support for API Mediation Layer</a:t>
-            </a:r>
-            <a:r>
-              <a:rPr lang="en-US" dirty="0"/>
-              <a:t> </a:t>
-            </a:r>
-          </a:p>
-          <a:p>
-            <a:pPr marL="101600" indent="0">
-              <a:buNone/>
-            </a:pPr>
-            <a:r>
-              <a:rPr lang="en-US" dirty="0"/>
-              <a:t>(in support of SECURITY theme)</a:t>
-            </a:r>
-          </a:p>
-          <a:p>
-            <a:pPr marL="101600" indent="0">
-              <a:buNone/>
-            </a:pPr>
+            <a:r>
+              <a:rPr lang="en-US" dirty="0"/>
+              <a:t>Cross Squad Dependencies 1</a:t>
+            </a:r>
+          </a:p>
+          <a:p>
+            <a:r>
+              <a:rPr lang="en-US" dirty="0"/>
+              <a:t>Cross Squad Dependencies 2</a:t>
+            </a:r>
+          </a:p>
+          <a:p>
             <a:endParaRPr lang="en-US" dirty="0"/>
-          </a:p>
-          <a:p>
-            <a:pPr marL="101600" indent="0">
-              <a:buNone/>
-            </a:pPr>
-            <a:r>
-              <a:rPr lang="en-US" dirty="0"/>
-              <a:t>As a system admin / security admin, I want to allow my platform users (Michelle, Tyler) to authenticate their custom client applications or </a:t>
-            </a:r>
-            <a:r>
-              <a:rPr lang="en-US" dirty="0" err="1"/>
-              <a:t>Zowe</a:t>
-            </a:r>
-            <a:r>
-              <a:rPr lang="en-US" dirty="0"/>
-              <a:t> client applications (</a:t>
-            </a:r>
-            <a:r>
-              <a:rPr lang="en-US" dirty="0" err="1"/>
-              <a:t>zowe</a:t>
-            </a:r>
-            <a:r>
-              <a:rPr lang="en-US" dirty="0"/>
-              <a:t> explorer, cli, desktop) using client certificates (x.509) which are industry-proven to be more secure than </a:t>
-            </a:r>
-            <a:r>
-              <a:rPr lang="en-US" dirty="0" err="1"/>
-              <a:t>PassTickets</a:t>
-            </a:r>
-            <a:r>
-              <a:rPr lang="en-US" dirty="0"/>
-              <a:t>, JWT or credential authentication.</a:t>
-            </a:r>
-          </a:p>
-          <a:p>
-            <a:pPr marL="101600" indent="0">
-              <a:buNone/>
-            </a:pPr>
-            <a:endParaRPr lang="en-US" dirty="0"/>
-          </a:p>
-          <a:p>
-            <a:pPr marL="101600" indent="0">
-              <a:buNone/>
-            </a:pPr>
-            <a:r>
-              <a:rPr lang="en-US" b="1" dirty="0"/>
-              <a:t>Deliverable: </a:t>
-            </a:r>
-            <a:r>
-              <a:rPr lang="en-US" dirty="0"/>
-              <a:t>APIML can validate client certificates and exchange with the authentication mechanism that is native to the given service (e.g. JWT, </a:t>
-            </a:r>
-            <a:r>
-              <a:rPr lang="en-US" dirty="0" err="1"/>
-              <a:t>PassTickets</a:t>
-            </a:r>
-            <a:r>
-              <a:rPr lang="en-US" dirty="0"/>
-              <a:t>).</a:t>
-            </a:r>
           </a:p>
           <a:p>
             <a:pPr marL="101600" indent="0">
@@ -8088,7 +9433,7 @@
     </p:spTree>
     <p:extLst>
       <p:ext uri="{BB962C8B-B14F-4D97-AF65-F5344CB8AC3E}">
-        <p14:creationId xmlns:p14="http://schemas.microsoft.com/office/powerpoint/2010/main" val="90732165"/>
+        <p14:creationId xmlns:p14="http://schemas.microsoft.com/office/powerpoint/2010/main" val="1060192488"/>
       </p:ext>
     </p:extLst>
   </p:cSld>
@@ -8141,7 +9486,7 @@
           <a:p>
             <a:r>
               <a:rPr lang="en-US" dirty="0"/>
-              <a:t>Feature 2</a:t>
+              <a:t>Feature 1</a:t>
             </a:r>
           </a:p>
         </p:txBody>
@@ -8179,9 +9524,12 @@
               <a:rPr lang="en-US" u="sng" dirty="0">
                 <a:hlinkClick r:id="rId3"/>
               </a:rPr>
-              <a:t>Remove the dependency of APIML on z/OSMF for authentication and use SAF to obtain the JWT </a:t>
-            </a:r>
-            <a:endParaRPr lang="en-US" u="sng" dirty="0"/>
+              <a:t>x.509 client certificate authentication support for API Mediation Layer</a:t>
+            </a:r>
+            <a:r>
+              <a:rPr lang="en-US" dirty="0"/>
+              <a:t> </a:t>
+            </a:r>
           </a:p>
           <a:p>
             <a:pPr marL="101600" indent="0">
@@ -8204,7 +9552,7 @@
             </a:pPr>
             <a:r>
               <a:rPr lang="en-US" dirty="0"/>
-              <a:t>As a system admin / security admin, I want a configurable option at installation of </a:t>
+              <a:t>As a system admin / security admin, I want to allow my platform users (Michelle, Tyler) to authenticate their custom client applications or </a:t>
             </a:r>
             <a:r>
               <a:rPr lang="en-US" dirty="0" err="1"/>
@@ -8212,7 +9560,23 @@
             </a:r>
             <a:r>
               <a:rPr lang="en-US" dirty="0"/>
-              <a:t> to use SAF as my authentication provider, thereby eliminating the pre-requisite on z/OSMF, and removing a barrier to my adoption.</a:t>
+              <a:t> client applications (</a:t>
+            </a:r>
+            <a:r>
+              <a:rPr lang="en-US" dirty="0" err="1"/>
+              <a:t>zowe</a:t>
+            </a:r>
+            <a:r>
+              <a:rPr lang="en-US" dirty="0"/>
+              <a:t> explorer, cli, desktop) using client certificates (x.509) which are industry-proven to be more secure than </a:t>
+            </a:r>
+            <a:r>
+              <a:rPr lang="en-US" dirty="0" err="1"/>
+              <a:t>PassTickets</a:t>
+            </a:r>
+            <a:r>
+              <a:rPr lang="en-US" dirty="0"/>
+              <a:t>, JWT or credential authentication.</a:t>
             </a:r>
           </a:p>
           <a:p>
@@ -8231,32 +9595,16 @@
             </a:r>
             <a:r>
               <a:rPr lang="en-US" dirty="0"/>
-              <a:t>Instead of a call to z/OSMF, APIML will use Java SAF APIs to verify credentials.</a:t>
-            </a:r>
-            <a:r>
-              <a:rPr lang="en-US" dirty="0">
-                <a:solidFill>
-                  <a:srgbClr val="000000"/>
-                </a:solidFill>
-                <a:latin typeface="Arial"/>
-                <a:ea typeface="Arial"/>
-                <a:cs typeface="Arial"/>
-                <a:sym typeface="Arial"/>
-              </a:rPr>
-              <a:t> </a:t>
-            </a:r>
-            <a:r>
-              <a:rPr lang="en-US" dirty="0">
-                <a:sym typeface="Arial"/>
-              </a:rPr>
-              <a:t>This will be implemented as an additional provider, the z/OSMF authentication provider will remain the default.</a:t>
-            </a:r>
-          </a:p>
-          <a:p>
-            <a:pPr marL="101600" indent="0">
-              <a:buNone/>
-            </a:pPr>
-            <a:endParaRPr lang="en-US" dirty="0"/>
+              <a:t>APIML can validate client certificates and exchange with the authentication mechanism that is native to the given service (e.g. JWT, </a:t>
+            </a:r>
+            <a:r>
+              <a:rPr lang="en-US" dirty="0" err="1"/>
+              <a:t>PassTickets</a:t>
+            </a:r>
+            <a:r>
+              <a:rPr lang="en-US" dirty="0"/>
+              <a:t>).</a:t>
+            </a:r>
           </a:p>
           <a:p>
             <a:pPr marL="101600" indent="0">
@@ -8269,7 +9617,7 @@
     </p:spTree>
     <p:extLst>
       <p:ext uri="{BB962C8B-B14F-4D97-AF65-F5344CB8AC3E}">
-        <p14:creationId xmlns:p14="http://schemas.microsoft.com/office/powerpoint/2010/main" val="3879706553"/>
+        <p14:creationId xmlns:p14="http://schemas.microsoft.com/office/powerpoint/2010/main" val="90732165"/>
       </p:ext>
     </p:extLst>
   </p:cSld>
@@ -8322,7 +9670,7 @@
           <a:p>
             <a:r>
               <a:rPr lang="en-US" dirty="0"/>
-              <a:t>Feature 3</a:t>
+              <a:t>Feature 2</a:t>
             </a:r>
           </a:p>
         </p:txBody>
@@ -8360,6 +9708,187 @@
               <a:rPr lang="en-US" u="sng" dirty="0">
                 <a:hlinkClick r:id="rId3"/>
               </a:rPr>
+              <a:t>Remove the dependency of APIML on z/OSMF for authentication and use SAF to obtain the JWT </a:t>
+            </a:r>
+            <a:endParaRPr lang="en-US" u="sng" dirty="0"/>
+          </a:p>
+          <a:p>
+            <a:pPr marL="101600" indent="0">
+              <a:buNone/>
+            </a:pPr>
+            <a:r>
+              <a:rPr lang="en-US" dirty="0"/>
+              <a:t>(in support of SECURITY theme)</a:t>
+            </a:r>
+          </a:p>
+          <a:p>
+            <a:pPr marL="101600" indent="0">
+              <a:buNone/>
+            </a:pPr>
+            <a:endParaRPr lang="en-US" dirty="0"/>
+          </a:p>
+          <a:p>
+            <a:pPr marL="101600" indent="0">
+              <a:buNone/>
+            </a:pPr>
+            <a:r>
+              <a:rPr lang="en-US" dirty="0"/>
+              <a:t>As a system admin / security admin, I want a configurable option at installation of </a:t>
+            </a:r>
+            <a:r>
+              <a:rPr lang="en-US" dirty="0" err="1"/>
+              <a:t>Zowe</a:t>
+            </a:r>
+            <a:r>
+              <a:rPr lang="en-US" dirty="0"/>
+              <a:t> to use SAF as my authentication provider, thereby eliminating the pre-requisite on z/OSMF, and removing a barrier to my adoption.</a:t>
+            </a:r>
+          </a:p>
+          <a:p>
+            <a:pPr marL="101600" indent="0">
+              <a:buNone/>
+            </a:pPr>
+            <a:endParaRPr lang="en-US" dirty="0"/>
+          </a:p>
+          <a:p>
+            <a:pPr marL="101600" indent="0">
+              <a:buNone/>
+            </a:pPr>
+            <a:r>
+              <a:rPr lang="en-US" b="1" dirty="0"/>
+              <a:t>Deliverable: </a:t>
+            </a:r>
+            <a:r>
+              <a:rPr lang="en-US" dirty="0"/>
+              <a:t>Instead of a call to z/OSMF, APIML will use Java SAF APIs to verify credentials.</a:t>
+            </a:r>
+            <a:r>
+              <a:rPr lang="en-US" dirty="0">
+                <a:solidFill>
+                  <a:srgbClr val="000000"/>
+                </a:solidFill>
+                <a:latin typeface="Arial"/>
+                <a:ea typeface="Arial"/>
+                <a:cs typeface="Arial"/>
+                <a:sym typeface="Arial"/>
+              </a:rPr>
+              <a:t> </a:t>
+            </a:r>
+            <a:r>
+              <a:rPr lang="en-US" dirty="0">
+                <a:sym typeface="Arial"/>
+              </a:rPr>
+              <a:t>This will be implemented as an additional provider, the z/OSMF authentication provider will remain the default.</a:t>
+            </a:r>
+          </a:p>
+          <a:p>
+            <a:pPr marL="101600" indent="0">
+              <a:buNone/>
+            </a:pPr>
+            <a:endParaRPr lang="en-US" dirty="0"/>
+          </a:p>
+          <a:p>
+            <a:pPr marL="101600" indent="0">
+              <a:buNone/>
+            </a:pPr>
+            <a:endParaRPr lang="en-US" dirty="0"/>
+          </a:p>
+        </p:txBody>
+      </p:sp>
+    </p:spTree>
+    <p:extLst>
+      <p:ext uri="{BB962C8B-B14F-4D97-AF65-F5344CB8AC3E}">
+        <p14:creationId xmlns:p14="http://schemas.microsoft.com/office/powerpoint/2010/main" val="3879706553"/>
+      </p:ext>
+    </p:extLst>
+  </p:cSld>
+  <p:clrMapOvr>
+    <a:masterClrMapping/>
+  </p:clrMapOvr>
+  <p:transition spd="med">
+    <p:fade thruBlk="1"/>
+  </p:transition>
+</p:sld>
+</file>
+
+<file path=ppt/slides/slide8.xml><?xml version="1.0" encoding="utf-8"?>
+<p:sld xmlns:a="http://schemas.openxmlformats.org/drawingml/2006/main" xmlns:r="http://schemas.openxmlformats.org/officeDocument/2006/relationships" xmlns:p="http://schemas.openxmlformats.org/presentationml/2006/main">
+  <p:cSld>
+    <p:spTree>
+      <p:nvGrpSpPr>
+        <p:cNvPr id="1" name=""/>
+        <p:cNvGrpSpPr/>
+        <p:nvPr/>
+      </p:nvGrpSpPr>
+      <p:grpSpPr>
+        <a:xfrm>
+          <a:off x="0" y="0"/>
+          <a:ext cx="0" cy="0"/>
+          <a:chOff x="0" y="0"/>
+          <a:chExt cx="0" cy="0"/>
+        </a:xfrm>
+      </p:grpSpPr>
+      <p:sp>
+        <p:nvSpPr>
+          <p:cNvPr id="3" name="Title 2">
+            <a:extLst>
+              <a:ext uri="{FF2B5EF4-FFF2-40B4-BE49-F238E27FC236}">
+                <a16:creationId xmlns:a16="http://schemas.microsoft.com/office/drawing/2014/main" id="{CFEEEE36-E132-0D40-A4B8-9BDC5C8B6528}"/>
+              </a:ext>
+            </a:extLst>
+          </p:cNvPr>
+          <p:cNvSpPr>
+            <a:spLocks noGrp="1"/>
+          </p:cNvSpPr>
+          <p:nvPr>
+            <p:ph type="title"/>
+          </p:nvPr>
+        </p:nvSpPr>
+        <p:spPr/>
+        <p:txBody>
+          <a:bodyPr/>
+          <a:lstStyle/>
+          <a:p>
+            <a:r>
+              <a:rPr lang="en-US" dirty="0"/>
+              <a:t>Feature 3</a:t>
+            </a:r>
+          </a:p>
+        </p:txBody>
+      </p:sp>
+      <p:sp>
+        <p:nvSpPr>
+          <p:cNvPr id="4" name="Text Placeholder 3">
+            <a:extLst>
+              <a:ext uri="{FF2B5EF4-FFF2-40B4-BE49-F238E27FC236}">
+                <a16:creationId xmlns:a16="http://schemas.microsoft.com/office/drawing/2014/main" id="{C0DB4ECB-A7D5-6B47-8180-75CB3C3DB7DE}"/>
+              </a:ext>
+            </a:extLst>
+          </p:cNvPr>
+          <p:cNvSpPr>
+            <a:spLocks noGrp="1"/>
+          </p:cNvSpPr>
+          <p:nvPr>
+            <p:ph type="body" idx="1"/>
+          </p:nvPr>
+        </p:nvSpPr>
+        <p:spPr>
+          <a:xfrm>
+            <a:off x="306211" y="774096"/>
+            <a:ext cx="8369400" cy="4147860"/>
+          </a:xfrm>
+        </p:spPr>
+        <p:txBody>
+          <a:bodyPr/>
+          <a:lstStyle/>
+          <a:p>
+            <a:pPr marL="101600" indent="0">
+              <a:buNone/>
+            </a:pPr>
+            <a:r>
+              <a:rPr lang="en-US" u="sng" dirty="0">
+                <a:hlinkClick r:id="rId3"/>
+              </a:rPr>
               <a:t>Support for high availability / </a:t>
             </a:r>
             <a:r>
@@ -8457,7 +9986,7 @@
 </p:sld>
 </file>
 
-<file path=ppt/slides/slide8.xml><?xml version="1.0" encoding="utf-8"?>
+<file path=ppt/slides/slide9.xml><?xml version="1.0" encoding="utf-8"?>
 <p:sld xmlns:a="http://schemas.openxmlformats.org/drawingml/2006/main" xmlns:r="http://schemas.openxmlformats.org/officeDocument/2006/relationships" xmlns:p="http://schemas.openxmlformats.org/presentationml/2006/main">
   <p:cSld>
     <p:spTree>
@@ -8520,103 +10049,6 @@
   </p:clrMapOvr>
   <p:transition spd="med">
     <p:fade/>
-  </p:transition>
-</p:sld>
-</file>
-
-<file path=ppt/slides/slide9.xml><?xml version="1.0" encoding="utf-8"?>
-<p:sld xmlns:a="http://schemas.openxmlformats.org/drawingml/2006/main" xmlns:r="http://schemas.openxmlformats.org/officeDocument/2006/relationships" xmlns:p="http://schemas.openxmlformats.org/presentationml/2006/main">
-  <p:cSld>
-    <p:spTree>
-      <p:nvGrpSpPr>
-        <p:cNvPr id="1" name=""/>
-        <p:cNvGrpSpPr/>
-        <p:nvPr/>
-      </p:nvGrpSpPr>
-      <p:grpSpPr>
-        <a:xfrm>
-          <a:off x="0" y="0"/>
-          <a:ext cx="0" cy="0"/>
-          <a:chOff x="0" y="0"/>
-          <a:chExt cx="0" cy="0"/>
-        </a:xfrm>
-      </p:grpSpPr>
-      <p:sp>
-        <p:nvSpPr>
-          <p:cNvPr id="3" name="Title 2">
-            <a:extLst>
-              <a:ext uri="{FF2B5EF4-FFF2-40B4-BE49-F238E27FC236}">
-                <a16:creationId xmlns:a16="http://schemas.microsoft.com/office/drawing/2014/main" id="{CFEEEE36-E132-0D40-A4B8-9BDC5C8B6528}"/>
-              </a:ext>
-            </a:extLst>
-          </p:cNvPr>
-          <p:cNvSpPr>
-            <a:spLocks noGrp="1"/>
-          </p:cNvSpPr>
-          <p:nvPr>
-            <p:ph type="title"/>
-          </p:nvPr>
-        </p:nvSpPr>
-        <p:spPr/>
-        <p:txBody>
-          <a:bodyPr/>
-          <a:lstStyle/>
-          <a:p>
-            <a:r>
-              <a:rPr lang="en-US" dirty="0"/>
-              <a:t>Features</a:t>
-            </a:r>
-          </a:p>
-        </p:txBody>
-      </p:sp>
-      <p:sp>
-        <p:nvSpPr>
-          <p:cNvPr id="4" name="Text Placeholder 3">
-            <a:extLst>
-              <a:ext uri="{FF2B5EF4-FFF2-40B4-BE49-F238E27FC236}">
-                <a16:creationId xmlns:a16="http://schemas.microsoft.com/office/drawing/2014/main" id="{C0DB4ECB-A7D5-6B47-8180-75CB3C3DB7DE}"/>
-              </a:ext>
-            </a:extLst>
-          </p:cNvPr>
-          <p:cNvSpPr>
-            <a:spLocks noGrp="1"/>
-          </p:cNvSpPr>
-          <p:nvPr>
-            <p:ph type="body" idx="1"/>
-          </p:nvPr>
-        </p:nvSpPr>
-        <p:spPr/>
-        <p:txBody>
-          <a:bodyPr/>
-          <a:lstStyle/>
-          <a:p>
-            <a:r>
-              <a:rPr lang="en-US" dirty="0"/>
-              <a:t>Feature </a:t>
-            </a:r>
-            <a:r>
-              <a:rPr lang="en-US" dirty="0" err="1"/>
-              <a:t>xxxx</a:t>
-            </a:r>
-            <a:r>
-              <a:rPr lang="en-US" dirty="0"/>
-              <a:t> (in support of theme xxx)</a:t>
-            </a:r>
-          </a:p>
-        </p:txBody>
-      </p:sp>
-    </p:spTree>
-    <p:extLst>
-      <p:ext uri="{BB962C8B-B14F-4D97-AF65-F5344CB8AC3E}">
-        <p14:creationId xmlns:p14="http://schemas.microsoft.com/office/powerpoint/2010/main" val="1714517199"/>
-      </p:ext>
-    </p:extLst>
-  </p:cSld>
-  <p:clrMapOvr>
-    <a:masterClrMapping/>
-  </p:clrMapOvr>
-  <p:transition spd="med">
-    <p:fade thruBlk="1"/>
   </p:transition>
 </p:sld>
 </file>
@@ -9184,12 +10616,6 @@
 </file>
 
 <file path=customXml/item1.xml><?xml version="1.0" encoding="utf-8"?>
-<p:properties xmlns:p="http://schemas.microsoft.com/office/2006/metadata/properties" xmlns:xsi="http://www.w3.org/2001/XMLSchema-instance" xmlns:pc="http://schemas.microsoft.com/office/infopath/2007/PartnerControls">
-  <documentManagement/>
-</p:properties>
-</file>
-
-<file path=customXml/item2.xml><?xml version="1.0" encoding="utf-8"?>
 <ct:contentTypeSchema xmlns:ct="http://schemas.microsoft.com/office/2006/metadata/contentType" xmlns:ma="http://schemas.microsoft.com/office/2006/metadata/properties/metaAttributes" ct:_="" ma:_="" ma:contentTypeName="Document" ma:contentTypeID="0x01010078366F8B0CAC4944B54E4FE62E1853FF" ma:contentTypeVersion="13" ma:contentTypeDescription="Create a new document." ma:contentTypeScope="" ma:versionID="c0144efe8435d8d2a41eb877ff779f3d">
   <xsd:schema xmlns:xsd="http://www.w3.org/2001/XMLSchema" xmlns:xs="http://www.w3.org/2001/XMLSchema" xmlns:p="http://schemas.microsoft.com/office/2006/metadata/properties" xmlns:ns3="dc93a766-66e7-40cb-ae91-7d18686f06cb" xmlns:ns4="218ddd80-e909-418b-876b-6da869ab062e" targetNamespace="http://schemas.microsoft.com/office/2006/metadata/properties" ma:root="true" ma:fieldsID="98e515d43d9a7e057d5a8f41d3b12b29" ns3:_="" ns4:_="">
     <xsd:import namespace="dc93a766-66e7-40cb-ae91-7d18686f06cb"/>
@@ -9412,6 +10838,12 @@
 </ct:contentTypeSchema>
 </file>
 
+<file path=customXml/item2.xml><?xml version="1.0" encoding="utf-8"?>
+<p:properties xmlns:p="http://schemas.microsoft.com/office/2006/metadata/properties" xmlns:xsi="http://www.w3.org/2001/XMLSchema-instance" xmlns:pc="http://schemas.microsoft.com/office/infopath/2007/PartnerControls">
+  <documentManagement/>
+</p:properties>
+</file>
+
 <file path=customXml/item3.xml><?xml version="1.0" encoding="utf-8"?>
 <?mso-contentType ?>
 <FormTemplates xmlns="http://schemas.microsoft.com/sharepoint/v3/contenttype/forms">
@@ -9422,23 +10854,6 @@
 </file>
 
 <file path=customXml/itemProps1.xml><?xml version="1.0" encoding="utf-8"?>
-<ds:datastoreItem xmlns:ds="http://schemas.openxmlformats.org/officeDocument/2006/customXml" ds:itemID="{0A54B724-95FE-4227-A509-89C0BE165019}">
-  <ds:schemaRefs>
-    <ds:schemaRef ds:uri="http://purl.org/dc/terms/"/>
-    <ds:schemaRef ds:uri="218ddd80-e909-418b-876b-6da869ab062e"/>
-    <ds:schemaRef ds:uri="http://purl.org/dc/dcmitype/"/>
-    <ds:schemaRef ds:uri="http://schemas.microsoft.com/office/infopath/2007/PartnerControls"/>
-    <ds:schemaRef ds:uri="http://purl.org/dc/elements/1.1/"/>
-    <ds:schemaRef ds:uri="http://schemas.microsoft.com/office/2006/metadata/properties"/>
-    <ds:schemaRef ds:uri="http://schemas.microsoft.com/office/2006/documentManagement/types"/>
-    <ds:schemaRef ds:uri="http://schemas.openxmlformats.org/package/2006/metadata/core-properties"/>
-    <ds:schemaRef ds:uri="dc93a766-66e7-40cb-ae91-7d18686f06cb"/>
-    <ds:schemaRef ds:uri="http://www.w3.org/XML/1998/namespace"/>
-  </ds:schemaRefs>
-</ds:datastoreItem>
-</file>
-
-<file path=customXml/itemProps2.xml><?xml version="1.0" encoding="utf-8"?>
 <ds:datastoreItem xmlns:ds="http://schemas.openxmlformats.org/officeDocument/2006/customXml" ds:itemID="{75DFD259-8AF4-4CFA-9594-D45098FC5839}">
   <ds:schemaRefs>
     <ds:schemaRef ds:uri="http://schemas.microsoft.com/office/2006/metadata/contentType"/>
@@ -9457,6 +10872,23 @@
 </ds:datastoreItem>
 </file>
 
+<file path=customXml/itemProps2.xml><?xml version="1.0" encoding="utf-8"?>
+<ds:datastoreItem xmlns:ds="http://schemas.openxmlformats.org/officeDocument/2006/customXml" ds:itemID="{0A54B724-95FE-4227-A509-89C0BE165019}">
+  <ds:schemaRefs>
+    <ds:schemaRef ds:uri="http://purl.org/dc/terms/"/>
+    <ds:schemaRef ds:uri="218ddd80-e909-418b-876b-6da869ab062e"/>
+    <ds:schemaRef ds:uri="http://purl.org/dc/dcmitype/"/>
+    <ds:schemaRef ds:uri="http://schemas.microsoft.com/office/infopath/2007/PartnerControls"/>
+    <ds:schemaRef ds:uri="http://purl.org/dc/elements/1.1/"/>
+    <ds:schemaRef ds:uri="http://schemas.microsoft.com/office/2006/metadata/properties"/>
+    <ds:schemaRef ds:uri="http://schemas.microsoft.com/office/2006/documentManagement/types"/>
+    <ds:schemaRef ds:uri="http://schemas.openxmlformats.org/package/2006/metadata/core-properties"/>
+    <ds:schemaRef ds:uri="dc93a766-66e7-40cb-ae91-7d18686f06cb"/>
+    <ds:schemaRef ds:uri="http://www.w3.org/XML/1998/namespace"/>
+  </ds:schemaRefs>
+</ds:datastoreItem>
+</file>
+
 <file path=customXml/itemProps3.xml><?xml version="1.0" encoding="utf-8"?>
 <ds:datastoreItem xmlns:ds="http://schemas.openxmlformats.org/officeDocument/2006/customXml" ds:itemID="{B16FB3BA-9F7C-4CD8-B3AB-262CEFAAFDB4}">
   <ds:schemaRefs>

</xml_diff>

<commit_message>
Added API Ml dependency
</commit_message>
<xml_diff>
--- a/Project Management/20PI3 Planning/Zowe Community Squad Focus for 20PI3.pptx
+++ b/Project Management/20PI3 Planning/Zowe Community Squad Focus for 20PI3.pptx
@@ -45,16 +45,16 @@
   <p:notesSz cx="6858000" cy="9144000"/>
   <p:embeddedFontLst>
     <p:embeddedFont>
-      <p:font typeface="Calibri" panose="020F0502020204030204" pitchFamily="34" charset="0"/>
+      <p:font typeface="Gill Sans" panose="020B0604020202020204" charset="0"/>
       <p:regular r:id="rId38"/>
       <p:bold r:id="rId39"/>
-      <p:italic r:id="rId40"/>
-      <p:boldItalic r:id="rId41"/>
     </p:embeddedFont>
     <p:embeddedFont>
-      <p:font typeface="Gill Sans" panose="020B0502020104020203" pitchFamily="34" charset="-79"/>
-      <p:regular r:id="rId42"/>
-      <p:bold r:id="rId43"/>
+      <p:font typeface="Calibri" panose="020F0502020204030204" pitchFamily="34" charset="0"/>
+      <p:regular r:id="rId40"/>
+      <p:bold r:id="rId41"/>
+      <p:italic r:id="rId42"/>
+      <p:boldItalic r:id="rId43"/>
     </p:embeddedFont>
   </p:embeddedFontLst>
   <p:defaultTextStyle>
@@ -6526,6 +6526,10 @@
             <a:pPr marL="101600" indent="0">
               <a:buNone/>
             </a:pPr>
+            <a:r>
+              <a:rPr lang="en-US" u="sng" dirty="0"/>
+              <a:t/>
+            </a:r>
             <a:br>
               <a:rPr lang="en-US" u="sng" dirty="0"/>
             </a:br>
@@ -6548,6 +6552,10 @@
             <a:br>
               <a:rPr lang="en-US" dirty="0"/>
             </a:br>
+            <a:r>
+              <a:rPr lang="en-US" dirty="0"/>
+              <a:t/>
+            </a:r>
             <a:br>
               <a:rPr lang="en-US" dirty="0"/>
             </a:br>
@@ -9409,15 +9417,26 @@
           <a:lstStyle/>
           <a:p>
             <a:r>
-              <a:rPr lang="en-US" dirty="0"/>
-              <a:t>Cross Squad Dependencies 1</a:t>
-            </a:r>
-          </a:p>
-          <a:p>
-            <a:r>
-              <a:rPr lang="en-US" dirty="0"/>
-              <a:t>Cross Squad Dependencies 2</a:t>
-            </a:r>
+              <a:rPr lang="en-US" dirty="0" smtClean="0"/>
+              <a:t>Systems Squad </a:t>
+            </a:r>
+            <a:r>
+              <a:rPr lang="en-US" dirty="0" smtClean="0"/>
+              <a:t>– ‘Design </a:t>
+            </a:r>
+            <a:r>
+              <a:rPr lang="en-US" dirty="0" err="1"/>
+              <a:t>Zowe</a:t>
+            </a:r>
+            <a:r>
+              <a:rPr lang="en-US" dirty="0"/>
+              <a:t> HA </a:t>
+            </a:r>
+            <a:r>
+              <a:rPr lang="en-US" dirty="0" smtClean="0"/>
+              <a:t>Infrastructure’</a:t>
+            </a:r>
+            <a:endParaRPr lang="en-US" dirty="0"/>
           </a:p>
           <a:p>
             <a:endParaRPr lang="en-US" dirty="0"/>
@@ -9953,8 +9972,41 @@
             </a:r>
             <a:r>
               <a:rPr lang="en-US" dirty="0"/>
-              <a:t> distributor.</a:t>
-            </a:r>
+              <a:t> distributor</a:t>
+            </a:r>
+            <a:r>
+              <a:rPr lang="en-US" dirty="0" smtClean="0"/>
+              <a:t>.</a:t>
+            </a:r>
+          </a:p>
+          <a:p>
+            <a:pPr marL="101600" indent="0">
+              <a:buNone/>
+            </a:pPr>
+            <a:endParaRPr lang="en-US" dirty="0"/>
+          </a:p>
+          <a:p>
+            <a:pPr marL="101600" indent="0">
+              <a:buNone/>
+            </a:pPr>
+            <a:r>
+              <a:rPr lang="en-US" dirty="0"/>
+              <a:t>Dependency: Systems Squad – ‘Design </a:t>
+            </a:r>
+            <a:r>
+              <a:rPr lang="en-US" dirty="0" err="1"/>
+              <a:t>Zowe</a:t>
+            </a:r>
+            <a:r>
+              <a:rPr lang="en-US" dirty="0"/>
+              <a:t> HA Infrastructure’</a:t>
+            </a:r>
+          </a:p>
+          <a:p>
+            <a:pPr marL="101600" indent="0">
+              <a:buNone/>
+            </a:pPr>
+            <a:endParaRPr lang="en-US" dirty="0"/>
           </a:p>
           <a:p>
             <a:pPr marL="101600" indent="0">
@@ -10616,6 +10668,21 @@
 </file>
 
 <file path=customXml/item1.xml><?xml version="1.0" encoding="utf-8"?>
+<?mso-contentType ?>
+<FormTemplates xmlns="http://schemas.microsoft.com/sharepoint/v3/contenttype/forms">
+  <Display>DocumentLibraryForm</Display>
+  <Edit>DocumentLibraryForm</Edit>
+  <New>DocumentLibraryForm</New>
+</FormTemplates>
+</file>
+
+<file path=customXml/item2.xml><?xml version="1.0" encoding="utf-8"?>
+<p:properties xmlns:p="http://schemas.microsoft.com/office/2006/metadata/properties" xmlns:xsi="http://www.w3.org/2001/XMLSchema-instance" xmlns:pc="http://schemas.microsoft.com/office/infopath/2007/PartnerControls">
+  <documentManagement/>
+</p:properties>
+</file>
+
+<file path=customXml/item3.xml><?xml version="1.0" encoding="utf-8"?>
 <ct:contentTypeSchema xmlns:ct="http://schemas.microsoft.com/office/2006/metadata/contentType" xmlns:ma="http://schemas.microsoft.com/office/2006/metadata/properties/metaAttributes" ct:_="" ma:_="" ma:contentTypeName="Document" ma:contentTypeID="0x01010078366F8B0CAC4944B54E4FE62E1853FF" ma:contentTypeVersion="13" ma:contentTypeDescription="Create a new document." ma:contentTypeScope="" ma:versionID="c0144efe8435d8d2a41eb877ff779f3d">
   <xsd:schema xmlns:xsd="http://www.w3.org/2001/XMLSchema" xmlns:xs="http://www.w3.org/2001/XMLSchema" xmlns:p="http://schemas.microsoft.com/office/2006/metadata/properties" xmlns:ns3="dc93a766-66e7-40cb-ae91-7d18686f06cb" xmlns:ns4="218ddd80-e909-418b-876b-6da869ab062e" targetNamespace="http://schemas.microsoft.com/office/2006/metadata/properties" ma:root="true" ma:fieldsID="98e515d43d9a7e057d5a8f41d3b12b29" ns3:_="" ns4:_="">
     <xsd:import namespace="dc93a766-66e7-40cb-ae91-7d18686f06cb"/>
@@ -10838,36 +10905,10 @@
 </ct:contentTypeSchema>
 </file>
 
-<file path=customXml/item2.xml><?xml version="1.0" encoding="utf-8"?>
-<p:properties xmlns:p="http://schemas.microsoft.com/office/2006/metadata/properties" xmlns:xsi="http://www.w3.org/2001/XMLSchema-instance" xmlns:pc="http://schemas.microsoft.com/office/infopath/2007/PartnerControls">
-  <documentManagement/>
-</p:properties>
-</file>
-
-<file path=customXml/item3.xml><?xml version="1.0" encoding="utf-8"?>
-<?mso-contentType ?>
-<FormTemplates xmlns="http://schemas.microsoft.com/sharepoint/v3/contenttype/forms">
-  <Display>DocumentLibraryForm</Display>
-  <Edit>DocumentLibraryForm</Edit>
-  <New>DocumentLibraryForm</New>
-</FormTemplates>
-</file>
-
 <file path=customXml/itemProps1.xml><?xml version="1.0" encoding="utf-8"?>
-<ds:datastoreItem xmlns:ds="http://schemas.openxmlformats.org/officeDocument/2006/customXml" ds:itemID="{75DFD259-8AF4-4CFA-9594-D45098FC5839}">
+<ds:datastoreItem xmlns:ds="http://schemas.openxmlformats.org/officeDocument/2006/customXml" ds:itemID="{B16FB3BA-9F7C-4CD8-B3AB-262CEFAAFDB4}">
   <ds:schemaRefs>
-    <ds:schemaRef ds:uri="http://schemas.microsoft.com/office/2006/metadata/contentType"/>
-    <ds:schemaRef ds:uri="http://schemas.microsoft.com/office/2006/metadata/properties/metaAttributes"/>
-    <ds:schemaRef ds:uri="http://www.w3.org/2001/XMLSchema"/>
-    <ds:schemaRef ds:uri="http://schemas.microsoft.com/office/2006/metadata/properties"/>
-    <ds:schemaRef ds:uri="dc93a766-66e7-40cb-ae91-7d18686f06cb"/>
-    <ds:schemaRef ds:uri="218ddd80-e909-418b-876b-6da869ab062e"/>
-    <ds:schemaRef ds:uri="http://schemas.microsoft.com/office/2006/documentManagement/types"/>
-    <ds:schemaRef ds:uri="http://schemas.microsoft.com/office/infopath/2007/PartnerControls"/>
-    <ds:schemaRef ds:uri="http://schemas.openxmlformats.org/package/2006/metadata/core-properties"/>
-    <ds:schemaRef ds:uri="http://purl.org/dc/elements/1.1/"/>
-    <ds:schemaRef ds:uri="http://purl.org/dc/terms/"/>
-    <ds:schemaRef ds:uri="http://schemas.microsoft.com/internal/obd"/>
+    <ds:schemaRef ds:uri="http://schemas.microsoft.com/sharepoint/v3/contenttype/forms"/>
   </ds:schemaRefs>
 </ds:datastoreItem>
 </file>
@@ -10890,9 +10931,20 @@
 </file>
 
 <file path=customXml/itemProps3.xml><?xml version="1.0" encoding="utf-8"?>
-<ds:datastoreItem xmlns:ds="http://schemas.openxmlformats.org/officeDocument/2006/customXml" ds:itemID="{B16FB3BA-9F7C-4CD8-B3AB-262CEFAAFDB4}">
+<ds:datastoreItem xmlns:ds="http://schemas.openxmlformats.org/officeDocument/2006/customXml" ds:itemID="{75DFD259-8AF4-4CFA-9594-D45098FC5839}">
   <ds:schemaRefs>
-    <ds:schemaRef ds:uri="http://schemas.microsoft.com/sharepoint/v3/contenttype/forms"/>
+    <ds:schemaRef ds:uri="http://schemas.microsoft.com/office/2006/metadata/contentType"/>
+    <ds:schemaRef ds:uri="http://schemas.microsoft.com/office/2006/metadata/properties/metaAttributes"/>
+    <ds:schemaRef ds:uri="http://www.w3.org/2001/XMLSchema"/>
+    <ds:schemaRef ds:uri="http://schemas.microsoft.com/office/2006/metadata/properties"/>
+    <ds:schemaRef ds:uri="dc93a766-66e7-40cb-ae91-7d18686f06cb"/>
+    <ds:schemaRef ds:uri="218ddd80-e909-418b-876b-6da869ab062e"/>
+    <ds:schemaRef ds:uri="http://schemas.microsoft.com/office/2006/documentManagement/types"/>
+    <ds:schemaRef ds:uri="http://schemas.microsoft.com/office/infopath/2007/PartnerControls"/>
+    <ds:schemaRef ds:uri="http://schemas.openxmlformats.org/package/2006/metadata/core-properties"/>
+    <ds:schemaRef ds:uri="http://purl.org/dc/elements/1.1/"/>
+    <ds:schemaRef ds:uri="http://purl.org/dc/terms/"/>
+    <ds:schemaRef ds:uri="http://schemas.microsoft.com/internal/obd"/>
   </ds:schemaRefs>
 </ds:datastoreItem>
 </file>
</xml_diff>

<commit_message>
Add Doc dependency and meeting URL
Signed-off-by: nannanli <nannanli@cn.ibm.com>
</commit_message>
<xml_diff>
--- a/Project Management/20PI3 Planning/Zowe Community Squad Focus for 20PI3.pptx
+++ b/Project Management/20PI3 Planning/Zowe Community Squad Focus for 20PI3.pptx
@@ -5,7 +5,7 @@
     <p:sldMasterId id="2147483653" r:id="rId4"/>
   </p:sldMasterIdLst>
   <p:notesMasterIdLst>
-    <p:notesMasterId r:id="rId37"/>
+    <p:notesMasterId r:id="rId36"/>
   </p:notesMasterIdLst>
   <p:sldIdLst>
     <p:sldId id="279" r:id="rId5"/>
@@ -29,32 +29,31 @@
     <p:sldId id="2142532374" r:id="rId23"/>
     <p:sldId id="2142532359" r:id="rId24"/>
     <p:sldId id="2142532380" r:id="rId25"/>
-    <p:sldId id="2142532366" r:id="rId26"/>
-    <p:sldId id="2142532370" r:id="rId27"/>
-    <p:sldId id="2142532356" r:id="rId28"/>
-    <p:sldId id="2142532381" r:id="rId29"/>
-    <p:sldId id="2142532364" r:id="rId30"/>
-    <p:sldId id="2142532357" r:id="rId31"/>
-    <p:sldId id="2142532382" r:id="rId32"/>
-    <p:sldId id="2142532365" r:id="rId33"/>
-    <p:sldId id="2142532358" r:id="rId34"/>
-    <p:sldId id="2142532383" r:id="rId35"/>
-    <p:sldId id="2142532367" r:id="rId36"/>
+    <p:sldId id="2142532370" r:id="rId26"/>
+    <p:sldId id="2142532356" r:id="rId27"/>
+    <p:sldId id="2142532381" r:id="rId28"/>
+    <p:sldId id="2142532364" r:id="rId29"/>
+    <p:sldId id="2142532357" r:id="rId30"/>
+    <p:sldId id="2142532382" r:id="rId31"/>
+    <p:sldId id="2142532365" r:id="rId32"/>
+    <p:sldId id="2142532358" r:id="rId33"/>
+    <p:sldId id="2142532383" r:id="rId34"/>
+    <p:sldId id="2142532367" r:id="rId35"/>
   </p:sldIdLst>
   <p:sldSz cx="9144000" cy="5143500" type="screen16x9"/>
   <p:notesSz cx="6858000" cy="9144000"/>
   <p:embeddedFontLst>
     <p:embeddedFont>
-      <p:font typeface="Gill Sans" panose="020B0604020202020204" charset="0"/>
-      <p:regular r:id="rId38"/>
-      <p:bold r:id="rId39"/>
+      <p:font typeface="Calibri" panose="020F0502020204030204" pitchFamily="34" charset="0"/>
+      <p:regular r:id="rId37"/>
+      <p:bold r:id="rId38"/>
+      <p:italic r:id="rId39"/>
+      <p:boldItalic r:id="rId40"/>
     </p:embeddedFont>
     <p:embeddedFont>
-      <p:font typeface="Calibri" panose="020F0502020204030204" pitchFamily="34" charset="0"/>
-      <p:regular r:id="rId40"/>
-      <p:bold r:id="rId41"/>
-      <p:italic r:id="rId42"/>
-      <p:boldItalic r:id="rId43"/>
+      <p:font typeface="Gill Sans" panose="020B0502020104020203" pitchFamily="34" charset="-79"/>
+      <p:regular r:id="rId41"/>
+      <p:bold r:id="rId42"/>
     </p:embeddedFont>
   </p:embeddedFontLst>
   <p:defaultTextStyle>
@@ -6526,10 +6525,6 @@
             <a:pPr marL="101600" indent="0">
               <a:buNone/>
             </a:pPr>
-            <a:r>
-              <a:rPr lang="en-US" u="sng" dirty="0"/>
-              <a:t/>
-            </a:r>
             <a:br>
               <a:rPr lang="en-US" u="sng" dirty="0"/>
             </a:br>
@@ -6552,10 +6547,6 @@
             <a:br>
               <a:rPr lang="en-US" dirty="0"/>
             </a:br>
-            <a:r>
-              <a:rPr lang="en-US" dirty="0"/>
-              <a:t/>
-            </a:r>
             <a:br>
               <a:rPr lang="en-US" dirty="0"/>
             </a:br>
@@ -7679,19 +7670,90 @@
             <p:ph type="body" idx="1"/>
           </p:nvPr>
         </p:nvSpPr>
-        <p:spPr/>
+        <p:spPr>
+          <a:xfrm>
+            <a:off x="317500" y="943428"/>
+            <a:ext cx="8369400" cy="4085772"/>
+          </a:xfrm>
+        </p:spPr>
         <p:txBody>
           <a:bodyPr/>
           <a:lstStyle/>
           <a:p>
             <a:r>
               <a:rPr lang="en-US" dirty="0"/>
-              <a:t>Focus </a:t>
-            </a:r>
-            <a:r>
-              <a:rPr lang="en-US" dirty="0" err="1"/>
-              <a:t>xxxx</a:t>
-            </a:r>
+              <a:t>Further Conformance Process Maturity</a:t>
+            </a:r>
+          </a:p>
+          <a:p>
+            <a:pPr lvl="1"/>
+            <a:r>
+              <a:rPr lang="en-US" dirty="0"/>
+              <a:t>Active LTS conformance test criteria updates / incremental badging / app-store-like landscape page</a:t>
+            </a:r>
+          </a:p>
+          <a:p>
+            <a:pPr lvl="1"/>
+            <a:r>
+              <a:rPr lang="en-US" dirty="0"/>
+              <a:t>Active LTS conformance change requests (test criteria &amp; submitter form)</a:t>
+            </a:r>
+          </a:p>
+          <a:p>
+            <a:r>
+              <a:rPr lang="en-US" dirty="0"/>
+              <a:t>Increase focus on Outreach</a:t>
+            </a:r>
+          </a:p>
+          <a:p>
+            <a:pPr lvl="1"/>
+            <a:r>
+              <a:rPr lang="en-US" dirty="0"/>
+              <a:t>Webinars &amp; Marketing</a:t>
+            </a:r>
+          </a:p>
+          <a:p>
+            <a:r>
+              <a:rPr lang="en-US" dirty="0"/>
+              <a:t>Improve Onboarding experience</a:t>
+            </a:r>
+          </a:p>
+          <a:p>
+            <a:pPr lvl="1"/>
+            <a:r>
+              <a:rPr lang="en-US" dirty="0"/>
+              <a:t>Improve/influence Zowe.org website navigation</a:t>
+            </a:r>
+          </a:p>
+          <a:p>
+            <a:pPr lvl="1"/>
+            <a:r>
+              <a:rPr lang="en-US" dirty="0"/>
+              <a:t>Accurately “direct” new-to-Zowe visitors</a:t>
+            </a:r>
+          </a:p>
+          <a:p>
+            <a:r>
+              <a:rPr lang="en-US" dirty="0"/>
+              <a:t>Continue and transition stat reporting (KPI-centric)</a:t>
+            </a:r>
+          </a:p>
+          <a:p>
+            <a:pPr lvl="1"/>
+            <a:r>
+              <a:rPr lang="en-US" dirty="0"/>
+              <a:t>Identify trends &amp; influencers</a:t>
+            </a:r>
+          </a:p>
+          <a:p>
+            <a:pPr lvl="1"/>
+            <a:r>
+              <a:rPr lang="en-US" dirty="0"/>
+              <a:t>Easy prep for all Zowe Communications</a:t>
+            </a:r>
+          </a:p>
+          <a:p>
+            <a:pPr lvl="1"/>
             <a:endParaRPr lang="en-US" dirty="0"/>
           </a:p>
         </p:txBody>
@@ -7699,7 +7761,7 @@
     </p:spTree>
     <p:extLst>
       <p:ext uri="{BB962C8B-B14F-4D97-AF65-F5344CB8AC3E}">
-        <p14:creationId xmlns:p14="http://schemas.microsoft.com/office/powerpoint/2010/main" val="2827431278"/>
+        <p14:creationId xmlns:p14="http://schemas.microsoft.com/office/powerpoint/2010/main" val="345901736"/>
       </p:ext>
     </p:extLst>
   </p:cSld>
@@ -7713,6 +7775,91 @@
 </file>
 
 <file path=ppt/slides/slide23.xml><?xml version="1.0" encoding="utf-8"?>
+<p:sld xmlns:a="http://schemas.openxmlformats.org/drawingml/2006/main" xmlns:r="http://schemas.openxmlformats.org/officeDocument/2006/relationships" xmlns:p="http://schemas.openxmlformats.org/presentationml/2006/main">
+  <p:cSld>
+    <p:spTree>
+      <p:nvGrpSpPr>
+        <p:cNvPr id="1" name=""/>
+        <p:cNvGrpSpPr/>
+        <p:nvPr/>
+      </p:nvGrpSpPr>
+      <p:grpSpPr>
+        <a:xfrm>
+          <a:off x="0" y="0"/>
+          <a:ext cx="0" cy="0"/>
+          <a:chOff x="0" y="0"/>
+          <a:chExt cx="0" cy="0"/>
+        </a:xfrm>
+      </p:grpSpPr>
+      <p:sp>
+        <p:nvSpPr>
+          <p:cNvPr id="2" name="Text Placeholder 1">
+            <a:extLst>
+              <a:ext uri="{FF2B5EF4-FFF2-40B4-BE49-F238E27FC236}">
+                <a16:creationId xmlns:a16="http://schemas.microsoft.com/office/drawing/2014/main" id="{ADB2E00A-906F-6645-9A30-53C6D93DC43C}"/>
+              </a:ext>
+            </a:extLst>
+          </p:cNvPr>
+          <p:cNvSpPr>
+            <a:spLocks noGrp="1"/>
+          </p:cNvSpPr>
+          <p:nvPr>
+            <p:ph type="body" idx="1"/>
+          </p:nvPr>
+        </p:nvSpPr>
+        <p:spPr/>
+        <p:txBody>
+          <a:bodyPr/>
+          <a:lstStyle/>
+          <a:p>
+            <a:r>
+              <a:rPr lang="en-US" dirty="0"/>
+              <a:t>Systems Squad Focus</a:t>
+            </a:r>
+          </a:p>
+          <a:p>
+            <a:r>
+              <a:rPr lang="en-US" sz="2000" dirty="0"/>
+              <a:t>Mark </a:t>
+            </a:r>
+            <a:r>
+              <a:rPr lang="en-US" sz="2000" dirty="0" err="1"/>
+              <a:t>Ackert</a:t>
+            </a:r>
+            <a:r>
+              <a:rPr lang="en-US" sz="2000" dirty="0"/>
+              <a:t> (Squad Lead)</a:t>
+            </a:r>
+          </a:p>
+          <a:p>
+            <a:r>
+              <a:rPr lang="en-US" sz="2000" dirty="0" err="1"/>
+              <a:t>f.k.a</a:t>
+            </a:r>
+            <a:r>
+              <a:rPr lang="en-US" sz="2000" dirty="0"/>
+              <a:t>. CI/CD Squad</a:t>
+            </a:r>
+          </a:p>
+        </p:txBody>
+      </p:sp>
+    </p:spTree>
+    <p:extLst>
+      <p:ext uri="{BB962C8B-B14F-4D97-AF65-F5344CB8AC3E}">
+        <p14:creationId xmlns:p14="http://schemas.microsoft.com/office/powerpoint/2010/main" val="2949732729"/>
+      </p:ext>
+    </p:extLst>
+  </p:cSld>
+  <p:clrMapOvr>
+    <a:masterClrMapping/>
+  </p:clrMapOvr>
+  <p:transition spd="med">
+    <p:fade/>
+  </p:transition>
+</p:sld>
+</file>
+
+<file path=ppt/slides/slide24.xml><?xml version="1.0" encoding="utf-8"?>
 <p:sld xmlns:a="http://schemas.openxmlformats.org/drawingml/2006/main" xmlns:r="http://schemas.openxmlformats.org/officeDocument/2006/relationships" xmlns:p="http://schemas.openxmlformats.org/presentationml/2006/main">
   <p:cSld>
     <p:spTree>
@@ -7752,7 +7899,7 @@
           <a:p>
             <a:r>
               <a:rPr lang="en-US" dirty="0"/>
-              <a:t>Focus</a:t>
+              <a:t>Dependencies</a:t>
             </a:r>
           </a:p>
         </p:txBody>
@@ -7775,8 +7922,8 @@
         </p:nvSpPr>
         <p:spPr>
           <a:xfrm>
-            <a:off x="317500" y="943428"/>
-            <a:ext cx="8369400" cy="4085772"/>
+            <a:off x="306211" y="774096"/>
+            <a:ext cx="8369400" cy="4147860"/>
           </a:xfrm>
         </p:spPr>
         <p:txBody>
@@ -7785,78 +7932,22 @@
           <a:p>
             <a:r>
               <a:rPr lang="en-US" dirty="0"/>
-              <a:t>Further Conformance Process Maturity</a:t>
-            </a:r>
-          </a:p>
-          <a:p>
-            <a:pPr lvl="1"/>
-            <a:r>
-              <a:rPr lang="en-US" dirty="0"/>
-              <a:t>Active LTS conformance test criteria updates / incremental badging / app-store-like landscape page</a:t>
-            </a:r>
-          </a:p>
-          <a:p>
-            <a:pPr lvl="1"/>
-            <a:r>
-              <a:rPr lang="en-US" dirty="0"/>
-              <a:t>Active LTS conformance change requests (test criteria &amp; submitter form)</a:t>
-            </a:r>
-          </a:p>
-          <a:p>
-            <a:r>
-              <a:rPr lang="en-US" dirty="0"/>
-              <a:t>Increase focus on Outreach</a:t>
-            </a:r>
-          </a:p>
-          <a:p>
-            <a:pPr lvl="1"/>
-            <a:r>
-              <a:rPr lang="en-US" dirty="0"/>
-              <a:t>Webinars &amp; Marketing</a:t>
-            </a:r>
-          </a:p>
-          <a:p>
-            <a:r>
-              <a:rPr lang="en-US" dirty="0"/>
-              <a:t>Improve Onboarding experience</a:t>
-            </a:r>
-          </a:p>
-          <a:p>
-            <a:pPr lvl="1"/>
-            <a:r>
-              <a:rPr lang="en-US" dirty="0"/>
-              <a:t>Improve/influence Zowe.org website navigation</a:t>
-            </a:r>
-          </a:p>
-          <a:p>
-            <a:pPr lvl="1"/>
-            <a:r>
-              <a:rPr lang="en-US" dirty="0"/>
-              <a:t>Accurately “direct” new-to-Zowe visitors</a:t>
-            </a:r>
-          </a:p>
-          <a:p>
-            <a:r>
-              <a:rPr lang="en-US" dirty="0"/>
-              <a:t>Continue and transition stat reporting (KPI-centric)</a:t>
-            </a:r>
-          </a:p>
-          <a:p>
-            <a:pPr lvl="1"/>
-            <a:r>
-              <a:rPr lang="en-US" dirty="0"/>
-              <a:t>Identify trends &amp; influencers</a:t>
-            </a:r>
-          </a:p>
-          <a:p>
-            <a:pPr lvl="1"/>
-            <a:r>
-              <a:rPr lang="en-US" dirty="0"/>
-              <a:t>Easy prep for all Zowe Communications</a:t>
-            </a:r>
-          </a:p>
-          <a:p>
-            <a:pPr lvl="1"/>
+              <a:t>Cross Squad Dependencies 1</a:t>
+            </a:r>
+          </a:p>
+          <a:p>
+            <a:r>
+              <a:rPr lang="en-US" dirty="0"/>
+              <a:t>Cross Squad Dependencies 2</a:t>
+            </a:r>
+          </a:p>
+          <a:p>
+            <a:endParaRPr lang="en-US" dirty="0"/>
+          </a:p>
+          <a:p>
+            <a:pPr marL="101600" indent="0">
+              <a:buNone/>
+            </a:pPr>
             <a:endParaRPr lang="en-US" dirty="0"/>
           </a:p>
         </p:txBody>
@@ -7864,7 +7955,7 @@
     </p:spTree>
     <p:extLst>
       <p:ext uri="{BB962C8B-B14F-4D97-AF65-F5344CB8AC3E}">
-        <p14:creationId xmlns:p14="http://schemas.microsoft.com/office/powerpoint/2010/main" val="345901736"/>
+        <p14:creationId xmlns:p14="http://schemas.microsoft.com/office/powerpoint/2010/main" val="1515987240"/>
       </p:ext>
     </p:extLst>
   </p:cSld>
@@ -7873,91 +7964,6 @@
   </p:clrMapOvr>
   <p:transition spd="med">
     <p:fade thruBlk="1"/>
-  </p:transition>
-</p:sld>
-</file>
-
-<file path=ppt/slides/slide24.xml><?xml version="1.0" encoding="utf-8"?>
-<p:sld xmlns:a="http://schemas.openxmlformats.org/drawingml/2006/main" xmlns:r="http://schemas.openxmlformats.org/officeDocument/2006/relationships" xmlns:p="http://schemas.openxmlformats.org/presentationml/2006/main">
-  <p:cSld>
-    <p:spTree>
-      <p:nvGrpSpPr>
-        <p:cNvPr id="1" name=""/>
-        <p:cNvGrpSpPr/>
-        <p:nvPr/>
-      </p:nvGrpSpPr>
-      <p:grpSpPr>
-        <a:xfrm>
-          <a:off x="0" y="0"/>
-          <a:ext cx="0" cy="0"/>
-          <a:chOff x="0" y="0"/>
-          <a:chExt cx="0" cy="0"/>
-        </a:xfrm>
-      </p:grpSpPr>
-      <p:sp>
-        <p:nvSpPr>
-          <p:cNvPr id="2" name="Text Placeholder 1">
-            <a:extLst>
-              <a:ext uri="{FF2B5EF4-FFF2-40B4-BE49-F238E27FC236}">
-                <a16:creationId xmlns:a16="http://schemas.microsoft.com/office/drawing/2014/main" id="{ADB2E00A-906F-6645-9A30-53C6D93DC43C}"/>
-              </a:ext>
-            </a:extLst>
-          </p:cNvPr>
-          <p:cNvSpPr>
-            <a:spLocks noGrp="1"/>
-          </p:cNvSpPr>
-          <p:nvPr>
-            <p:ph type="body" idx="1"/>
-          </p:nvPr>
-        </p:nvSpPr>
-        <p:spPr/>
-        <p:txBody>
-          <a:bodyPr/>
-          <a:lstStyle/>
-          <a:p>
-            <a:r>
-              <a:rPr lang="en-US" dirty="0"/>
-              <a:t>Systems Squad Focus</a:t>
-            </a:r>
-          </a:p>
-          <a:p>
-            <a:r>
-              <a:rPr lang="en-US" sz="2000" dirty="0"/>
-              <a:t>Mark </a:t>
-            </a:r>
-            <a:r>
-              <a:rPr lang="en-US" sz="2000" dirty="0" err="1"/>
-              <a:t>Ackert</a:t>
-            </a:r>
-            <a:r>
-              <a:rPr lang="en-US" sz="2000" dirty="0"/>
-              <a:t> (Squad Lead)</a:t>
-            </a:r>
-          </a:p>
-          <a:p>
-            <a:r>
-              <a:rPr lang="en-US" sz="2000" dirty="0" err="1"/>
-              <a:t>f.k.a</a:t>
-            </a:r>
-            <a:r>
-              <a:rPr lang="en-US" sz="2000" dirty="0"/>
-              <a:t>. CI/CD Squad</a:t>
-            </a:r>
-          </a:p>
-        </p:txBody>
-      </p:sp>
-    </p:spTree>
-    <p:extLst>
-      <p:ext uri="{BB962C8B-B14F-4D97-AF65-F5344CB8AC3E}">
-        <p14:creationId xmlns:p14="http://schemas.microsoft.com/office/powerpoint/2010/main" val="2949732729"/>
-      </p:ext>
-    </p:extLst>
-  </p:cSld>
-  <p:clrMapOvr>
-    <a:masterClrMapping/>
-  </p:clrMapOvr>
-  <p:transition spd="med">
-    <p:fade/>
   </p:transition>
 </p:sld>
 </file>
@@ -8002,115 +8008,6 @@
           <a:p>
             <a:r>
               <a:rPr lang="en-US" dirty="0"/>
-              <a:t>Dependencies</a:t>
-            </a:r>
-          </a:p>
-        </p:txBody>
-      </p:sp>
-      <p:sp>
-        <p:nvSpPr>
-          <p:cNvPr id="4" name="Text Placeholder 3">
-            <a:extLst>
-              <a:ext uri="{FF2B5EF4-FFF2-40B4-BE49-F238E27FC236}">
-                <a16:creationId xmlns:a16="http://schemas.microsoft.com/office/drawing/2014/main" id="{C0DB4ECB-A7D5-6B47-8180-75CB3C3DB7DE}"/>
-              </a:ext>
-            </a:extLst>
-          </p:cNvPr>
-          <p:cNvSpPr>
-            <a:spLocks noGrp="1"/>
-          </p:cNvSpPr>
-          <p:nvPr>
-            <p:ph type="body" idx="1"/>
-          </p:nvPr>
-        </p:nvSpPr>
-        <p:spPr>
-          <a:xfrm>
-            <a:off x="306211" y="774096"/>
-            <a:ext cx="8369400" cy="4147860"/>
-          </a:xfrm>
-        </p:spPr>
-        <p:txBody>
-          <a:bodyPr/>
-          <a:lstStyle/>
-          <a:p>
-            <a:r>
-              <a:rPr lang="en-US" dirty="0"/>
-              <a:t>Cross Squad Dependencies 1</a:t>
-            </a:r>
-          </a:p>
-          <a:p>
-            <a:r>
-              <a:rPr lang="en-US" dirty="0"/>
-              <a:t>Cross Squad Dependencies 2</a:t>
-            </a:r>
-          </a:p>
-          <a:p>
-            <a:endParaRPr lang="en-US" dirty="0"/>
-          </a:p>
-          <a:p>
-            <a:pPr marL="101600" indent="0">
-              <a:buNone/>
-            </a:pPr>
-            <a:endParaRPr lang="en-US" dirty="0"/>
-          </a:p>
-        </p:txBody>
-      </p:sp>
-    </p:spTree>
-    <p:extLst>
-      <p:ext uri="{BB962C8B-B14F-4D97-AF65-F5344CB8AC3E}">
-        <p14:creationId xmlns:p14="http://schemas.microsoft.com/office/powerpoint/2010/main" val="1515987240"/>
-      </p:ext>
-    </p:extLst>
-  </p:cSld>
-  <p:clrMapOvr>
-    <a:masterClrMapping/>
-  </p:clrMapOvr>
-  <p:transition spd="med">
-    <p:fade thruBlk="1"/>
-  </p:transition>
-</p:sld>
-</file>
-
-<file path=ppt/slides/slide26.xml><?xml version="1.0" encoding="utf-8"?>
-<p:sld xmlns:a="http://schemas.openxmlformats.org/drawingml/2006/main" xmlns:r="http://schemas.openxmlformats.org/officeDocument/2006/relationships" xmlns:p="http://schemas.openxmlformats.org/presentationml/2006/main">
-  <p:cSld>
-    <p:spTree>
-      <p:nvGrpSpPr>
-        <p:cNvPr id="1" name=""/>
-        <p:cNvGrpSpPr/>
-        <p:nvPr/>
-      </p:nvGrpSpPr>
-      <p:grpSpPr>
-        <a:xfrm>
-          <a:off x="0" y="0"/>
-          <a:ext cx="0" cy="0"/>
-          <a:chOff x="0" y="0"/>
-          <a:chExt cx="0" cy="0"/>
-        </a:xfrm>
-      </p:grpSpPr>
-      <p:sp>
-        <p:nvSpPr>
-          <p:cNvPr id="3" name="Title 2">
-            <a:extLst>
-              <a:ext uri="{FF2B5EF4-FFF2-40B4-BE49-F238E27FC236}">
-                <a16:creationId xmlns:a16="http://schemas.microsoft.com/office/drawing/2014/main" id="{CFEEEE36-E132-0D40-A4B8-9BDC5C8B6528}"/>
-              </a:ext>
-            </a:extLst>
-          </p:cNvPr>
-          <p:cNvSpPr>
-            <a:spLocks noGrp="1"/>
-          </p:cNvSpPr>
-          <p:nvPr>
-            <p:ph type="title"/>
-          </p:nvPr>
-        </p:nvSpPr>
-        <p:spPr/>
-        <p:txBody>
-          <a:bodyPr/>
-          <a:lstStyle/>
-          <a:p>
-            <a:r>
-              <a:rPr lang="en-US" dirty="0"/>
               <a:t>Focus</a:t>
             </a:r>
           </a:p>
@@ -8234,7 +8131,7 @@
 </p:sld>
 </file>
 
-<file path=ppt/slides/slide27.xml><?xml version="1.0" encoding="utf-8"?>
+<file path=ppt/slides/slide26.xml><?xml version="1.0" encoding="utf-8"?>
 <p:sld xmlns:a="http://schemas.openxmlformats.org/drawingml/2006/main" xmlns:r="http://schemas.openxmlformats.org/officeDocument/2006/relationships" xmlns:p="http://schemas.openxmlformats.org/presentationml/2006/main">
   <p:cSld>
     <p:spTree>
@@ -8316,6 +8213,115 @@
 </p:sld>
 </file>
 
+<file path=ppt/slides/slide27.xml><?xml version="1.0" encoding="utf-8"?>
+<p:sld xmlns:a="http://schemas.openxmlformats.org/drawingml/2006/main" xmlns:r="http://schemas.openxmlformats.org/officeDocument/2006/relationships" xmlns:p="http://schemas.openxmlformats.org/presentationml/2006/main">
+  <p:cSld>
+    <p:spTree>
+      <p:nvGrpSpPr>
+        <p:cNvPr id="1" name=""/>
+        <p:cNvGrpSpPr/>
+        <p:nvPr/>
+      </p:nvGrpSpPr>
+      <p:grpSpPr>
+        <a:xfrm>
+          <a:off x="0" y="0"/>
+          <a:ext cx="0" cy="0"/>
+          <a:chOff x="0" y="0"/>
+          <a:chExt cx="0" cy="0"/>
+        </a:xfrm>
+      </p:grpSpPr>
+      <p:sp>
+        <p:nvSpPr>
+          <p:cNvPr id="3" name="Title 2">
+            <a:extLst>
+              <a:ext uri="{FF2B5EF4-FFF2-40B4-BE49-F238E27FC236}">
+                <a16:creationId xmlns:a16="http://schemas.microsoft.com/office/drawing/2014/main" id="{CFEEEE36-E132-0D40-A4B8-9BDC5C8B6528}"/>
+              </a:ext>
+            </a:extLst>
+          </p:cNvPr>
+          <p:cNvSpPr>
+            <a:spLocks noGrp="1"/>
+          </p:cNvSpPr>
+          <p:nvPr>
+            <p:ph type="title"/>
+          </p:nvPr>
+        </p:nvSpPr>
+        <p:spPr/>
+        <p:txBody>
+          <a:bodyPr/>
+          <a:lstStyle/>
+          <a:p>
+            <a:r>
+              <a:rPr lang="en-US" dirty="0"/>
+              <a:t>Dependencies</a:t>
+            </a:r>
+          </a:p>
+        </p:txBody>
+      </p:sp>
+      <p:sp>
+        <p:nvSpPr>
+          <p:cNvPr id="4" name="Text Placeholder 3">
+            <a:extLst>
+              <a:ext uri="{FF2B5EF4-FFF2-40B4-BE49-F238E27FC236}">
+                <a16:creationId xmlns:a16="http://schemas.microsoft.com/office/drawing/2014/main" id="{C0DB4ECB-A7D5-6B47-8180-75CB3C3DB7DE}"/>
+              </a:ext>
+            </a:extLst>
+          </p:cNvPr>
+          <p:cNvSpPr>
+            <a:spLocks noGrp="1"/>
+          </p:cNvSpPr>
+          <p:nvPr>
+            <p:ph type="body" idx="1"/>
+          </p:nvPr>
+        </p:nvSpPr>
+        <p:spPr>
+          <a:xfrm>
+            <a:off x="306211" y="774096"/>
+            <a:ext cx="8369400" cy="4147860"/>
+          </a:xfrm>
+        </p:spPr>
+        <p:txBody>
+          <a:bodyPr/>
+          <a:lstStyle/>
+          <a:p>
+            <a:r>
+              <a:rPr lang="en-US" dirty="0"/>
+              <a:t>Cross Squad Dependencies 1</a:t>
+            </a:r>
+          </a:p>
+          <a:p>
+            <a:r>
+              <a:rPr lang="en-US" dirty="0"/>
+              <a:t>Cross Squad Dependencies 2</a:t>
+            </a:r>
+          </a:p>
+          <a:p>
+            <a:endParaRPr lang="en-US" dirty="0"/>
+          </a:p>
+          <a:p>
+            <a:pPr marL="101600" indent="0">
+              <a:buNone/>
+            </a:pPr>
+            <a:endParaRPr lang="en-US" dirty="0"/>
+          </a:p>
+        </p:txBody>
+      </p:sp>
+    </p:spTree>
+    <p:extLst>
+      <p:ext uri="{BB962C8B-B14F-4D97-AF65-F5344CB8AC3E}">
+        <p14:creationId xmlns:p14="http://schemas.microsoft.com/office/powerpoint/2010/main" val="1120286917"/>
+      </p:ext>
+    </p:extLst>
+  </p:cSld>
+  <p:clrMapOvr>
+    <a:masterClrMapping/>
+  </p:clrMapOvr>
+  <p:transition spd="med">
+    <p:fade thruBlk="1"/>
+  </p:transition>
+</p:sld>
+</file>
+
 <file path=ppt/slides/slide28.xml><?xml version="1.0" encoding="utf-8"?>
 <p:sld xmlns:a="http://schemas.openxmlformats.org/drawingml/2006/main" xmlns:r="http://schemas.openxmlformats.org/officeDocument/2006/relationships" xmlns:p="http://schemas.openxmlformats.org/presentationml/2006/main">
   <p:cSld>
@@ -8356,7 +8362,7 @@
           <a:p>
             <a:r>
               <a:rPr lang="en-US" dirty="0"/>
-              <a:t>Dependencies</a:t>
+              <a:t>Focus</a:t>
             </a:r>
           </a:p>
         </p:txBody>
@@ -8377,42 +8383,104 @@
             <p:ph type="body" idx="1"/>
           </p:nvPr>
         </p:nvSpPr>
-        <p:spPr>
-          <a:xfrm>
-            <a:off x="306211" y="774096"/>
-            <a:ext cx="8369400" cy="4147860"/>
-          </a:xfrm>
-        </p:spPr>
+        <p:spPr/>
         <p:txBody>
           <a:bodyPr/>
           <a:lstStyle/>
           <a:p>
             <a:r>
               <a:rPr lang="en-US" dirty="0"/>
-              <a:t>Cross Squad Dependencies 1</a:t>
-            </a:r>
-          </a:p>
-          <a:p>
-            <a:r>
-              <a:rPr lang="en-US" dirty="0"/>
-              <a:t>Cross Squad Dependencies 2</a:t>
-            </a:r>
-          </a:p>
-          <a:p>
-            <a:endParaRPr lang="en-US" dirty="0"/>
-          </a:p>
-          <a:p>
-            <a:pPr marL="101600" indent="0">
-              <a:buNone/>
-            </a:pPr>
-            <a:endParaRPr lang="en-US" dirty="0"/>
+              <a:t>Design and Begin </a:t>
+            </a:r>
+            <a:r>
+              <a:rPr lang="en-US" dirty="0" err="1"/>
+              <a:t>Zowe</a:t>
+            </a:r>
+            <a:r>
+              <a:rPr lang="en-US" dirty="0"/>
+              <a:t> Extensions Refactor  [Steve, Joe]</a:t>
+            </a:r>
+          </a:p>
+          <a:p>
+            <a:pPr lvl="1"/>
+            <a:r>
+              <a:rPr lang="en-US" dirty="0"/>
+              <a:t>Improve both </a:t>
+            </a:r>
+            <a:r>
+              <a:rPr lang="en-US" dirty="0" err="1"/>
+              <a:t>Zowe</a:t>
+            </a:r>
+            <a:r>
+              <a:rPr lang="en-US" dirty="0"/>
+              <a:t> administrator and </a:t>
+            </a:r>
+            <a:r>
+              <a:rPr lang="en-US" dirty="0" err="1"/>
+              <a:t>Zowe</a:t>
+            </a:r>
+            <a:r>
+              <a:rPr lang="en-US" dirty="0"/>
+              <a:t> extender user experiences when developing and deploying </a:t>
+            </a:r>
+            <a:r>
+              <a:rPr lang="en-US" dirty="0" err="1"/>
+              <a:t>Zowe</a:t>
+            </a:r>
+            <a:r>
+              <a:rPr lang="en-US" dirty="0"/>
+              <a:t> extensions by streamlining packaging, install, upgrade, and configuration.</a:t>
+            </a:r>
+          </a:p>
+          <a:p>
+            <a:pPr lvl="1"/>
+            <a:r>
+              <a:rPr lang="en-US" dirty="0"/>
+              <a:t>Unify existing </a:t>
+            </a:r>
+            <a:r>
+              <a:rPr lang="en-US" dirty="0" err="1"/>
+              <a:t>Zowe</a:t>
+            </a:r>
+            <a:r>
+              <a:rPr lang="en-US" dirty="0"/>
+              <a:t> extensions with the new extension design and rebuild documentation</a:t>
+            </a:r>
+          </a:p>
+          <a:p>
+            <a:pPr lvl="1"/>
+            <a:r>
+              <a:rPr lang="en-US" dirty="0"/>
+              <a:t>This may shift into v2 if breaking changes are required</a:t>
+            </a:r>
+          </a:p>
+          <a:p>
+            <a:r>
+              <a:rPr lang="en-US" dirty="0"/>
+              <a:t>Research and POC containerization of </a:t>
+            </a:r>
+            <a:r>
+              <a:rPr lang="en-US" dirty="0" err="1"/>
+              <a:t>Zowe</a:t>
+            </a:r>
+            <a:r>
+              <a:rPr lang="en-US" dirty="0"/>
+              <a:t>. [Sean]</a:t>
+            </a:r>
+          </a:p>
+          <a:p>
+            <a:pPr lvl="1"/>
+            <a:r>
+              <a:rPr lang="en-US" dirty="0"/>
+              <a:t>Initially targeted for developers</a:t>
+            </a:r>
           </a:p>
         </p:txBody>
       </p:sp>
     </p:spTree>
     <p:extLst>
       <p:ext uri="{BB962C8B-B14F-4D97-AF65-F5344CB8AC3E}">
-        <p14:creationId xmlns:p14="http://schemas.microsoft.com/office/powerpoint/2010/main" val="1120286917"/>
+        <p14:creationId xmlns:p14="http://schemas.microsoft.com/office/powerpoint/2010/main" val="209280467"/>
       </p:ext>
     </p:extLst>
   </p:cSld>
@@ -8444,38 +8512,10 @@
       </p:grpSpPr>
       <p:sp>
         <p:nvSpPr>
-          <p:cNvPr id="3" name="Title 2">
+          <p:cNvPr id="2" name="Text Placeholder 1">
             <a:extLst>
               <a:ext uri="{FF2B5EF4-FFF2-40B4-BE49-F238E27FC236}">
-                <a16:creationId xmlns:a16="http://schemas.microsoft.com/office/drawing/2014/main" id="{CFEEEE36-E132-0D40-A4B8-9BDC5C8B6528}"/>
-              </a:ext>
-            </a:extLst>
-          </p:cNvPr>
-          <p:cNvSpPr>
-            <a:spLocks noGrp="1"/>
-          </p:cNvSpPr>
-          <p:nvPr>
-            <p:ph type="title"/>
-          </p:nvPr>
-        </p:nvSpPr>
-        <p:spPr/>
-        <p:txBody>
-          <a:bodyPr/>
-          <a:lstStyle/>
-          <a:p>
-            <a:r>
-              <a:rPr lang="en-US" dirty="0"/>
-              <a:t>Focus</a:t>
-            </a:r>
-          </a:p>
-        </p:txBody>
-      </p:sp>
-      <p:sp>
-        <p:nvSpPr>
-          <p:cNvPr id="4" name="Text Placeholder 3">
-            <a:extLst>
-              <a:ext uri="{FF2B5EF4-FFF2-40B4-BE49-F238E27FC236}">
-                <a16:creationId xmlns:a16="http://schemas.microsoft.com/office/drawing/2014/main" id="{C0DB4ECB-A7D5-6B47-8180-75CB3C3DB7DE}"/>
+                <a16:creationId xmlns:a16="http://schemas.microsoft.com/office/drawing/2014/main" id="{ADB2E00A-906F-6645-9A30-53C6D93DC43C}"/>
               </a:ext>
             </a:extLst>
           </p:cNvPr>
@@ -8493,89 +8533,29 @@
           <a:p>
             <a:r>
               <a:rPr lang="en-US" dirty="0"/>
-              <a:t>Design and Begin </a:t>
-            </a:r>
-            <a:r>
-              <a:rPr lang="en-US" dirty="0" err="1"/>
-              <a:t>Zowe</a:t>
-            </a:r>
-            <a:r>
-              <a:rPr lang="en-US" dirty="0"/>
-              <a:t> Extensions Refactor  [Steve, Joe]</a:t>
-            </a:r>
-          </a:p>
-          <a:p>
-            <a:pPr lvl="1"/>
-            <a:r>
-              <a:rPr lang="en-US" dirty="0"/>
-              <a:t>Improve both </a:t>
-            </a:r>
-            <a:r>
-              <a:rPr lang="en-US" dirty="0" err="1"/>
-              <a:t>Zowe</a:t>
-            </a:r>
-            <a:r>
-              <a:rPr lang="en-US" dirty="0"/>
-              <a:t> administrator and </a:t>
-            </a:r>
-            <a:r>
-              <a:rPr lang="en-US" dirty="0" err="1"/>
-              <a:t>Zowe</a:t>
-            </a:r>
-            <a:r>
-              <a:rPr lang="en-US" dirty="0"/>
-              <a:t> extender user experiences when developing and deploying </a:t>
-            </a:r>
-            <a:r>
-              <a:rPr lang="en-US" dirty="0" err="1"/>
-              <a:t>Zowe</a:t>
-            </a:r>
-            <a:r>
-              <a:rPr lang="en-US" dirty="0"/>
-              <a:t> extensions by streamlining packaging, install, upgrade, and configuration.</a:t>
-            </a:r>
-          </a:p>
-          <a:p>
-            <a:pPr lvl="1"/>
-            <a:r>
-              <a:rPr lang="en-US" dirty="0"/>
-              <a:t>Unify existing </a:t>
-            </a:r>
-            <a:r>
-              <a:rPr lang="en-US" dirty="0" err="1"/>
-              <a:t>Zowe</a:t>
-            </a:r>
-            <a:r>
-              <a:rPr lang="en-US" dirty="0"/>
-              <a:t> extensions with the new extension design and rebuild documentation</a:t>
-            </a:r>
-          </a:p>
-          <a:p>
-            <a:pPr lvl="1"/>
-            <a:r>
-              <a:rPr lang="en-US" dirty="0"/>
-              <a:t>This may shift into v2 if breaking changes are required</a:t>
-            </a:r>
-          </a:p>
-          <a:p>
-            <a:r>
-              <a:rPr lang="en-US" dirty="0"/>
-              <a:t>Research and POC containerization of </a:t>
-            </a:r>
-            <a:r>
-              <a:rPr lang="en-US" dirty="0" err="1"/>
-              <a:t>Zowe</a:t>
-            </a:r>
-            <a:r>
-              <a:rPr lang="en-US" dirty="0"/>
-              <a:t>. [Sean]</a:t>
-            </a:r>
-          </a:p>
-          <a:p>
-            <a:pPr lvl="1"/>
-            <a:r>
-              <a:rPr lang="en-US" dirty="0"/>
-              <a:t>Initially targeted for developers</a:t>
+              <a:t>Doc Squad Focus</a:t>
+            </a:r>
+          </a:p>
+          <a:p>
+            <a:r>
+              <a:rPr lang="en-US" sz="2000" dirty="0"/>
+              <a:t>Ashley</a:t>
+            </a:r>
+            <a:r>
+              <a:rPr lang="zh-CN" altLang="en-US" sz="2000" dirty="0"/>
+              <a:t> </a:t>
+            </a:r>
+            <a:r>
+              <a:rPr lang="en-US" altLang="zh-CN" sz="2000" dirty="0"/>
+              <a:t>Li</a:t>
+            </a:r>
+            <a:r>
+              <a:rPr lang="zh-CN" altLang="en-US" sz="2000" dirty="0"/>
+              <a:t> </a:t>
+            </a:r>
+            <a:r>
+              <a:rPr lang="en-US" sz="2000" dirty="0"/>
+              <a:t>(Squad Lead)</a:t>
             </a:r>
           </a:p>
         </p:txBody>
@@ -8583,7 +8563,7 @@
     </p:spTree>
     <p:extLst>
       <p:ext uri="{BB962C8B-B14F-4D97-AF65-F5344CB8AC3E}">
-        <p14:creationId xmlns:p14="http://schemas.microsoft.com/office/powerpoint/2010/main" val="209280467"/>
+        <p14:creationId xmlns:p14="http://schemas.microsoft.com/office/powerpoint/2010/main" val="1157146962"/>
       </p:ext>
     </p:extLst>
   </p:cSld>
@@ -8591,7 +8571,7 @@
     <a:masterClrMapping/>
   </p:clrMapOvr>
   <p:transition spd="med">
-    <p:fade thruBlk="1"/>
+    <p:fade/>
   </p:transition>
 </p:sld>
 </file>
@@ -8765,89 +8745,6 @@
       </p:grpSpPr>
       <p:sp>
         <p:nvSpPr>
-          <p:cNvPr id="2" name="Text Placeholder 1">
-            <a:extLst>
-              <a:ext uri="{FF2B5EF4-FFF2-40B4-BE49-F238E27FC236}">
-                <a16:creationId xmlns:a16="http://schemas.microsoft.com/office/drawing/2014/main" id="{ADB2E00A-906F-6645-9A30-53C6D93DC43C}"/>
-              </a:ext>
-            </a:extLst>
-          </p:cNvPr>
-          <p:cNvSpPr>
-            <a:spLocks noGrp="1"/>
-          </p:cNvSpPr>
-          <p:nvPr>
-            <p:ph type="body" idx="1"/>
-          </p:nvPr>
-        </p:nvSpPr>
-        <p:spPr/>
-        <p:txBody>
-          <a:bodyPr/>
-          <a:lstStyle/>
-          <a:p>
-            <a:r>
-              <a:rPr lang="en-US" dirty="0"/>
-              <a:t>Doc Squad Focus</a:t>
-            </a:r>
-          </a:p>
-          <a:p>
-            <a:r>
-              <a:rPr lang="en-US" sz="2000" dirty="0"/>
-              <a:t>Ashley</a:t>
-            </a:r>
-            <a:r>
-              <a:rPr lang="zh-CN" altLang="en-US" sz="2000" dirty="0"/>
-              <a:t> </a:t>
-            </a:r>
-            <a:r>
-              <a:rPr lang="en-US" altLang="zh-CN" sz="2000" dirty="0"/>
-              <a:t>Li</a:t>
-            </a:r>
-            <a:r>
-              <a:rPr lang="zh-CN" altLang="en-US" sz="2000" dirty="0"/>
-              <a:t> </a:t>
-            </a:r>
-            <a:r>
-              <a:rPr lang="en-US" sz="2000" dirty="0"/>
-              <a:t>(Squad Lead)</a:t>
-            </a:r>
-          </a:p>
-        </p:txBody>
-      </p:sp>
-    </p:spTree>
-    <p:extLst>
-      <p:ext uri="{BB962C8B-B14F-4D97-AF65-F5344CB8AC3E}">
-        <p14:creationId xmlns:p14="http://schemas.microsoft.com/office/powerpoint/2010/main" val="1157146962"/>
-      </p:ext>
-    </p:extLst>
-  </p:cSld>
-  <p:clrMapOvr>
-    <a:masterClrMapping/>
-  </p:clrMapOvr>
-  <p:transition spd="med">
-    <p:fade/>
-  </p:transition>
-</p:sld>
-</file>
-
-<file path=ppt/slides/slide31.xml><?xml version="1.0" encoding="utf-8"?>
-<p:sld xmlns:a="http://schemas.openxmlformats.org/drawingml/2006/main" xmlns:r="http://schemas.openxmlformats.org/officeDocument/2006/relationships" xmlns:p="http://schemas.openxmlformats.org/presentationml/2006/main">
-  <p:cSld>
-    <p:spTree>
-      <p:nvGrpSpPr>
-        <p:cNvPr id="1" name=""/>
-        <p:cNvGrpSpPr/>
-        <p:nvPr/>
-      </p:nvGrpSpPr>
-      <p:grpSpPr>
-        <a:xfrm>
-          <a:off x="0" y="0"/>
-          <a:ext cx="0" cy="0"/>
-          <a:chOff x="0" y="0"/>
-          <a:chExt cx="0" cy="0"/>
-        </a:xfrm>
-      </p:grpSpPr>
-      <p:sp>
-        <p:nvSpPr>
           <p:cNvPr id="3" name="Title 2">
             <a:extLst>
               <a:ext uri="{FF2B5EF4-FFF2-40B4-BE49-F238E27FC236}">
@@ -8876,46 +8773,414 @@
       </p:sp>
       <p:sp>
         <p:nvSpPr>
-          <p:cNvPr id="4" name="Text Placeholder 3">
+          <p:cNvPr id="6" name="Text Placeholder 3">
             <a:extLst>
               <a:ext uri="{FF2B5EF4-FFF2-40B4-BE49-F238E27FC236}">
-                <a16:creationId xmlns:a16="http://schemas.microsoft.com/office/drawing/2014/main" id="{C0DB4ECB-A7D5-6B47-8180-75CB3C3DB7DE}"/>
+                <a16:creationId xmlns:a16="http://schemas.microsoft.com/office/drawing/2014/main" id="{7DDA8DD6-8DFC-7B40-B543-B7065359847A}"/>
               </a:ext>
             </a:extLst>
           </p:cNvPr>
-          <p:cNvSpPr>
-            <a:spLocks noGrp="1"/>
+          <p:cNvSpPr txBox="1">
+            <a:spLocks/>
           </p:cNvSpPr>
-          <p:nvPr>
-            <p:ph type="body" idx="1"/>
-          </p:nvPr>
+          <p:nvPr/>
         </p:nvSpPr>
         <p:spPr>
           <a:xfrm>
-            <a:off x="306211" y="774096"/>
-            <a:ext cx="8369400" cy="4147860"/>
+            <a:off x="333992" y="729290"/>
+            <a:ext cx="8369400" cy="1995056"/>
           </a:xfrm>
+          <a:prstGeom prst="rect">
+            <a:avLst/>
+          </a:prstGeom>
+          <a:noFill/>
+          <a:ln>
+            <a:noFill/>
+          </a:ln>
         </p:spPr>
         <p:txBody>
-          <a:bodyPr/>
-          <a:lstStyle/>
-          <a:p>
-            <a:r>
-              <a:rPr lang="en-US" dirty="0"/>
-              <a:t>Cross Squad Dependencies 1</a:t>
-            </a:r>
-          </a:p>
-          <a:p>
-            <a:r>
-              <a:rPr lang="en-US" dirty="0"/>
-              <a:t>Cross Squad Dependencies 2</a:t>
-            </a:r>
-          </a:p>
-          <a:p>
+          <a:bodyPr spcFirstLastPara="1" wrap="square" lIns="91425" tIns="91425" rIns="91425" bIns="91425" anchor="t" anchorCtr="0">
+            <a:noAutofit/>
+          </a:bodyPr>
+          <a:lstStyle>
+            <a:defPPr marR="0" lvl="0" algn="l" rtl="0">
+              <a:lnSpc>
+                <a:spcPct val="100000"/>
+              </a:lnSpc>
+              <a:spcBef>
+                <a:spcPts val="0"/>
+              </a:spcBef>
+              <a:spcAft>
+                <a:spcPts val="0"/>
+              </a:spcAft>
+            </a:defPPr>
+            <a:lvl1pPr marL="457200" marR="0" lvl="0" indent="-355600" algn="l" rtl="0">
+              <a:lnSpc>
+                <a:spcPct val="100000"/>
+              </a:lnSpc>
+              <a:spcBef>
+                <a:spcPts val="400"/>
+              </a:spcBef>
+              <a:spcAft>
+                <a:spcPts val="0"/>
+              </a:spcAft>
+              <a:buClr>
+                <a:schemeClr val="dk1"/>
+              </a:buClr>
+              <a:buSzPts val="2000"/>
+              <a:buFont typeface="Arial"/>
+              <a:buChar char="•"/>
+              <a:defRPr sz="2000" b="0" i="0" u="none" strike="noStrike" cap="none">
+                <a:solidFill>
+                  <a:schemeClr val="dk1"/>
+                </a:solidFill>
+                <a:latin typeface="Gill Sans"/>
+                <a:ea typeface="Gill Sans"/>
+                <a:cs typeface="Gill Sans"/>
+                <a:sym typeface="Gill Sans"/>
+              </a:defRPr>
+            </a:lvl1pPr>
+            <a:lvl2pPr marL="914400" marR="0" lvl="1" indent="-342900" algn="l" rtl="0">
+              <a:lnSpc>
+                <a:spcPct val="100000"/>
+              </a:lnSpc>
+              <a:spcBef>
+                <a:spcPts val="360"/>
+              </a:spcBef>
+              <a:spcAft>
+                <a:spcPts val="0"/>
+              </a:spcAft>
+              <a:buClr>
+                <a:schemeClr val="dk1"/>
+              </a:buClr>
+              <a:buSzPts val="1800"/>
+              <a:buFont typeface="Arial"/>
+              <a:buChar char="–"/>
+              <a:defRPr sz="1800" b="0" i="0" u="none" strike="noStrike" cap="none">
+                <a:solidFill>
+                  <a:schemeClr val="dk1"/>
+                </a:solidFill>
+                <a:latin typeface="Gill Sans"/>
+                <a:ea typeface="Gill Sans"/>
+                <a:cs typeface="Gill Sans"/>
+                <a:sym typeface="Gill Sans"/>
+              </a:defRPr>
+            </a:lvl2pPr>
+            <a:lvl3pPr marL="1371600" marR="0" lvl="2" indent="-330200" algn="l" rtl="0">
+              <a:lnSpc>
+                <a:spcPct val="100000"/>
+              </a:lnSpc>
+              <a:spcBef>
+                <a:spcPts val="320"/>
+              </a:spcBef>
+              <a:spcAft>
+                <a:spcPts val="0"/>
+              </a:spcAft>
+              <a:buClr>
+                <a:schemeClr val="dk1"/>
+              </a:buClr>
+              <a:buSzPts val="1600"/>
+              <a:buFont typeface="Arial"/>
+              <a:buChar char="•"/>
+              <a:defRPr sz="1600" b="0" i="0" u="none" strike="noStrike" cap="none">
+                <a:solidFill>
+                  <a:schemeClr val="dk1"/>
+                </a:solidFill>
+                <a:latin typeface="Gill Sans"/>
+                <a:ea typeface="Gill Sans"/>
+                <a:cs typeface="Gill Sans"/>
+                <a:sym typeface="Gill Sans"/>
+              </a:defRPr>
+            </a:lvl3pPr>
+            <a:lvl4pPr marL="1828800" marR="0" lvl="3" indent="-330200" algn="l" rtl="0">
+              <a:lnSpc>
+                <a:spcPct val="100000"/>
+              </a:lnSpc>
+              <a:spcBef>
+                <a:spcPts val="320"/>
+              </a:spcBef>
+              <a:spcAft>
+                <a:spcPts val="0"/>
+              </a:spcAft>
+              <a:buClr>
+                <a:schemeClr val="dk1"/>
+              </a:buClr>
+              <a:buSzPts val="1600"/>
+              <a:buFont typeface="Arial"/>
+              <a:buChar char="–"/>
+              <a:defRPr sz="1600" b="0" i="0" u="none" strike="noStrike" cap="none">
+                <a:solidFill>
+                  <a:schemeClr val="dk1"/>
+                </a:solidFill>
+                <a:latin typeface="Gill Sans"/>
+                <a:ea typeface="Gill Sans"/>
+                <a:cs typeface="Gill Sans"/>
+                <a:sym typeface="Gill Sans"/>
+              </a:defRPr>
+            </a:lvl4pPr>
+            <a:lvl5pPr marL="2286000" marR="0" lvl="4" indent="-330200" algn="l" rtl="0">
+              <a:lnSpc>
+                <a:spcPct val="100000"/>
+              </a:lnSpc>
+              <a:spcBef>
+                <a:spcPts val="320"/>
+              </a:spcBef>
+              <a:spcAft>
+                <a:spcPts val="0"/>
+              </a:spcAft>
+              <a:buClr>
+                <a:schemeClr val="dk1"/>
+              </a:buClr>
+              <a:buSzPts val="1600"/>
+              <a:buFont typeface="Arial"/>
+              <a:buChar char="»"/>
+              <a:defRPr sz="1600" b="0" i="0" u="none" strike="noStrike" cap="none">
+                <a:solidFill>
+                  <a:schemeClr val="dk1"/>
+                </a:solidFill>
+                <a:latin typeface="Gill Sans"/>
+                <a:ea typeface="Gill Sans"/>
+                <a:cs typeface="Gill Sans"/>
+                <a:sym typeface="Gill Sans"/>
+              </a:defRPr>
+            </a:lvl5pPr>
+            <a:lvl6pPr marL="2743200" marR="0" lvl="5" indent="-355600" algn="l" rtl="0">
+              <a:lnSpc>
+                <a:spcPct val="100000"/>
+              </a:lnSpc>
+              <a:spcBef>
+                <a:spcPts val="400"/>
+              </a:spcBef>
+              <a:spcAft>
+                <a:spcPts val="0"/>
+              </a:spcAft>
+              <a:buClr>
+                <a:schemeClr val="dk1"/>
+              </a:buClr>
+              <a:buSzPts val="2000"/>
+              <a:buFont typeface="Arial"/>
+              <a:buChar char="•"/>
+              <a:defRPr sz="2000" b="0" i="0" u="none" strike="noStrike" cap="none">
+                <a:solidFill>
+                  <a:schemeClr val="dk1"/>
+                </a:solidFill>
+                <a:latin typeface="Calibri"/>
+                <a:ea typeface="Calibri"/>
+                <a:cs typeface="Calibri"/>
+                <a:sym typeface="Calibri"/>
+              </a:defRPr>
+            </a:lvl6pPr>
+            <a:lvl7pPr marL="3200400" marR="0" lvl="6" indent="-355600" algn="l" rtl="0">
+              <a:lnSpc>
+                <a:spcPct val="100000"/>
+              </a:lnSpc>
+              <a:spcBef>
+                <a:spcPts val="400"/>
+              </a:spcBef>
+              <a:spcAft>
+                <a:spcPts val="0"/>
+              </a:spcAft>
+              <a:buClr>
+                <a:schemeClr val="dk1"/>
+              </a:buClr>
+              <a:buSzPts val="2000"/>
+              <a:buFont typeface="Arial"/>
+              <a:buChar char="•"/>
+              <a:defRPr sz="2000" b="0" i="0" u="none" strike="noStrike" cap="none">
+                <a:solidFill>
+                  <a:schemeClr val="dk1"/>
+                </a:solidFill>
+                <a:latin typeface="Calibri"/>
+                <a:ea typeface="Calibri"/>
+                <a:cs typeface="Calibri"/>
+                <a:sym typeface="Calibri"/>
+              </a:defRPr>
+            </a:lvl7pPr>
+            <a:lvl8pPr marL="3657600" marR="0" lvl="7" indent="-355600" algn="l" rtl="0">
+              <a:lnSpc>
+                <a:spcPct val="100000"/>
+              </a:lnSpc>
+              <a:spcBef>
+                <a:spcPts val="400"/>
+              </a:spcBef>
+              <a:spcAft>
+                <a:spcPts val="0"/>
+              </a:spcAft>
+              <a:buClr>
+                <a:schemeClr val="dk1"/>
+              </a:buClr>
+              <a:buSzPts val="2000"/>
+              <a:buFont typeface="Arial"/>
+              <a:buChar char="•"/>
+              <a:defRPr sz="2000" b="0" i="0" u="none" strike="noStrike" cap="none">
+                <a:solidFill>
+                  <a:schemeClr val="dk1"/>
+                </a:solidFill>
+                <a:latin typeface="Calibri"/>
+                <a:ea typeface="Calibri"/>
+                <a:cs typeface="Calibri"/>
+                <a:sym typeface="Calibri"/>
+              </a:defRPr>
+            </a:lvl8pPr>
+            <a:lvl9pPr marL="4114800" marR="0" lvl="8" indent="-355600" algn="l" rtl="0">
+              <a:lnSpc>
+                <a:spcPct val="100000"/>
+              </a:lnSpc>
+              <a:spcBef>
+                <a:spcPts val="400"/>
+              </a:spcBef>
+              <a:spcAft>
+                <a:spcPts val="0"/>
+              </a:spcAft>
+              <a:buClr>
+                <a:schemeClr val="dk1"/>
+              </a:buClr>
+              <a:buSzPts val="2000"/>
+              <a:buFont typeface="Arial"/>
+              <a:buChar char="•"/>
+              <a:defRPr sz="2000" b="0" i="0" u="none" strike="noStrike" cap="none">
+                <a:solidFill>
+                  <a:schemeClr val="dk1"/>
+                </a:solidFill>
+                <a:latin typeface="Calibri"/>
+                <a:ea typeface="Calibri"/>
+                <a:cs typeface="Calibri"/>
+                <a:sym typeface="Calibri"/>
+              </a:defRPr>
+            </a:lvl9pPr>
+          </a:lstStyle>
+          <a:p>
+            <a:r>
+              <a:rPr lang="en-US" altLang="zh-CN" dirty="0"/>
+              <a:t>All</a:t>
+            </a:r>
+            <a:r>
+              <a:rPr lang="zh-CN" altLang="en-US" dirty="0"/>
+              <a:t> </a:t>
+            </a:r>
+            <a:r>
+              <a:rPr lang="en-US" altLang="zh-CN" dirty="0"/>
+              <a:t>squads</a:t>
+            </a:r>
+            <a:r>
+              <a:rPr lang="zh-CN" altLang="en-US" dirty="0"/>
+              <a:t> </a:t>
+            </a:r>
+            <a:r>
+              <a:rPr lang="en-US" altLang="zh-CN" dirty="0"/>
+              <a:t>–</a:t>
+            </a:r>
+            <a:r>
+              <a:rPr lang="zh-CN" altLang="en-US" dirty="0"/>
+              <a:t> </a:t>
+            </a:r>
+            <a:r>
+              <a:rPr lang="en-US" altLang="zh-CN" dirty="0"/>
+              <a:t>New</a:t>
+            </a:r>
+            <a:r>
+              <a:rPr lang="zh-CN" altLang="en-US" dirty="0"/>
+              <a:t> </a:t>
+            </a:r>
+            <a:r>
+              <a:rPr lang="en-US" altLang="zh-CN" dirty="0"/>
+              <a:t>feature</a:t>
+            </a:r>
+            <a:r>
+              <a:rPr lang="zh-CN" altLang="en-US" dirty="0"/>
+              <a:t> </a:t>
+            </a:r>
+            <a:r>
+              <a:rPr lang="en-US" altLang="zh-CN" dirty="0"/>
+              <a:t>content</a:t>
+            </a:r>
             <a:endParaRPr lang="en-US" dirty="0"/>
           </a:p>
           <a:p>
+            <a:r>
+              <a:rPr lang="en-US" altLang="zh-CN" dirty="0"/>
+              <a:t>Onboarding</a:t>
+            </a:r>
+            <a:r>
+              <a:rPr lang="zh-CN" altLang="en-US" dirty="0"/>
+              <a:t> </a:t>
+            </a:r>
+            <a:r>
+              <a:rPr lang="en-US" altLang="zh-CN" dirty="0"/>
+              <a:t>squad</a:t>
+            </a:r>
+            <a:r>
+              <a:rPr lang="zh-CN" altLang="en-US" dirty="0"/>
+              <a:t> </a:t>
+            </a:r>
+            <a:r>
+              <a:rPr lang="en-US" altLang="zh-CN" dirty="0"/>
+              <a:t>–</a:t>
+            </a:r>
+            <a:r>
+              <a:rPr lang="zh-CN" altLang="en-US" dirty="0"/>
+              <a:t> </a:t>
+            </a:r>
+            <a:r>
+              <a:rPr lang="en-US" altLang="zh-CN" dirty="0"/>
+              <a:t>Collaborate</a:t>
+            </a:r>
+            <a:r>
+              <a:rPr lang="zh-CN" altLang="en-US" dirty="0"/>
+              <a:t> </a:t>
+            </a:r>
+            <a:r>
+              <a:rPr lang="en-US" altLang="zh-CN" dirty="0"/>
+              <a:t>on</a:t>
+            </a:r>
+            <a:r>
+              <a:rPr lang="zh-CN" altLang="en-US" dirty="0"/>
+              <a:t> </a:t>
+            </a:r>
+            <a:r>
+              <a:rPr lang="en-US" altLang="zh-CN" dirty="0" err="1"/>
+              <a:t>zowe.org</a:t>
+            </a:r>
+            <a:r>
+              <a:rPr lang="zh-CN" altLang="en-US" dirty="0"/>
+              <a:t> </a:t>
+            </a:r>
+            <a:r>
+              <a:rPr lang="en-US" altLang="zh-CN" dirty="0"/>
+              <a:t>design</a:t>
+            </a:r>
+            <a:r>
+              <a:rPr lang="zh-CN" altLang="en-US" dirty="0"/>
+              <a:t> </a:t>
+            </a:r>
+            <a:r>
+              <a:rPr lang="en-US" altLang="zh-CN" dirty="0"/>
+              <a:t>and</a:t>
+            </a:r>
+            <a:r>
+              <a:rPr lang="zh-CN" altLang="en-US" dirty="0"/>
+              <a:t> </a:t>
+            </a:r>
+            <a:r>
+              <a:rPr lang="en-US" altLang="zh-CN" dirty="0"/>
+              <a:t>better</a:t>
+            </a:r>
+            <a:r>
+              <a:rPr lang="zh-CN" altLang="en-US" dirty="0"/>
+              <a:t> </a:t>
+            </a:r>
+            <a:r>
+              <a:rPr lang="en-US" altLang="zh-CN" dirty="0"/>
+              <a:t>navigation</a:t>
+            </a:r>
+            <a:endParaRPr lang="en-US" dirty="0"/>
+          </a:p>
+          <a:p>
+            <a:endParaRPr lang="en-US" dirty="0"/>
+          </a:p>
+          <a:p>
             <a:pPr marL="101600" indent="0">
+              <a:buFont typeface="Arial"/>
               <a:buNone/>
             </a:pPr>
             <a:endParaRPr lang="en-US" dirty="0"/>
@@ -8938,7 +9203,7 @@
 </p:sld>
 </file>
 
-<file path=ppt/slides/slide32.xml><?xml version="1.0" encoding="utf-8"?>
+<file path=ppt/slides/slide31.xml><?xml version="1.0" encoding="utf-8"?>
 <p:sld xmlns:a="http://schemas.openxmlformats.org/drawingml/2006/main" xmlns:r="http://schemas.openxmlformats.org/officeDocument/2006/relationships" xmlns:p="http://schemas.openxmlformats.org/presentationml/2006/main">
   <p:cSld>
     <p:spTree>
@@ -9417,12 +9682,8 @@
           <a:lstStyle/>
           <a:p>
             <a:r>
-              <a:rPr lang="en-US" dirty="0" smtClean="0"/>
-              <a:t>Systems Squad </a:t>
-            </a:r>
-            <a:r>
-              <a:rPr lang="en-US" dirty="0" smtClean="0"/>
-              <a:t>– ‘Design </a:t>
+              <a:rPr lang="en-US" dirty="0"/>
+              <a:t>Systems Squad – ‘Design </a:t>
             </a:r>
             <a:r>
               <a:rPr lang="en-US" dirty="0" err="1"/>
@@ -9430,13 +9691,8 @@
             </a:r>
             <a:r>
               <a:rPr lang="en-US" dirty="0"/>
-              <a:t> HA </a:t>
-            </a:r>
-            <a:r>
-              <a:rPr lang="en-US" dirty="0" smtClean="0"/>
-              <a:t>Infrastructure’</a:t>
-            </a:r>
-            <a:endParaRPr lang="en-US" dirty="0"/>
+              <a:t> HA Infrastructure’</a:t>
+            </a:r>
           </a:p>
           <a:p>
             <a:endParaRPr lang="en-US" dirty="0"/>
@@ -9972,11 +10228,7 @@
             </a:r>
             <a:r>
               <a:rPr lang="en-US" dirty="0"/>
-              <a:t> distributor</a:t>
-            </a:r>
-            <a:r>
-              <a:rPr lang="en-US" dirty="0" smtClean="0"/>
-              <a:t>.</a:t>
+              <a:t> distributor.</a:t>
             </a:r>
           </a:p>
           <a:p>
@@ -10668,18 +10920,18 @@
 </file>
 
 <file path=customXml/item1.xml><?xml version="1.0" encoding="utf-8"?>
+<p:properties xmlns:p="http://schemas.microsoft.com/office/2006/metadata/properties" xmlns:xsi="http://www.w3.org/2001/XMLSchema-instance" xmlns:pc="http://schemas.microsoft.com/office/infopath/2007/PartnerControls">
+  <documentManagement/>
+</p:properties>
+</file>
+
+<file path=customXml/item2.xml><?xml version="1.0" encoding="utf-8"?>
 <?mso-contentType ?>
 <FormTemplates xmlns="http://schemas.microsoft.com/sharepoint/v3/contenttype/forms">
   <Display>DocumentLibraryForm</Display>
   <Edit>DocumentLibraryForm</Edit>
   <New>DocumentLibraryForm</New>
 </FormTemplates>
-</file>
-
-<file path=customXml/item2.xml><?xml version="1.0" encoding="utf-8"?>
-<p:properties xmlns:p="http://schemas.microsoft.com/office/2006/metadata/properties" xmlns:xsi="http://www.w3.org/2001/XMLSchema-instance" xmlns:pc="http://schemas.microsoft.com/office/infopath/2007/PartnerControls">
-  <documentManagement/>
-</p:properties>
 </file>
 
 <file path=customXml/item3.xml><?xml version="1.0" encoding="utf-8"?>
@@ -10906,14 +11158,6 @@
 </file>
 
 <file path=customXml/itemProps1.xml><?xml version="1.0" encoding="utf-8"?>
-<ds:datastoreItem xmlns:ds="http://schemas.openxmlformats.org/officeDocument/2006/customXml" ds:itemID="{B16FB3BA-9F7C-4CD8-B3AB-262CEFAAFDB4}">
-  <ds:schemaRefs>
-    <ds:schemaRef ds:uri="http://schemas.microsoft.com/sharepoint/v3/contenttype/forms"/>
-  </ds:schemaRefs>
-</ds:datastoreItem>
-</file>
-
-<file path=customXml/itemProps2.xml><?xml version="1.0" encoding="utf-8"?>
 <ds:datastoreItem xmlns:ds="http://schemas.openxmlformats.org/officeDocument/2006/customXml" ds:itemID="{0A54B724-95FE-4227-A509-89C0BE165019}">
   <ds:schemaRefs>
     <ds:schemaRef ds:uri="http://purl.org/dc/terms/"/>
@@ -10926,6 +11170,14 @@
     <ds:schemaRef ds:uri="http://schemas.openxmlformats.org/package/2006/metadata/core-properties"/>
     <ds:schemaRef ds:uri="dc93a766-66e7-40cb-ae91-7d18686f06cb"/>
     <ds:schemaRef ds:uri="http://www.w3.org/XML/1998/namespace"/>
+  </ds:schemaRefs>
+</ds:datastoreItem>
+</file>
+
+<file path=customXml/itemProps2.xml><?xml version="1.0" encoding="utf-8"?>
+<ds:datastoreItem xmlns:ds="http://schemas.openxmlformats.org/officeDocument/2006/customXml" ds:itemID="{B16FB3BA-9F7C-4CD8-B3AB-262CEFAAFDB4}">
+  <ds:schemaRefs>
+    <ds:schemaRef ds:uri="http://schemas.microsoft.com/sharepoint/v3/contenttype/forms"/>
   </ds:schemaRefs>
 </ds:datastoreItem>
 </file>

</xml_diff>

<commit_message>
add community feedback slides
Signed-off-by: MikeBauerCA <35504792+MikeBauerCA@users.noreply.github.com>
</commit_message>
<xml_diff>
--- a/Project Management/20PI3 Planning/Zowe Community Squad Focus for 20PI3.pptx
+++ b/Project Management/20PI3 Planning/Zowe Community Squad Focus for 20PI3.pptx
@@ -5,7 +5,7 @@
     <p:sldMasterId id="2147483653" r:id="rId4"/>
   </p:sldMasterIdLst>
   <p:notesMasterIdLst>
-    <p:notesMasterId r:id="rId36"/>
+    <p:notesMasterId r:id="rId37"/>
   </p:notesMasterIdLst>
   <p:sldIdLst>
     <p:sldId id="279" r:id="rId5"/>
@@ -20,40 +20,41 @@
     <p:sldId id="2142532377" r:id="rId14"/>
     <p:sldId id="2142532361" r:id="rId15"/>
     <p:sldId id="2142532354" r:id="rId16"/>
-    <p:sldId id="2142532378" r:id="rId17"/>
-    <p:sldId id="2142532371" r:id="rId18"/>
+    <p:sldId id="2142532371" r:id="rId17"/>
+    <p:sldId id="2142532384" r:id="rId18"/>
     <p:sldId id="2142532373" r:id="rId19"/>
-    <p:sldId id="2142532355" r:id="rId20"/>
-    <p:sldId id="2142532379" r:id="rId21"/>
-    <p:sldId id="2142532363" r:id="rId22"/>
-    <p:sldId id="2142532374" r:id="rId23"/>
-    <p:sldId id="2142532359" r:id="rId24"/>
-    <p:sldId id="2142532380" r:id="rId25"/>
-    <p:sldId id="2142532370" r:id="rId26"/>
-    <p:sldId id="2142532356" r:id="rId27"/>
-    <p:sldId id="2142532381" r:id="rId28"/>
-    <p:sldId id="2142532364" r:id="rId29"/>
-    <p:sldId id="2142532357" r:id="rId30"/>
-    <p:sldId id="2142532365" r:id="rId31"/>
-    <p:sldId id="2142532382" r:id="rId32"/>
-    <p:sldId id="2142532358" r:id="rId33"/>
-    <p:sldId id="2142532383" r:id="rId34"/>
-    <p:sldId id="2142532367" r:id="rId35"/>
+    <p:sldId id="2142532386" r:id="rId20"/>
+    <p:sldId id="2142532355" r:id="rId21"/>
+    <p:sldId id="2142532379" r:id="rId22"/>
+    <p:sldId id="2142532363" r:id="rId23"/>
+    <p:sldId id="2142532374" r:id="rId24"/>
+    <p:sldId id="2142532359" r:id="rId25"/>
+    <p:sldId id="2142532380" r:id="rId26"/>
+    <p:sldId id="2142532370" r:id="rId27"/>
+    <p:sldId id="2142532356" r:id="rId28"/>
+    <p:sldId id="2142532381" r:id="rId29"/>
+    <p:sldId id="2142532364" r:id="rId30"/>
+    <p:sldId id="2142532357" r:id="rId31"/>
+    <p:sldId id="2142532365" r:id="rId32"/>
+    <p:sldId id="2142532382" r:id="rId33"/>
+    <p:sldId id="2142532358" r:id="rId34"/>
+    <p:sldId id="2142532383" r:id="rId35"/>
+    <p:sldId id="2142532367" r:id="rId36"/>
   </p:sldIdLst>
   <p:sldSz cx="9144000" cy="5143500" type="screen16x9"/>
   <p:notesSz cx="6858000" cy="9144000"/>
   <p:embeddedFontLst>
     <p:embeddedFont>
       <p:font typeface="Gill Sans" panose="020B0604020202020204" charset="0"/>
-      <p:regular r:id="rId37"/>
-      <p:bold r:id="rId38"/>
+      <p:regular r:id="rId38"/>
+      <p:bold r:id="rId39"/>
     </p:embeddedFont>
     <p:embeddedFont>
       <p:font typeface="Calibri" panose="020F0502020204030204" pitchFamily="34" charset="0"/>
-      <p:regular r:id="rId39"/>
-      <p:bold r:id="rId40"/>
-      <p:italic r:id="rId41"/>
-      <p:boldItalic r:id="rId42"/>
+      <p:regular r:id="rId40"/>
+      <p:bold r:id="rId41"/>
+      <p:italic r:id="rId42"/>
+      <p:boldItalic r:id="rId43"/>
     </p:embeddedFont>
   </p:embeddedFontLst>
   <p:defaultTextStyle>
@@ -1050,7 +1051,7 @@
     </p:spTree>
     <p:extLst>
       <p:ext uri="{BB962C8B-B14F-4D97-AF65-F5344CB8AC3E}">
-        <p14:creationId xmlns:p14="http://schemas.microsoft.com/office/powerpoint/2010/main" val="2275415211"/>
+        <p14:creationId xmlns:p14="http://schemas.microsoft.com/office/powerpoint/2010/main" val="3404991244"/>
       </p:ext>
     </p:extLst>
   </p:cSld>
@@ -1119,7 +1120,7 @@
     </p:spTree>
     <p:extLst>
       <p:ext uri="{BB962C8B-B14F-4D97-AF65-F5344CB8AC3E}">
-        <p14:creationId xmlns:p14="http://schemas.microsoft.com/office/powerpoint/2010/main" val="594138897"/>
+        <p14:creationId xmlns:p14="http://schemas.microsoft.com/office/powerpoint/2010/main" val="2275415211"/>
       </p:ext>
     </p:extLst>
   </p:cSld>
@@ -1178,31 +1179,6 @@
           <a:bodyPr/>
           <a:lstStyle/>
           <a:p>
-            <a:pPr marL="457200" marR="0" lvl="0" indent="-298450" algn="l" defTabSz="914400" rtl="0" eaLnBrk="1" fontAlgn="auto" latinLnBrk="0" hangingPunct="1">
-              <a:lnSpc>
-                <a:spcPct val="100000"/>
-              </a:lnSpc>
-              <a:spcBef>
-                <a:spcPts val="0"/>
-              </a:spcBef>
-              <a:spcAft>
-                <a:spcPts val="0"/>
-              </a:spcAft>
-              <a:buClr>
-                <a:srgbClr val="000000"/>
-              </a:buClr>
-              <a:buSzPts val="1100"/>
-              <a:buFont typeface="Arial"/>
-              <a:buChar char="●"/>
-              <a:tabLst/>
-              <a:defRPr/>
-            </a:pPr>
-            <a:r>
-              <a:rPr lang="en-US" dirty="0"/>
-              <a:t>Leverage new UX members / design thinking / persona identification Onboarding New Members</a:t>
-            </a:r>
-          </a:p>
-          <a:p>
             <a:pPr marL="158750" indent="0">
               <a:buNone/>
             </a:pPr>
@@ -1213,7 +1189,7 @@
     </p:spTree>
     <p:extLst>
       <p:ext uri="{BB962C8B-B14F-4D97-AF65-F5344CB8AC3E}">
-        <p14:creationId xmlns:p14="http://schemas.microsoft.com/office/powerpoint/2010/main" val="1618876320"/>
+        <p14:creationId xmlns:p14="http://schemas.microsoft.com/office/powerpoint/2010/main" val="594138897"/>
       </p:ext>
     </p:extLst>
   </p:cSld>
@@ -1272,6 +1248,31 @@
           <a:bodyPr/>
           <a:lstStyle/>
           <a:p>
+            <a:pPr marL="457200" marR="0" lvl="0" indent="-298450" algn="l" defTabSz="914400" rtl="0" eaLnBrk="1" fontAlgn="auto" latinLnBrk="0" hangingPunct="1">
+              <a:lnSpc>
+                <a:spcPct val="100000"/>
+              </a:lnSpc>
+              <a:spcBef>
+                <a:spcPts val="0"/>
+              </a:spcBef>
+              <a:spcAft>
+                <a:spcPts val="0"/>
+              </a:spcAft>
+              <a:buClr>
+                <a:srgbClr val="000000"/>
+              </a:buClr>
+              <a:buSzPts val="1100"/>
+              <a:buFont typeface="Arial"/>
+              <a:buChar char="●"/>
+              <a:tabLst/>
+              <a:defRPr/>
+            </a:pPr>
+            <a:r>
+              <a:rPr lang="en-US" dirty="0"/>
+              <a:t>Leverage new UX members / design thinking / persona identification Onboarding New Members</a:t>
+            </a:r>
+          </a:p>
+          <a:p>
             <a:pPr marL="158750" indent="0">
               <a:buNone/>
             </a:pPr>
@@ -1282,7 +1283,7 @@
     </p:spTree>
     <p:extLst>
       <p:ext uri="{BB962C8B-B14F-4D97-AF65-F5344CB8AC3E}">
-        <p14:creationId xmlns:p14="http://schemas.microsoft.com/office/powerpoint/2010/main" val="2155591195"/>
+        <p14:creationId xmlns:p14="http://schemas.microsoft.com/office/powerpoint/2010/main" val="1618876320"/>
       </p:ext>
     </p:extLst>
   </p:cSld>
@@ -1341,6 +1342,9 @@
           <a:bodyPr/>
           <a:lstStyle/>
           <a:p>
+            <a:pPr marL="158750" indent="0">
+              <a:buNone/>
+            </a:pPr>
             <a:endParaRPr lang="en-US" dirty="0"/>
           </a:p>
         </p:txBody>
@@ -1348,7 +1352,7 @@
     </p:spTree>
     <p:extLst>
       <p:ext uri="{BB962C8B-B14F-4D97-AF65-F5344CB8AC3E}">
-        <p14:creationId xmlns:p14="http://schemas.microsoft.com/office/powerpoint/2010/main" val="702557294"/>
+        <p14:creationId xmlns:p14="http://schemas.microsoft.com/office/powerpoint/2010/main" val="2155591195"/>
       </p:ext>
     </p:extLst>
   </p:cSld>
@@ -1407,6 +1411,72 @@
           <a:bodyPr/>
           <a:lstStyle/>
           <a:p>
+            <a:endParaRPr lang="en-US" dirty="0"/>
+          </a:p>
+        </p:txBody>
+      </p:sp>
+    </p:spTree>
+    <p:extLst>
+      <p:ext uri="{BB962C8B-B14F-4D97-AF65-F5344CB8AC3E}">
+        <p14:creationId xmlns:p14="http://schemas.microsoft.com/office/powerpoint/2010/main" val="702557294"/>
+      </p:ext>
+    </p:extLst>
+  </p:cSld>
+  <p:clrMapOvr>
+    <a:masterClrMapping/>
+  </p:clrMapOvr>
+</p:notes>
+</file>
+
+<file path=ppt/notesSlides/notesSlide16.xml><?xml version="1.0" encoding="utf-8"?>
+<p:notes xmlns:a="http://schemas.openxmlformats.org/drawingml/2006/main" xmlns:r="http://schemas.openxmlformats.org/officeDocument/2006/relationships" xmlns:p="http://schemas.openxmlformats.org/presentationml/2006/main">
+  <p:cSld>
+    <p:spTree>
+      <p:nvGrpSpPr>
+        <p:cNvPr id="1" name=""/>
+        <p:cNvGrpSpPr/>
+        <p:nvPr/>
+      </p:nvGrpSpPr>
+      <p:grpSpPr>
+        <a:xfrm>
+          <a:off x="0" y="0"/>
+          <a:ext cx="0" cy="0"/>
+          <a:chOff x="0" y="0"/>
+          <a:chExt cx="0" cy="0"/>
+        </a:xfrm>
+      </p:grpSpPr>
+      <p:sp>
+        <p:nvSpPr>
+          <p:cNvPr id="2" name="Slide Image Placeholder 1"/>
+          <p:cNvSpPr>
+            <a:spLocks noGrp="1" noRot="1" noChangeAspect="1"/>
+          </p:cNvSpPr>
+          <p:nvPr>
+            <p:ph type="sldImg"/>
+          </p:nvPr>
+        </p:nvSpPr>
+        <p:spPr>
+          <a:xfrm>
+            <a:off x="381000" y="685800"/>
+            <a:ext cx="6096000" cy="3429000"/>
+          </a:xfrm>
+        </p:spPr>
+      </p:sp>
+      <p:sp>
+        <p:nvSpPr>
+          <p:cNvPr id="3" name="Notes Placeholder 2"/>
+          <p:cNvSpPr>
+            <a:spLocks noGrp="1"/>
+          </p:cNvSpPr>
+          <p:nvPr>
+            <p:ph type="body" idx="1"/>
+          </p:nvPr>
+        </p:nvSpPr>
+        <p:spPr/>
+        <p:txBody>
+          <a:bodyPr/>
+          <a:lstStyle/>
+          <a:p>
             <a:pPr marL="158750" indent="0">
               <a:buNone/>
             </a:pPr>
@@ -1427,7 +1497,7 @@
 </p:notes>
 </file>
 
-<file path=ppt/notesSlides/notesSlide16.xml><?xml version="1.0" encoding="utf-8"?>
+<file path=ppt/notesSlides/notesSlide17.xml><?xml version="1.0" encoding="utf-8"?>
 <p:notes xmlns:a="http://schemas.openxmlformats.org/drawingml/2006/main" xmlns:r="http://schemas.openxmlformats.org/officeDocument/2006/relationships" xmlns:p="http://schemas.openxmlformats.org/presentationml/2006/main">
   <p:cSld>
     <p:spTree>
@@ -2132,7 +2202,7 @@
     </p:spTree>
     <p:extLst>
       <p:ext uri="{BB962C8B-B14F-4D97-AF65-F5344CB8AC3E}">
-        <p14:creationId xmlns:p14="http://schemas.microsoft.com/office/powerpoint/2010/main" val="1063351652"/>
+        <p14:creationId xmlns:p14="http://schemas.microsoft.com/office/powerpoint/2010/main" val="1014495597"/>
       </p:ext>
     </p:extLst>
   </p:cSld>
@@ -2201,7 +2271,7 @@
     </p:spTree>
     <p:extLst>
       <p:ext uri="{BB962C8B-B14F-4D97-AF65-F5344CB8AC3E}">
-        <p14:creationId xmlns:p14="http://schemas.microsoft.com/office/powerpoint/2010/main" val="1014495597"/>
+        <p14:creationId xmlns:p14="http://schemas.microsoft.com/office/powerpoint/2010/main" val="1316273324"/>
       </p:ext>
     </p:extLst>
   </p:cSld>
@@ -6057,6 +6127,13 @@
   <p:clrMapOvr>
     <a:masterClrMapping/>
   </p:clrMapOvr>
+  <p:timing>
+    <p:tnLst>
+      <p:par>
+        <p:cTn id="1" dur="indefinite" restart="never" nodeType="tmRoot"/>
+      </p:par>
+    </p:tnLst>
+  </p:timing>
 </p:sld>
 </file>
 
@@ -6373,7 +6450,7 @@
           <a:p>
             <a:r>
               <a:rPr lang="en-US" dirty="0"/>
-              <a:t>Dependencies</a:t>
+              <a:t>Feature 1</a:t>
             </a:r>
           </a:p>
         </p:txBody>
@@ -6404,19 +6481,117 @@
           <a:bodyPr/>
           <a:lstStyle/>
           <a:p>
-            <a:r>
-              <a:rPr lang="en-US" dirty="0"/>
-              <a:t>Cross Squad Dependencies 1</a:t>
-            </a:r>
-          </a:p>
-          <a:p>
-            <a:r>
-              <a:rPr lang="en-US" dirty="0"/>
-              <a:t>Cross Squad Dependencies 2</a:t>
-            </a:r>
-          </a:p>
-          <a:p>
-            <a:endParaRPr lang="en-US" dirty="0"/>
+            <a:pPr marL="101600" indent="0">
+              <a:buNone/>
+            </a:pPr>
+            <a:r>
+              <a:rPr lang="en-US" dirty="0" err="1"/>
+              <a:t>Zowe</a:t>
+            </a:r>
+            <a:r>
+              <a:rPr lang="en-US" dirty="0"/>
+              <a:t> consumers</a:t>
+            </a:r>
+            <a:r>
+              <a:rPr lang="en-US" dirty="0"/>
+              <a:t> </a:t>
+            </a:r>
+            <a:r>
+              <a:rPr lang="en-US" dirty="0"/>
+              <a:t>can begin building apps and/or custom automation</a:t>
+            </a:r>
+            <a:r>
+              <a:rPr lang="en-US" dirty="0"/>
+              <a:t> </a:t>
+            </a:r>
+            <a:r>
+              <a:rPr lang="en-US" dirty="0"/>
+              <a:t>within hours by readily finding and leveraging </a:t>
+            </a:r>
+            <a:r>
+              <a:rPr lang="en-US" dirty="0" err="1"/>
+              <a:t>Zowe</a:t>
+            </a:r>
+            <a:r>
+              <a:rPr lang="en-US" dirty="0"/>
+              <a:t> SDKs, API documentation, and </a:t>
+            </a:r>
+            <a:r>
+              <a:rPr lang="en-US" dirty="0" smtClean="0"/>
+              <a:t>samples</a:t>
+            </a:r>
+            <a:br>
+              <a:rPr lang="en-US" dirty="0" smtClean="0"/>
+            </a:br>
+            <a:r>
+              <a:rPr lang="en-US" u="sng" dirty="0"/>
+              <a:t/>
+            </a:r>
+            <a:br>
+              <a:rPr lang="en-US" u="sng" dirty="0"/>
+            </a:br>
+            <a:r>
+              <a:rPr lang="en-US" b="1" dirty="0"/>
+              <a:t>Deliverables: </a:t>
+            </a:r>
+            <a:r>
+              <a:rPr lang="en-US" dirty="0"/>
+              <a:t>Documentation is published on our </a:t>
+            </a:r>
+            <a:r>
+              <a:rPr lang="en-US" dirty="0" err="1"/>
+              <a:t>Zowe</a:t>
+            </a:r>
+            <a:r>
+              <a:rPr lang="en-US" dirty="0"/>
+              <a:t> Docs site covering the overview and use of the SDKs as well as documenting how the community can contribute to the technology. In addition, detailed samples that leverage the SDKs are provided within each repository.</a:t>
+            </a:r>
+            <a:br>
+              <a:rPr lang="en-US" dirty="0"/>
+            </a:br>
+            <a:r>
+              <a:rPr lang="en-US" dirty="0"/>
+              <a:t/>
+            </a:r>
+            <a:br>
+              <a:rPr lang="en-US" dirty="0"/>
+            </a:br>
+            <a:r>
+              <a:rPr lang="en-US" dirty="0"/>
+              <a:t>To further drive visibility and adoption, the </a:t>
+            </a:r>
+            <a:r>
+              <a:rPr lang="en-US" dirty="0" err="1"/>
+              <a:t>Zowe</a:t>
+            </a:r>
+            <a:r>
+              <a:rPr lang="en-US" dirty="0"/>
+              <a:t> Node </a:t>
+            </a:r>
+            <a:r>
+              <a:rPr lang="en-US" dirty="0" smtClean="0"/>
+              <a:t>SDK packages are </a:t>
+            </a:r>
+            <a:r>
+              <a:rPr lang="en-US" dirty="0"/>
+              <a:t>published to public </a:t>
+            </a:r>
+            <a:r>
+              <a:rPr lang="en-US" dirty="0" err="1"/>
+              <a:t>npm</a:t>
+            </a:r>
+            <a:r>
+              <a:rPr lang="en-US" dirty="0"/>
+              <a:t> separate from the </a:t>
+            </a:r>
+            <a:r>
+              <a:rPr lang="en-US" dirty="0" err="1"/>
+              <a:t>Zowe</a:t>
+            </a:r>
+            <a:r>
+              <a:rPr lang="en-US" dirty="0"/>
+              <a:t> CLI.</a:t>
+            </a:r>
           </a:p>
           <a:p>
             <a:pPr marL="101600" indent="0">
@@ -6429,7 +6604,7 @@
     </p:spTree>
     <p:extLst>
       <p:ext uri="{BB962C8B-B14F-4D97-AF65-F5344CB8AC3E}">
-        <p14:creationId xmlns:p14="http://schemas.microsoft.com/office/powerpoint/2010/main" val="2764869177"/>
+        <p14:creationId xmlns:p14="http://schemas.microsoft.com/office/powerpoint/2010/main" val="2003776068"/>
       </p:ext>
     </p:extLst>
   </p:cSld>
@@ -6439,6 +6614,13 @@
   <p:transition spd="med">
     <p:fade thruBlk="1"/>
   </p:transition>
+  <p:timing>
+    <p:tnLst>
+      <p:par>
+        <p:cTn id="1" dur="indefinite" restart="never" nodeType="tmRoot"/>
+      </p:par>
+    </p:tnLst>
+  </p:timing>
 </p:sld>
 </file>
 
@@ -6481,132 +6663,65 @@
           <a:lstStyle/>
           <a:p>
             <a:r>
-              <a:rPr lang="en-US" dirty="0"/>
-              <a:t>Feature 1</a:t>
-            </a:r>
+              <a:rPr lang="en-US" dirty="0" smtClean="0"/>
+              <a:t>Community Feedback</a:t>
+            </a:r>
+            <a:endParaRPr lang="en-US" dirty="0"/>
           </a:p>
         </p:txBody>
       </p:sp>
-      <p:sp>
-        <p:nvSpPr>
-          <p:cNvPr id="4" name="Text Placeholder 3">
-            <a:extLst>
-              <a:ext uri="{FF2B5EF4-FFF2-40B4-BE49-F238E27FC236}">
-                <a16:creationId xmlns:a16="http://schemas.microsoft.com/office/drawing/2014/main" id="{C0DB4ECB-A7D5-6B47-8180-75CB3C3DB7DE}"/>
-              </a:ext>
-            </a:extLst>
-          </p:cNvPr>
-          <p:cNvSpPr>
-            <a:spLocks noGrp="1"/>
-          </p:cNvSpPr>
-          <p:nvPr>
-            <p:ph type="body" idx="1"/>
-          </p:nvPr>
-        </p:nvSpPr>
+      <p:pic>
+        <p:nvPicPr>
+          <p:cNvPr id="2" name="Picture 1"/>
+          <p:cNvPicPr>
+            <a:picLocks noChangeAspect="1"/>
+          </p:cNvPicPr>
+          <p:nvPr/>
+        </p:nvPicPr>
+        <p:blipFill>
+          <a:blip r:embed="rId3"/>
+          <a:stretch>
+            <a:fillRect/>
+          </a:stretch>
+        </p:blipFill>
         <p:spPr>
           <a:xfrm>
-            <a:off x="306211" y="774096"/>
-            <a:ext cx="8369400" cy="4147860"/>
+            <a:off x="333991" y="606741"/>
+            <a:ext cx="3722085" cy="4158005"/>
           </a:xfrm>
+          <a:prstGeom prst="rect">
+            <a:avLst/>
+          </a:prstGeom>
         </p:spPr>
-        <p:txBody>
-          <a:bodyPr/>
-          <a:lstStyle/>
-          <a:p>
-            <a:pPr marL="101600" indent="0">
-              <a:buNone/>
-            </a:pPr>
-            <a:r>
-              <a:rPr lang="en-US" dirty="0"/>
-              <a:t>Application developers and those developing scripts to drive interaction with z/OS can easily learn about, access, and leverage </a:t>
-            </a:r>
-            <a:r>
-              <a:rPr lang="en-US" dirty="0" err="1"/>
-              <a:t>Zowe</a:t>
-            </a:r>
-            <a:r>
-              <a:rPr lang="en-US" dirty="0"/>
-              <a:t> SDKs to implement an initial use case.</a:t>
-            </a:r>
-          </a:p>
-          <a:p>
-            <a:pPr marL="101600" indent="0">
-              <a:buNone/>
-            </a:pPr>
-            <a:r>
-              <a:rPr lang="en-US" u="sng" dirty="0"/>
-              <a:t/>
-            </a:r>
-            <a:br>
-              <a:rPr lang="en-US" u="sng" dirty="0"/>
-            </a:br>
-            <a:r>
-              <a:rPr lang="en-US" b="1" dirty="0"/>
-              <a:t>Deliverables: </a:t>
-            </a:r>
-            <a:r>
-              <a:rPr lang="en-US" dirty="0"/>
-              <a:t>Documentation is published on our </a:t>
-            </a:r>
-            <a:r>
-              <a:rPr lang="en-US" dirty="0" err="1"/>
-              <a:t>Zowe</a:t>
-            </a:r>
-            <a:r>
-              <a:rPr lang="en-US" dirty="0"/>
-              <a:t> Docs site covering the overview and use of the SDKs as well as documenting how the community can contribute to the technology. In addition, detailed samples that leverage the SDKs are provided within each repository.</a:t>
-            </a:r>
-            <a:br>
-              <a:rPr lang="en-US" dirty="0"/>
-            </a:br>
-            <a:r>
-              <a:rPr lang="en-US" dirty="0"/>
-              <a:t/>
-            </a:r>
-            <a:br>
-              <a:rPr lang="en-US" dirty="0"/>
-            </a:br>
-            <a:r>
-              <a:rPr lang="en-US" dirty="0"/>
-              <a:t>To further drive visibility and adoption, the </a:t>
-            </a:r>
-            <a:r>
-              <a:rPr lang="en-US" dirty="0" err="1"/>
-              <a:t>Zowe</a:t>
-            </a:r>
-            <a:r>
-              <a:rPr lang="en-US" dirty="0"/>
-              <a:t> Node SDK is published to public </a:t>
-            </a:r>
-            <a:r>
-              <a:rPr lang="en-US" dirty="0" err="1"/>
-              <a:t>npm</a:t>
-            </a:r>
-            <a:r>
-              <a:rPr lang="en-US" dirty="0"/>
-              <a:t> separate from the </a:t>
-            </a:r>
-            <a:r>
-              <a:rPr lang="en-US" dirty="0" err="1"/>
-              <a:t>Zowe</a:t>
-            </a:r>
-            <a:r>
-              <a:rPr lang="en-US" dirty="0"/>
-              <a:t> CLI.</a:t>
-            </a:r>
-          </a:p>
-          <a:p>
-            <a:pPr marL="101600" indent="0">
-              <a:buNone/>
-            </a:pPr>
-            <a:endParaRPr lang="en-US" dirty="0"/>
-          </a:p>
-        </p:txBody>
-      </p:sp>
+      </p:pic>
+      <p:pic>
+        <p:nvPicPr>
+          <p:cNvPr id="6" name="Picture 5"/>
+          <p:cNvPicPr>
+            <a:picLocks noChangeAspect="1"/>
+          </p:cNvPicPr>
+          <p:nvPr/>
+        </p:nvPicPr>
+        <p:blipFill>
+          <a:blip r:embed="rId4"/>
+          <a:stretch>
+            <a:fillRect/>
+          </a:stretch>
+        </p:blipFill>
+        <p:spPr>
+          <a:xfrm>
+            <a:off x="4379053" y="604704"/>
+            <a:ext cx="3848839" cy="4216488"/>
+          </a:xfrm>
+          <a:prstGeom prst="rect">
+            <a:avLst/>
+          </a:prstGeom>
+        </p:spPr>
+      </p:pic>
     </p:spTree>
     <p:extLst>
       <p:ext uri="{BB962C8B-B14F-4D97-AF65-F5344CB8AC3E}">
-        <p14:creationId xmlns:p14="http://schemas.microsoft.com/office/powerpoint/2010/main" val="2003776068"/>
+        <p14:creationId xmlns:p14="http://schemas.microsoft.com/office/powerpoint/2010/main" val="775432367"/>
       </p:ext>
     </p:extLst>
   </p:cSld>
@@ -6616,6 +6731,13 @@
   <p:transition spd="med">
     <p:fade thruBlk="1"/>
   </p:transition>
+  <p:timing>
+    <p:tnLst>
+      <p:par>
+        <p:cTn id="1" dur="indefinite" restart="never" nodeType="tmRoot"/>
+      </p:par>
+    </p:tnLst>
+  </p:timing>
 </p:sld>
 </file>
 
@@ -6694,16 +6816,16 @@
               <a:buNone/>
             </a:pPr>
             <a:r>
-              <a:rPr lang="en-US" dirty="0"/>
-              <a:t>Those leveraging </a:t>
-            </a:r>
-            <a:r>
-              <a:rPr lang="en-US" dirty="0" err="1"/>
+              <a:rPr lang="en-US" dirty="0" err="1" smtClean="0"/>
               <a:t>Zowe</a:t>
             </a:r>
             <a:r>
-              <a:rPr lang="en-US" dirty="0"/>
-              <a:t> client technologies can store all connection details and command option preferences in a single profile allowing for quick initial configuration and reduced effort when updating properties.</a:t>
+              <a:rPr lang="en-US" dirty="0" smtClean="0"/>
+              <a:t> CLI users </a:t>
+            </a:r>
+            <a:r>
+              <a:rPr lang="en-US" dirty="0"/>
+              <a:t>can store all connection details and command option preferences in a single profile allowing for quick initial configuration and reduced effort when updating properties.</a:t>
             </a:r>
             <a:br>
               <a:rPr lang="en-US" dirty="0"/>
@@ -6744,10 +6866,134 @@
   <p:transition spd="med">
     <p:fade thruBlk="1"/>
   </p:transition>
+  <p:timing>
+    <p:tnLst>
+      <p:par>
+        <p:cTn id="1" dur="indefinite" restart="never" nodeType="tmRoot"/>
+      </p:par>
+    </p:tnLst>
+  </p:timing>
 </p:sld>
 </file>
 
 <file path=ppt/slides/slide16.xml><?xml version="1.0" encoding="utf-8"?>
+<p:sld xmlns:a="http://schemas.openxmlformats.org/drawingml/2006/main" xmlns:r="http://schemas.openxmlformats.org/officeDocument/2006/relationships" xmlns:p="http://schemas.openxmlformats.org/presentationml/2006/main">
+  <p:cSld>
+    <p:spTree>
+      <p:nvGrpSpPr>
+        <p:cNvPr id="1" name=""/>
+        <p:cNvGrpSpPr/>
+        <p:nvPr/>
+      </p:nvGrpSpPr>
+      <p:grpSpPr>
+        <a:xfrm>
+          <a:off x="0" y="0"/>
+          <a:ext cx="0" cy="0"/>
+          <a:chOff x="0" y="0"/>
+          <a:chExt cx="0" cy="0"/>
+        </a:xfrm>
+      </p:grpSpPr>
+      <p:sp>
+        <p:nvSpPr>
+          <p:cNvPr id="3" name="Title 2">
+            <a:extLst>
+              <a:ext uri="{FF2B5EF4-FFF2-40B4-BE49-F238E27FC236}">
+                <a16:creationId xmlns:a16="http://schemas.microsoft.com/office/drawing/2014/main" id="{CFEEEE36-E132-0D40-A4B8-9BDC5C8B6528}"/>
+              </a:ext>
+            </a:extLst>
+          </p:cNvPr>
+          <p:cNvSpPr>
+            <a:spLocks noGrp="1"/>
+          </p:cNvSpPr>
+          <p:nvPr>
+            <p:ph type="title"/>
+          </p:nvPr>
+        </p:nvSpPr>
+        <p:spPr/>
+        <p:txBody>
+          <a:bodyPr/>
+          <a:lstStyle/>
+          <a:p>
+            <a:r>
+              <a:rPr lang="en-US" dirty="0"/>
+              <a:t>Community Feedback</a:t>
+            </a:r>
+            <a:endParaRPr lang="en-US" dirty="0"/>
+          </a:p>
+        </p:txBody>
+      </p:sp>
+      <p:pic>
+        <p:nvPicPr>
+          <p:cNvPr id="5" name="Picture 4"/>
+          <p:cNvPicPr>
+            <a:picLocks noChangeAspect="1"/>
+          </p:cNvPicPr>
+          <p:nvPr/>
+        </p:nvPicPr>
+        <p:blipFill>
+          <a:blip r:embed="rId3"/>
+          <a:stretch>
+            <a:fillRect/>
+          </a:stretch>
+        </p:blipFill>
+        <p:spPr>
+          <a:xfrm>
+            <a:off x="333991" y="803884"/>
+            <a:ext cx="4245695" cy="3997072"/>
+          </a:xfrm>
+          <a:prstGeom prst="rect">
+            <a:avLst/>
+          </a:prstGeom>
+        </p:spPr>
+      </p:pic>
+      <p:pic>
+        <p:nvPicPr>
+          <p:cNvPr id="4" name="Picture 3"/>
+          <p:cNvPicPr>
+            <a:picLocks noChangeAspect="1"/>
+          </p:cNvPicPr>
+          <p:nvPr/>
+        </p:nvPicPr>
+        <p:blipFill>
+          <a:blip r:embed="rId4"/>
+          <a:stretch>
+            <a:fillRect/>
+          </a:stretch>
+        </p:blipFill>
+        <p:spPr>
+          <a:xfrm>
+            <a:off x="4879903" y="803884"/>
+            <a:ext cx="3886688" cy="3997072"/>
+          </a:xfrm>
+          <a:prstGeom prst="rect">
+            <a:avLst/>
+          </a:prstGeom>
+        </p:spPr>
+      </p:pic>
+    </p:spTree>
+    <p:extLst>
+      <p:ext uri="{BB962C8B-B14F-4D97-AF65-F5344CB8AC3E}">
+        <p14:creationId xmlns:p14="http://schemas.microsoft.com/office/powerpoint/2010/main" val="2164096826"/>
+      </p:ext>
+    </p:extLst>
+  </p:cSld>
+  <p:clrMapOvr>
+    <a:masterClrMapping/>
+  </p:clrMapOvr>
+  <p:transition spd="med">
+    <p:fade thruBlk="1"/>
+  </p:transition>
+  <p:timing>
+    <p:tnLst>
+      <p:par>
+        <p:cTn id="1" dur="indefinite" restart="never" nodeType="tmRoot"/>
+      </p:par>
+    </p:tnLst>
+  </p:timing>
+</p:sld>
+</file>
+
+<file path=ppt/slides/slide17.xml><?xml version="1.0" encoding="utf-8"?>
 <p:sld xmlns:a="http://schemas.openxmlformats.org/drawingml/2006/main" xmlns:r="http://schemas.openxmlformats.org/officeDocument/2006/relationships" xmlns:p="http://schemas.openxmlformats.org/presentationml/2006/main">
   <p:cSld>
     <p:spTree>
@@ -6822,115 +7068,6 @@
   </p:clrMapOvr>
   <p:transition spd="med">
     <p:fade/>
-  </p:transition>
-</p:sld>
-</file>
-
-<file path=ppt/slides/slide17.xml><?xml version="1.0" encoding="utf-8"?>
-<p:sld xmlns:a="http://schemas.openxmlformats.org/drawingml/2006/main" xmlns:r="http://schemas.openxmlformats.org/officeDocument/2006/relationships" xmlns:p="http://schemas.openxmlformats.org/presentationml/2006/main">
-  <p:cSld>
-    <p:spTree>
-      <p:nvGrpSpPr>
-        <p:cNvPr id="1" name=""/>
-        <p:cNvGrpSpPr/>
-        <p:nvPr/>
-      </p:nvGrpSpPr>
-      <p:grpSpPr>
-        <a:xfrm>
-          <a:off x="0" y="0"/>
-          <a:ext cx="0" cy="0"/>
-          <a:chOff x="0" y="0"/>
-          <a:chExt cx="0" cy="0"/>
-        </a:xfrm>
-      </p:grpSpPr>
-      <p:sp>
-        <p:nvSpPr>
-          <p:cNvPr id="3" name="Title 2">
-            <a:extLst>
-              <a:ext uri="{FF2B5EF4-FFF2-40B4-BE49-F238E27FC236}">
-                <a16:creationId xmlns:a16="http://schemas.microsoft.com/office/drawing/2014/main" id="{CFEEEE36-E132-0D40-A4B8-9BDC5C8B6528}"/>
-              </a:ext>
-            </a:extLst>
-          </p:cNvPr>
-          <p:cNvSpPr>
-            <a:spLocks noGrp="1"/>
-          </p:cNvSpPr>
-          <p:nvPr>
-            <p:ph type="title"/>
-          </p:nvPr>
-        </p:nvSpPr>
-        <p:spPr/>
-        <p:txBody>
-          <a:bodyPr/>
-          <a:lstStyle/>
-          <a:p>
-            <a:r>
-              <a:rPr lang="en-US" dirty="0"/>
-              <a:t>Dependencies</a:t>
-            </a:r>
-          </a:p>
-        </p:txBody>
-      </p:sp>
-      <p:sp>
-        <p:nvSpPr>
-          <p:cNvPr id="4" name="Text Placeholder 3">
-            <a:extLst>
-              <a:ext uri="{FF2B5EF4-FFF2-40B4-BE49-F238E27FC236}">
-                <a16:creationId xmlns:a16="http://schemas.microsoft.com/office/drawing/2014/main" id="{C0DB4ECB-A7D5-6B47-8180-75CB3C3DB7DE}"/>
-              </a:ext>
-            </a:extLst>
-          </p:cNvPr>
-          <p:cNvSpPr>
-            <a:spLocks noGrp="1"/>
-          </p:cNvSpPr>
-          <p:nvPr>
-            <p:ph type="body" idx="1"/>
-          </p:nvPr>
-        </p:nvSpPr>
-        <p:spPr>
-          <a:xfrm>
-            <a:off x="306211" y="774096"/>
-            <a:ext cx="8369400" cy="4147860"/>
-          </a:xfrm>
-        </p:spPr>
-        <p:txBody>
-          <a:bodyPr/>
-          <a:lstStyle/>
-          <a:p>
-            <a:r>
-              <a:rPr lang="en-US" dirty="0"/>
-              <a:t>Cross Squad Dependencies 1</a:t>
-            </a:r>
-          </a:p>
-          <a:p>
-            <a:r>
-              <a:rPr lang="en-US" dirty="0"/>
-              <a:t>Cross Squad Dependencies 2</a:t>
-            </a:r>
-          </a:p>
-          <a:p>
-            <a:endParaRPr lang="en-US" dirty="0"/>
-          </a:p>
-          <a:p>
-            <a:pPr marL="101600" indent="0">
-              <a:buNone/>
-            </a:pPr>
-            <a:endParaRPr lang="en-US" dirty="0"/>
-          </a:p>
-        </p:txBody>
-      </p:sp>
-    </p:spTree>
-    <p:extLst>
-      <p:ext uri="{BB962C8B-B14F-4D97-AF65-F5344CB8AC3E}">
-        <p14:creationId xmlns:p14="http://schemas.microsoft.com/office/powerpoint/2010/main" val="2060212065"/>
-      </p:ext>
-    </p:extLst>
-  </p:cSld>
-  <p:clrMapOvr>
-    <a:masterClrMapping/>
-  </p:clrMapOvr>
-  <p:transition spd="med">
-    <p:fade thruBlk="1"/>
   </p:transition>
 </p:sld>
 </file>
@@ -6975,7 +7112,7 @@
           <a:p>
             <a:r>
               <a:rPr lang="en-US" dirty="0"/>
-              <a:t>Features</a:t>
+              <a:t>Dependencies</a:t>
             </a:r>
           </a:p>
         </p:txBody>
@@ -6998,8 +7135,8 @@
         </p:nvSpPr>
         <p:spPr>
           <a:xfrm>
-            <a:off x="317500" y="943428"/>
-            <a:ext cx="8369400" cy="3742871"/>
+            <a:off x="306211" y="774096"/>
+            <a:ext cx="8369400" cy="4147860"/>
           </a:xfrm>
         </p:spPr>
         <p:txBody>
@@ -7008,82 +7145,16 @@
           <a:p>
             <a:r>
               <a:rPr lang="en-US" dirty="0"/>
-              <a:t>Define and develop a set of conformance guidelines to be consumed by extenders of the </a:t>
-            </a:r>
-            <a:r>
-              <a:rPr lang="en-US" dirty="0" err="1"/>
-              <a:t>Zowe</a:t>
-            </a:r>
-            <a:r>
-              <a:rPr lang="en-US" dirty="0"/>
-              <a:t> Explorer. </a:t>
-            </a:r>
-            <a:r>
-              <a:rPr lang="en-US" dirty="0">
-                <a:hlinkClick r:id="rId2"/>
-              </a:rPr>
-              <a:t>#837</a:t>
-            </a:r>
-            <a:endParaRPr lang="en-US" dirty="0"/>
-          </a:p>
-          <a:p>
-            <a:pPr lvl="1"/>
-            <a:r>
-              <a:rPr lang="en-US" dirty="0"/>
-              <a:t>To deliver standardized guidelines that Extenders of the </a:t>
-            </a:r>
-            <a:r>
-              <a:rPr lang="en-US" dirty="0" err="1"/>
-              <a:t>Zowe</a:t>
-            </a:r>
-            <a:r>
-              <a:rPr lang="en-US" dirty="0"/>
-              <a:t> Explorer can follow in order to leverage and grow the </a:t>
-            </a:r>
-            <a:r>
-              <a:rPr lang="en-US" dirty="0" err="1"/>
-              <a:t>Zowe</a:t>
-            </a:r>
-            <a:r>
-              <a:rPr lang="en-US" dirty="0"/>
-              <a:t> ecosystem</a:t>
-            </a:r>
-            <a:br>
-              <a:rPr lang="en-US" dirty="0"/>
-            </a:br>
-            <a:endParaRPr lang="en-US" dirty="0"/>
-          </a:p>
-          <a:p>
-            <a:r>
-              <a:rPr lang="en-US" dirty="0"/>
-              <a:t>Leverage the </a:t>
-            </a:r>
-            <a:r>
-              <a:rPr lang="en-US" dirty="0" err="1"/>
-              <a:t>Zowe</a:t>
-            </a:r>
-            <a:r>
-              <a:rPr lang="en-US" dirty="0"/>
-              <a:t> CLI security enhancements around MFA and SSO for an improved security experience in the </a:t>
-            </a:r>
-            <a:r>
-              <a:rPr lang="en-US" dirty="0" err="1"/>
-              <a:t>Zowe</a:t>
-            </a:r>
-            <a:r>
-              <a:rPr lang="en-US" dirty="0"/>
-              <a:t> Explorer.</a:t>
-            </a:r>
-          </a:p>
-          <a:p>
-            <a:pPr lvl="1"/>
-            <a:r>
-              <a:rPr lang="en-US" dirty="0"/>
-              <a:t>To increase user confidence knowing that the extension implements best security practices in order to remain compliant with corporate policies.</a:t>
-            </a:r>
-            <a:br>
-              <a:rPr lang="en-US" dirty="0"/>
-            </a:br>
+              <a:t>Cross Squad Dependencies 1</a:t>
+            </a:r>
+          </a:p>
+          <a:p>
+            <a:r>
+              <a:rPr lang="en-US" dirty="0"/>
+              <a:t>Cross Squad Dependencies 2</a:t>
+            </a:r>
+          </a:p>
+          <a:p>
             <a:endParaRPr lang="en-US" dirty="0"/>
           </a:p>
           <a:p>
@@ -7097,7 +7168,7 @@
     </p:spTree>
     <p:extLst>
       <p:ext uri="{BB962C8B-B14F-4D97-AF65-F5344CB8AC3E}">
-        <p14:creationId xmlns:p14="http://schemas.microsoft.com/office/powerpoint/2010/main" val="183851054"/>
+        <p14:creationId xmlns:p14="http://schemas.microsoft.com/office/powerpoint/2010/main" val="2060212065"/>
       </p:ext>
     </p:extLst>
   </p:cSld>
@@ -7174,7 +7245,7 @@
         <p:spPr>
           <a:xfrm>
             <a:off x="317500" y="943428"/>
-            <a:ext cx="8369400" cy="3963005"/>
+            <a:ext cx="8369400" cy="3742871"/>
           </a:xfrm>
         </p:spPr>
         <p:txBody>
@@ -7183,7 +7254,7 @@
           <a:p>
             <a:r>
               <a:rPr lang="en-US" dirty="0"/>
-              <a:t>Enhance the profile management user experience of </a:t>
+              <a:t>Define and develop a set of conformance guidelines to be consumed by extenders of the </a:t>
             </a:r>
             <a:r>
               <a:rPr lang="en-US" dirty="0" err="1"/>
@@ -7191,34 +7262,37 @@
             </a:r>
             <a:r>
               <a:rPr lang="en-US" dirty="0"/>
-              <a:t> Explorer (for new and regular users) (</a:t>
+              <a:t> Explorer. </a:t>
             </a:r>
             <a:r>
               <a:rPr lang="en-US" dirty="0">
                 <a:hlinkClick r:id="rId2"/>
               </a:rPr>
-              <a:t>Epic</a:t>
-            </a:r>
-            <a:r>
-              <a:rPr lang="en-US" dirty="0"/>
-              <a:t>) (</a:t>
-            </a:r>
-            <a:r>
-              <a:rPr lang="en-US" dirty="0">
-                <a:hlinkClick r:id="rId3"/>
-              </a:rPr>
-              <a:t>Issues</a:t>
-            </a:r>
-            <a:r>
-              <a:rPr lang="en-US" dirty="0"/>
-              <a:t>)</a:t>
-            </a:r>
+              <a:t>#837</a:t>
+            </a:r>
+            <a:endParaRPr lang="en-US" dirty="0"/>
           </a:p>
           <a:p>
             <a:pPr lvl="1"/>
             <a:r>
               <a:rPr lang="en-US" dirty="0"/>
-              <a:t>To deliver a greater experience when configuring and managing connection details by addressing community related issues around profiles.</a:t>
+              <a:t>To deliver standardized guidelines that Extenders of the </a:t>
+            </a:r>
+            <a:r>
+              <a:rPr lang="en-US" dirty="0" err="1"/>
+              <a:t>Zowe</a:t>
+            </a:r>
+            <a:r>
+              <a:rPr lang="en-US" dirty="0"/>
+              <a:t> Explorer can follow in order to leverage and grow the </a:t>
+            </a:r>
+            <a:r>
+              <a:rPr lang="en-US" dirty="0" err="1"/>
+              <a:t>Zowe</a:t>
+            </a:r>
+            <a:r>
+              <a:rPr lang="en-US" dirty="0"/>
+              <a:t> ecosystem</a:t>
             </a:r>
             <a:br>
               <a:rPr lang="en-US" dirty="0"/>
@@ -7228,7 +7302,7 @@
           <a:p>
             <a:r>
               <a:rPr lang="en-US" dirty="0"/>
-              <a:t>Enhance the z/OS Unix user experience of </a:t>
+              <a:t>Leverage the </a:t>
             </a:r>
             <a:r>
               <a:rPr lang="en-US" dirty="0" err="1"/>
@@ -7236,44 +7310,7 @@
             </a:r>
             <a:r>
               <a:rPr lang="en-US" dirty="0"/>
-              <a:t> Explorer (</a:t>
-            </a:r>
-            <a:r>
-              <a:rPr lang="en-US" dirty="0">
-                <a:hlinkClick r:id="rId4"/>
-              </a:rPr>
-              <a:t>Epic</a:t>
-            </a:r>
-            <a:r>
-              <a:rPr lang="en-US" dirty="0"/>
-              <a:t>) (</a:t>
-            </a:r>
-            <a:r>
-              <a:rPr lang="en-US" dirty="0">
-                <a:hlinkClick r:id="rId5"/>
-              </a:rPr>
-              <a:t>Issues</a:t>
-            </a:r>
-            <a:r>
-              <a:rPr lang="en-US" dirty="0"/>
-              <a:t>)</a:t>
-            </a:r>
-          </a:p>
-          <a:p>
-            <a:pPr lvl="1"/>
-            <a:r>
-              <a:rPr lang="en-US" dirty="0"/>
-              <a:t>To deliver a greater experience when working with z/OS Unix by addressing community related issues.</a:t>
-            </a:r>
-          </a:p>
-          <a:p>
-            <a:pPr lvl="1"/>
-            <a:endParaRPr lang="en-US" dirty="0"/>
-          </a:p>
-          <a:p>
-            <a:r>
-              <a:rPr lang="en-US" dirty="0"/>
-              <a:t>Enhance the Dataset manipulation user experience of the </a:t>
+              <a:t> CLI security enhancements around MFA and SSO for an improved security experience in the </a:t>
             </a:r>
             <a:r>
               <a:rPr lang="en-US" dirty="0" err="1"/>
@@ -7281,25 +7318,24 @@
             </a:r>
             <a:r>
               <a:rPr lang="en-US" dirty="0"/>
-              <a:t> Explorer</a:t>
+              <a:t> Explorer.</a:t>
             </a:r>
           </a:p>
           <a:p>
             <a:pPr lvl="1"/>
             <a:r>
               <a:rPr lang="en-US" dirty="0"/>
-              <a:t>To deliver a customized experience for creating datasets so that users can </a:t>
-            </a:r>
-            <a:r>
-              <a:rPr lang="en-US"/>
-              <a:t>specify desired allocation details.</a:t>
-            </a:r>
+              <a:t>To increase user confidence knowing that the extension implements best security practices in order to remain compliant with corporate policies.</a:t>
+            </a:r>
+            <a:br>
+              <a:rPr lang="en-US" dirty="0"/>
+            </a:br>
             <a:endParaRPr lang="en-US" dirty="0"/>
           </a:p>
           <a:p>
-            <a:endParaRPr lang="en-US" dirty="0"/>
-          </a:p>
-          <a:p>
+            <a:pPr marL="101600" indent="0">
+              <a:buNone/>
+            </a:pPr>
             <a:endParaRPr lang="en-US" dirty="0"/>
           </a:p>
         </p:txBody>
@@ -7307,7 +7343,7 @@
     </p:spTree>
     <p:extLst>
       <p:ext uri="{BB962C8B-B14F-4D97-AF65-F5344CB8AC3E}">
-        <p14:creationId xmlns:p14="http://schemas.microsoft.com/office/powerpoint/2010/main" val="1367409270"/>
+        <p14:creationId xmlns:p14="http://schemas.microsoft.com/office/powerpoint/2010/main" val="183851054"/>
       </p:ext>
     </p:extLst>
   </p:cSld>
@@ -7468,10 +7504,38 @@
       </p:grpSpPr>
       <p:sp>
         <p:nvSpPr>
-          <p:cNvPr id="2" name="Text Placeholder 1">
+          <p:cNvPr id="3" name="Title 2">
             <a:extLst>
               <a:ext uri="{FF2B5EF4-FFF2-40B4-BE49-F238E27FC236}">
-                <a16:creationId xmlns:a16="http://schemas.microsoft.com/office/drawing/2014/main" id="{ADB2E00A-906F-6645-9A30-53C6D93DC43C}"/>
+                <a16:creationId xmlns:a16="http://schemas.microsoft.com/office/drawing/2014/main" id="{CFEEEE36-E132-0D40-A4B8-9BDC5C8B6528}"/>
+              </a:ext>
+            </a:extLst>
+          </p:cNvPr>
+          <p:cNvSpPr>
+            <a:spLocks noGrp="1"/>
+          </p:cNvSpPr>
+          <p:nvPr>
+            <p:ph type="title"/>
+          </p:nvPr>
+        </p:nvSpPr>
+        <p:spPr/>
+        <p:txBody>
+          <a:bodyPr/>
+          <a:lstStyle/>
+          <a:p>
+            <a:r>
+              <a:rPr lang="en-US" dirty="0"/>
+              <a:t>Features</a:t>
+            </a:r>
+          </a:p>
+        </p:txBody>
+      </p:sp>
+      <p:sp>
+        <p:nvSpPr>
+          <p:cNvPr id="4" name="Text Placeholder 3">
+            <a:extLst>
+              <a:ext uri="{FF2B5EF4-FFF2-40B4-BE49-F238E27FC236}">
+                <a16:creationId xmlns:a16="http://schemas.microsoft.com/office/drawing/2014/main" id="{C0DB4ECB-A7D5-6B47-8180-75CB3C3DB7DE}"/>
               </a:ext>
             </a:extLst>
           </p:cNvPr>
@@ -7482,28 +7546,143 @@
             <p:ph type="body" idx="1"/>
           </p:nvPr>
         </p:nvSpPr>
-        <p:spPr/>
+        <p:spPr>
+          <a:xfrm>
+            <a:off x="317500" y="943428"/>
+            <a:ext cx="8369400" cy="3963005"/>
+          </a:xfrm>
+        </p:spPr>
         <p:txBody>
           <a:bodyPr/>
           <a:lstStyle/>
           <a:p>
             <a:r>
               <a:rPr lang="en-US" dirty="0"/>
-              <a:t>Onboarding Squad Focus</a:t>
-            </a:r>
-          </a:p>
-          <a:p>
-            <a:r>
-              <a:rPr lang="en-US" sz="2000" dirty="0"/>
-              <a:t>Rose?? Joe W? (Squad Lead??)</a:t>
-            </a:r>
+              <a:t>Enhance the profile management user experience of </a:t>
+            </a:r>
+            <a:r>
+              <a:rPr lang="en-US" dirty="0" err="1"/>
+              <a:t>Zowe</a:t>
+            </a:r>
+            <a:r>
+              <a:rPr lang="en-US" dirty="0"/>
+              <a:t> Explorer (for new and regular users) (</a:t>
+            </a:r>
+            <a:r>
+              <a:rPr lang="en-US" dirty="0">
+                <a:hlinkClick r:id="rId2"/>
+              </a:rPr>
+              <a:t>Epic</a:t>
+            </a:r>
+            <a:r>
+              <a:rPr lang="en-US" dirty="0"/>
+              <a:t>) (</a:t>
+            </a:r>
+            <a:r>
+              <a:rPr lang="en-US" dirty="0">
+                <a:hlinkClick r:id="rId3"/>
+              </a:rPr>
+              <a:t>Issues</a:t>
+            </a:r>
+            <a:r>
+              <a:rPr lang="en-US" dirty="0"/>
+              <a:t>)</a:t>
+            </a:r>
+          </a:p>
+          <a:p>
+            <a:pPr lvl="1"/>
+            <a:r>
+              <a:rPr lang="en-US" dirty="0"/>
+              <a:t>To deliver a greater experience when configuring and managing connection details by addressing community related issues around profiles.</a:t>
+            </a:r>
+            <a:br>
+              <a:rPr lang="en-US" dirty="0"/>
+            </a:br>
+            <a:endParaRPr lang="en-US" dirty="0"/>
+          </a:p>
+          <a:p>
+            <a:r>
+              <a:rPr lang="en-US" dirty="0"/>
+              <a:t>Enhance the z/OS Unix user experience of </a:t>
+            </a:r>
+            <a:r>
+              <a:rPr lang="en-US" dirty="0" err="1"/>
+              <a:t>Zowe</a:t>
+            </a:r>
+            <a:r>
+              <a:rPr lang="en-US" dirty="0"/>
+              <a:t> Explorer (</a:t>
+            </a:r>
+            <a:r>
+              <a:rPr lang="en-US" dirty="0">
+                <a:hlinkClick r:id="rId4"/>
+              </a:rPr>
+              <a:t>Epic</a:t>
+            </a:r>
+            <a:r>
+              <a:rPr lang="en-US" dirty="0"/>
+              <a:t>) (</a:t>
+            </a:r>
+            <a:r>
+              <a:rPr lang="en-US" dirty="0">
+                <a:hlinkClick r:id="rId5"/>
+              </a:rPr>
+              <a:t>Issues</a:t>
+            </a:r>
+            <a:r>
+              <a:rPr lang="en-US" dirty="0"/>
+              <a:t>)</a:t>
+            </a:r>
+          </a:p>
+          <a:p>
+            <a:pPr lvl="1"/>
+            <a:r>
+              <a:rPr lang="en-US" dirty="0"/>
+              <a:t>To deliver a greater experience when working with z/OS Unix by addressing community related issues.</a:t>
+            </a:r>
+          </a:p>
+          <a:p>
+            <a:pPr lvl="1"/>
+            <a:endParaRPr lang="en-US" dirty="0"/>
+          </a:p>
+          <a:p>
+            <a:r>
+              <a:rPr lang="en-US" dirty="0"/>
+              <a:t>Enhance the Dataset manipulation user experience of the </a:t>
+            </a:r>
+            <a:r>
+              <a:rPr lang="en-US" dirty="0" err="1"/>
+              <a:t>Zowe</a:t>
+            </a:r>
+            <a:r>
+              <a:rPr lang="en-US" dirty="0"/>
+              <a:t> Explorer</a:t>
+            </a:r>
+          </a:p>
+          <a:p>
+            <a:pPr lvl="1"/>
+            <a:r>
+              <a:rPr lang="en-US" dirty="0"/>
+              <a:t>To deliver a customized experience for creating datasets so that users can </a:t>
+            </a:r>
+            <a:r>
+              <a:rPr lang="en-US"/>
+              <a:t>specify desired allocation details.</a:t>
+            </a:r>
+            <a:endParaRPr lang="en-US" dirty="0"/>
+          </a:p>
+          <a:p>
+            <a:endParaRPr lang="en-US" dirty="0"/>
+          </a:p>
+          <a:p>
+            <a:endParaRPr lang="en-US" dirty="0"/>
           </a:p>
         </p:txBody>
       </p:sp>
     </p:spTree>
     <p:extLst>
       <p:ext uri="{BB962C8B-B14F-4D97-AF65-F5344CB8AC3E}">
-        <p14:creationId xmlns:p14="http://schemas.microsoft.com/office/powerpoint/2010/main" val="322818001"/>
+        <p14:creationId xmlns:p14="http://schemas.microsoft.com/office/powerpoint/2010/main" val="1367409270"/>
       </p:ext>
     </p:extLst>
   </p:cSld>
@@ -7511,7 +7690,7 @@
     <a:masterClrMapping/>
   </p:clrMapOvr>
   <p:transition spd="med">
-    <p:fade/>
+    <p:fade thruBlk="1"/>
   </p:transition>
 </p:sld>
 </file>
@@ -7535,38 +7714,10 @@
       </p:grpSpPr>
       <p:sp>
         <p:nvSpPr>
-          <p:cNvPr id="3" name="Title 2">
+          <p:cNvPr id="2" name="Text Placeholder 1">
             <a:extLst>
               <a:ext uri="{FF2B5EF4-FFF2-40B4-BE49-F238E27FC236}">
-                <a16:creationId xmlns:a16="http://schemas.microsoft.com/office/drawing/2014/main" id="{CFEEEE36-E132-0D40-A4B8-9BDC5C8B6528}"/>
-              </a:ext>
-            </a:extLst>
-          </p:cNvPr>
-          <p:cNvSpPr>
-            <a:spLocks noGrp="1"/>
-          </p:cNvSpPr>
-          <p:nvPr>
-            <p:ph type="title"/>
-          </p:nvPr>
-        </p:nvSpPr>
-        <p:spPr/>
-        <p:txBody>
-          <a:bodyPr/>
-          <a:lstStyle/>
-          <a:p>
-            <a:r>
-              <a:rPr lang="en-US" dirty="0"/>
-              <a:t>Dependencies</a:t>
-            </a:r>
-          </a:p>
-        </p:txBody>
-      </p:sp>
-      <p:sp>
-        <p:nvSpPr>
-          <p:cNvPr id="4" name="Text Placeholder 3">
-            <a:extLst>
-              <a:ext uri="{FF2B5EF4-FFF2-40B4-BE49-F238E27FC236}">
-                <a16:creationId xmlns:a16="http://schemas.microsoft.com/office/drawing/2014/main" id="{C0DB4ECB-A7D5-6B47-8180-75CB3C3DB7DE}"/>
+                <a16:creationId xmlns:a16="http://schemas.microsoft.com/office/drawing/2014/main" id="{ADB2E00A-906F-6645-9A30-53C6D93DC43C}"/>
               </a:ext>
             </a:extLst>
           </p:cNvPr>
@@ -7577,42 +7728,28 @@
             <p:ph type="body" idx="1"/>
           </p:nvPr>
         </p:nvSpPr>
-        <p:spPr>
-          <a:xfrm>
-            <a:off x="306211" y="774096"/>
-            <a:ext cx="8369400" cy="4147860"/>
-          </a:xfrm>
-        </p:spPr>
+        <p:spPr/>
         <p:txBody>
           <a:bodyPr/>
           <a:lstStyle/>
           <a:p>
             <a:r>
               <a:rPr lang="en-US" dirty="0"/>
-              <a:t>Cross Squad Dependencies 1</a:t>
-            </a:r>
-          </a:p>
-          <a:p>
-            <a:r>
-              <a:rPr lang="en-US" dirty="0"/>
-              <a:t>Cross Squad Dependencies 2</a:t>
-            </a:r>
-          </a:p>
-          <a:p>
-            <a:endParaRPr lang="en-US" dirty="0"/>
-          </a:p>
-          <a:p>
-            <a:pPr marL="101600" indent="0">
-              <a:buNone/>
-            </a:pPr>
-            <a:endParaRPr lang="en-US" dirty="0"/>
+              <a:t>Onboarding Squad Focus</a:t>
+            </a:r>
+          </a:p>
+          <a:p>
+            <a:r>
+              <a:rPr lang="en-US" sz="2000" dirty="0"/>
+              <a:t>Rose?? Joe W? (Squad Lead??)</a:t>
+            </a:r>
           </a:p>
         </p:txBody>
       </p:sp>
     </p:spTree>
     <p:extLst>
       <p:ext uri="{BB962C8B-B14F-4D97-AF65-F5344CB8AC3E}">
-        <p14:creationId xmlns:p14="http://schemas.microsoft.com/office/powerpoint/2010/main" val="995374145"/>
+        <p14:creationId xmlns:p14="http://schemas.microsoft.com/office/powerpoint/2010/main" val="322818001"/>
       </p:ext>
     </p:extLst>
   </p:cSld>
@@ -7620,7 +7757,7 @@
     <a:masterClrMapping/>
   </p:clrMapOvr>
   <p:transition spd="med">
-    <p:fade thruBlk="1"/>
+    <p:fade/>
   </p:transition>
 </p:sld>
 </file>
@@ -7665,6 +7802,115 @@
           <a:p>
             <a:r>
               <a:rPr lang="en-US" dirty="0"/>
+              <a:t>Dependencies</a:t>
+            </a:r>
+          </a:p>
+        </p:txBody>
+      </p:sp>
+      <p:sp>
+        <p:nvSpPr>
+          <p:cNvPr id="4" name="Text Placeholder 3">
+            <a:extLst>
+              <a:ext uri="{FF2B5EF4-FFF2-40B4-BE49-F238E27FC236}">
+                <a16:creationId xmlns:a16="http://schemas.microsoft.com/office/drawing/2014/main" id="{C0DB4ECB-A7D5-6B47-8180-75CB3C3DB7DE}"/>
+              </a:ext>
+            </a:extLst>
+          </p:cNvPr>
+          <p:cNvSpPr>
+            <a:spLocks noGrp="1"/>
+          </p:cNvSpPr>
+          <p:nvPr>
+            <p:ph type="body" idx="1"/>
+          </p:nvPr>
+        </p:nvSpPr>
+        <p:spPr>
+          <a:xfrm>
+            <a:off x="306211" y="774096"/>
+            <a:ext cx="8369400" cy="4147860"/>
+          </a:xfrm>
+        </p:spPr>
+        <p:txBody>
+          <a:bodyPr/>
+          <a:lstStyle/>
+          <a:p>
+            <a:r>
+              <a:rPr lang="en-US" dirty="0"/>
+              <a:t>Cross Squad Dependencies 1</a:t>
+            </a:r>
+          </a:p>
+          <a:p>
+            <a:r>
+              <a:rPr lang="en-US" dirty="0"/>
+              <a:t>Cross Squad Dependencies 2</a:t>
+            </a:r>
+          </a:p>
+          <a:p>
+            <a:endParaRPr lang="en-US" dirty="0"/>
+          </a:p>
+          <a:p>
+            <a:pPr marL="101600" indent="0">
+              <a:buNone/>
+            </a:pPr>
+            <a:endParaRPr lang="en-US" dirty="0"/>
+          </a:p>
+        </p:txBody>
+      </p:sp>
+    </p:spTree>
+    <p:extLst>
+      <p:ext uri="{BB962C8B-B14F-4D97-AF65-F5344CB8AC3E}">
+        <p14:creationId xmlns:p14="http://schemas.microsoft.com/office/powerpoint/2010/main" val="995374145"/>
+      </p:ext>
+    </p:extLst>
+  </p:cSld>
+  <p:clrMapOvr>
+    <a:masterClrMapping/>
+  </p:clrMapOvr>
+  <p:transition spd="med">
+    <p:fade thruBlk="1"/>
+  </p:transition>
+</p:sld>
+</file>
+
+<file path=ppt/slides/slide23.xml><?xml version="1.0" encoding="utf-8"?>
+<p:sld xmlns:a="http://schemas.openxmlformats.org/drawingml/2006/main" xmlns:r="http://schemas.openxmlformats.org/officeDocument/2006/relationships" xmlns:p="http://schemas.openxmlformats.org/presentationml/2006/main">
+  <p:cSld>
+    <p:spTree>
+      <p:nvGrpSpPr>
+        <p:cNvPr id="1" name=""/>
+        <p:cNvGrpSpPr/>
+        <p:nvPr/>
+      </p:nvGrpSpPr>
+      <p:grpSpPr>
+        <a:xfrm>
+          <a:off x="0" y="0"/>
+          <a:ext cx="0" cy="0"/>
+          <a:chOff x="0" y="0"/>
+          <a:chExt cx="0" cy="0"/>
+        </a:xfrm>
+      </p:grpSpPr>
+      <p:sp>
+        <p:nvSpPr>
+          <p:cNvPr id="3" name="Title 2">
+            <a:extLst>
+              <a:ext uri="{FF2B5EF4-FFF2-40B4-BE49-F238E27FC236}">
+                <a16:creationId xmlns:a16="http://schemas.microsoft.com/office/drawing/2014/main" id="{CFEEEE36-E132-0D40-A4B8-9BDC5C8B6528}"/>
+              </a:ext>
+            </a:extLst>
+          </p:cNvPr>
+          <p:cNvSpPr>
+            <a:spLocks noGrp="1"/>
+          </p:cNvSpPr>
+          <p:nvPr>
+            <p:ph type="title"/>
+          </p:nvPr>
+        </p:nvSpPr>
+        <p:spPr/>
+        <p:txBody>
+          <a:bodyPr/>
+          <a:lstStyle/>
+          <a:p>
+            <a:r>
+              <a:rPr lang="en-US" dirty="0"/>
               <a:t>Focus</a:t>
             </a:r>
           </a:p>
@@ -7790,7 +8036,7 @@
 </p:sld>
 </file>
 
-<file path=ppt/slides/slide23.xml><?xml version="1.0" encoding="utf-8"?>
+<file path=ppt/slides/slide24.xml><?xml version="1.0" encoding="utf-8"?>
 <p:sld xmlns:a="http://schemas.openxmlformats.org/drawingml/2006/main" xmlns:r="http://schemas.openxmlformats.org/officeDocument/2006/relationships" xmlns:p="http://schemas.openxmlformats.org/presentationml/2006/main">
   <p:cSld>
     <p:spTree>
@@ -7871,115 +8117,6 @@
   </p:clrMapOvr>
   <p:transition spd="med">
     <p:fade/>
-  </p:transition>
-</p:sld>
-</file>
-
-<file path=ppt/slides/slide24.xml><?xml version="1.0" encoding="utf-8"?>
-<p:sld xmlns:a="http://schemas.openxmlformats.org/drawingml/2006/main" xmlns:r="http://schemas.openxmlformats.org/officeDocument/2006/relationships" xmlns:p="http://schemas.openxmlformats.org/presentationml/2006/main">
-  <p:cSld>
-    <p:spTree>
-      <p:nvGrpSpPr>
-        <p:cNvPr id="1" name=""/>
-        <p:cNvGrpSpPr/>
-        <p:nvPr/>
-      </p:nvGrpSpPr>
-      <p:grpSpPr>
-        <a:xfrm>
-          <a:off x="0" y="0"/>
-          <a:ext cx="0" cy="0"/>
-          <a:chOff x="0" y="0"/>
-          <a:chExt cx="0" cy="0"/>
-        </a:xfrm>
-      </p:grpSpPr>
-      <p:sp>
-        <p:nvSpPr>
-          <p:cNvPr id="3" name="Title 2">
-            <a:extLst>
-              <a:ext uri="{FF2B5EF4-FFF2-40B4-BE49-F238E27FC236}">
-                <a16:creationId xmlns:a16="http://schemas.microsoft.com/office/drawing/2014/main" id="{CFEEEE36-E132-0D40-A4B8-9BDC5C8B6528}"/>
-              </a:ext>
-            </a:extLst>
-          </p:cNvPr>
-          <p:cNvSpPr>
-            <a:spLocks noGrp="1"/>
-          </p:cNvSpPr>
-          <p:nvPr>
-            <p:ph type="title"/>
-          </p:nvPr>
-        </p:nvSpPr>
-        <p:spPr/>
-        <p:txBody>
-          <a:bodyPr/>
-          <a:lstStyle/>
-          <a:p>
-            <a:r>
-              <a:rPr lang="en-US" dirty="0"/>
-              <a:t>Dependencies</a:t>
-            </a:r>
-          </a:p>
-        </p:txBody>
-      </p:sp>
-      <p:sp>
-        <p:nvSpPr>
-          <p:cNvPr id="4" name="Text Placeholder 3">
-            <a:extLst>
-              <a:ext uri="{FF2B5EF4-FFF2-40B4-BE49-F238E27FC236}">
-                <a16:creationId xmlns:a16="http://schemas.microsoft.com/office/drawing/2014/main" id="{C0DB4ECB-A7D5-6B47-8180-75CB3C3DB7DE}"/>
-              </a:ext>
-            </a:extLst>
-          </p:cNvPr>
-          <p:cNvSpPr>
-            <a:spLocks noGrp="1"/>
-          </p:cNvSpPr>
-          <p:nvPr>
-            <p:ph type="body" idx="1"/>
-          </p:nvPr>
-        </p:nvSpPr>
-        <p:spPr>
-          <a:xfrm>
-            <a:off x="306211" y="774096"/>
-            <a:ext cx="8369400" cy="4147860"/>
-          </a:xfrm>
-        </p:spPr>
-        <p:txBody>
-          <a:bodyPr/>
-          <a:lstStyle/>
-          <a:p>
-            <a:r>
-              <a:rPr lang="en-US" dirty="0"/>
-              <a:t>Cross Squad Dependencies 1</a:t>
-            </a:r>
-          </a:p>
-          <a:p>
-            <a:r>
-              <a:rPr lang="en-US" dirty="0"/>
-              <a:t>Cross Squad Dependencies 2</a:t>
-            </a:r>
-          </a:p>
-          <a:p>
-            <a:endParaRPr lang="en-US" dirty="0"/>
-          </a:p>
-          <a:p>
-            <a:pPr marL="101600" indent="0">
-              <a:buNone/>
-            </a:pPr>
-            <a:endParaRPr lang="en-US" dirty="0"/>
-          </a:p>
-        </p:txBody>
-      </p:sp>
-    </p:spTree>
-    <p:extLst>
-      <p:ext uri="{BB962C8B-B14F-4D97-AF65-F5344CB8AC3E}">
-        <p14:creationId xmlns:p14="http://schemas.microsoft.com/office/powerpoint/2010/main" val="1515987240"/>
-      </p:ext>
-    </p:extLst>
-  </p:cSld>
-  <p:clrMapOvr>
-    <a:masterClrMapping/>
-  </p:clrMapOvr>
-  <p:transition spd="med">
-    <p:fade thruBlk="1"/>
   </p:transition>
 </p:sld>
 </file>
@@ -8024,6 +8161,115 @@
           <a:p>
             <a:r>
               <a:rPr lang="en-US" dirty="0"/>
+              <a:t>Dependencies</a:t>
+            </a:r>
+          </a:p>
+        </p:txBody>
+      </p:sp>
+      <p:sp>
+        <p:nvSpPr>
+          <p:cNvPr id="4" name="Text Placeholder 3">
+            <a:extLst>
+              <a:ext uri="{FF2B5EF4-FFF2-40B4-BE49-F238E27FC236}">
+                <a16:creationId xmlns:a16="http://schemas.microsoft.com/office/drawing/2014/main" id="{C0DB4ECB-A7D5-6B47-8180-75CB3C3DB7DE}"/>
+              </a:ext>
+            </a:extLst>
+          </p:cNvPr>
+          <p:cNvSpPr>
+            <a:spLocks noGrp="1"/>
+          </p:cNvSpPr>
+          <p:nvPr>
+            <p:ph type="body" idx="1"/>
+          </p:nvPr>
+        </p:nvSpPr>
+        <p:spPr>
+          <a:xfrm>
+            <a:off x="306211" y="774096"/>
+            <a:ext cx="8369400" cy="4147860"/>
+          </a:xfrm>
+        </p:spPr>
+        <p:txBody>
+          <a:bodyPr/>
+          <a:lstStyle/>
+          <a:p>
+            <a:r>
+              <a:rPr lang="en-US" dirty="0"/>
+              <a:t>Cross Squad Dependencies 1</a:t>
+            </a:r>
+          </a:p>
+          <a:p>
+            <a:r>
+              <a:rPr lang="en-US" dirty="0"/>
+              <a:t>Cross Squad Dependencies 2</a:t>
+            </a:r>
+          </a:p>
+          <a:p>
+            <a:endParaRPr lang="en-US" dirty="0"/>
+          </a:p>
+          <a:p>
+            <a:pPr marL="101600" indent="0">
+              <a:buNone/>
+            </a:pPr>
+            <a:endParaRPr lang="en-US" dirty="0"/>
+          </a:p>
+        </p:txBody>
+      </p:sp>
+    </p:spTree>
+    <p:extLst>
+      <p:ext uri="{BB962C8B-B14F-4D97-AF65-F5344CB8AC3E}">
+        <p14:creationId xmlns:p14="http://schemas.microsoft.com/office/powerpoint/2010/main" val="1515987240"/>
+      </p:ext>
+    </p:extLst>
+  </p:cSld>
+  <p:clrMapOvr>
+    <a:masterClrMapping/>
+  </p:clrMapOvr>
+  <p:transition spd="med">
+    <p:fade thruBlk="1"/>
+  </p:transition>
+</p:sld>
+</file>
+
+<file path=ppt/slides/slide26.xml><?xml version="1.0" encoding="utf-8"?>
+<p:sld xmlns:a="http://schemas.openxmlformats.org/drawingml/2006/main" xmlns:r="http://schemas.openxmlformats.org/officeDocument/2006/relationships" xmlns:p="http://schemas.openxmlformats.org/presentationml/2006/main">
+  <p:cSld>
+    <p:spTree>
+      <p:nvGrpSpPr>
+        <p:cNvPr id="1" name=""/>
+        <p:cNvGrpSpPr/>
+        <p:nvPr/>
+      </p:nvGrpSpPr>
+      <p:grpSpPr>
+        <a:xfrm>
+          <a:off x="0" y="0"/>
+          <a:ext cx="0" cy="0"/>
+          <a:chOff x="0" y="0"/>
+          <a:chExt cx="0" cy="0"/>
+        </a:xfrm>
+      </p:grpSpPr>
+      <p:sp>
+        <p:nvSpPr>
+          <p:cNvPr id="3" name="Title 2">
+            <a:extLst>
+              <a:ext uri="{FF2B5EF4-FFF2-40B4-BE49-F238E27FC236}">
+                <a16:creationId xmlns:a16="http://schemas.microsoft.com/office/drawing/2014/main" id="{CFEEEE36-E132-0D40-A4B8-9BDC5C8B6528}"/>
+              </a:ext>
+            </a:extLst>
+          </p:cNvPr>
+          <p:cNvSpPr>
+            <a:spLocks noGrp="1"/>
+          </p:cNvSpPr>
+          <p:nvPr>
+            <p:ph type="title"/>
+          </p:nvPr>
+        </p:nvSpPr>
+        <p:spPr/>
+        <p:txBody>
+          <a:bodyPr/>
+          <a:lstStyle/>
+          <a:p>
+            <a:r>
+              <a:rPr lang="en-US" dirty="0"/>
               <a:t>Focus</a:t>
             </a:r>
           </a:p>
@@ -8147,7 +8393,7 @@
 </p:sld>
 </file>
 
-<file path=ppt/slides/slide26.xml><?xml version="1.0" encoding="utf-8"?>
+<file path=ppt/slides/slide27.xml><?xml version="1.0" encoding="utf-8"?>
 <p:sld xmlns:a="http://schemas.openxmlformats.org/drawingml/2006/main" xmlns:r="http://schemas.openxmlformats.org/officeDocument/2006/relationships" xmlns:p="http://schemas.openxmlformats.org/presentationml/2006/main">
   <p:cSld>
     <p:spTree>
@@ -8229,176 +8475,6 @@
 </p:sld>
 </file>
 
-<file path=ppt/slides/slide27.xml><?xml version="1.0" encoding="utf-8"?>
-<p:sld xmlns:a="http://schemas.openxmlformats.org/drawingml/2006/main" xmlns:r="http://schemas.openxmlformats.org/officeDocument/2006/relationships" xmlns:p="http://schemas.openxmlformats.org/presentationml/2006/main">
-  <p:cSld>
-    <p:spTree>
-      <p:nvGrpSpPr>
-        <p:cNvPr id="1" name=""/>
-        <p:cNvGrpSpPr/>
-        <p:nvPr/>
-      </p:nvGrpSpPr>
-      <p:grpSpPr>
-        <a:xfrm>
-          <a:off x="0" y="0"/>
-          <a:ext cx="0" cy="0"/>
-          <a:chOff x="0" y="0"/>
-          <a:chExt cx="0" cy="0"/>
-        </a:xfrm>
-      </p:grpSpPr>
-      <p:sp>
-        <p:nvSpPr>
-          <p:cNvPr id="3" name="Title 2">
-            <a:extLst>
-              <a:ext uri="{FF2B5EF4-FFF2-40B4-BE49-F238E27FC236}">
-                <a16:creationId xmlns:a16="http://schemas.microsoft.com/office/drawing/2014/main" id="{CFEEEE36-E132-0D40-A4B8-9BDC5C8B6528}"/>
-              </a:ext>
-            </a:extLst>
-          </p:cNvPr>
-          <p:cNvSpPr>
-            <a:spLocks noGrp="1"/>
-          </p:cNvSpPr>
-          <p:nvPr>
-            <p:ph type="title"/>
-          </p:nvPr>
-        </p:nvSpPr>
-        <p:spPr/>
-        <p:txBody>
-          <a:bodyPr/>
-          <a:lstStyle/>
-          <a:p>
-            <a:r>
-              <a:rPr lang="en-US" dirty="0"/>
-              <a:t>Focus</a:t>
-            </a:r>
-          </a:p>
-        </p:txBody>
-      </p:sp>
-      <p:sp>
-        <p:nvSpPr>
-          <p:cNvPr id="4" name="Text Placeholder 3">
-            <a:extLst>
-              <a:ext uri="{FF2B5EF4-FFF2-40B4-BE49-F238E27FC236}">
-                <a16:creationId xmlns:a16="http://schemas.microsoft.com/office/drawing/2014/main" id="{C0DB4ECB-A7D5-6B47-8180-75CB3C3DB7DE}"/>
-              </a:ext>
-            </a:extLst>
-          </p:cNvPr>
-          <p:cNvSpPr>
-            <a:spLocks noGrp="1"/>
-          </p:cNvSpPr>
-          <p:nvPr>
-            <p:ph type="body" idx="1"/>
-          </p:nvPr>
-        </p:nvSpPr>
-        <p:spPr/>
-        <p:txBody>
-          <a:bodyPr/>
-          <a:lstStyle/>
-          <a:p>
-            <a:r>
-              <a:rPr lang="en-US" dirty="0"/>
-              <a:t>Design and Begin Deployment, Packaging and Management Hill [Steve, Joe]</a:t>
-            </a:r>
-          </a:p>
-          <a:p>
-            <a:pPr lvl="1"/>
-            <a:r>
-              <a:rPr lang="en-US" dirty="0"/>
-              <a:t>Improve both </a:t>
-            </a:r>
-            <a:r>
-              <a:rPr lang="en-US" dirty="0" err="1"/>
-              <a:t>Zowe</a:t>
-            </a:r>
-            <a:r>
-              <a:rPr lang="en-US" dirty="0"/>
-              <a:t> administrator and </a:t>
-            </a:r>
-            <a:r>
-              <a:rPr lang="en-US" dirty="0" err="1"/>
-              <a:t>Zowe</a:t>
-            </a:r>
-            <a:r>
-              <a:rPr lang="en-US" dirty="0"/>
-              <a:t> extender user experiences when developing and deploying </a:t>
-            </a:r>
-            <a:r>
-              <a:rPr lang="en-US" dirty="0" err="1"/>
-              <a:t>Zowe</a:t>
-            </a:r>
-            <a:r>
-              <a:rPr lang="en-US" dirty="0"/>
-              <a:t> extensions by streamlining packaging, install, upgrade, and configuration.</a:t>
-            </a:r>
-          </a:p>
-          <a:p>
-            <a:pPr lvl="1"/>
-            <a:r>
-              <a:rPr lang="en-US" dirty="0"/>
-              <a:t>Unify existing </a:t>
-            </a:r>
-            <a:r>
-              <a:rPr lang="en-US" dirty="0" err="1"/>
-              <a:t>Zowe</a:t>
-            </a:r>
-            <a:r>
-              <a:rPr lang="en-US" dirty="0"/>
-              <a:t> core components and extensions with the new extension design and rebuild documentation</a:t>
-            </a:r>
-          </a:p>
-          <a:p>
-            <a:pPr lvl="1"/>
-            <a:r>
-              <a:rPr lang="en-US" dirty="0"/>
-              <a:t>Scope of changes dependent on available resource and design validation</a:t>
-            </a:r>
-          </a:p>
-          <a:p>
-            <a:pPr lvl="1"/>
-            <a:r>
-              <a:rPr lang="en-US" dirty="0"/>
-              <a:t>This may shift into v2 if breaking changes are required</a:t>
-            </a:r>
-          </a:p>
-          <a:p>
-            <a:r>
-              <a:rPr lang="en-US" dirty="0"/>
-              <a:t>Research and POC containerization of </a:t>
-            </a:r>
-            <a:r>
-              <a:rPr lang="en-US" dirty="0" err="1"/>
-              <a:t>Zowe</a:t>
-            </a:r>
-            <a:r>
-              <a:rPr lang="en-US" dirty="0"/>
-              <a:t>. [Sean]</a:t>
-            </a:r>
-          </a:p>
-          <a:p>
-            <a:pPr lvl="1"/>
-            <a:r>
-              <a:rPr lang="en-US" dirty="0"/>
-              <a:t>Initially targeted for developers</a:t>
-            </a:r>
-          </a:p>
-        </p:txBody>
-      </p:sp>
-    </p:spTree>
-    <p:extLst>
-      <p:ext uri="{BB962C8B-B14F-4D97-AF65-F5344CB8AC3E}">
-        <p14:creationId xmlns:p14="http://schemas.microsoft.com/office/powerpoint/2010/main" val="209280467"/>
-      </p:ext>
-    </p:extLst>
-  </p:cSld>
-  <p:clrMapOvr>
-    <a:masterClrMapping/>
-  </p:clrMapOvr>
-  <p:transition spd="med">
-    <p:fade thruBlk="1"/>
-  </p:transition>
-</p:sld>
-</file>
-
 <file path=ppt/slides/slide28.xml><?xml version="1.0" encoding="utf-8"?>
 <p:sld xmlns:a="http://schemas.openxmlformats.org/drawingml/2006/main" xmlns:r="http://schemas.openxmlformats.org/officeDocument/2006/relationships" xmlns:p="http://schemas.openxmlformats.org/presentationml/2006/main">
   <p:cSld>
@@ -8439,7 +8515,7 @@
           <a:p>
             <a:r>
               <a:rPr lang="en-US" dirty="0"/>
-              <a:t>Dependencies</a:t>
+              <a:t>Focus</a:t>
             </a:r>
           </a:p>
         </p:txBody>
@@ -8460,95 +8536,103 @@
             <p:ph type="body" idx="1"/>
           </p:nvPr>
         </p:nvSpPr>
-        <p:spPr>
-          <a:xfrm>
-            <a:off x="306211" y="774096"/>
-            <a:ext cx="8369400" cy="4147860"/>
-          </a:xfrm>
-        </p:spPr>
+        <p:spPr/>
         <p:txBody>
           <a:bodyPr/>
           <a:lstStyle/>
           <a:p>
             <a:r>
               <a:rPr lang="en-US" dirty="0"/>
-              <a:t>Cross squad:</a:t>
+              <a:t>Design and Begin Deployment, Packaging and Management Hill [Steve, Joe]</a:t>
             </a:r>
           </a:p>
           <a:p>
             <a:pPr lvl="1"/>
             <a:r>
               <a:rPr lang="en-US" dirty="0"/>
-              <a:t>If we get around to the de-coupling of the existing </a:t>
+              <a:t>Improve both </a:t>
             </a:r>
             <a:r>
               <a:rPr lang="en-US" dirty="0" err="1"/>
-              <a:t>zowe</a:t>
-            </a:r>
-            <a:r>
-              <a:rPr lang="en-US" dirty="0"/>
-              <a:t> core components, then some assistance in migrating current install scripts out of </a:t>
+              <a:t>Zowe</a:t>
+            </a:r>
+            <a:r>
+              <a:rPr lang="en-US" dirty="0"/>
+              <a:t> administrator and </a:t>
             </a:r>
             <a:r>
               <a:rPr lang="en-US" dirty="0" err="1"/>
-              <a:t>zowe</a:t>
-            </a:r>
-            <a:r>
-              <a:rPr lang="en-US" dirty="0"/>
-              <a:t>-install-packaging maybe be required</a:t>
-            </a:r>
-          </a:p>
-          <a:p>
-            <a:r>
-              <a:rPr lang="en-US" dirty="0"/>
-              <a:t>Other dependencies:</a:t>
+              <a:t>Zowe</a:t>
+            </a:r>
+            <a:r>
+              <a:rPr lang="en-US" dirty="0"/>
+              <a:t> extender user experiences when developing and deploying </a:t>
+            </a:r>
+            <a:r>
+              <a:rPr lang="en-US" dirty="0" err="1"/>
+              <a:t>Zowe</a:t>
+            </a:r>
+            <a:r>
+              <a:rPr lang="en-US" dirty="0"/>
+              <a:t> extensions by streamlining packaging, install, upgrade, and configuration.</a:t>
             </a:r>
           </a:p>
           <a:p>
             <a:pPr lvl="1"/>
             <a:r>
               <a:rPr lang="en-US" dirty="0"/>
-              <a:t>Access to extender and installers to validate the design</a:t>
+              <a:t>Unify existing </a:t>
+            </a:r>
+            <a:r>
+              <a:rPr lang="en-US" dirty="0" err="1"/>
+              <a:t>Zowe</a:t>
+            </a:r>
+            <a:r>
+              <a:rPr lang="en-US" dirty="0"/>
+              <a:t> core components and extensions with the new extension design and rebuild documentation</a:t>
             </a:r>
           </a:p>
           <a:p>
             <a:pPr lvl="1"/>
             <a:r>
               <a:rPr lang="en-US" dirty="0"/>
-              <a:t>Sample spring boot rest </a:t>
+              <a:t>Scope of changes dependent on available resource and design validation</a:t>
+            </a:r>
+          </a:p>
+          <a:p>
+            <a:pPr lvl="1"/>
+            <a:r>
+              <a:rPr lang="en-US" dirty="0"/>
+              <a:t>This may shift into v2 if breaking changes are required</a:t>
+            </a:r>
+          </a:p>
+          <a:p>
+            <a:r>
+              <a:rPr lang="en-US" dirty="0"/>
+              <a:t>Research and POC containerization of </a:t>
             </a:r>
             <a:r>
               <a:rPr lang="en-US" dirty="0" err="1"/>
-              <a:t>api</a:t>
-            </a:r>
-            <a:r>
-              <a:rPr lang="en-US" dirty="0"/>
-              <a:t> and sample node </a:t>
-            </a:r>
-            <a:r>
-              <a:rPr lang="en-US" dirty="0" err="1"/>
-              <a:t>api</a:t>
-            </a:r>
-            <a:r>
-              <a:rPr lang="en-US" dirty="0"/>
-              <a:t> to extend/use as the base for the packaging and deployment samples</a:t>
-            </a:r>
-          </a:p>
-          <a:p>
-            <a:endParaRPr lang="en-US" dirty="0"/>
-          </a:p>
-          <a:p>
-            <a:pPr marL="101600" indent="0">
-              <a:buNone/>
-            </a:pPr>
-            <a:endParaRPr lang="en-US" dirty="0"/>
+              <a:t>Zowe</a:t>
+            </a:r>
+            <a:r>
+              <a:rPr lang="en-US" dirty="0"/>
+              <a:t>. [Sean]</a:t>
+            </a:r>
+          </a:p>
+          <a:p>
+            <a:pPr lvl="1"/>
+            <a:r>
+              <a:rPr lang="en-US" dirty="0"/>
+              <a:t>Initially targeted for developers</a:t>
+            </a:r>
           </a:p>
         </p:txBody>
       </p:sp>
     </p:spTree>
     <p:extLst>
       <p:ext uri="{BB962C8B-B14F-4D97-AF65-F5344CB8AC3E}">
-        <p14:creationId xmlns:p14="http://schemas.microsoft.com/office/powerpoint/2010/main" val="1120286917"/>
+        <p14:creationId xmlns:p14="http://schemas.microsoft.com/office/powerpoint/2010/main" val="209280467"/>
       </p:ext>
     </p:extLst>
   </p:cSld>
@@ -8580,10 +8664,38 @@
       </p:grpSpPr>
       <p:sp>
         <p:nvSpPr>
-          <p:cNvPr id="2" name="Text Placeholder 1">
+          <p:cNvPr id="3" name="Title 2">
             <a:extLst>
               <a:ext uri="{FF2B5EF4-FFF2-40B4-BE49-F238E27FC236}">
-                <a16:creationId xmlns:a16="http://schemas.microsoft.com/office/drawing/2014/main" id="{ADB2E00A-906F-6645-9A30-53C6D93DC43C}"/>
+                <a16:creationId xmlns:a16="http://schemas.microsoft.com/office/drawing/2014/main" id="{CFEEEE36-E132-0D40-A4B8-9BDC5C8B6528}"/>
+              </a:ext>
+            </a:extLst>
+          </p:cNvPr>
+          <p:cNvSpPr>
+            <a:spLocks noGrp="1"/>
+          </p:cNvSpPr>
+          <p:nvPr>
+            <p:ph type="title"/>
+          </p:nvPr>
+        </p:nvSpPr>
+        <p:spPr/>
+        <p:txBody>
+          <a:bodyPr/>
+          <a:lstStyle/>
+          <a:p>
+            <a:r>
+              <a:rPr lang="en-US" dirty="0"/>
+              <a:t>Dependencies</a:t>
+            </a:r>
+          </a:p>
+        </p:txBody>
+      </p:sp>
+      <p:sp>
+        <p:nvSpPr>
+          <p:cNvPr id="4" name="Text Placeholder 3">
+            <a:extLst>
+              <a:ext uri="{FF2B5EF4-FFF2-40B4-BE49-F238E27FC236}">
+                <a16:creationId xmlns:a16="http://schemas.microsoft.com/office/drawing/2014/main" id="{C0DB4ECB-A7D5-6B47-8180-75CB3C3DB7DE}"/>
               </a:ext>
             </a:extLst>
           </p:cNvPr>
@@ -8594,44 +8706,95 @@
             <p:ph type="body" idx="1"/>
           </p:nvPr>
         </p:nvSpPr>
-        <p:spPr/>
+        <p:spPr>
+          <a:xfrm>
+            <a:off x="306211" y="774096"/>
+            <a:ext cx="8369400" cy="4147860"/>
+          </a:xfrm>
+        </p:spPr>
         <p:txBody>
           <a:bodyPr/>
           <a:lstStyle/>
           <a:p>
             <a:r>
               <a:rPr lang="en-US" dirty="0"/>
-              <a:t>Doc Squad Focus</a:t>
-            </a:r>
-          </a:p>
-          <a:p>
-            <a:r>
-              <a:rPr lang="en-US" sz="2000" dirty="0"/>
-              <a:t>Ashley</a:t>
-            </a:r>
-            <a:r>
-              <a:rPr lang="zh-CN" altLang="en-US" sz="2000" dirty="0"/>
-              <a:t> </a:t>
-            </a:r>
-            <a:r>
-              <a:rPr lang="en-US" altLang="zh-CN" sz="2000" dirty="0"/>
-              <a:t>Li</a:t>
-            </a:r>
-            <a:r>
-              <a:rPr lang="zh-CN" altLang="en-US" sz="2000" dirty="0"/>
-              <a:t> </a:t>
-            </a:r>
-            <a:r>
-              <a:rPr lang="en-US" sz="2000" dirty="0"/>
-              <a:t>(Squad Lead)</a:t>
-            </a:r>
+              <a:t>Cross squad:</a:t>
+            </a:r>
+          </a:p>
+          <a:p>
+            <a:pPr lvl="1"/>
+            <a:r>
+              <a:rPr lang="en-US" dirty="0"/>
+              <a:t>If we get around to the de-coupling of the existing </a:t>
+            </a:r>
+            <a:r>
+              <a:rPr lang="en-US" dirty="0" err="1"/>
+              <a:t>zowe</a:t>
+            </a:r>
+            <a:r>
+              <a:rPr lang="en-US" dirty="0"/>
+              <a:t> core components, then some assistance in migrating current install scripts out of </a:t>
+            </a:r>
+            <a:r>
+              <a:rPr lang="en-US" dirty="0" err="1"/>
+              <a:t>zowe</a:t>
+            </a:r>
+            <a:r>
+              <a:rPr lang="en-US" dirty="0"/>
+              <a:t>-install-packaging maybe be required</a:t>
+            </a:r>
+          </a:p>
+          <a:p>
+            <a:r>
+              <a:rPr lang="en-US" dirty="0"/>
+              <a:t>Other dependencies:</a:t>
+            </a:r>
+          </a:p>
+          <a:p>
+            <a:pPr lvl="1"/>
+            <a:r>
+              <a:rPr lang="en-US" dirty="0"/>
+              <a:t>Access to extender and installers to validate the design</a:t>
+            </a:r>
+          </a:p>
+          <a:p>
+            <a:pPr lvl="1"/>
+            <a:r>
+              <a:rPr lang="en-US" dirty="0"/>
+              <a:t>Sample spring boot rest </a:t>
+            </a:r>
+            <a:r>
+              <a:rPr lang="en-US" dirty="0" err="1"/>
+              <a:t>api</a:t>
+            </a:r>
+            <a:r>
+              <a:rPr lang="en-US" dirty="0"/>
+              <a:t> and sample node </a:t>
+            </a:r>
+            <a:r>
+              <a:rPr lang="en-US" dirty="0" err="1"/>
+              <a:t>api</a:t>
+            </a:r>
+            <a:r>
+              <a:rPr lang="en-US" dirty="0"/>
+              <a:t> to extend/use as the base for the packaging and deployment samples</a:t>
+            </a:r>
+          </a:p>
+          <a:p>
+            <a:endParaRPr lang="en-US" dirty="0"/>
+          </a:p>
+          <a:p>
+            <a:pPr marL="101600" indent="0">
+              <a:buNone/>
+            </a:pPr>
+            <a:endParaRPr lang="en-US" dirty="0"/>
           </a:p>
         </p:txBody>
       </p:sp>
     </p:spTree>
     <p:extLst>
       <p:ext uri="{BB962C8B-B14F-4D97-AF65-F5344CB8AC3E}">
-        <p14:creationId xmlns:p14="http://schemas.microsoft.com/office/powerpoint/2010/main" val="1157146962"/>
+        <p14:creationId xmlns:p14="http://schemas.microsoft.com/office/powerpoint/2010/main" val="1120286917"/>
       </p:ext>
     </p:extLst>
   </p:cSld>
@@ -8639,7 +8802,7 @@
     <a:masterClrMapping/>
   </p:clrMapOvr>
   <p:transition spd="med">
-    <p:fade/>
+    <p:fade thruBlk="1"/>
   </p:transition>
 </p:sld>
 </file>
@@ -8813,6 +8976,89 @@
       </p:grpSpPr>
       <p:sp>
         <p:nvSpPr>
+          <p:cNvPr id="2" name="Text Placeholder 1">
+            <a:extLst>
+              <a:ext uri="{FF2B5EF4-FFF2-40B4-BE49-F238E27FC236}">
+                <a16:creationId xmlns:a16="http://schemas.microsoft.com/office/drawing/2014/main" id="{ADB2E00A-906F-6645-9A30-53C6D93DC43C}"/>
+              </a:ext>
+            </a:extLst>
+          </p:cNvPr>
+          <p:cNvSpPr>
+            <a:spLocks noGrp="1"/>
+          </p:cNvSpPr>
+          <p:nvPr>
+            <p:ph type="body" idx="1"/>
+          </p:nvPr>
+        </p:nvSpPr>
+        <p:spPr/>
+        <p:txBody>
+          <a:bodyPr/>
+          <a:lstStyle/>
+          <a:p>
+            <a:r>
+              <a:rPr lang="en-US" dirty="0"/>
+              <a:t>Doc Squad Focus</a:t>
+            </a:r>
+          </a:p>
+          <a:p>
+            <a:r>
+              <a:rPr lang="en-US" sz="2000" dirty="0"/>
+              <a:t>Ashley</a:t>
+            </a:r>
+            <a:r>
+              <a:rPr lang="zh-CN" altLang="en-US" sz="2000" dirty="0"/>
+              <a:t> </a:t>
+            </a:r>
+            <a:r>
+              <a:rPr lang="en-US" altLang="zh-CN" sz="2000" dirty="0"/>
+              <a:t>Li</a:t>
+            </a:r>
+            <a:r>
+              <a:rPr lang="zh-CN" altLang="en-US" sz="2000" dirty="0"/>
+              <a:t> </a:t>
+            </a:r>
+            <a:r>
+              <a:rPr lang="en-US" sz="2000" dirty="0"/>
+              <a:t>(Squad Lead)</a:t>
+            </a:r>
+          </a:p>
+        </p:txBody>
+      </p:sp>
+    </p:spTree>
+    <p:extLst>
+      <p:ext uri="{BB962C8B-B14F-4D97-AF65-F5344CB8AC3E}">
+        <p14:creationId xmlns:p14="http://schemas.microsoft.com/office/powerpoint/2010/main" val="1157146962"/>
+      </p:ext>
+    </p:extLst>
+  </p:cSld>
+  <p:clrMapOvr>
+    <a:masterClrMapping/>
+  </p:clrMapOvr>
+  <p:transition spd="med">
+    <p:fade/>
+  </p:transition>
+</p:sld>
+</file>
+
+<file path=ppt/slides/slide31.xml><?xml version="1.0" encoding="utf-8"?>
+<p:sld xmlns:a="http://schemas.openxmlformats.org/drawingml/2006/main" xmlns:r="http://schemas.openxmlformats.org/officeDocument/2006/relationships" xmlns:p="http://schemas.openxmlformats.org/presentationml/2006/main">
+  <p:cSld>
+    <p:spTree>
+      <p:nvGrpSpPr>
+        <p:cNvPr id="1" name=""/>
+        <p:cNvGrpSpPr/>
+        <p:nvPr/>
+      </p:nvGrpSpPr>
+      <p:grpSpPr>
+        <a:xfrm>
+          <a:off x="0" y="0"/>
+          <a:ext cx="0" cy="0"/>
+          <a:chOff x="0" y="0"/>
+          <a:chExt cx="0" cy="0"/>
+        </a:xfrm>
+      </p:grpSpPr>
+      <p:sp>
+        <p:nvSpPr>
           <p:cNvPr id="3" name="Title 2">
             <a:extLst>
               <a:ext uri="{FF2B5EF4-FFF2-40B4-BE49-F238E27FC236}">
@@ -9271,7 +9517,7 @@
 </p:sld>
 </file>
 
-<file path=ppt/slides/slide31.xml><?xml version="1.0" encoding="utf-8"?>
+<file path=ppt/slides/slide32.xml><?xml version="1.0" encoding="utf-8"?>
 <p:sld xmlns:a="http://schemas.openxmlformats.org/drawingml/2006/main" xmlns:r="http://schemas.openxmlformats.org/officeDocument/2006/relationships" xmlns:p="http://schemas.openxmlformats.org/presentationml/2006/main">
   <p:cSld>
     <p:spTree>
@@ -9903,11 +10149,7 @@
             </a:r>
             <a:r>
               <a:rPr lang="en-US" dirty="0" smtClean="0"/>
-              <a:t> users and </a:t>
-            </a:r>
-            <a:r>
-              <a:rPr lang="en-US" dirty="0" smtClean="0"/>
-              <a:t>client </a:t>
+              <a:t> users and client </a:t>
             </a:r>
             <a:r>
               <a:rPr lang="en-US" dirty="0"/>
@@ -9923,11 +10165,7 @@
             </a:r>
             <a:r>
               <a:rPr lang="en-US" dirty="0" smtClean="0"/>
-              <a:t> clients and custom applications) </a:t>
-            </a:r>
-            <a:r>
-              <a:rPr lang="en-US" dirty="0" smtClean="0"/>
-              <a:t>to </a:t>
+              <a:t> clients and custom applications) to </a:t>
             </a:r>
             <a:r>
               <a:rPr lang="en-US" dirty="0"/>
@@ -11080,6 +11318,12 @@
 </file>
 
 <file path=customXml/item1.xml><?xml version="1.0" encoding="utf-8"?>
+<p:properties xmlns:p="http://schemas.microsoft.com/office/2006/metadata/properties" xmlns:xsi="http://www.w3.org/2001/XMLSchema-instance" xmlns:pc="http://schemas.microsoft.com/office/infopath/2007/PartnerControls">
+  <documentManagement/>
+</p:properties>
+</file>
+
+<file path=customXml/item2.xml><?xml version="1.0" encoding="utf-8"?>
 <ct:contentTypeSchema xmlns:ct="http://schemas.microsoft.com/office/2006/metadata/contentType" xmlns:ma="http://schemas.microsoft.com/office/2006/metadata/properties/metaAttributes" ct:_="" ma:_="" ma:contentTypeName="Document" ma:contentTypeID="0x01010078366F8B0CAC4944B54E4FE62E1853FF" ma:contentTypeVersion="13" ma:contentTypeDescription="Create a new document." ma:contentTypeScope="" ma:versionID="c0144efe8435d8d2a41eb877ff779f3d">
   <xsd:schema xmlns:xsd="http://www.w3.org/2001/XMLSchema" xmlns:xs="http://www.w3.org/2001/XMLSchema" xmlns:p="http://schemas.microsoft.com/office/2006/metadata/properties" xmlns:ns3="dc93a766-66e7-40cb-ae91-7d18686f06cb" xmlns:ns4="218ddd80-e909-418b-876b-6da869ab062e" targetNamespace="http://schemas.microsoft.com/office/2006/metadata/properties" ma:root="true" ma:fieldsID="98e515d43d9a7e057d5a8f41d3b12b29" ns3:_="" ns4:_="">
     <xsd:import namespace="dc93a766-66e7-40cb-ae91-7d18686f06cb"/>
@@ -11302,12 +11546,6 @@
 </ct:contentTypeSchema>
 </file>
 
-<file path=customXml/item2.xml><?xml version="1.0" encoding="utf-8"?>
-<p:properties xmlns:p="http://schemas.microsoft.com/office/2006/metadata/properties" xmlns:xsi="http://www.w3.org/2001/XMLSchema-instance" xmlns:pc="http://schemas.microsoft.com/office/infopath/2007/PartnerControls">
-  <documentManagement/>
-</p:properties>
-</file>
-
 <file path=customXml/item3.xml><?xml version="1.0" encoding="utf-8"?>
 <?mso-contentType ?>
 <FormTemplates xmlns="http://schemas.microsoft.com/sharepoint/v3/contenttype/forms">
@@ -11318,6 +11556,23 @@
 </file>
 
 <file path=customXml/itemProps1.xml><?xml version="1.0" encoding="utf-8"?>
+<ds:datastoreItem xmlns:ds="http://schemas.openxmlformats.org/officeDocument/2006/customXml" ds:itemID="{0A54B724-95FE-4227-A509-89C0BE165019}">
+  <ds:schemaRefs>
+    <ds:schemaRef ds:uri="http://purl.org/dc/terms/"/>
+    <ds:schemaRef ds:uri="218ddd80-e909-418b-876b-6da869ab062e"/>
+    <ds:schemaRef ds:uri="http://purl.org/dc/dcmitype/"/>
+    <ds:schemaRef ds:uri="http://schemas.microsoft.com/office/infopath/2007/PartnerControls"/>
+    <ds:schemaRef ds:uri="http://purl.org/dc/elements/1.1/"/>
+    <ds:schemaRef ds:uri="http://schemas.microsoft.com/office/2006/metadata/properties"/>
+    <ds:schemaRef ds:uri="http://schemas.microsoft.com/office/2006/documentManagement/types"/>
+    <ds:schemaRef ds:uri="http://schemas.openxmlformats.org/package/2006/metadata/core-properties"/>
+    <ds:schemaRef ds:uri="dc93a766-66e7-40cb-ae91-7d18686f06cb"/>
+    <ds:schemaRef ds:uri="http://www.w3.org/XML/1998/namespace"/>
+  </ds:schemaRefs>
+</ds:datastoreItem>
+</file>
+
+<file path=customXml/itemProps2.xml><?xml version="1.0" encoding="utf-8"?>
 <ds:datastoreItem xmlns:ds="http://schemas.openxmlformats.org/officeDocument/2006/customXml" ds:itemID="{75DFD259-8AF4-4CFA-9594-D45098FC5839}">
   <ds:schemaRefs>
     <ds:schemaRef ds:uri="http://schemas.microsoft.com/office/2006/metadata/contentType"/>
@@ -11336,23 +11591,6 @@
 </ds:datastoreItem>
 </file>
 
-<file path=customXml/itemProps2.xml><?xml version="1.0" encoding="utf-8"?>
-<ds:datastoreItem xmlns:ds="http://schemas.openxmlformats.org/officeDocument/2006/customXml" ds:itemID="{0A54B724-95FE-4227-A509-89C0BE165019}">
-  <ds:schemaRefs>
-    <ds:schemaRef ds:uri="http://purl.org/dc/terms/"/>
-    <ds:schemaRef ds:uri="218ddd80-e909-418b-876b-6da869ab062e"/>
-    <ds:schemaRef ds:uri="http://purl.org/dc/dcmitype/"/>
-    <ds:schemaRef ds:uri="http://schemas.microsoft.com/office/infopath/2007/PartnerControls"/>
-    <ds:schemaRef ds:uri="http://purl.org/dc/elements/1.1/"/>
-    <ds:schemaRef ds:uri="http://schemas.microsoft.com/office/2006/metadata/properties"/>
-    <ds:schemaRef ds:uri="http://schemas.microsoft.com/office/2006/documentManagement/types"/>
-    <ds:schemaRef ds:uri="http://schemas.openxmlformats.org/package/2006/metadata/core-properties"/>
-    <ds:schemaRef ds:uri="dc93a766-66e7-40cb-ae91-7d18686f06cb"/>
-    <ds:schemaRef ds:uri="http://www.w3.org/XML/1998/namespace"/>
-  </ds:schemaRefs>
-</ds:datastoreItem>
-</file>
-
 <file path=customXml/itemProps3.xml><?xml version="1.0" encoding="utf-8"?>
 <ds:datastoreItem xmlns:ds="http://schemas.openxmlformats.org/officeDocument/2006/customXml" ds:itemID="{B16FB3BA-9F7C-4CD8-B3AB-262CEFAAFDB4}">
   <ds:schemaRefs>

</xml_diff>

<commit_message>
update performance test case 2
Signed-off-by: Jack (T.) Jia <jack-tiefeng.jia@ibm.com>
</commit_message>
<xml_diff>
--- a/Project Management/20PI3 Planning/Zowe Community Squad Focus for 20PI3.pptx
+++ b/Project Management/20PI3 Planning/Zowe Community Squad Focus for 20PI3.pptx
@@ -8841,19 +8841,29 @@
             </a:pPr>
             <a:r>
               <a:rPr lang="en-US" dirty="0"/>
-              <a:t>As a z/OS system programmer, with our designed work load (concurrent user and use scenario), I would like to know</a:t>
-            </a:r>
-          </a:p>
-          <a:p>
-            <a:r>
-              <a:rPr lang="en-US" dirty="0"/>
-              <a:t>how to optimize z/OS environment for better performance,</a:t>
-            </a:r>
-          </a:p>
-          <a:p>
-            <a:r>
-              <a:rPr lang="en-US" dirty="0"/>
-              <a:t>how much cost (CPU time) I may expect which can share with management team.</a:t>
+              <a:t>As a z/OS system programmer, I would like to be able to estimate the cost of running </a:t>
+            </a:r>
+            <a:r>
+              <a:rPr lang="en-US" dirty="0" err="1"/>
+              <a:t>Zowe</a:t>
+            </a:r>
+            <a:r>
+              <a:rPr lang="en-US" dirty="0"/>
+              <a:t>, and fine tune my </a:t>
+            </a:r>
+            <a:r>
+              <a:rPr lang="en-US" dirty="0" err="1"/>
+              <a:t>Zowe</a:t>
+            </a:r>
+            <a:r>
+              <a:rPr lang="en-US" dirty="0"/>
+              <a:t> performance based on my estimated workload.</a:t>
+            </a:r>
+          </a:p>
+          <a:p>
+            <a:r>
+              <a:rPr lang="en-US" dirty="0"/>
+              <a:t>Estimated workload at first refers to concurrent user count.</a:t>
             </a:r>
           </a:p>
           <a:p>
@@ -8872,6 +8882,13 @@
             </a:r>
           </a:p>
           <a:p>
+            <a:r>
+              <a:rPr lang="en-US" dirty="0"/>
+              <a:t>Deliver a tool users can run to provide them with a performance and cost estimation report.</a:t>
+            </a:r>
+          </a:p>
+          <a:p>
+            <a:pPr lvl="1"/>
             <a:r>
               <a:rPr lang="en-US" dirty="0"/>
               <a:t>Provide a way to aggregate accurate z/OS resource for </a:t>
@@ -11959,6 +11976,15 @@
 </file>
 
 <file path=customXml/item1.xml><?xml version="1.0" encoding="utf-8"?>
+<?mso-contentType ?>
+<FormTemplates xmlns="http://schemas.microsoft.com/sharepoint/v3/contenttype/forms">
+  <Display>DocumentLibraryForm</Display>
+  <Edit>DocumentLibraryForm</Edit>
+  <New>DocumentLibraryForm</New>
+</FormTemplates>
+</file>
+
+<file path=customXml/item2.xml><?xml version="1.0" encoding="utf-8"?>
 <ct:contentTypeSchema xmlns:ct="http://schemas.microsoft.com/office/2006/metadata/contentType" xmlns:ma="http://schemas.microsoft.com/office/2006/metadata/properties/metaAttributes" ct:_="" ma:_="" ma:contentTypeName="Document" ma:contentTypeID="0x01010078366F8B0CAC4944B54E4FE62E1853FF" ma:contentTypeVersion="13" ma:contentTypeDescription="Create a new document." ma:contentTypeScope="" ma:versionID="c0144efe8435d8d2a41eb877ff779f3d">
   <xsd:schema xmlns:xsd="http://www.w3.org/2001/XMLSchema" xmlns:xs="http://www.w3.org/2001/XMLSchema" xmlns:p="http://schemas.microsoft.com/office/2006/metadata/properties" xmlns:ns3="dc93a766-66e7-40cb-ae91-7d18686f06cb" xmlns:ns4="218ddd80-e909-418b-876b-6da869ab062e" targetNamespace="http://schemas.microsoft.com/office/2006/metadata/properties" ma:root="true" ma:fieldsID="98e515d43d9a7e057d5a8f41d3b12b29" ns3:_="" ns4:_="">
     <xsd:import namespace="dc93a766-66e7-40cb-ae91-7d18686f06cb"/>
@@ -12181,22 +12207,21 @@
 </ct:contentTypeSchema>
 </file>
 
-<file path=customXml/item2.xml><?xml version="1.0" encoding="utf-8"?>
+<file path=customXml/item3.xml><?xml version="1.0" encoding="utf-8"?>
 <p:properties xmlns:p="http://schemas.microsoft.com/office/2006/metadata/properties" xmlns:xsi="http://www.w3.org/2001/XMLSchema-instance" xmlns:pc="http://schemas.microsoft.com/office/infopath/2007/PartnerControls">
   <documentManagement/>
 </p:properties>
 </file>
 
-<file path=customXml/item3.xml><?xml version="1.0" encoding="utf-8"?>
-<?mso-contentType ?>
-<FormTemplates xmlns="http://schemas.microsoft.com/sharepoint/v3/contenttype/forms">
-  <Display>DocumentLibraryForm</Display>
-  <Edit>DocumentLibraryForm</Edit>
-  <New>DocumentLibraryForm</New>
-</FormTemplates>
+<file path=customXml/itemProps1.xml><?xml version="1.0" encoding="utf-8"?>
+<ds:datastoreItem xmlns:ds="http://schemas.openxmlformats.org/officeDocument/2006/customXml" ds:itemID="{B16FB3BA-9F7C-4CD8-B3AB-262CEFAAFDB4}">
+  <ds:schemaRefs>
+    <ds:schemaRef ds:uri="http://schemas.microsoft.com/sharepoint/v3/contenttype/forms"/>
+  </ds:schemaRefs>
+</ds:datastoreItem>
 </file>
 
-<file path=customXml/itemProps1.xml><?xml version="1.0" encoding="utf-8"?>
+<file path=customXml/itemProps2.xml><?xml version="1.0" encoding="utf-8"?>
 <ds:datastoreItem xmlns:ds="http://schemas.openxmlformats.org/officeDocument/2006/customXml" ds:itemID="{75DFD259-8AF4-4CFA-9594-D45098FC5839}">
   <ds:schemaRefs>
     <ds:schemaRef ds:uri="http://schemas.microsoft.com/office/2006/metadata/contentType"/>
@@ -12215,7 +12240,7 @@
 </ds:datastoreItem>
 </file>
 
-<file path=customXml/itemProps2.xml><?xml version="1.0" encoding="utf-8"?>
+<file path=customXml/itemProps3.xml><?xml version="1.0" encoding="utf-8"?>
 <ds:datastoreItem xmlns:ds="http://schemas.openxmlformats.org/officeDocument/2006/customXml" ds:itemID="{0A54B724-95FE-4227-A509-89C0BE165019}">
   <ds:schemaRefs>
     <ds:schemaRef ds:uri="http://purl.org/dc/terms/"/>
@@ -12230,12 +12255,4 @@
     <ds:schemaRef ds:uri="http://www.w3.org/XML/1998/namespace"/>
   </ds:schemaRefs>
 </ds:datastoreItem>
-</file>
-
-<file path=customXml/itemProps3.xml><?xml version="1.0" encoding="utf-8"?>
-<ds:datastoreItem xmlns:ds="http://schemas.openxmlformats.org/officeDocument/2006/customXml" ds:itemID="{B16FB3BA-9F7C-4CD8-B3AB-262CEFAAFDB4}">
-  <ds:schemaRefs>
-    <ds:schemaRef ds:uri="http://schemas.microsoft.com/sharepoint/v3/contenttype/forms"/>
-  </ds:schemaRefs>
-</ds:datastoreItem>
 </file>
</xml_diff>